<commit_message>
Added days between completion and deadline indicator
</commit_message>
<xml_diff>
--- a/PromoManager.pptx
+++ b/PromoManager.pptx
@@ -247,7 +247,7 @@
             <a:spLocks noGrp="1" noChangeArrowheads="1"/>
             <a:extLst>
               <a:ext uri="smNativeData">
-                <pr:smNativeData xmlns:pr="smNativeData" val="SMDATA_13_qYmVXhMAAAAlAAAAZAAAAA8BAAAAkAAAAEgAAACQAAAASAAAAAAAAAABAAAAAAAAAAEAAABQAAAAAAAAAAAA4D8AAAAAAADgPwAAAAAAAOA/AAAAAAAA4D8AAAAAAADgPwAAAAAAAOA/AAAAAAAA4D8AAAAAAADgPwAAAAAAAOA/AAAAAAAA4D8CAAAAjAAAAAEAAAAAAAAA////CP///wgAAAAAAAAAAAAAAAAAAAAAAAAAAAAAAAAAAAAAZAAAAAEAAABAAAAAAAAAAAAAAAAAAAAAAAAAAAAAAAAAAAAAAAAAAAAAAAAAAAAAAAAAAAAAAAAAAAAAAAAAAAAAAAAAAAAAAAAAAAAAAAAAAAAAAAAAAAAAAAAAAAAAFAAAADwAAAABAAAAAAAAAAAAAAkoAAAAAQAAABQAAAAUAAAAFAAAAAEAAAAAAAAAZAAAAGQAAAAAAAAAZAAAAGQAAAAVAAAAYAAAAAAAAAAAAAAADwAAACADAAAAAAAAAAAAAAEAAACgMgAAVgcAAKr4//8BAAAAf39/AAEAAABkAAAAAAAAABQAAABAHwAAAAAAACYAAAAAAAAAwOD//wAAAAAmAAAAZAAAABYAAABMAAAAAAAAAAAAAAAEAAAAAAAAAAEAAADy8vIKAAAAACgAAAAoAAAAZAAAAGQAAAAAAAAAzMzMAAAAAABQAAAAUAAAAGQAAABkAAAAAAAAABcAAAAUAAAAAAAAAAAAAAD/fwAA/38AAAAAAAAJAAAABAAAAAAAAAAMAAAAEAAAAAAAAAAAAAAAAAAAAAAAAAAeAAAAaAAAAAAAAAAAAAAAAAAAAAAAAAAAAAAAECcAABAnAAAAAAAAAAAAAAAAAAAAAAAAAAAAAAAAAAAAAAAAAAAAABQAAAAAAAAAwMD/AAAAAABkAAAAMgAAAAAAAABkAAAAAAAAAH9/fwAKAAAAHwAAAFQAAAD///8B////AQAAAAAAAAAAAAAAAAAAAAAAAAAAAAAAAAAAAAAAAAAAAAAAAn9/fwDy8vIDzMzMAMDA/wB/f38AAAAAAAAAAAAAAAAAAAAAAAAAAAAhAAAAGAAAABQAAADbCQAArw4AAC1BAADOGAAAEAAAACYAAAAIAAAAAYAAAAAAAAA="/>
+                <pr:smNativeData xmlns:pr="smNativeData" val="SMDATA_13_TQCXXhMAAAAlAAAAZAAAAA8BAAAAkAAAAEgAAACQAAAASAAAAAAAAAABAAAAAAAAAAEAAABQAAAAAAAAAAAA4D8AAAAAAADgPwAAAAAAAOA/AAAAAAAA4D8AAAAAAADgPwAAAAAAAOA/AAAAAAAA4D8AAAAAAADgPwAAAAAAAOA/AAAAAAAA4D8CAAAAjAAAAAEAAAAAAAAA////CP///wgAAAAAAAAAAAAAAAAAAAAAAAAAAAAAAAAAAAAAZAAAAAEAAABAAAAAAAAAAAAAAAAAAAAAAAAAAAAAAAAAAAAAAAAAAAAAAAAAAAAAAAAAAAAAAAAAAAAAAAAAAAAAAAAAAAAAAAAAAAAAAAAAAAAAAAAAAAAAAAAAAAAAFAAAADwAAAABAAAAAAAAAAAAAAkoAAAAAQAAABQAAAAUAAAAFAAAAAEAAAAAAAAAZAAAAGQAAAAAAAAAZAAAAGQAAAAVAAAAYAAAAAAAAAAAAAAADwAAACADAAAAAAAAAAAAAAEAAACgMgAAVgcAAKr4//8BAAAAf39/AAEAAABkAAAAAAAAABQAAABAHwAAAAAAACYAAAAAAAAAwOD//wAAAAAmAAAAZAAAABYAAABMAAAAAAAAAAAAAAAEAAAAAAAAAAEAAADy8vIKAAAAACgAAAAoAAAAZAAAAGQAAAAAAAAAzMzMAAAAAABQAAAAUAAAAGQAAABkAAAAAAAAABcAAAAUAAAAAAAAAAAAAAD/fwAA/38AAAAAAAAJAAAABAAAAAAAAAAMAAAAEAAAAAAAAAAAAAAAAAAAAAAAAAAeAAAAaAAAAAAAAAAAAAAAAAAAAAAAAAAAAAAAECcAABAnAAAAAAAAAAAAAAAAAAAAAAAAAAAAAAAAAAAAAAAAAAAAABQAAAAAAAAAwMD/AAAAAABkAAAAMgAAAAAAAABkAAAAAAAAAH9/fwAKAAAAHwAAAFQAAAD///8B////AQAAAAAAAAAAAAAAAAAAAAAAAAAAAAAAAAAAAAAAAAAAAAAAAn9/fwDy8vIDzMzMAMDA/wB/f38AAAAAAAAAAAAAAAAAAAAAAAAAAAAhAAAAGAAAABQAAADbCQAArw4AAC1BAADOGAAAEAAAACYAAAAIAAAAAYAAAAAAAAA="/>
               </a:ext>
             </a:extLst>
           </p:cNvSpPr>
@@ -285,7 +285,7 @@
             <a:spLocks noGrp="1" noChangeArrowheads="1"/>
             <a:extLst>
               <a:ext uri="smNativeData">
-                <pr:smNativeData xmlns:pr="smNativeData" val="SMDATA_13_qYmVXhMAAAAlAAAAZAAAAA8BAAAAkAAAAEgAAACQAAAASAAAAAAAAAAAAAAAAAAAAAEAAABQAAAAAAAAAAAA4D8AAAAAAADgPwAAAAAAAOA/AAAAAAAA4D8AAAAAAADgPwAAAAAAAOA/AAAAAAAA4D8AAAAAAADgPwAAAAAAAOA/AAAAAAAA4D8CAAAAjAAAAAAAAAAAAAAAg8C6DP///wgAAAAAAAAAAAAAAAAAAAAAAAAAAAAAAAAAAAAAZAAAAAEAAABAAAAAAAAAAAAAAAAAAAAAAAAAAAAAAAAAAAAAAAAAAAAAAAAAAAAAAAAAAAAAAAAAAAAAAAAAAAAAAAAAAAAAAAAAAAAAAAAAAAAAAAAAAAAAAAAAAAAAFAAAADwAAAAAAAAAAAAAAAAAAAkUAAAAAQAAABQAAAAUAAAAFAAAAAEAAAAAAAAAZAAAAGQAAAAAAAAAZAAAAGQAAAAVAAAAYAAAAAAAAAAAAAAADwAAACADAAAAAAAAAAAAAAEAAACgMgAAVgcAAKr4//8BAAAAf39/AAEAAABkAAAAAAAAABQAAABAHwAAAAAAACYAAAAAAAAAwOD//wAAAAAmAAAAZAAAABYAAABMAAAAAAAAAAAAAAAEAAAAAAAAAAEAAADy8vIKAAAAACgAAAAoAAAAZAAAAGQAAAAAAAAAzMzMAAAAAABQAAAAUAAAAGQAAABkAAAAAAAAABcAAAAUAAAAAAAAAAAAAAD/fwAA/38AAAAAAAAJAAAABAAAANGAANAMAAAAEAAAAAAAAAAAAAAAAAAAAAAAAAAeAAAAaAAAAAAAAAAAAAAAAAAAAAAAAAAAAAAAECcAABAnAAAAAAAAAAAAAAAAAAAAAAAAAAAAAAAAAAAAAAAAAAAAABQAAAAAAAAAwMD/AAAAAABkAAAAMgAAAAAAAABkAAAAAAAAAH9/fwAKAAAAHwAAAFQAAACDwLoF////AQAAAAAAAAAAAAAAAAAAAAAAAAAAAAAAAAAAAAAAAAAAAAAAAn9/fwDy8vIDzMzMAMDA/wB/f38AAAAAAAAAAAAAAAAAAAAAAAAAAAAhAAAAGAAAABQAAACWEAAAxhoAAGs6AABkIgAAEAAAACYAAAAIAAAAAYAAAAAAAAA="/>
+                <pr:smNativeData xmlns:pr="smNativeData" val="SMDATA_13_TQCXXhMAAAAlAAAAZAAAAA8BAAAAkAAAAEgAAACQAAAASAAAAAAAAAAAAAAAAAAAAAEAAABQAAAAAAAAAAAA4D8AAAAAAADgPwAAAAAAAOA/AAAAAAAA4D8AAAAAAADgPwAAAAAAAOA/AAAAAAAA4D8AAAAAAADgPwAAAAAAAOA/AAAAAAAA4D8CAAAAjAAAAAAAAAAAAAAAg8C6DP///wgAAAAAAAAAAAAAAAAAAAAAAAAAAAAAAAAAAAAAZAAAAAEAAABAAAAAAAAAAAAAAAAAAAAAAAAAAAAAAAAAAAAAAAAAAAAAAAAAAAAAAAAAAAAAAAAAAAAAAAAAAAAAAAAAAAAAAAAAAAAAAAAAAAAAAAAAAAAAAAAAAAAAFAAAADwAAAAAAAAAAAAAAAAAAAkUAAAAAQAAABQAAAAUAAAAFAAAAAEAAAAAAAAAZAAAAGQAAAAAAAAAZAAAAGQAAAAVAAAAYAAAAAAAAAAAAAAADwAAACADAAAAAAAAAAAAAAEAAACgMgAAVgcAAKr4//8BAAAAf39/AAEAAABkAAAAAAAAABQAAABAHwAAAAAAACYAAAAAAAAAwOD//wAAAAAmAAAAZAAAABYAAABMAAAAAAAAAAAAAAAEAAAAAAAAAAEAAADy8vIKAAAAACgAAAAoAAAAZAAAAGQAAAAAAAAAzMzMAAAAAABQAAAAUAAAAGQAAABkAAAAAAAAABcAAAAUAAAAAAAAAAAAAAD/fwAA/38AAAAAAAAJAAAABAAAANGAANAMAAAAEAAAAAAAAAAAAAAAAAAAAAAAAAAeAAAAaAAAAAAAAAAAAAAAAAAAAAAAAAAAAAAAECcAABAnAAAAAAAAAAAAAAAAAAAAAAAAAAAAAAAAAAAAAAAAAAAAABQAAAAAAAAAwMD/AAAAAABkAAAAMgAAAAAAAABkAAAAAAAAAH9/fwAKAAAAHwAAAFQAAACDwLoF////AQAAAAAAAAAAAAAAAAAAAAAAAAAAAAAAAAAAAAAAAAAAAAAAAn9/fwDy8vIDzMzMAMDA/wB/f38AAAAAAAAAAAAAAAAAAAAAAAAAAAAhAAAAGAAAABQAAACWEAAAxhoAAGs6AABkIgAAEAAAACYAAAAIAAAAAYAAAAAAAAA="/>
               </a:ext>
             </a:extLst>
           </p:cNvSpPr>
@@ -350,7 +350,7 @@
             <a:spLocks noGrp="1" noChangeArrowheads="1"/>
             <a:extLst>
               <a:ext uri="smNativeData">
-                <pr:smNativeData xmlns:pr="smNativeData" val="SMDATA_13_qYmVXhMAAAAlAAAAZAAAAA8BAAAAkAAAAEgAAACQAAAASAAAAAAAAAAAAAAAAAAAAAEAAABQAAAAAAAAAAAA4D8AAAAAAADgPwAAAAAAAOA/AAAAAAAA4D8AAAAAAADgPwAAAAAAAOA/AAAAAAAA4D8AAAAAAADgPwAAAAAAAOA/AAAAAAAA4D8CAAAAjAAAAAAAAAAAAAAAg8C6DP///wgAAAAAAAAAAAAAAAAAAAAAAAAAAAAAAAAAAAAAZAAAAAEAAABAAAAAAAAAAAAAAAAAAAAAAAAAAAAAAAAAAAAAAAAAAAAAAAAAAAAAAAAAAAAAAAAAAAAAAAAAAAAAAAAAAAAAAAAAAAAAAAAAAAAAAAAAAAAAAAAAAAAAFAAAADwAAAAAAAAAAAAAAAAAAAkUAAAAAQAAABQAAAAUAAAAFAAAAAEAAAAAAAAAZAAAAGQAAAAAAAAAZAAAAGQAAAAVAAAAYAAAAAAAAAAAAAAADwAAACADAAAAAAAAAAAAAAEAAACgMgAAVgcAAKr4//8BAAAAf39/AAEAAABkAAAAAAAAABQAAABAHwAAAAAAACYAAAAAAAAAwOD//wAAAAAmAAAAZAAAABYAAABMAAAAAAAAAAAAAAAEAAAAAAAAAAEAAADy8vIKAAAAACgAAAAoAAAAZAAAAGQAAAAAAAAAzMzMAAAAAABQAAAAUAAAAGQAAABkAAAAAAAAABcAAAAUAAAAAAAAAAAAAAD/fwAA/38AAAAAAAAJAAAABAAAAGVlZWUMAAAAEAAAAAAAAAAAAAAAAAAAAAAAAAAeAAAAaAAAAAAAAAAAAAAAAAAAAAAAAAAAAAAAECcAABAnAAAAAAAAAAAAAAAAAAAAAAAAAAAAAAAAAAAAAAAAAAAAABQAAAAAAAAAwMD/AAAAAABkAAAAMgAAAAAAAABkAAAAAAAAAH9/fwAKAAAAHwAAAFQAAACDwLoF////AQAAAAAAAAAAAAAAAAAAAAAAAAAAAAAAAAAAAAAAAAAAAAAAAn9/fwDy8vIDzMzMAMDA/wB/f38AAAAAAAAAAAAAAAAAAAAAAAAAAAAhAAAAGAAAABQAAAAfMAAAYiYAABBBAABgKAAAEAAAACYAAAAIAAAAAIAAAAAAAAA="/>
+                <pr:smNativeData xmlns:pr="smNativeData" val="SMDATA_13_TQCXXhMAAAAlAAAAZAAAAA8BAAAAkAAAAEgAAACQAAAASAAAAAAAAAAAAAAAAAAAAAEAAABQAAAAAAAAAAAA4D8AAAAAAADgPwAAAAAAAOA/AAAAAAAA4D8AAAAAAADgPwAAAAAAAOA/AAAAAAAA4D8AAAAAAADgPwAAAAAAAOA/AAAAAAAA4D8CAAAAjAAAAAAAAAAAAAAAg8C6DP///wgAAAAAAAAAAAAAAAAAAAAAAAAAAAAAAAAAAAAAZAAAAAEAAABAAAAAAAAAAAAAAAAAAAAAAAAAAAAAAAAAAAAAAAAAAAAAAAAAAAAAAAAAAAAAAAAAAAAAAAAAAAAAAAAAAAAAAAAAAAAAAAAAAAAAAAAAAAAAAAAAAAAAFAAAADwAAAAAAAAAAAAAAAAAAAkUAAAAAQAAABQAAAAUAAAAFAAAAAEAAAAAAAAAZAAAAGQAAAAAAAAAZAAAAGQAAAAVAAAAYAAAAAAAAAAAAAAADwAAACADAAAAAAAAAAAAAAEAAACgMgAAVgcAAKr4//8BAAAAf39/AAEAAABkAAAAAAAAABQAAABAHwAAAAAAACYAAAAAAAAAwOD//wAAAAAmAAAAZAAAABYAAABMAAAAAAAAAAAAAAAEAAAAAAAAAAEAAADy8vIKAAAAACgAAAAoAAAAZAAAAGQAAAAAAAAAzMzMAAAAAABQAAAAUAAAAGQAAABkAAAAAAAAABcAAAAUAAAAAAAAAAAAAAD/fwAA/38AAAAAAAAJAAAABAAAAGVlZWUMAAAAEAAAAAAAAAAAAAAAAAAAAAAAAAAeAAAAaAAAAAAAAAAAAAAAAAAAAAAAAAAAAAAAECcAABAnAAAAAAAAAAAAAAAAAAAAAAAAAAAAAAAAAAAAAAAAAAAAABQAAAAAAAAAwMD/AAAAAABkAAAAMgAAAAAAAABkAAAAAAAAAH9/fwAKAAAAHwAAAFQAAACDwLoF////AQAAAAAAAAAAAAAAAAAAAAAAAAAAAAAAAAAAAAAAAAAAAAAAAn9/fwDy8vIDzMzMAMDA/wB/f38AAAAAAAAAAAAAAAAAAAAAAAAAAAAhAAAAGAAAABQAAAAfMAAAYiYAABBBAABgKAAAEAAAACYAAAAIAAAAAIAAAAAAAAA="/>
               </a:ext>
             </a:extLst>
           </p:cNvSpPr>
@@ -372,8 +372,8 @@
           </a:lstStyle>
           <a:p>
             <a:pPr/>
-            <a:fld id="{1D72A94E-00F0-275F-BECA-F60AE78448A3}" type="datetime1">
-              <a:t>{Date/Time}</a:t>
+            <a:fld id="{6F9569EF-A182-C09F-CC2D-57CA27633A02}" type="datetime1">
+              <a:t/>
             </a:fld>
           </a:p>
         </p:txBody>
@@ -385,7 +385,7 @@
             <a:spLocks noGrp="1" noChangeArrowheads="1"/>
             <a:extLst>
               <a:ext uri="smNativeData">
-                <pr:smNativeData xmlns:pr="smNativeData" val="SMDATA_13_qYmVXhMAAAAlAAAAZAAAAA8BAAAAkAAAAEgAAACQAAAASAAAAAAAAAAAAAAAAAAAAAEAAABQAAAAAAAAAAAA4D8AAAAAAADgPwAAAAAAAOA/AAAAAAAA4D8AAAAAAADgPwAAAAAAAOA/AAAAAAAA4D8AAAAAAADgPwAAAAAAAOA/AAAAAAAA4D8CAAAAjAAAAAAAAAAAAAAAg8C6DP///wgAAAAAAAAAAAAAAAAAAAAAAAAAAAAAAAAAAAAAZAAAAAEAAABAAAAAAAAAAAAAAAAAAAAAAAAAAAAAAAAAAAAAAAAAAAAAAAAAAAAAAAAAAAAAAAAAAAAAAAAAAAAAAAAAAAAAAAAAAAAAAAAAAAAAAAAAAAAAAAAAAAAAFAAAADwAAAAAAAAAAAAAAAAAAAkUAAAAAQAAABQAAAAUAAAAFAAAAAEAAAAAAAAAZAAAAGQAAAAAAAAAZAAAAGQAAAAVAAAAYAAAAAAAAAAAAAAADwAAACADAAAAAAAAAAAAAAEAAACgMgAAVgcAAKr4//8BAAAAf39/AAEAAABkAAAAAAAAABQAAABAHwAAAAAAACYAAAAAAAAAwOD//wAAAAAmAAAAZAAAABYAAABMAAAAAAAAAAAAAAAEAAAAAAAAAAEAAADy8vIKAAAAACgAAAAoAAAAZAAAAGQAAAAAAAAAzMzMAAAAAABQAAAAUAAAAGQAAABkAAAAAAAAABcAAAAUAAAAAAAAAAAAAAD/fwAA/38AAAAAAAAJAAAABAAAAAAAAAAMAAAAEAAAAAAAAAAAAAAAAAAAAAAAAAAeAAAAaAAAAAAAAAAAAAAAAAAAAAAAAAAAAAAAECcAABAnAAAAAAAAAAAAAAAAAAAAAAAAAAAAAAAAAAAAAAAAAAAAABQAAAAAAAAAwMD/AAAAAABkAAAAMgAAAAAAAABkAAAAAAAAAH9/fwAKAAAAHwAAAFQAAACDwLoF////AQAAAAAAAAAAAAAAAAAAAAAAAAAAAAAAAAAAAAAAAAAAAAAAAn9/fwDy8vIDzMzMAMDA/wB/f38AAAAAAAAAAAAAAAAAAAAAAAAAAAAhAAAAGAAAABQAAADcCQAAXCYAACguAABVKAAAEAAAACYAAAAIAAAAAIAAAAAAAAA="/>
+                <pr:smNativeData xmlns:pr="smNativeData" val="SMDATA_13_TQCXXhMAAAAlAAAAZAAAAA8BAAAAkAAAAEgAAACQAAAASAAAAAAAAAAAAAAAAAAAAAEAAABQAAAAAAAAAAAA4D8AAAAAAADgPwAAAAAAAOA/AAAAAAAA4D8AAAAAAADgPwAAAAAAAOA/AAAAAAAA4D8AAAAAAADgPwAAAAAAAOA/AAAAAAAA4D8CAAAAjAAAAAAAAAAAAAAAg8C6DP///wgAAAAAAAAAAAAAAAAAAAAAAAAAAAAAAAAAAAAAZAAAAAEAAABAAAAAAAAAAAAAAAAAAAAAAAAAAAAAAAAAAAAAAAAAAAAAAAAAAAAAAAAAAAAAAAAAAAAAAAAAAAAAAAAAAAAAAAAAAAAAAAAAAAAAAAAAAAAAAAAAAAAAFAAAADwAAAAAAAAAAAAAAAAAAAkUAAAAAQAAABQAAAAUAAAAFAAAAAEAAAAAAAAAZAAAAGQAAAAAAAAAZAAAAGQAAAAVAAAAYAAAAAAAAAAAAAAADwAAACADAAAAAAAAAAAAAAEAAACgMgAAVgcAAKr4//8BAAAAf39/AAEAAABkAAAAAAAAABQAAABAHwAAAAAAACYAAAAAAAAAwOD//wAAAAAmAAAAZAAAABYAAABMAAAAAAAAAAAAAAAEAAAAAAAAAAEAAADy8vIKAAAAACgAAAAoAAAAZAAAAGQAAAAAAAAAzMzMAAAAAABQAAAAUAAAAGQAAABkAAAAAAAAABcAAAAUAAAAAAAAAAAAAAD/fwAA/38AAAAAAAAJAAAABAAAAAAAAAAMAAAAEAAAAAAAAAAAAAAAAAAAAAAAAAAeAAAAaAAAAAAAAAAAAAAAAAAAAAAAAAAAAAAAECcAABAnAAAAAAAAAAAAAAAAAAAAAAAAAAAAAAAAAAAAAAAAAAAAABQAAAAAAAAAwMD/AAAAAABkAAAAMgAAAAAAAABkAAAAAAAAAH9/fwAKAAAAHwAAAFQAAACDwLoF////AQAAAAAAAAAAAAAAAAAAAAAAAAAAAAAAAAAAAAAAAAAAAAAAAn9/fwDy8vIDzMzMAMDA/wB/f38AAAAAAAAAAAAAAAAAAAAAAAAAAAAhAAAAGAAAABQAAADcCQAAXCYAACguAABVKAAAEAAAACYAAAAIAAAAAIAAAAAAAAA="/>
               </a:ext>
             </a:extLst>
           </p:cNvSpPr>
@@ -420,7 +420,7 @@
             <a:spLocks noGrp="1" noChangeArrowheads="1"/>
             <a:extLst>
               <a:ext uri="smNativeData">
-                <pr:smNativeData xmlns:pr="smNativeData" val="SMDATA_13_qYmVXhMAAAAlAAAAZAAAAA8BAAAAkAAAAEgAAACQAAAASAAAAAAAAAAAAAAAAAAAAAEAAABQAAAAAAAAAAAA4D8AAAAAAADgPwAAAAAAAOA/AAAAAAAA4D8AAAAAAADgPwAAAAAAAOA/AAAAAAAA4D8AAAAAAADgPwAAAAAAAOA/AAAAAAAA4D8CAAAAjAAAAAEAAAAAAAAAUXdz3P///wgAAAAAAAAAAAAAAAAAAAAAAAAAAAAAAAAAAAAAZAAAAAEAAABAAAAAAAAAAAAAAAAAAAAAAAAAAAAAAAAAAAAAAAAAAAAAAAAAAAAAAAAAAAAAAAAAAAAAAAAAAAAAAAAAAAAAAAAAAAAAAAAAAAAAAAAAAAAAAAAAAAAAFAAAADwAAAAAAAAAAAAAAAAAAAkUAAAAAQAAABQAAAAUAAAAFAAAAAEAAAAAAAAAZAAAAGQAAAAAAAAAZAAAAGQAAAAVAAAAYAAAAAAAAAAAAAAADwAAACADAAAAAAAAAAAAAAEAAACgMgAAVgcAAKr4//8BAAAAf39/AAEAAABkAAAAAAAAABQAAABAHwAAAAAAACYAAAAAAAAAwOD//wAAAAAmAAAAZAAAABYAAABMAAAAAAAAAAAAAAAEAAAAAAAAAAEAAADy8vIKAAAAACgAAAAoAAAAZAAAAGQAAAAAAAAAzMzMAAAAAABQAAAAUAAAAGQAAABkAAAAAAAAABcAAAAUAAAAAAAAAAAAAAD/fwAA/38AAAAAAAAJAAAABAAAAHJhawAMAAAAEAAAAAAAAAAAAAAAAAAAAAAAAAAeAAAAaAAAAAAAAAAAAAAAAAAAAAAAAAAAAAAAECcAABAnAAAAAAAAAAAAAAAAAAAAAAAAAAAAAAAAAAAAAAAAAAAAABQAAAAAAAAAwMD/AAAAAABkAAAAMgAAAAAAAABkAAAAAAAAAH9/fwAKAAAAHwAAAFQAAABRd3O1////AQAAAAAAAAAAAAAAAAAAAAAAAAAAAAAAAAAAAAAAAAAAAAAAAn9/fwDy8vIDzMzMAMDA/wB/f38AAAAAAAAAAAAAAAAAAAAAAAAAAAAhAAAAGAAAABQAAAAyQgAAYiYAAHdEAAAwKgAAEAAAACYAAAAIAAAAAAAAAAQAAAA="/>
+                <pr:smNativeData xmlns:pr="smNativeData" val="SMDATA_13_TQCXXhMAAAAlAAAAZAAAAA8BAAAAkAAAAEgAAACQAAAASAAAAAAAAAAAAAAAAAAAAAEAAABQAAAAAAAAAAAA4D8AAAAAAADgPwAAAAAAAOA/AAAAAAAA4D8AAAAAAADgPwAAAAAAAOA/AAAAAAAA4D8AAAAAAADgPwAAAAAAAOA/AAAAAAAA4D8CAAAAjAAAAAEAAAAAAAAAUXdz3P///wgAAAAAAAAAAAAAAAAAAAAAAAAAAAAAAAAAAAAAZAAAAAEAAABAAAAAAAAAAAAAAAAAAAAAAAAAAAAAAAAAAAAAAAAAAAAAAAAAAAAAAAAAAAAAAAAAAAAAAAAAAAAAAAAAAAAAAAAAAAAAAAAAAAAAAAAAAAAAAAAAAAAAFAAAADwAAAAAAAAAAAAAAAAAAAkUAAAAAQAAABQAAAAUAAAAFAAAAAEAAAAAAAAAZAAAAGQAAAAAAAAAZAAAAGQAAAAVAAAAYAAAAAAAAAAAAAAADwAAACADAAAAAAAAAAAAAAEAAACgMgAAVgcAAKr4//8BAAAAf39/AAEAAABkAAAAAAAAABQAAABAHwAAAAAAACYAAAAAAAAAwOD//wAAAAAmAAAAZAAAABYAAABMAAAAAAAAAAAAAAAEAAAAAAAAAAEAAADy8vIKAAAAACgAAAAoAAAAZAAAAGQAAAAAAAAAzMzMAAAAAABQAAAAUAAAAGQAAABkAAAAAAAAABcAAAAUAAAAAAAAAAAAAAD/fwAA/38AAAAAAAAJAAAABAAAAHJhawAMAAAAEAAAAAAAAAAAAAAAAAAAAAAAAAAeAAAAaAAAAAAAAAAAAAAAAAAAAAAAAAAAAAAAECcAABAnAAAAAAAAAAAAAAAAAAAAAAAAAAAAAAAAAAAAAAAAAAAAABQAAAAAAAAAwMD/AAAAAABkAAAAMgAAAAAAAABkAAAAAAAAAH9/fwAKAAAAHwAAAFQAAABRd3O1////AQAAAAAAAAAAAAAAAAAAAAAAAAAAAAAAAAAAAAAAAAAAAAAAAn9/fwDy8vIDzMzMAMDA/wB/f38AAAAAAAAAAAAAAAAAAAAAAAAAAAAhAAAAGAAAABQAAAAyQgAAYiYAAHdEAAAwKgAAEAAAACYAAAAIAAAAAAAAAAQAAAA="/>
               </a:ext>
             </a:extLst>
           </p:cNvSpPr>
@@ -440,8 +440,8 @@
           <a:lstStyle/>
           <a:p>
             <a:pPr/>
-            <a:fld id="{1CF4B9E7-A9F1-A14F-BF4C-5F1AF702490A}" type="slidenum">
-              <a:t>{Nr.}</a:t>
+            <a:fld id="{1CEEEF7B-35F1-BB19-BF56-C34CA1184996}" type="slidenum">
+              <a:t/>
             </a:fld>
           </a:p>
         </p:txBody>
@@ -478,7 +478,7 @@
             <a:spLocks noGrp="1" noChangeArrowheads="1"/>
             <a:extLst>
               <a:ext uri="smNativeData">
-                <pr:smNativeData xmlns:pr="smNativeData" val="SMDATA_13_qYmVXhMAAAAlAAAAZAAAAA8BAAAAkAAAAEgAAACQAAAASAAAAAAAAAABAAAAAAAAAAEAAABQAAAAAAAAAAAA4D8AAAAAAADgPwAAAAAAAOA/AAAAAAAA4D8AAAAAAADgPwAAAAAAAOA/AAAAAAAA4D8AAAAAAADgPwAAAAAAAOA/AAAAAAAA4D8CAAAAjAAAAAEAAAAAAAAA////CP///wgAAAAAAAAAAAAAAAAAAAAAAAAAAAAAAAAAAAAAZAAAAAEAAABAAAAAAAAAAAAAAAAAAAAAAAAAAAAAAAAAAAAAAAAAAAAAAAAAAAAAAAAAAAAAAAAAAAAAAAAAAAAAAAAAAAAAAAAAAAAAAAAAAAAAAAAAAAAAAAAAAAAAFAAAADwAAAABAAAAAAAAAAAAAAkoAAAAAQAAABQAAAAUAAAAFAAAAAEAAAAAAAAAZAAAAGQAAAAAAAAAZAAAAGQAAAAVAAAAYAAAAAAAAAAAAAAADwAAACADAAAAAAAAAAAAAAEAAACgMgAAVgcAAKr4//8BAAAAf39/AAEAAABkAAAAAAAAABQAAABAHwAAAAAAACYAAAAAAAAAwOD//wAAAAAmAAAAZAAAABYAAABMAAAAAAAAAAAAAAAEAAAAAAAAAAEAAADy8vIKAAAAACgAAAAoAAAAZAAAAGQAAAAAAAAAzMzMAAAAAABQAAAAUAAAAGQAAABkAAAAAAAAABcAAAAUAAAAAAAAAAAAAAD/fwAA/38AAAAAAAAJAAAABAAAAAAAAAAMAAAAEAAAAAAAAAAAAAAAAAAAAAAAAAAeAAAAaAAAAAAAAAAAAAAAAAAAAAAAAAAAAAAAECcAABAnAAAAAAAAAAAAAAAAAAAAAAAAAAAAAAAAAAAAAAAAAAAAABQAAAAAAAAAwMD/AAAAAABkAAAAMgAAAAAAAABkAAAAAAAAAH9/fwAKAAAAHwAAAFQAAAD///8B////AQAAAAAAAAAAAAAAAAAAAAAAAAAAAAAAAAAAAAAAAAAAAAAAAn9/fwDy8vIDzMzMAMDA/wB/f38AAAAAAAAAAAAAAAAAAAAAAAAAAAAhAAAAGAAAABQAAAC7DQAA7wUAAEc9AAA+DQAAEAAAACYAAAAIAAAAAAAAAAAAAAA="/>
+                <pr:smNativeData xmlns:pr="smNativeData" val="SMDATA_13_TQCXXhMAAAAlAAAAZAAAAA8BAAAAkAAAAEgAAACQAAAASAAAAAAAAAABAAAAAAAAAAEAAABQAAAAAAAAAAAA4D8AAAAAAADgPwAAAAAAAOA/AAAAAAAA4D8AAAAAAADgPwAAAAAAAOA/AAAAAAAA4D8AAAAAAADgPwAAAAAAAOA/AAAAAAAA4D8CAAAAjAAAAAEAAAAAAAAA////CP///wgAAAAAAAAAAAAAAAAAAAAAAAAAAAAAAAAAAAAAZAAAAAEAAABAAAAAAAAAAAAAAAAAAAAAAAAAAAAAAAAAAAAAAAAAAAAAAAAAAAAAAAAAAAAAAAAAAAAAAAAAAAAAAAAAAAAAAAAAAAAAAAAAAAAAAAAAAAAAAAAAAAAAFAAAADwAAAABAAAAAAAAAAAAAAkoAAAAAQAAABQAAAAUAAAAFAAAAAEAAAAAAAAAZAAAAGQAAAAAAAAAZAAAAGQAAAAVAAAAYAAAAAAAAAAAAAAADwAAACADAAAAAAAAAAAAAAEAAACgMgAAVgcAAKr4//8BAAAAf39/AAEAAABkAAAAAAAAABQAAABAHwAAAAAAACYAAAAAAAAAwOD//wAAAAAmAAAAZAAAABYAAABMAAAAAAAAAAAAAAAEAAAAAAAAAAEAAADy8vIKAAAAACgAAAAoAAAAZAAAAGQAAAAAAAAAzMzMAAAAAABQAAAAUAAAAGQAAABkAAAAAAAAABcAAAAUAAAAAAAAAAAAAAD/fwAA/38AAAAAAAAJAAAABAAAAAAAAAAMAAAAEAAAAAAAAAAAAAAAAAAAAAAAAAAeAAAAaAAAAAAAAAAAAAAAAAAAAAAAAAAAAAAAECcAABAnAAAAAAAAAAAAAAAAAAAAAAAAAAAAAAAAAAAAAAAAAAAAABQAAAAAAAAAwMD/AAAAAABkAAAAMgAAAAAAAABkAAAAAAAAAH9/fwAKAAAAHwAAAFQAAAD///8B////AQAAAAAAAAAAAAAAAAAAAAAAAAAAAAAAAAAAAAAAAAAAAAAAAn9/fwDy8vIDzMzMAMDA/wB/f38AAAAAAAAAAAAAAAAAAAAAAAAAAAAhAAAAGAAAABQAAAC7DQAA7wUAAEc9AAA+DQAAEAAAACYAAAAIAAAAAAAAAAAAAAA="/>
               </a:ext>
             </a:extLst>
           </p:cNvSpPr>
@@ -507,7 +507,7 @@
             <a:spLocks noGrp="1" noChangeArrowheads="1"/>
             <a:extLst>
               <a:ext uri="smNativeData">
-                <pr:smNativeData xmlns:pr="smNativeData" val="SMDATA_13_qYmVXhMAAAAlAAAAZAAAAA8BAAAAkAAAAEgAAACQAAAASAAAAAAAAAAAAAAAAQAAAAEAAABQAAAAAAAAAAAA4D8AAAAAAADgPwAAAAAAAOA/AAAAAAAA4D8AAAAAAADgPwAAAAAAAOA/AAAAAAAA4D8AAAAAAADgPwAAAAAAAOA/AAAAAAAA4D8CAAAAjAAAAAAAAAAAAAAAg8C6DP///wgAAAAAAAAAAAAAAAAAAAAAAAAAAAAAAAAAAAAAZAAAAAEAAABAAAAAAAAAAAAAAAAAAAAAAAAAAAAAAAAAAAAAAAAAAAAAAAAAAAAAAAAAAAAAAAAAAAAAAAAAAAAAAAAAAAAAAAAAAAAAAAAAAAAAAAAAAAAAAAAAAAAAFAAAADwAAAAAAAAAAAAAAAAAAAkUAAAAAQAAABQAAAAUAAAAFAAAAAEAAAAAAAAAZAAAAGQAAAAAAAAAZAAAAGQAAAAVAAAAYAAAAAAAAAAAAAAADwAAACADAAAAAAAAAAAAAAEAAACgMgAAVgcAAKr4//8BAAAAf39/AAEAAABkAAAAAAAAABQAAABAHwAAAAAAACYAAAAAAAAAwOD//wAAAAAmAAAAZAAAABYAAABMAAAAAAAAAAAAAAAEAAAAAAAAAAEAAADy8vIKAAAAACgAAAAoAAAAZAAAAGQAAAAAAAAAzMzMAAAAAABQAAAAUAAAAGQAAABkAAAAAAAAABcAAAAUAAAAAAAAAAAAAAD/fwAA/38AAAAAAAAJAAAABAAAAAAAAAAMAAAAEAAAAAAAAAAAAAAAAAAAAAAAAAAeAAAAaAAAAAAAAAAAAAAAAAAAAAAAAAAAAAAAECcAABAnAAAAAAAAAAAAAAAAAAAAAAAAAAAAAAAAAAAAAAAAAAAAABQAAAAAAAAAwMD/AAAAAABkAAAAMgAAAAAAAABkAAAAAAAAAH9/fwAKAAAAHwAAAFQAAACDwLoF////AQAAAAAAAAAAAAAAAAAAAAAAAAAAAAAAAAAAAAAAAAAAAAAAAn9/fwDy8vIDzMzMAMDA/wB/f38AAAAAAAAAAAAAAAAAAAAAAAAAAAAhAAAAGAAAABQAAAC7DQAAPBAAAEc9AABTIwAAEAAAACYAAAAIAAAAAgAAAAAAAAA="/>
+                <pr:smNativeData xmlns:pr="smNativeData" val="SMDATA_13_TQCXXhMAAAAlAAAAZAAAAA8BAAAAkAAAAEgAAACQAAAASAAAAAAAAAAAAAAAAQAAAAEAAABQAAAAAAAAAAAA4D8AAAAAAADgPwAAAAAAAOA/AAAAAAAA4D8AAAAAAADgPwAAAAAAAOA/AAAAAAAA4D8AAAAAAADgPwAAAAAAAOA/AAAAAAAA4D8CAAAAjAAAAAAAAAAAAAAAg8C6DP///wgAAAAAAAAAAAAAAAAAAAAAAAAAAAAAAAAAAAAAZAAAAAEAAABAAAAAAAAAAAAAAAAAAAAAAAAAAAAAAAAAAAAAAAAAAAAAAAAAAAAAAAAAAAAAAAAAAAAAAAAAAAAAAAAAAAAAAAAAAAAAAAAAAAAAAAAAAAAAAAAAAAAAFAAAADwAAAAAAAAAAAAAAAAAAAkUAAAAAQAAABQAAAAUAAAAFAAAAAEAAAAAAAAAZAAAAGQAAAAAAAAAZAAAAGQAAAAVAAAAYAAAAAAAAAAAAAAADwAAACADAAAAAAAAAAAAAAEAAACgMgAAVgcAAKr4//8BAAAAf39/AAEAAABkAAAAAAAAABQAAABAHwAAAAAAACYAAAAAAAAAwOD//wAAAAAmAAAAZAAAABYAAABMAAAAAAAAAAAAAAAEAAAAAAAAAAEAAADy8vIKAAAAACgAAAAoAAAAZAAAAGQAAAAAAAAAzMzMAAAAAABQAAAAUAAAAGQAAABkAAAAAAAAABcAAAAUAAAAAAAAAAAAAAD/fwAA/38AAAAAAAAJAAAABAAAAAAAAAAMAAAAEAAAAAAAAAAAAAAAAAAAAAAAAAAeAAAAaAAAAAAAAAAAAAAAAAAAAAAAAAAAAAAAECcAABAnAAAAAAAAAAAAAAAAAAAAAAAAAAAAAAAAAAAAAAAAAAAAABQAAAAAAAAAwMD/AAAAAABkAAAAMgAAAAAAAABkAAAAAAAAAH9/fwAKAAAAHwAAAFQAAACDwLoF////AQAAAAAAAAAAAAAAAAAAAAAAAAAAAAAAAAAAAAAAAAAAAAAAAn9/fwDy8vIDzMzMAMDA/wB/f38AAAAAAAAAAAAAAAAAAAAAAAAAAAAhAAAAGAAAABQAAAC7DQAAPBAAAEc9AABTIwAAEAAAACYAAAAIAAAAAgAAAAAAAAA="/>
               </a:ext>
             </a:extLst>
           </p:cNvSpPr>
@@ -562,7 +562,7 @@
             <a:spLocks noGrp="1" noChangeArrowheads="1"/>
             <a:extLst>
               <a:ext uri="smNativeData">
-                <pr:smNativeData xmlns:pr="smNativeData" val="SMDATA_13_qYmVXhMAAAAlAAAAZAAAAA8BAAAAkAAAAEgAAACQAAAASAAAAAAAAAAAAAAAAAAAAAEAAABQAAAAAAAAAAAA4D8AAAAAAADgPwAAAAAAAOA/AAAAAAAA4D8AAAAAAADgPwAAAAAAAOA/AAAAAAAA4D8AAAAAAADgPwAAAAAAAOA/AAAAAAAA4D8CAAAAjAAAAAAAAAAAAAAAg8C6DP///wgAAAAAAAAAAAAAAAAAAAAAAAAAAAAAAAAAAAAAZAAAAAEAAABAAAAAAAAAAAAAAAAAAAAAAAAAAAAAAAAAAAAAAAAAAAAAAAAAAAAAAAAAAAAAAAAAAAAAAAAAAAAAAAAAAAAAAAAAAAAAAAAAAAAAAAAAAAAAAAAAAAAAFAAAADwAAAAAAAAAAAAAAAAAAAkUAAAAAQAAABQAAAAUAAAAFAAAAAEAAAAAAAAAZAAAAGQAAAAAAAAAZAAAAGQAAAAVAAAAYAAAAAAAAAAAAAAADwAAACADAAAAAAAAAAAAAAEAAACgMgAAVgcAAKr4//8BAAAAf39/AAEAAABkAAAAAAAAABQAAABAHwAAAAAAACYAAAAAAAAAwOD//wAAAAAmAAAAZAAAABYAAABMAAAAAAAAAAAAAAAEAAAAAAAAAAEAAADy8vIKAAAAACgAAAAoAAAAZAAAAGQAAAAAAAAAzMzMAAAAAABQAAAAUAAAAGQAAABkAAAAAAAAABcAAAAUAAAAAAAAAAAAAAD/fwAA/38AAAAAAAAJAAAABAAAAAAAAAAMAAAAEAAAAAAAAAAAAAAAAAAAAAAAAAAeAAAAaAAAAAAAAAAAAAAAAAAAAAAAAAAAAAAAECcAABAnAAAAAAAAAAAAAAAAAAAAAAAAAAAAAAAAAAAAAAAAAAAAABQAAAAAAAAAwMD/AAAAAABkAAAAMgAAAAAAAABkAAAAAAAAAH9/fwAKAAAAHwAAAFQAAACDwLoF////AQAAAAAAAAAAAAAAAAAAAAAAAAAAAAAAAAAAAAAAAAAAAAAAAn9/fwDy8vIDzMzMAMDA/wB/f38AAAAAAAAAAAAAAAAAAAAAAAAAAAAhAAAAGAAAABQAAAAfMAAAYiYAABBBAABgKAAAEAAAACYAAAAIAAAAAAAAAAAAAAA="/>
+                <pr:smNativeData xmlns:pr="smNativeData" val="SMDATA_13_TQCXXhMAAAAlAAAAZAAAAA8BAAAAkAAAAEgAAACQAAAASAAAAAAAAAAAAAAAAAAAAAEAAABQAAAAAAAAAAAA4D8AAAAAAADgPwAAAAAAAOA/AAAAAAAA4D8AAAAAAADgPwAAAAAAAOA/AAAAAAAA4D8AAAAAAADgPwAAAAAAAOA/AAAAAAAA4D8CAAAAjAAAAAAAAAAAAAAAg8C6DP///wgAAAAAAAAAAAAAAAAAAAAAAAAAAAAAAAAAAAAAZAAAAAEAAABAAAAAAAAAAAAAAAAAAAAAAAAAAAAAAAAAAAAAAAAAAAAAAAAAAAAAAAAAAAAAAAAAAAAAAAAAAAAAAAAAAAAAAAAAAAAAAAAAAAAAAAAAAAAAAAAAAAAAFAAAADwAAAAAAAAAAAAAAAAAAAkUAAAAAQAAABQAAAAUAAAAFAAAAAEAAAAAAAAAZAAAAGQAAAAAAAAAZAAAAGQAAAAVAAAAYAAAAAAAAAAAAAAADwAAACADAAAAAAAAAAAAAAEAAACgMgAAVgcAAKr4//8BAAAAf39/AAEAAABkAAAAAAAAABQAAABAHwAAAAAAACYAAAAAAAAAwOD//wAAAAAmAAAAZAAAABYAAABMAAAAAAAAAAAAAAAEAAAAAAAAAAEAAADy8vIKAAAAACgAAAAoAAAAZAAAAGQAAAAAAAAAzMzMAAAAAABQAAAAUAAAAGQAAABkAAAAAAAAABcAAAAUAAAAAAAAAAAAAAD/fwAA/38AAAAAAAAJAAAABAAAAAAAAAAMAAAAEAAAAAAAAAAAAAAAAAAAAAAAAAAeAAAAaAAAAAAAAAAAAAAAAAAAAAAAAAAAAAAAECcAABAnAAAAAAAAAAAAAAAAAAAAAAAAAAAAAAAAAAAAAAAAAAAAABQAAAAAAAAAwMD/AAAAAABkAAAAMgAAAAAAAABkAAAAAAAAAH9/fwAKAAAAHwAAAFQAAACDwLoF////AQAAAAAAAAAAAAAAAAAAAAAAAAAAAAAAAAAAAAAAAAAAAAAAAn9/fwDy8vIDzMzMAMDA/wB/f38AAAAAAAAAAAAAAAAAAAAAAAAAAAAhAAAAGAAAABQAAAAfMAAAYiYAABBBAABgKAAAEAAAACYAAAAIAAAAAAAAAAAAAAA="/>
               </a:ext>
             </a:extLst>
           </p:cNvSpPr>
@@ -576,7 +576,7 @@
           <a:lstStyle/>
           <a:p>
             <a:pPr/>
-            <a:fld id="{454B2874-3AA8-1EDE-E6F3-CC8B66BD1099}" type="datetime1">
+            <a:fld id="{327A29D6-98DF-2FDF-91C2-6E8A678C673B}" type="datetime1">
               <a:t>{Date/Time}</a:t>
             </a:fld>
           </a:p>
@@ -589,7 +589,7 @@
             <a:spLocks noGrp="1" noChangeArrowheads="1"/>
             <a:extLst>
               <a:ext uri="smNativeData">
-                <pr:smNativeData xmlns:pr="smNativeData" val="SMDATA_13_qYmVXhMAAAAlAAAAZAAAAA8BAAAAkAAAAEgAAACQAAAASAAAAAAAAAAAAAAAAAAAAAEAAABQAAAAAAAAAAAA4D8AAAAAAADgPwAAAAAAAOA/AAAAAAAA4D8AAAAAAADgPwAAAAAAAOA/AAAAAAAA4D8AAAAAAADgPwAAAAAAAOA/AAAAAAAA4D8CAAAAjAAAAAAAAAAAAAAAg8C6DP///wgAAAAAAAAAAAAAAAAAAAAAAAAAAAAAAAAAAAAAZAAAAAEAAABAAAAAAAAAAAAAAAAAAAAAAAAAAAAAAAAAAAAAAAAAAAAAAAAAAAAAAAAAAAAAAAAAAAAAAAAAAAAAAAAAAAAAAAAAAAAAAAAAAAAAAAAAAAAAAAAAAAAAFAAAADwAAAAAAAAAAAAAAAAAAAkUAAAAAQAAABQAAAAUAAAAFAAAAAEAAAAAAAAAZAAAAGQAAAAAAAAAZAAAAGQAAAAVAAAAYAAAAAAAAAAAAAAADwAAACADAAAAAAAAAAAAAAEAAACgMgAAVgcAAKr4//8BAAAAf39/AAEAAABkAAAAAAAAABQAAABAHwAAAAAAACYAAAAAAAAAwOD//wAAAAAmAAAAZAAAABYAAABMAAAAAAAAAAAAAAAEAAAAAAAAAAEAAADy8vIKAAAAACgAAAAoAAAAZAAAAGQAAAAAAAAAzMzMAAAAAABQAAAAUAAAAGQAAABkAAAAAAAAABcAAAAUAAAAAAAAAAAAAAD/fwAA/38AAAAAAAAJAAAABAAAAAAAAAAMAAAAEAAAAAAAAAAAAAAAAAAAAAAAAAAeAAAAaAAAAAAAAAAAAAAAAAAAAAAAAAAAAAAAECcAABAnAAAAAAAAAAAAAAAAAAAAAAAAAAAAAAAAAAAAAAAAAAAAABQAAAAAAAAAwMD/AAAAAABkAAAAMgAAAAAAAABkAAAAAAAAAH9/fwAKAAAAHwAAAFQAAACDwLoF////AQAAAAAAAAAAAAAAAAAAAAAAAAAAAAAAAAAAAAAAAAAAAAAAAn9/fwDy8vIDzMzMAMDA/wB/f38AAAAAAAAAAAAAAAAAAAAAAAAAAAAhAAAAGAAAABQAAADcCQAAXCYAACguAABVKAAAEAAAACYAAAAIAAAAAAAAAAAAAAA="/>
+                <pr:smNativeData xmlns:pr="smNativeData" val="SMDATA_13_TQCXXhMAAAAlAAAAZAAAAA8BAAAAkAAAAEgAAACQAAAASAAAAAAAAAAAAAAAAAAAAAEAAABQAAAAAAAAAAAA4D8AAAAAAADgPwAAAAAAAOA/AAAAAAAA4D8AAAAAAADgPwAAAAAAAOA/AAAAAAAA4D8AAAAAAADgPwAAAAAAAOA/AAAAAAAA4D8CAAAAjAAAAAAAAAAAAAAAg8C6DP///wgAAAAAAAAAAAAAAAAAAAAAAAAAAAAAAAAAAAAAZAAAAAEAAABAAAAAAAAAAAAAAAAAAAAAAAAAAAAAAAAAAAAAAAAAAAAAAAAAAAAAAAAAAAAAAAAAAAAAAAAAAAAAAAAAAAAAAAAAAAAAAAAAAAAAAAAAAAAAAAAAAAAAFAAAADwAAAAAAAAAAAAAAAAAAAkUAAAAAQAAABQAAAAUAAAAFAAAAAEAAAAAAAAAZAAAAGQAAAAAAAAAZAAAAGQAAAAVAAAAYAAAAAAAAAAAAAAADwAAACADAAAAAAAAAAAAAAEAAACgMgAAVgcAAKr4//8BAAAAf39/AAEAAABkAAAAAAAAABQAAABAHwAAAAAAACYAAAAAAAAAwOD//wAAAAAmAAAAZAAAABYAAABMAAAAAAAAAAAAAAAEAAAAAAAAAAEAAADy8vIKAAAAACgAAAAoAAAAZAAAAGQAAAAAAAAAzMzMAAAAAABQAAAAUAAAAGQAAABkAAAAAAAAABcAAAAUAAAAAAAAAAAAAAD/fwAA/38AAAAAAAAJAAAABAAAAAAAAAAMAAAAEAAAAAAAAAAAAAAAAAAAAAAAAAAeAAAAaAAAAAAAAAAAAAAAAAAAAAAAAAAAAAAAECcAABAnAAAAAAAAAAAAAAAAAAAAAAAAAAAAAAAAAAAAAAAAAAAAABQAAAAAAAAAwMD/AAAAAABkAAAAMgAAAAAAAABkAAAAAAAAAH9/fwAKAAAAHwAAAFQAAACDwLoF////AQAAAAAAAAAAAAAAAAAAAAAAAAAAAAAAAAAAAAAAAAAAAAAAAn9/fwDy8vIDzMzMAMDA/wB/f38AAAAAAAAAAAAAAAAAAAAAAAAAAAAhAAAAGAAAABQAAADcCQAAXCYAACguAABVKAAAEAAAACYAAAAIAAAAAAAAAAAAAAA="/>
               </a:ext>
             </a:extLst>
           </p:cNvSpPr>
@@ -616,7 +616,7 @@
             <a:spLocks noGrp="1" noChangeArrowheads="1"/>
             <a:extLst>
               <a:ext uri="smNativeData">
-                <pr:smNativeData xmlns:pr="smNativeData" val="SMDATA_13_qYmVXhMAAAAlAAAAZAAAAA8BAAAAkAAAAEgAAACQAAAASAAAAAAAAAAAAAAAAAAAAAEAAABQAAAAAAAAAAAA4D8AAAAAAADgPwAAAAAAAOA/AAAAAAAA4D8AAAAAAADgPwAAAAAAAOA/AAAAAAAA4D8AAAAAAADgPwAAAAAAAOA/AAAAAAAA4D8CAAAAjAAAAAEAAAAAAAAAeHh4yv///wgAAAAAAAAAAAAAAAAAAAAAAAAAAAAAAAAAAAAAZAAAAAEAAABAAAAAAAAAAAAAAAAAAAAAAAAAAAAAAAAAAAAAAAAAAAAAAAAAAAAAAAAAAAAAAAAAAAAAAAAAAAAAAAAAAAAAAAAAAAAAAAAAAAAAAAAAAAAAAAAAAAAAFAAAADwAAAAAAAAAAAAAAAAAAAkUAAAAAQAAABQAAAAUAAAAFAAAAAEAAAAAAAAAZAAAAGQAAAAAAAAAZAAAAGQAAAAVAAAAYAAAAAAAAAAAAAAADwAAACADAAAAAAAAAAAAAAEAAACgMgAAVgcAAKr4//8BAAAAf39/AAEAAABkAAAAAAAAABQAAABAHwAAAAAAACYAAAAAAAAAwOD//wAAAAAmAAAAZAAAABYAAABMAAAAAAAAAAAAAAAEAAAAAAAAAAEAAADy8vIKAAAAACgAAAAoAAAAZAAAAGQAAAAAAAAAzMzMAAAAAABQAAAAUAAAAGQAAABkAAAAAAAAABcAAAAUAAAAAAAAAAAAAAD/fwAA/38AAAAAAAAJAAAABAAAAAAAAAAMAAAAEAAAAAAAAAAAAAAAAAAAAAAAAAAeAAAAaAAAAAAAAAAAAAAAAAAAAAAAAAAAAAAAECcAABAnAAAAAAAAAAAAAAAAAAAAAAAAAAAAAAAAAAAAAAAAAAAAABQAAAAAAAAAwMD/AAAAAABkAAAAMgAAAAAAAABkAAAAAAAAAH9/fwAKAAAAHwAAAFQAAAB4eHjD////AQAAAAAAAAAAAAAAAAAAAAAAAAAAAAAAAAAAAAAAAAAAAAAAAn9/fwDy8vIDzMzMAMDA/wB/f38AAAAAAAAAAAAAAAAAAAAAAAAAAAAhAAAAGAAAABQAAAAyQgAAYiYAAHdEAAAwKgAAEAAAACYAAAAIAAAAAAAAAAAAAAA="/>
+                <pr:smNativeData xmlns:pr="smNativeData" val="SMDATA_13_TQCXXhMAAAAlAAAAZAAAAA8BAAAAkAAAAEgAAACQAAAASAAAAAAAAAAAAAAAAAAAAAEAAABQAAAAAAAAAAAA4D8AAAAAAADgPwAAAAAAAOA/AAAAAAAA4D8AAAAAAADgPwAAAAAAAOA/AAAAAAAA4D8AAAAAAADgPwAAAAAAAOA/AAAAAAAA4D8CAAAAjAAAAAEAAAAAAAAAeHh4yv///wgAAAAAAAAAAAAAAAAAAAAAAAAAAAAAAAAAAAAAZAAAAAEAAABAAAAAAAAAAAAAAAAAAAAAAAAAAAAAAAAAAAAAAAAAAAAAAAAAAAAAAAAAAAAAAAAAAAAAAAAAAAAAAAAAAAAAAAAAAAAAAAAAAAAAAAAAAAAAAAAAAAAAFAAAADwAAAAAAAAAAAAAAAAAAAkUAAAAAQAAABQAAAAUAAAAFAAAAAEAAAAAAAAAZAAAAGQAAAAAAAAAZAAAAGQAAAAVAAAAYAAAAAAAAAAAAAAADwAAACADAAAAAAAAAAAAAAEAAACgMgAAVgcAAKr4//8BAAAAf39/AAEAAABkAAAAAAAAABQAAABAHwAAAAAAACYAAAAAAAAAwOD//wAAAAAmAAAAZAAAABYAAABMAAAAAAAAAAAAAAAEAAAAAAAAAAEAAADy8vIKAAAAACgAAAAoAAAAZAAAAGQAAAAAAAAAzMzMAAAAAABQAAAAUAAAAGQAAABkAAAAAAAAABcAAAAUAAAAAAAAAAAAAAD/fwAA/38AAAAAAAAJAAAABAAAAAAAAAAMAAAAEAAAAAAAAAAAAAAAAAAAAAAAAAAeAAAAaAAAAAAAAAAAAAAAAAAAAAAAAAAAAAAAECcAABAnAAAAAAAAAAAAAAAAAAAAAAAAAAAAAAAAAAAAAAAAAAAAABQAAAAAAAAAwMD/AAAAAABkAAAAMgAAAAAAAABkAAAAAAAAAH9/fwAKAAAAHwAAAFQAAAB4eHjD////AQAAAAAAAAAAAAAAAAAAAAAAAAAAAAAAAAAAAAAAAAAAAAAAAn9/fwDy8vIDzMzMAMDA/wB/f38AAAAAAAAAAAAAAAAAAAAAAAAAAAAhAAAAGAAAABQAAAAyQgAAYiYAAHdEAAAwKgAAEAAAACYAAAAIAAAAAAAAAAAAAAA="/>
               </a:ext>
             </a:extLst>
           </p:cNvSpPr>
@@ -630,7 +630,7 @@
           <a:lstStyle/>
           <a:p>
             <a:pPr/>
-            <a:fld id="{305F95DC-92DD-0A63-93E7-6436DBA96531}" type="slidenum">
+            <a:fld id="{2D8285A8-E6C0-D773-8E3A-1026CB747845}" type="slidenum">
               <a:t>{Nr.}</a:t>
             </a:fld>
           </a:p>
@@ -668,7 +668,7 @@
             <a:spLocks noGrp="1" noChangeArrowheads="1"/>
             <a:extLst>
               <a:ext uri="smNativeData">
-                <pr:smNativeData xmlns:pr="smNativeData" val="SMDATA_13_qYmVXhMAAAAlAAAAZAAAAA8BAAAAkAAAAEgAAACQAAAASAAAAAAAAAABAAAAAQAAAAEAAABQAAAAAAAAAAAA4D8AAAAAAADgPwAAAAAAAOA/AAAAAAAA4D8AAAAAAADgPwAAAAAAAOA/AAAAAAAA4D8AAAAAAADgPwAAAAAAAOA/AAAAAAAA4D8CAAAAjAAAAAEAAAAAAAAA////CP///wgAAAAAAAAAAAAAAAAAAAAAAAAAAAAAAAAAAAAAZAAAAAEAAABAAAAAAAAAAAAAAAAAAAAAAAAAAAAAAAAAAAAAAAAAAAAAAAAAAAAAAAAAAAAAAAAAAAAAAAAAAAAAAAAAAAAAAAAAAAAAAAAAAAAAAAAAAAAAAAAAAAAAFAAAADwAAAABAAAAAAAAAAAAAAkoAAAAAQAAABQAAAAUAAAAFAAAAAEAAAAAAAAAZAAAAGQAAAAAAAAAZAAAAGQAAAAVAAAAYAAAAAAAAAAAAAAADwAAACADAAAAAAAAAAAAAAEAAACgMgAAVgcAAKr4//8BAAAAf39/AAEAAABkAAAAAAAAABQAAABAHwAAAAAAACYAAAAAAAAAwOD//wAAAAAmAAAAZAAAABYAAABMAAAAAAAAAAAAAAAEAAAAAAAAAAEAAADy8vIKAAAAACgAAAAoAAAAZAAAAGQAAAAAAAAAzMzMAAAAAABQAAAAUAAAAGQAAABkAAAAAAAAABcAAAAUAAAAAAAAAAAAAAD/fwAA/38AAAAAAAAJAAAABAAAAAAAAAAMAAAAEAAAAAAAAAAAAAAAAAAAAAAAAAAeAAAAaAAAAAAAAAAAAAAAAAAAAAAAAAAAAAAAECcAABAnAAAAAAAAAAAAAAAAAAAAAAAAAAAAAAAAAAAAAAAAAAAAABQAAAAAAAAAwMD/AAAAAABkAAAAMgAAAAAAAABkAAAAAAAAAH9/fwAKAAAAHwAAAFQAAAD///8B////AQAAAAAAAAAAAAAAAAAAAAAAAAAAAAAAAAAAAAAAAAAAAAAAAn9/fwDy8vIDzMzMAMDA/wB/f38AAAAAAAAAAAAAAAAAAAAAAAAAAAAhAAAAGAAAABQAAAA+NQAAwgUAAD09AABoJAAAEAAAACYAAAAIAAAAAwAAAAAAAAA="/>
+                <pr:smNativeData xmlns:pr="smNativeData" val="SMDATA_13_TQCXXhMAAAAlAAAAZAAAAA8BAAAAkAAAAEgAAACQAAAASAAAAAAAAAABAAAAAQAAAAEAAABQAAAAAAAAAAAA4D8AAAAAAADgPwAAAAAAAOA/AAAAAAAA4D8AAAAAAADgPwAAAAAAAOA/AAAAAAAA4D8AAAAAAADgPwAAAAAAAOA/AAAAAAAA4D8CAAAAjAAAAAEAAAAAAAAA////CP///wgAAAAAAAAAAAAAAAAAAAAAAAAAAAAAAAAAAAAAZAAAAAEAAABAAAAAAAAAAAAAAAAAAAAAAAAAAAAAAAAAAAAAAAAAAAAAAAAAAAAAAAAAAAAAAAAAAAAAAAAAAAAAAAAAAAAAAAAAAAAAAAAAAAAAAAAAAAAAAAAAAAAAFAAAADwAAAABAAAAAAAAAAAAAAkoAAAAAQAAABQAAAAUAAAAFAAAAAEAAAAAAAAAZAAAAGQAAAAAAAAAZAAAAGQAAAAVAAAAYAAAAAAAAAAAAAAADwAAACADAAAAAAAAAAAAAAEAAACgMgAAVgcAAKr4//8BAAAAf39/AAEAAABkAAAAAAAAABQAAABAHwAAAAAAACYAAAAAAAAAwOD//wAAAAAmAAAAZAAAABYAAABMAAAAAAAAAAAAAAAEAAAAAAAAAAEAAADy8vIKAAAAACgAAAAoAAAAZAAAAGQAAAAAAAAAzMzMAAAAAABQAAAAUAAAAGQAAABkAAAAAAAAABcAAAAUAAAAAAAAAAAAAAD/fwAA/38AAAAAAAAJAAAABAAAAAAAAAAMAAAAEAAAAAAAAAAAAAAAAAAAAAAAAAAeAAAAaAAAAAAAAAAAAAAAAAAAAAAAAAAAAAAAECcAABAnAAAAAAAAAAAAAAAAAAAAAAAAAAAAAAAAAAAAAAAAAAAAABQAAAAAAAAAwMD/AAAAAABkAAAAMgAAAAAAAABkAAAAAAAAAH9/fwAKAAAAHwAAAFQAAAD///8B////AQAAAAAAAAAAAAAAAAAAAAAAAAAAAAAAAAAAAAAAAAAAAAAAAn9/fwDy8vIDzMzMAMDA/wB/f38AAAAAAAAAAAAAAAAAAAAAAAAAAAAhAAAAGAAAABQAAAA+NQAAwgUAAD09AABoJAAAEAAAACYAAAAIAAAAAwAAAAAAAAA="/>
               </a:ext>
             </a:extLst>
           </p:cNvSpPr>
@@ -706,7 +706,7 @@
             <a:spLocks noGrp="1" noChangeArrowheads="1"/>
             <a:extLst>
               <a:ext uri="smNativeData">
-                <pr:smNativeData xmlns:pr="smNativeData" val="SMDATA_13_qYmVXhMAAAAlAAAAZAAAAA8BAAAAkAAAAEgAAACQAAAASAAAAAAAAAAAAAAAAQAAAAEAAABQAAAAAAAAAAAA4D8AAAAAAADgPwAAAAAAAOA/AAAAAAAA4D8AAAAAAADgPwAAAAAAAOA/AAAAAAAA4D8AAAAAAADgPwAAAAAAAOA/AAAAAAAA4D8CAAAAjAAAAAAAAAAAAAAAg8C6DP///wgAAAAAAAAAAAAAAAAAAAAAAAAAAAAAAAAAAAAAZAAAAAEAAABAAAAAAAAAAAAAAAAAAAAAAAAAAAAAAAAAAAAAAAAAAAAAAAAAAAAAAAAAAAAAAAAAAAAAAAAAAAAAAAAAAAAAAAAAAAAAAAAAAAAAAAAAAAAAAAAAAAAAFAAAADwAAAAAAAAAAAAAAAAAAAkUAAAAAQAAABQAAAAUAAAAFAAAAAEAAAAAAAAAZAAAAGQAAAAAAAAAZAAAAGQAAAAVAAAAYAAAAAAAAAAAAAAADwAAACADAAAAAAAAAAAAAAEAAACgMgAAVgcAAKr4//8BAAAAf39/AAEAAABkAAAAAAAAABQAAABAHwAAAAAAACYAAAAAAAAAwOD//wAAAAAmAAAAZAAAABYAAABMAAAAAAAAAAAAAAAEAAAAAAAAAAEAAADy8vIKAAAAACgAAAAoAAAAZAAAAGQAAAAAAAAAzMzMAAAAAABQAAAAUAAAAGQAAABkAAAAAAAAABcAAAAUAAAAAAAAAAAAAAD/fwAA/38AAAAAAAAJAAAABAAAAAAAAAAMAAAAEAAAAAAAAAAAAAAAAAAAAAAAAAAeAAAAaAAAAAAAAAAAAAAAAAAAAAAAAAAAAAAAECcAABAnAAAAAAAAAAAAAAAAAAAAAAAAAAAAAAAAAAAAAAAAAAAAABQAAAAAAAAAwMD/AAAAAABkAAAAMgAAAAAAAABkAAAAAAAAAH9/fwAKAAAAHwAAAFQAAACDwLoF////AQAAAAAAAAAAAAAAAAAAAAAAAAAAAAAAAAAAAAAAAAAAAAAAAn9/fwDy8vIDzMzMAMDA/wB/f38AAAAAAAAAAAAAAAAAAAAAAAAAAAAhAAAAGAAAABQAAAC7DQAAwgUAAN4zAABoJAAAEAAAACYAAAAIAAAAAwAAAAAAAAA="/>
+                <pr:smNativeData xmlns:pr="smNativeData" val="SMDATA_13_TQCXXhMAAAAlAAAAZAAAAA8BAAAAkAAAAEgAAACQAAAASAAAAAAAAAAAAAAAAQAAAAEAAABQAAAAAAAAAAAA4D8AAAAAAADgPwAAAAAAAOA/AAAAAAAA4D8AAAAAAADgPwAAAAAAAOA/AAAAAAAA4D8AAAAAAADgPwAAAAAAAOA/AAAAAAAA4D8CAAAAjAAAAAAAAAAAAAAAg8C6DP///wgAAAAAAAAAAAAAAAAAAAAAAAAAAAAAAAAAAAAAZAAAAAEAAABAAAAAAAAAAAAAAAAAAAAAAAAAAAAAAAAAAAAAAAAAAAAAAAAAAAAAAAAAAAAAAAAAAAAAAAAAAAAAAAAAAAAAAAAAAAAAAAAAAAAAAAAAAAAAAAAAAAAAFAAAADwAAAAAAAAAAAAAAAAAAAkUAAAAAQAAABQAAAAUAAAAFAAAAAEAAAAAAAAAZAAAAGQAAAAAAAAAZAAAAGQAAAAVAAAAYAAAAAAAAAAAAAAADwAAACADAAAAAAAAAAAAAAEAAACgMgAAVgcAAKr4//8BAAAAf39/AAEAAABkAAAAAAAAABQAAABAHwAAAAAAACYAAAAAAAAAwOD//wAAAAAmAAAAZAAAABYAAABMAAAAAAAAAAAAAAAEAAAAAAAAAAEAAADy8vIKAAAAACgAAAAoAAAAZAAAAGQAAAAAAAAAzMzMAAAAAABQAAAAUAAAAGQAAABkAAAAAAAAABcAAAAUAAAAAAAAAAAAAAD/fwAA/38AAAAAAAAJAAAABAAAAAAAAAAMAAAAEAAAAAAAAAAAAAAAAAAAAAAAAAAeAAAAaAAAAAAAAAAAAAAAAAAAAAAAAAAAAAAAECcAABAnAAAAAAAAAAAAAAAAAAAAAAAAAAAAAAAAAAAAAAAAAAAAABQAAAAAAAAAwMD/AAAAAABkAAAAMgAAAAAAAABkAAAAAAAAAH9/fwAKAAAAHwAAAFQAAACDwLoF////AQAAAAAAAAAAAAAAAAAAAAAAAAAAAAAAAAAAAAAAAAAAAAAAAn9/fwDy8vIDzMzMAMDA/wB/f38AAAAAAAAAAAAAAAAAAAAAAAAAAAAhAAAAGAAAABQAAAC7DQAAwgUAAN4zAABoJAAAEAAAACYAAAAIAAAAAwAAAAAAAAA="/>
               </a:ext>
             </a:extLst>
           </p:cNvSpPr>
@@ -766,7 +766,7 @@
             <a:spLocks noGrp="1" noChangeArrowheads="1"/>
             <a:extLst>
               <a:ext uri="smNativeData">
-                <pr:smNativeData xmlns:pr="smNativeData" val="SMDATA_13_qYmVXhMAAAAlAAAAZAAAAA8BAAAAkAAAAEgAAACQAAAASAAAAAAAAAAAAAAAAAAAAAEAAABQAAAAAAAAAAAA4D8AAAAAAADgPwAAAAAAAOA/AAAAAAAA4D8AAAAAAADgPwAAAAAAAOA/AAAAAAAA4D8AAAAAAADgPwAAAAAAAOA/AAAAAAAA4D8CAAAAjAAAAAAAAAAAAAAAg8C6DP///wgAAAAAAAAAAAAAAAAAAAAAAAAAAAAAAAAAAAAAZAAAAAEAAABAAAAAAAAAAAAAAAAAAAAAAAAAAAAAAAAAAAAAAAAAAAAAAAAAAAAAAAAAAAAAAAAAAAAAAAAAAAAAAAAAAAAAAAAAAAAAAAAAAAAAAAAAAAAAAAAAAAAAFAAAADwAAAAAAAAAAAAAAAAAAAkUAAAAAQAAABQAAAAUAAAAFAAAAAEAAAAAAAAAZAAAAGQAAAAAAAAAZAAAAGQAAAAVAAAAYAAAAAAAAAAAAAAADwAAACADAAAAAAAAAAAAAAEAAACgMgAAVgcAAKr4//8BAAAAf39/AAEAAABkAAAAAAAAABQAAABAHwAAAAAAACYAAAAAAAAAwOD//wAAAAAmAAAAZAAAABYAAABMAAAAAAAAAAAAAAAEAAAAAAAAAAEAAADy8vIKAAAAACgAAAAoAAAAZAAAAGQAAAAAAAAAzMzMAAAAAABQAAAAUAAAAGQAAABkAAAAAAAAABcAAAAUAAAAAAAAAAAAAAD/fwAA/38AAAAAAAAJAAAABAAAAAAAAAAMAAAAEAAAAAAAAAAAAAAAAAAAAAAAAAAeAAAAaAAAAAAAAAAAAAAAAAAAAAAAAAAAAAAAECcAABAnAAAAAAAAAAAAAAAAAAAAAAAAAAAAAAAAAAAAAAAAAAAAABQAAAAAAAAAwMD/AAAAAABkAAAAMgAAAAAAAABkAAAAAAAAAH9/fwAKAAAAHwAAAFQAAACDwLoF////AQAAAAAAAAAAAAAAAAAAAAAAAAAAAAAAAAAAAAAAAAAAAAAAAn9/fwDy8vIDzMzMAMDA/wB/f38AAAAAAAAAAAAAAAAAAAAAAAAAAAAhAAAAGAAAABQAAAAfMAAAYiYAABBBAABgKAAAEAAAACYAAAAIAAAAAAAAAAAAAAA="/>
+                <pr:smNativeData xmlns:pr="smNativeData" val="SMDATA_13_TQCXXhMAAAAlAAAAZAAAAA8BAAAAkAAAAEgAAACQAAAASAAAAAAAAAAAAAAAAAAAAAEAAABQAAAAAAAAAAAA4D8AAAAAAADgPwAAAAAAAOA/AAAAAAAA4D8AAAAAAADgPwAAAAAAAOA/AAAAAAAA4D8AAAAAAADgPwAAAAAAAOA/AAAAAAAA4D8CAAAAjAAAAAAAAAAAAAAAg8C6DP///wgAAAAAAAAAAAAAAAAAAAAAAAAAAAAAAAAAAAAAZAAAAAEAAABAAAAAAAAAAAAAAAAAAAAAAAAAAAAAAAAAAAAAAAAAAAAAAAAAAAAAAAAAAAAAAAAAAAAAAAAAAAAAAAAAAAAAAAAAAAAAAAAAAAAAAAAAAAAAAAAAAAAAFAAAADwAAAAAAAAAAAAAAAAAAAkUAAAAAQAAABQAAAAUAAAAFAAAAAEAAAAAAAAAZAAAAGQAAAAAAAAAZAAAAGQAAAAVAAAAYAAAAAAAAAAAAAAADwAAACADAAAAAAAAAAAAAAEAAACgMgAAVgcAAKr4//8BAAAAf39/AAEAAABkAAAAAAAAABQAAABAHwAAAAAAACYAAAAAAAAAwOD//wAAAAAmAAAAZAAAABYAAABMAAAAAAAAAAAAAAAEAAAAAAAAAAEAAADy8vIKAAAAACgAAAAoAAAAZAAAAGQAAAAAAAAAzMzMAAAAAABQAAAAUAAAAGQAAABkAAAAAAAAABcAAAAUAAAAAAAAAAAAAAD/fwAA/38AAAAAAAAJAAAABAAAAAAAAAAMAAAAEAAAAAAAAAAAAAAAAAAAAAAAAAAeAAAAaAAAAAAAAAAAAAAAAAAAAAAAAAAAAAAAECcAABAnAAAAAAAAAAAAAAAAAAAAAAAAAAAAAAAAAAAAAAAAAAAAABQAAAAAAAAAwMD/AAAAAABkAAAAMgAAAAAAAABkAAAAAAAAAH9/fwAKAAAAHwAAAFQAAACDwLoF////AQAAAAAAAAAAAAAAAAAAAAAAAAAAAAAAAAAAAAAAAAAAAAAAAn9/fwDy8vIDzMzMAMDA/wB/f38AAAAAAAAAAAAAAAAAAAAAAAAAAAAhAAAAGAAAABQAAAAfMAAAYiYAABBBAABgKAAAEAAAACYAAAAIAAAAAAAAAAAAAAA="/>
               </a:ext>
             </a:extLst>
           </p:cNvSpPr>
@@ -780,7 +780,7 @@
           <a:lstStyle/>
           <a:p>
             <a:pPr/>
-            <a:fld id="{4D30AF5B-15A0-6559-EE88-E30CE1C618B6}" type="datetime1">
+            <a:fld id="{1E26F154-1AF3-7307-BD9E-EC52BFD04BB9}" type="datetime1">
               <a:t>{Date/Time}</a:t>
             </a:fld>
           </a:p>
@@ -793,7 +793,7 @@
             <a:spLocks noGrp="1" noChangeArrowheads="1"/>
             <a:extLst>
               <a:ext uri="smNativeData">
-                <pr:smNativeData xmlns:pr="smNativeData" val="SMDATA_13_qYmVXhMAAAAlAAAAZAAAAA8BAAAAkAAAAEgAAACQAAAASAAAAAAAAAAAAAAAAAAAAAEAAABQAAAAAAAAAAAA4D8AAAAAAADgPwAAAAAAAOA/AAAAAAAA4D8AAAAAAADgPwAAAAAAAOA/AAAAAAAA4D8AAAAAAADgPwAAAAAAAOA/AAAAAAAA4D8CAAAAjAAAAAAAAAAAAAAAg8C6DP///wgAAAAAAAAAAAAAAAAAAAAAAAAAAAAAAAAAAAAAZAAAAAEAAABAAAAAAAAAAAAAAAAAAAAAAAAAAAAAAAAAAAAAAAAAAAAAAAAAAAAAAAAAAAAAAAAAAAAAAAAAAAAAAAAAAAAAAAAAAAAAAAAAAAAAAAAAAAAAAAAAAAAAFAAAADwAAAAAAAAAAAAAAAAAAAkUAAAAAQAAABQAAAAUAAAAFAAAAAEAAAAAAAAAZAAAAGQAAAAAAAAAZAAAAGQAAAAVAAAAYAAAAAAAAAAAAAAADwAAACADAAAAAAAAAAAAAAEAAACgMgAAVgcAAKr4//8BAAAAf39/AAEAAABkAAAAAAAAABQAAABAHwAAAAAAACYAAAAAAAAAwOD//wAAAAAmAAAAZAAAABYAAABMAAAAAAAAAAAAAAAEAAAAAAAAAAEAAADy8vIKAAAAACgAAAAoAAAAZAAAAGQAAAAAAAAAzMzMAAAAAABQAAAAUAAAAGQAAABkAAAAAAAAABcAAAAUAAAAAAAAAAAAAAD/fwAA/38AAAAAAAAJAAAABAAAAAAAAAAMAAAAEAAAAAAAAAAAAAAAAAAAAAAAAAAeAAAAaAAAAAAAAAAAAAAAAAAAAAAAAAAAAAAAECcAABAnAAAAAAAAAAAAAAAAAAAAAAAAAAAAAAAAAAAAAAAAAAAAABQAAAAAAAAAwMD/AAAAAABkAAAAMgAAAAAAAABkAAAAAAAAAH9/fwAKAAAAHwAAAFQAAACDwLoF////AQAAAAAAAAAAAAAAAAAAAAAAAAAAAAAAAAAAAAAAAAAAAAAAAn9/fwDy8vIDzMzMAMDA/wB/f38AAAAAAAAAAAAAAAAAAAAAAAAAAAAhAAAAGAAAABQAAADcCQAAXCYAACguAABVKAAAEAAAACYAAAAIAAAAAAAAAAAAAAA="/>
+                <pr:smNativeData xmlns:pr="smNativeData" val="SMDATA_13_TQCXXhMAAAAlAAAAZAAAAA8BAAAAkAAAAEgAAACQAAAASAAAAAAAAAAAAAAAAAAAAAEAAABQAAAAAAAAAAAA4D8AAAAAAADgPwAAAAAAAOA/AAAAAAAA4D8AAAAAAADgPwAAAAAAAOA/AAAAAAAA4D8AAAAAAADgPwAAAAAAAOA/AAAAAAAA4D8CAAAAjAAAAAAAAAAAAAAAg8C6DP///wgAAAAAAAAAAAAAAAAAAAAAAAAAAAAAAAAAAAAAZAAAAAEAAABAAAAAAAAAAAAAAAAAAAAAAAAAAAAAAAAAAAAAAAAAAAAAAAAAAAAAAAAAAAAAAAAAAAAAAAAAAAAAAAAAAAAAAAAAAAAAAAAAAAAAAAAAAAAAAAAAAAAAFAAAADwAAAAAAAAAAAAAAAAAAAkUAAAAAQAAABQAAAAUAAAAFAAAAAEAAAAAAAAAZAAAAGQAAAAAAAAAZAAAAGQAAAAVAAAAYAAAAAAAAAAAAAAADwAAACADAAAAAAAAAAAAAAEAAACgMgAAVgcAAKr4//8BAAAAf39/AAEAAABkAAAAAAAAABQAAABAHwAAAAAAACYAAAAAAAAAwOD//wAAAAAmAAAAZAAAABYAAABMAAAAAAAAAAAAAAAEAAAAAAAAAAEAAADy8vIKAAAAACgAAAAoAAAAZAAAAGQAAAAAAAAAzMzMAAAAAABQAAAAUAAAAGQAAABkAAAAAAAAABcAAAAUAAAAAAAAAAAAAAD/fwAA/38AAAAAAAAJAAAABAAAAAAAAAAMAAAAEAAAAAAAAAAAAAAAAAAAAAAAAAAeAAAAaAAAAAAAAAAAAAAAAAAAAAAAAAAAAAAAECcAABAnAAAAAAAAAAAAAAAAAAAAAAAAAAAAAAAAAAAAAAAAAAAAABQAAAAAAAAAwMD/AAAAAABkAAAAMgAAAAAAAABkAAAAAAAAAH9/fwAKAAAAHwAAAFQAAACDwLoF////AQAAAAAAAAAAAAAAAAAAAAAAAAAAAAAAAAAAAAAAAAAAAAAAAn9/fwDy8vIDzMzMAMDA/wB/f38AAAAAAAAAAAAAAAAAAAAAAAAAAAAhAAAAGAAAABQAAADcCQAAXCYAACguAABVKAAAEAAAACYAAAAIAAAAAAAAAAAAAAA="/>
               </a:ext>
             </a:extLst>
           </p:cNvSpPr>
@@ -820,7 +820,7 @@
             <a:spLocks noGrp="1" noChangeArrowheads="1"/>
             <a:extLst>
               <a:ext uri="smNativeData">
-                <pr:smNativeData xmlns:pr="smNativeData" val="SMDATA_13_qYmVXhMAAAAlAAAAZAAAAA8BAAAAkAAAAEgAAACQAAAASAAAAAAAAAAAAAAAAAAAAAEAAABQAAAAAAAAAAAA4D8AAAAAAADgPwAAAAAAAOA/AAAAAAAA4D8AAAAAAADgPwAAAAAAAOA/AAAAAAAA4D8AAAAAAADgPwAAAAAAAOA/AAAAAAAA4D8CAAAAjAAAAAEAAAAAAAAAeHh4yv///wgAAAAAAAAAAAAAAAAAAAAAAAAAAAAAAAAAAAAAZAAAAAEAAABAAAAAAAAAAAAAAAAAAAAAAAAAAAAAAAAAAAAAAAAAAAAAAAAAAAAAAAAAAAAAAAAAAAAAAAAAAAAAAAAAAAAAAAAAAAAAAAAAAAAAAAAAAAAAAAAAAAAAFAAAADwAAAAAAAAAAAAAAAAAAAkUAAAAAQAAABQAAAAUAAAAFAAAAAEAAAAAAAAAZAAAAGQAAAAAAAAAZAAAAGQAAAAVAAAAYAAAAAAAAAAAAAAADwAAACADAAAAAAAAAAAAAAEAAACgMgAAVgcAAKr4//8BAAAAf39/AAEAAABkAAAAAAAAABQAAABAHwAAAAAAACYAAAAAAAAAwOD//wAAAAAmAAAAZAAAABYAAABMAAAAAAAAAAAAAAAEAAAAAAAAAAEAAADy8vIKAAAAACgAAAAoAAAAZAAAAGQAAAAAAAAAzMzMAAAAAABQAAAAUAAAAGQAAABkAAAAAAAAABcAAAAUAAAAAAAAAAAAAAD/fwAA/38AAAAAAAAJAAAABAAAAAAAAAAMAAAAEAAAAAAAAAAAAAAAAAAAAAAAAAAeAAAAaAAAAAAAAAAAAAAAAAAAAAAAAAAAAAAAECcAABAnAAAAAAAAAAAAAAAAAAAAAAAAAAAAAAAAAAAAAAAAAAAAABQAAAAAAAAAwMD/AAAAAABkAAAAMgAAAAAAAABkAAAAAAAAAH9/fwAKAAAAHwAAAFQAAAB4eHjD////AQAAAAAAAAAAAAAAAAAAAAAAAAAAAAAAAAAAAAAAAAAAAAAAAn9/fwDy8vIDzMzMAMDA/wB/f38AAAAAAAAAAAAAAAAAAAAAAAAAAAAhAAAAGAAAABQAAAAyQgAAYiYAAHdEAAAwKgAAEAAAACYAAAAIAAAAAAAAAAAAAAA="/>
+                <pr:smNativeData xmlns:pr="smNativeData" val="SMDATA_13_TQCXXhMAAAAlAAAAZAAAAA8BAAAAkAAAAEgAAACQAAAASAAAAAAAAAAAAAAAAAAAAAEAAABQAAAAAAAAAAAA4D8AAAAAAADgPwAAAAAAAOA/AAAAAAAA4D8AAAAAAADgPwAAAAAAAOA/AAAAAAAA4D8AAAAAAADgPwAAAAAAAOA/AAAAAAAA4D8CAAAAjAAAAAEAAAAAAAAAeHh4yv///wgAAAAAAAAAAAAAAAAAAAAAAAAAAAAAAAAAAAAAZAAAAAEAAABAAAAAAAAAAAAAAAAAAAAAAAAAAAAAAAAAAAAAAAAAAAAAAAAAAAAAAAAAAAAAAAAAAAAAAAAAAAAAAAAAAAAAAAAAAAAAAAAAAAAAAAAAAAAAAAAAAAAAFAAAADwAAAAAAAAAAAAAAAAAAAkUAAAAAQAAABQAAAAUAAAAFAAAAAEAAAAAAAAAZAAAAGQAAAAAAAAAZAAAAGQAAAAVAAAAYAAAAAAAAAAAAAAADwAAACADAAAAAAAAAAAAAAEAAACgMgAAVgcAAKr4//8BAAAAf39/AAEAAABkAAAAAAAAABQAAABAHwAAAAAAACYAAAAAAAAAwOD//wAAAAAmAAAAZAAAABYAAABMAAAAAAAAAAAAAAAEAAAAAAAAAAEAAADy8vIKAAAAACgAAAAoAAAAZAAAAGQAAAAAAAAAzMzMAAAAAABQAAAAUAAAAGQAAABkAAAAAAAAABcAAAAUAAAAAAAAAAAAAAD/fwAA/38AAAAAAAAJAAAABAAAAAAAAAAMAAAAEAAAAAAAAAAAAAAAAAAAAAAAAAAeAAAAaAAAAAAAAAAAAAAAAAAAAAAAAAAAAAAAECcAABAnAAAAAAAAAAAAAAAAAAAAAAAAAAAAAAAAAAAAAAAAAAAAABQAAAAAAAAAwMD/AAAAAABkAAAAMgAAAAAAAABkAAAAAAAAAH9/fwAKAAAAHwAAAFQAAAB4eHjD////AQAAAAAAAAAAAAAAAAAAAAAAAAAAAAAAAAAAAAAAAAAAAAAAAn9/fwDy8vIDzMzMAMDA/wB/f38AAAAAAAAAAAAAAAAAAAAAAAAAAAAhAAAAGAAAABQAAAAyQgAAYiYAAHdEAAAwKgAAEAAAACYAAAAIAAAAAAAAAAAAAAA="/>
               </a:ext>
             </a:extLst>
           </p:cNvSpPr>
@@ -834,7 +834,7 @@
           <a:lstStyle/>
           <a:p>
             <a:pPr/>
-            <a:fld id="{28DD268B-C5C5-88D0-8B65-3385682B7D66}" type="slidenum">
+            <a:fld id="{4E33F0F0-BEA3-6606-ED8B-4853BEC51B1D}" type="slidenum">
               <a:t>{Nr.}</a:t>
             </a:fld>
           </a:p>
@@ -872,7 +872,7 @@
             <a:spLocks noGrp="1" noChangeArrowheads="1"/>
             <a:extLst>
               <a:ext uri="smNativeData">
-                <pr:smNativeData xmlns:pr="smNativeData" val="SMDATA_13_qYmVXhMAAAAlAAAAZAAAAA8BAAAAkAAAAEgAAACQAAAASAAAAAAAAAABAAAAAAAAAAEAAABQAAAAAAAAAAAA4D8AAAAAAADgPwAAAAAAAOA/AAAAAAAA4D8AAAAAAADgPwAAAAAAAOA/AAAAAAAA4D8AAAAAAADgPwAAAAAAAOA/AAAAAAAA4D8CAAAAjAAAAAEAAAAAAAAA////CP///wgAAAAAAAAAAAAAAAAAAAAAAAAAAAAAAAAAAAAAZAAAAAEAAABAAAAAAAAAAAAAAAAAAAAAAAAAAAAAAAAAAAAAAAAAAAAAAAAAAAAAAAAAAAAAAAAAAAAAAAAAAAAAAAAAAAAAAAAAAAAAAAAAAAAAAAAAAAAAAAAAAAAAFAAAADwAAAABAAAAAAAAAAAAAAkoAAAAAQAAABQAAAAUAAAAFAAAAAEAAAAAAAAAZAAAAGQAAAAAAAAAZAAAAGQAAAAVAAAAYAAAAAAAAAAAAAAADwAAACADAAAAAAAAAAAAAAEAAACgMgAAVgcAAKr4//8BAAAAf39/AAEAAABkAAAAAAAAABQAAABAHwAAAAAAACYAAAAAAAAAwOD//wAAAAAmAAAAZAAAABYAAABMAAAAAAAAAAAAAAAEAAAAAAAAAAEAAADy8vIKAAAAACgAAAAoAAAAZAAAAGQAAAAAAAAAzMzMAAAAAABQAAAAUAAAAGQAAABkAAAAAAAAABcAAAAUAAAAAAAAAAAAAAD/fwAA/38AAAAAAAAJAAAABAAAAFJhYmkMAAAAEAAAAAAAAAAAAAAAAAAAAAAAAAAeAAAAaAAAAAAAAAAAAAAAAAAAAAAAAAAAAAAAECcAABAnAAAAAAAAAAAAAAAAAAAAAAAAAAAAAAAAAAAAAAAAAAAAABQAAAAAAAAAwMD/AAAAAABkAAAAMgAAAAAAAABkAAAAAAAAAH9/fwAKAAAAHwAAAFQAAAD///8B////AQAAAAAAAAAAAAAAAAAAAAAAAAAAAAAAAAAAAAAAAAAAAAAAAn9/fwDy8vIDzMzMAMDA/wB/f38AAAAAAAAAAAAAAAAAAAAAAAAAAAAhAAAAGAAAABQAAAC7DQAA7wUAAEc9AAA+DQAAEAAAACYAAAAIAAAAAAAAAAAAAAA="/>
+                <pr:smNativeData xmlns:pr="smNativeData" val="SMDATA_13_TQCXXhMAAAAlAAAAZAAAAA8BAAAAkAAAAEgAAACQAAAASAAAAAAAAAABAAAAAAAAAAEAAABQAAAAAAAAAAAA4D8AAAAAAADgPwAAAAAAAOA/AAAAAAAA4D8AAAAAAADgPwAAAAAAAOA/AAAAAAAA4D8AAAAAAADgPwAAAAAAAOA/AAAAAAAA4D8CAAAAjAAAAAEAAAAAAAAA////CP///wgAAAAAAAAAAAAAAAAAAAAAAAAAAAAAAAAAAAAAZAAAAAEAAABAAAAAAAAAAAAAAAAAAAAAAAAAAAAAAAAAAAAAAAAAAAAAAAAAAAAAAAAAAAAAAAAAAAAAAAAAAAAAAAAAAAAAAAAAAAAAAAAAAAAAAAAAAAAAAAAAAAAAFAAAADwAAAABAAAAAAAAAAAAAAkoAAAAAQAAABQAAAAUAAAAFAAAAAEAAAAAAAAAZAAAAGQAAAAAAAAAZAAAAGQAAAAVAAAAYAAAAAAAAAAAAAAADwAAACADAAAAAAAAAAAAAAEAAACgMgAAVgcAAKr4//8BAAAAf39/AAEAAABkAAAAAAAAABQAAABAHwAAAAAAACYAAAAAAAAAwOD//wAAAAAmAAAAZAAAABYAAABMAAAAAAAAAAAAAAAEAAAAAAAAAAEAAADy8vIKAAAAACgAAAAoAAAAZAAAAGQAAAAAAAAAzMzMAAAAAABQAAAAUAAAAGQAAABkAAAAAAAAABcAAAAUAAAAAAAAAAAAAAD/fwAA/38AAAAAAAAJAAAABAAAAFJhYmkMAAAAEAAAAAAAAAAAAAAAAAAAAAAAAAAeAAAAaAAAAAAAAAAAAAAAAAAAAAAAAAAAAAAAECcAABAnAAAAAAAAAAAAAAAAAAAAAAAAAAAAAAAAAAAAAAAAAAAAABQAAAAAAAAAwMD/AAAAAABkAAAAMgAAAAAAAABkAAAAAAAAAH9/fwAKAAAAHwAAAFQAAAD///8B////AQAAAAAAAAAAAAAAAAAAAAAAAAAAAAAAAAAAAAAAAAAAAAAAAn9/fwDy8vIDzMzMAMDA/wB/f38AAAAAAAAAAAAAAAAAAAAAAAAAAAAhAAAAGAAAABQAAAC7DQAA7wUAAEc9AAA+DQAAEAAAACYAAAAIAAAAAAAAAAAAAAA="/>
               </a:ext>
             </a:extLst>
           </p:cNvSpPr>
@@ -901,7 +901,7 @@
             <a:spLocks noGrp="1" noChangeArrowheads="1"/>
             <a:extLst>
               <a:ext uri="smNativeData">
-                <pr:smNativeData xmlns:pr="smNativeData" val="SMDATA_13_qYmVXhMAAAAlAAAAZAAAAA8BAAAAkAAAAEgAAACQAAAASAAAAAAAAAAAAAAAAAAAAAEAAABQAAAAAAAAAAAA4D8AAAAAAADgPwAAAAAAAOA/AAAAAAAA4D8AAAAAAADgPwAAAAAAAOA/AAAAAAAA4D8AAAAAAADgPwAAAAAAAOA/AAAAAAAA4D8CAAAAjAAAAAAAAAAAAAAAg8C6DP///wgAAAAAAAAAAAAAAAAAAAAAAAAAAAAAAAAAAAAAZAAAAAEAAABAAAAAAAAAAAAAAAAAAAAAAAAAAAAAAAAAAAAAAAAAAAAAAAAAAAAAAAAAAAAAAAAAAAAAAAAAAAAAAAAAAAAAAAAAAAAAAAAAAAAAAAAAAAAAAAAAAAAAFAAAADwAAAAAAAAAAAAAAAAAAAkUAAAAAQAAABQAAAAUAAAAFAAAAAEAAAAAAAAAZAAAAGQAAAAAAAAAZAAAAGQAAAAVAAAAYAAAAAAAAAAAAAAADwAAACADAAAAAAAAAAAAAAEAAACgMgAAVgcAAKr4//8BAAAAf39/AAEAAABkAAAAAAAAABQAAABAHwAAAAAAACYAAAAAAAAAwOD//wAAAAAmAAAAZAAAABYAAABMAAAAAAAAAAAAAAAEAAAAAAAAAAEAAADy8vIKAAAAACgAAAAoAAAAZAAAAGQAAAAAAAAAzMzMAAAAAABQAAAAUAAAAGQAAABkAAAAAAAAABcAAAAUAAAAAAAAAAAAAAD/fwAA/38AAAAAAAAJAAAABAAAAGVlZWUMAAAAEAAAAAAAAAAAAAAAAAAAAAAAAAAeAAAAaAAAAAAAAAAAAAAAAAAAAAAAAAAAAAAAECcAABAnAAAAAAAAAAAAAAAAAAAAAAAAAAAAAAAAAAAAAAAAAAAAABQAAAAAAAAAwMD/AAAAAABkAAAAMgAAAAAAAABkAAAAAAAAAH9/fwAKAAAAHwAAAFQAAACDwLoF////AQAAAAAAAAAAAAAAAAAAAAAAAAAAAAAAAAAAAAAAAAAAAAAAAn9/fwDy8vIDzMzMAMDA/wB/f38AAAAAAAAAAAAAAAAAAAAAAAAAAAAhAAAAGAAAABQAAAC7DQAAPBAAAEc9AABTIwAAEAAAACYAAAAIAAAAAAAAAAAAAAA="/>
+                <pr:smNativeData xmlns:pr="smNativeData" val="SMDATA_13_TQCXXhMAAAAlAAAAZAAAAA8BAAAAkAAAAEgAAACQAAAASAAAAAAAAAAAAAAAAAAAAAEAAABQAAAAAAAAAAAA4D8AAAAAAADgPwAAAAAAAOA/AAAAAAAA4D8AAAAAAADgPwAAAAAAAOA/AAAAAAAA4D8AAAAAAADgPwAAAAAAAOA/AAAAAAAA4D8CAAAAjAAAAAAAAAAAAAAAg8C6DP///wgAAAAAAAAAAAAAAAAAAAAAAAAAAAAAAAAAAAAAZAAAAAEAAABAAAAAAAAAAAAAAAAAAAAAAAAAAAAAAAAAAAAAAAAAAAAAAAAAAAAAAAAAAAAAAAAAAAAAAAAAAAAAAAAAAAAAAAAAAAAAAAAAAAAAAAAAAAAAAAAAAAAAFAAAADwAAAAAAAAAAAAAAAAAAAkUAAAAAQAAABQAAAAUAAAAFAAAAAEAAAAAAAAAZAAAAGQAAAAAAAAAZAAAAGQAAAAVAAAAYAAAAAAAAAAAAAAADwAAACADAAAAAAAAAAAAAAEAAACgMgAAVgcAAKr4//8BAAAAf39/AAEAAABkAAAAAAAAABQAAABAHwAAAAAAACYAAAAAAAAAwOD//wAAAAAmAAAAZAAAABYAAABMAAAAAAAAAAAAAAAEAAAAAAAAAAEAAADy8vIKAAAAACgAAAAoAAAAZAAAAGQAAAAAAAAAzMzMAAAAAABQAAAAUAAAAGQAAABkAAAAAAAAABcAAAAUAAAAAAAAAAAAAAD/fwAA/38AAAAAAAAJAAAABAAAAGVlZWUMAAAAEAAAAAAAAAAAAAAAAAAAAAAAAAAeAAAAaAAAAAAAAAAAAAAAAAAAAAAAAAAAAAAAECcAABAnAAAAAAAAAAAAAAAAAAAAAAAAAAAAAAAAAAAAAAAAAAAAABQAAAAAAAAAwMD/AAAAAABkAAAAMgAAAAAAAABkAAAAAAAAAH9/fwAKAAAAHwAAAFQAAACDwLoF////AQAAAAAAAAAAAAAAAAAAAAAAAAAAAAAAAAAAAAAAAAAAAAAAAn9/fwDy8vIDzMzMAMDA/wB/f38AAAAAAAAAAAAAAAAAAAAAAAAAAAAhAAAAGAAAABQAAAC7DQAAPBAAAEc9AABTIwAAEAAAACYAAAAIAAAAAAAAAAAAAAA="/>
               </a:ext>
             </a:extLst>
           </p:cNvSpPr>
@@ -952,7 +952,7 @@
             <a:spLocks noGrp="1" noChangeArrowheads="1"/>
             <a:extLst>
               <a:ext uri="smNativeData">
-                <pr:smNativeData xmlns:pr="smNativeData" val="SMDATA_13_qYmVXhMAAAAlAAAAZAAAAA8BAAAAkAAAAEgAAACQAAAASAAAAAAAAAAAAAAAAAAAAAEAAABQAAAAAAAAAAAA4D8AAAAAAADgPwAAAAAAAOA/AAAAAAAA4D8AAAAAAADgPwAAAAAAAOA/AAAAAAAA4D8AAAAAAADgPwAAAAAAAOA/AAAAAAAA4D8CAAAAjAAAAAAAAAAAAAAAg8C6DP///wgAAAAAAAAAAAAAAAAAAAAAAAAAAAAAAAAAAAAAZAAAAAEAAABAAAAAAAAAAAAAAAAAAAAAAAAAAAAAAAAAAAAAAAAAAAAAAAAAAAAAAAAAAAAAAAAAAAAAAAAAAAAAAAAAAAAAAAAAAAAAAAAAAAAAAAAAAAAAAAAAAAAAFAAAADwAAAAAAAAAAAAAAAAAAAkUAAAAAQAAABQAAAAUAAAAFAAAAAEAAAAAAAAAZAAAAGQAAAAAAAAAZAAAAGQAAAAVAAAAYAAAAAAAAAAAAAAADwAAACADAAAAAAAAAAAAAAEAAACgMgAAVgcAAKr4//8BAAAAf39/AAEAAABkAAAAAAAAABQAAABAHwAAAAAAACYAAAAAAAAAwOD//wAAAAAmAAAAZAAAABYAAABMAAAAAAAAAAAAAAAEAAAAAAAAAAEAAADy8vIKAAAAACgAAAAoAAAAZAAAAGQAAAAAAAAAzMzMAAAAAABQAAAAUAAAAGQAAABkAAAAAAAAABcAAAAUAAAAAAAAAAAAAAD/fwAA/38AAAAAAAAJAAAABAAAAIPQsdAMAAAAEAAAAAAAAAAAAAAAAAAAAAAAAAAeAAAAaAAAAAAAAAAAAAAAAAAAAAAAAAAAAAAAECcAABAnAAAAAAAAAAAAAAAAAAAAAAAAAAAAAAAAAAAAAAAAAAAAABQAAAAAAAAAwMD/AAAAAABkAAAAMgAAAAAAAABkAAAAAAAAAH9/fwAKAAAAHwAAAFQAAACDwLoF////AQAAAAAAAAAAAAAAAAAAAAAAAAAAAAAAAAAAAAAAAAAAAAAAAn9/fwDy8vIDzMzMAMDA/wB/f38AAAAAAAAAAAAAAAAAAAAAAAAAAAAhAAAAGAAAABQAAAAfMAAAYiYAABBBAABgKAAAEAAAACYAAAAIAAAAAAAAAAAAAAA="/>
+                <pr:smNativeData xmlns:pr="smNativeData" val="SMDATA_13_TQCXXhMAAAAlAAAAZAAAAA8BAAAAkAAAAEgAAACQAAAASAAAAAAAAAAAAAAAAAAAAAEAAABQAAAAAAAAAAAA4D8AAAAAAADgPwAAAAAAAOA/AAAAAAAA4D8AAAAAAADgPwAAAAAAAOA/AAAAAAAA4D8AAAAAAADgPwAAAAAAAOA/AAAAAAAA4D8CAAAAjAAAAAAAAAAAAAAAg8C6DP///wgAAAAAAAAAAAAAAAAAAAAAAAAAAAAAAAAAAAAAZAAAAAEAAABAAAAAAAAAAAAAAAAAAAAAAAAAAAAAAAAAAAAAAAAAAAAAAAAAAAAAAAAAAAAAAAAAAAAAAAAAAAAAAAAAAAAAAAAAAAAAAAAAAAAAAAAAAAAAAAAAAAAAFAAAADwAAAAAAAAAAAAAAAAAAAkUAAAAAQAAABQAAAAUAAAAFAAAAAEAAAAAAAAAZAAAAGQAAAAAAAAAZAAAAGQAAAAVAAAAYAAAAAAAAAAAAAAADwAAACADAAAAAAAAAAAAAAEAAACgMgAAVgcAAKr4//8BAAAAf39/AAEAAABkAAAAAAAAABQAAABAHwAAAAAAACYAAAAAAAAAwOD//wAAAAAmAAAAZAAAABYAAABMAAAAAAAAAAAAAAAEAAAAAAAAAAEAAADy8vIKAAAAACgAAAAoAAAAZAAAAGQAAAAAAAAAzMzMAAAAAABQAAAAUAAAAGQAAABkAAAAAAAAABcAAAAUAAAAAAAAAAAAAAD/fwAA/38AAAAAAAAJAAAABAAAAIPQsdAMAAAAEAAAAAAAAAAAAAAAAAAAAAAAAAAeAAAAaAAAAAAAAAAAAAAAAAAAAAAAAAAAAAAAECcAABAnAAAAAAAAAAAAAAAAAAAAAAAAAAAAAAAAAAAAAAAAAAAAABQAAAAAAAAAwMD/AAAAAABkAAAAMgAAAAAAAABkAAAAAAAAAH9/fwAKAAAAHwAAAFQAAACDwLoF////AQAAAAAAAAAAAAAAAAAAAAAAAAAAAAAAAAAAAAAAAAAAAAAAAn9/fwDy8vIDzMzMAMDA/wB/f38AAAAAAAAAAAAAAAAAAAAAAAAAAAAhAAAAGAAAABQAAAAfMAAAYiYAABBBAABgKAAAEAAAACYAAAAIAAAAAAAAAAAAAAA="/>
               </a:ext>
             </a:extLst>
           </p:cNvSpPr>
@@ -966,8 +966,8 @@
           <a:lstStyle/>
           <a:p>
             <a:pPr/>
-            <a:fld id="{1A7AA8EE-A0F7-2F5E-B9C2-560BE68C4F03}" type="datetime1">
-              <a:t>{Date/Time}</a:t>
+            <a:fld id="{7586FA57-1998-D30C-D63E-EF59B47020BA}" type="datetime1">
+              <a:t/>
             </a:fld>
           </a:p>
         </p:txBody>
@@ -979,7 +979,7 @@
             <a:spLocks noGrp="1" noChangeArrowheads="1"/>
             <a:extLst>
               <a:ext uri="smNativeData">
-                <pr:smNativeData xmlns:pr="smNativeData" val="SMDATA_13_qYmVXhMAAAAlAAAAZAAAAA8BAAAAkAAAAEgAAACQAAAASAAAAAAAAAAAAAAAAAAAAAEAAABQAAAAAAAAAAAA4D8AAAAAAADgPwAAAAAAAOA/AAAAAAAA4D8AAAAAAADgPwAAAAAAAOA/AAAAAAAA4D8AAAAAAADgPwAAAAAAAOA/AAAAAAAA4D8CAAAAjAAAAAAAAAAAAAAAg8C6DP///wgAAAAAAAAAAAAAAAAAAAAAAAAAAAAAAAAAAAAAZAAAAAEAAABAAAAAAAAAAAAAAAAAAAAAAAAAAAAAAAAAAAAAAAAAAAAAAAAAAAAAAAAAAAAAAAAAAAAAAAAAAAAAAAAAAAAAAAAAAAAAAAAAAAAAAAAAAAAAAAAAAAAAFAAAADwAAAAAAAAAAAAAAAAAAAkUAAAAAQAAABQAAAAUAAAAFAAAAAEAAAAAAAAAZAAAAGQAAAAAAAAAZAAAAGQAAAAVAAAAYAAAAAAAAAAAAAAADwAAACADAAAAAAAAAAAAAAEAAACgMgAAVgcAAKr4//8BAAAAf39/AAEAAABkAAAAAAAAABQAAABAHwAAAAAAACYAAAAAAAAAwOD//wAAAAAmAAAAZAAAABYAAABMAAAAAAAAAAAAAAAEAAAAAAAAAAEAAADy8vIKAAAAACgAAAAoAAAAZAAAAGQAAAAAAAAAzMzMAAAAAABQAAAAUAAAAGQAAABkAAAAAAAAABcAAAAUAAAAAAAAAAAAAAD/fwAA/38AAAAAAAAJAAAABAAAAE0AaQAMAAAAEAAAAAAAAAAAAAAAAAAAAAAAAAAeAAAAaAAAAAAAAAAAAAAAAAAAAAAAAAAAAAAAECcAABAnAAAAAAAAAAAAAAAAAAAAAAAAAAAAAAAAAAAAAAAAAAAAABQAAAAAAAAAwMD/AAAAAABkAAAAMgAAAAAAAABkAAAAAAAAAH9/fwAKAAAAHwAAAFQAAACDwLoF////AQAAAAAAAAAAAAAAAAAAAAAAAAAAAAAAAAAAAAAAAAAAAAAAAn9/fwDy8vIDzMzMAMDA/wB/f38AAAAAAAAAAAAAAAAAAAAAAAAAAAAhAAAAGAAAABQAAADcCQAAXCYAACguAABVKAAAEAAAACYAAAAIAAAAAAAAAAAAAAA="/>
+                <pr:smNativeData xmlns:pr="smNativeData" val="SMDATA_13_TQCXXhMAAAAlAAAAZAAAAA8BAAAAkAAAAEgAAACQAAAASAAAAAAAAAAAAAAAAAAAAAEAAABQAAAAAAAAAAAA4D8AAAAAAADgPwAAAAAAAOA/AAAAAAAA4D8AAAAAAADgPwAAAAAAAOA/AAAAAAAA4D8AAAAAAADgPwAAAAAAAOA/AAAAAAAA4D8CAAAAjAAAAAAAAAAAAAAAg8C6DP///wgAAAAAAAAAAAAAAAAAAAAAAAAAAAAAAAAAAAAAZAAAAAEAAABAAAAAAAAAAAAAAAAAAAAAAAAAAAAAAAAAAAAAAAAAAAAAAAAAAAAAAAAAAAAAAAAAAAAAAAAAAAAAAAAAAAAAAAAAAAAAAAAAAAAAAAAAAAAAAAAAAAAAFAAAADwAAAAAAAAAAAAAAAAAAAkUAAAAAQAAABQAAAAUAAAAFAAAAAEAAAAAAAAAZAAAAGQAAAAAAAAAZAAAAGQAAAAVAAAAYAAAAAAAAAAAAAAADwAAACADAAAAAAAAAAAAAAEAAACgMgAAVgcAAKr4//8BAAAAf39/AAEAAABkAAAAAAAAABQAAABAHwAAAAAAACYAAAAAAAAAwOD//wAAAAAmAAAAZAAAABYAAABMAAAAAAAAAAAAAAAEAAAAAAAAAAEAAADy8vIKAAAAACgAAAAoAAAAZAAAAGQAAAAAAAAAzMzMAAAAAABQAAAAUAAAAGQAAABkAAAAAAAAABcAAAAUAAAAAAAAAAAAAAD/fwAA/38AAAAAAAAJAAAABAAAAE0AaQAMAAAAEAAAAAAAAAAAAAAAAAAAAAAAAAAeAAAAaAAAAAAAAAAAAAAAAAAAAAAAAAAAAAAAECcAABAnAAAAAAAAAAAAAAAAAAAAAAAAAAAAAAAAAAAAAAAAAAAAABQAAAAAAAAAwMD/AAAAAABkAAAAMgAAAAAAAABkAAAAAAAAAH9/fwAKAAAAHwAAAFQAAACDwLoF////AQAAAAAAAAAAAAAAAAAAAAAAAAAAAAAAAAAAAAAAAAAAAAAAAn9/fwDy8vIDzMzMAMDA/wB/f38AAAAAAAAAAAAAAAAAAAAAAAAAAAAhAAAAGAAAABQAAADcCQAAXCYAACguAABVKAAAEAAAACYAAAAIAAAAAAAAAAAAAAA="/>
               </a:ext>
             </a:extLst>
           </p:cNvSpPr>
@@ -1006,7 +1006,7 @@
             <a:spLocks noGrp="1" noChangeArrowheads="1"/>
             <a:extLst>
               <a:ext uri="smNativeData">
-                <pr:smNativeData xmlns:pr="smNativeData" val="SMDATA_13_qYmVXhMAAAAlAAAAZAAAAA8BAAAAkAAAAEgAAACQAAAASAAAAAAAAAAAAAAAAAAAAAEAAABQAAAAAAAAAAAA4D8AAAAAAADgPwAAAAAAAOA/AAAAAAAA4D8AAAAAAADgPwAAAAAAAOA/AAAAAAAA4D8AAAAAAADgPwAAAAAAAOA/AAAAAAAA4D8CAAAAjAAAAAEAAAAAAAAAeHh4yv///wgAAAAAAAAAAAAAAAAAAAAAAAAAAAAAAAAAAAAAZAAAAAEAAABAAAAAAAAAAAAAAAAAAAAAAAAAAAAAAAAAAAAAAAAAAAAAAAAAAAAAAAAAAAAAAAAAAAAAAAAAAAAAAAAAAAAAAAAAAAAAAAAAAAAAAAAAAAAAAAAAAAAAFAAAADwAAAAAAAAAAAAAAAAAAAkUAAAAAQAAABQAAAAUAAAAFAAAAAEAAAAAAAAAZAAAAGQAAAAAAAAAZAAAAGQAAAAVAAAAYAAAAAAAAAAAAAAADwAAACADAAAAAAAAAAAAAAEAAACgMgAAVgcAAKr4//8BAAAAf39/AAEAAABkAAAAAAAAABQAAABAHwAAAAAAACYAAAAAAAAAwOD//wAAAAAmAAAAZAAAABYAAABMAAAAAAAAAAAAAAAEAAAAAAAAAAEAAADy8vIKAAAAACgAAAAoAAAAZAAAAGQAAAAAAAAAzMzMAAAAAABQAAAAUAAAAGQAAABkAAAAAAAAABcAAAAUAAAAAAAAAAAAAAD/fwAA/38AAAAAAAAJAAAABAAAACAATQAMAAAAEAAAAAAAAAAAAAAAAAAAAAAAAAAeAAAAaAAAAAAAAAAAAAAAAAAAAAAAAAAAAAAAECcAABAnAAAAAAAAAAAAAAAAAAAAAAAAAAAAAAAAAAAAAAAAAAAAABQAAAAAAAAAwMD/AAAAAABkAAAAMgAAAAAAAABkAAAAAAAAAH9/fwAKAAAAHwAAAFQAAAB4eHjD////AQAAAAAAAAAAAAAAAAAAAAAAAAAAAAAAAAAAAAAAAAAAAAAAAn9/fwDy8vIDzMzMAMDA/wB/f38AAAAAAAAAAAAAAAAAAAAAAAAAAAAhAAAAGAAAABQAAAAyQgAAYiYAAHdEAAAwKgAAEAAAACYAAAAIAAAAAAAAAAAAAAA="/>
+                <pr:smNativeData xmlns:pr="smNativeData" val="SMDATA_13_TQCXXhMAAAAlAAAAZAAAAA8BAAAAkAAAAEgAAACQAAAASAAAAAAAAAAAAAAAAAAAAAEAAABQAAAAAAAAAAAA4D8AAAAAAADgPwAAAAAAAOA/AAAAAAAA4D8AAAAAAADgPwAAAAAAAOA/AAAAAAAA4D8AAAAAAADgPwAAAAAAAOA/AAAAAAAA4D8CAAAAjAAAAAEAAAAAAAAAeHh4yv///wgAAAAAAAAAAAAAAAAAAAAAAAAAAAAAAAAAAAAAZAAAAAEAAABAAAAAAAAAAAAAAAAAAAAAAAAAAAAAAAAAAAAAAAAAAAAAAAAAAAAAAAAAAAAAAAAAAAAAAAAAAAAAAAAAAAAAAAAAAAAAAAAAAAAAAAAAAAAAAAAAAAAAFAAAADwAAAAAAAAAAAAAAAAAAAkUAAAAAQAAABQAAAAUAAAAFAAAAAEAAAAAAAAAZAAAAGQAAAAAAAAAZAAAAGQAAAAVAAAAYAAAAAAAAAAAAAAADwAAACADAAAAAAAAAAAAAAEAAACgMgAAVgcAAKr4//8BAAAAf39/AAEAAABkAAAAAAAAABQAAABAHwAAAAAAACYAAAAAAAAAwOD//wAAAAAmAAAAZAAAABYAAABMAAAAAAAAAAAAAAAEAAAAAAAAAAEAAADy8vIKAAAAACgAAAAoAAAAZAAAAGQAAAAAAAAAzMzMAAAAAABQAAAAUAAAAGQAAABkAAAAAAAAABcAAAAUAAAAAAAAAAAAAAD/fwAA/38AAAAAAAAJAAAABAAAACAATQAMAAAAEAAAAAAAAAAAAAAAAAAAAAAAAAAeAAAAaAAAAAAAAAAAAAAAAAAAAAAAAAAAAAAAECcAABAnAAAAAAAAAAAAAAAAAAAAAAAAAAAAAAAAAAAAAAAAAAAAABQAAAAAAAAAwMD/AAAAAABkAAAAMgAAAAAAAABkAAAAAAAAAH9/fwAKAAAAHwAAAFQAAAB4eHjD////AQAAAAAAAAAAAAAAAAAAAAAAAAAAAAAAAAAAAAAAAAAAAAAAAn9/fwDy8vIDzMzMAMDA/wB/f38AAAAAAAAAAAAAAAAAAAAAAAAAAAAhAAAAGAAAABQAAAAyQgAAYiYAAHdEAAAwKgAAEAAAACYAAAAIAAAAAAAAAAAAAAA="/>
               </a:ext>
             </a:extLst>
           </p:cNvSpPr>
@@ -1020,8 +1020,8 @@
           <a:lstStyle/>
           <a:p>
             <a:pPr/>
-            <a:fld id="{0F69DF4A-04E2-3C29-ACD1-F27C919F5AA7}" type="slidenum">
-              <a:t>{Nr.}</a:t>
+            <a:fld id="{14441A84-CAF9-11EC-B7FC-3CB954B24169}" type="slidenum">
+              <a:t/>
             </a:fld>
           </a:p>
         </p:txBody>
@@ -1066,7 +1066,7 @@
             <a:spLocks noGrp="1" noChangeArrowheads="1"/>
             <a:extLst>
               <a:ext uri="smNativeData">
-                <pr:smNativeData xmlns:pr="smNativeData" val="SMDATA_13_qYmVXhMAAAAlAAAAZAAAAA8BAAAAkAAAAEgAAACQAAAASAAAAAAAAAABAAAAAAAAAAEAAABQAAAAAAAAAAAA4D8AAAAAAADgPwAAAAAAAOA/AAAAAAAA4D8AAAAAAADgPwAAAAAAAOA/AAAAAAAA4D8AAAAAAADgPwAAAAAAAOA/AAAAAAAA4D8CAAAAjAAAAAEAAAAAAAAA////CP///wgAAAAAAAAAAAAAAAAAAAAAAAAAAAAAAAAAAAAAZAAAAAEAAABAAAAAAAAAAAAAAAAAAAAAAAAAAAAAAAAAAAAAAAAAAAAAAAAAAAAAAAAAAAAAAAAAAAAAAAAAAAAAAAAAAAAAAAAAAAAAAAAAAAAAAAAAAAAAAAAAAAAAFAAAADwAAAABAAAAAAAAAAAAAAkoAAAAAQAAABQAAAAUAAAAFAAAAAEAAAAAAAAAZAAAAGQAAAAAAAAAZAAAAGQAAAAVAAAAYAAAAAAAAAAAAAAADwAAACADAAAAAAAAAAAAAAEAAACgMgAAVgcAAKr4//8BAAAAf39/AAEAAABkAAAAAAAAABQAAABAHwAAAAAAACYAAAAAAAAAwOD//wAAAAAmAAAAZAAAABYAAABMAAAAAAAAAAAAAAAEAAAAAAAAAAEAAADy8vIKAAAAACgAAAAoAAAAZAAAAGQAAAAAAAAAzMzMAAAAAABQAAAAUAAAAGQAAABkAAAAAAAAABcAAAAUAAAAAAAAAAAAAAD/fwAA/38AAAAAAAAJAAAABAAAAAAAAAAMAAAAEAAAAAAAAAAAAAAAAAAAAAAAAAAeAAAAaAAAAAAAAAAAAAAAAAAAAAAAAAAAAAAAECcAABAnAAAAAAAAAAAAAAAAAAAAAAAAAAAAAAAAAAAAAAAAAAAAABQAAAAAAAAAwMD/AAAAAABkAAAAMgAAAAAAAABkAAAAAAAAAH9/fwAKAAAAHwAAAFQAAAD///8B////AQAAAAAAAAAAAAAAAAAAAAAAAAAAAAAAAAAAAAAAAAAAAAAAAn9/fwDy8vIDzMzMAMDA/wB/f38AAAAAAAAAAAAAAAAAAAAAAAAAAAAhAAAAGAAAABQAAADbCQAAsA4AAC1BAADPGAAAEAAAACYAAAAIAAAAAYAAAAAAAAA="/>
+                <pr:smNativeData xmlns:pr="smNativeData" val="SMDATA_13_TQCXXhMAAAAlAAAAZAAAAA8BAAAAkAAAAEgAAACQAAAASAAAAAAAAAABAAAAAAAAAAEAAABQAAAAAAAAAAAA4D8AAAAAAADgPwAAAAAAAOA/AAAAAAAA4D8AAAAAAADgPwAAAAAAAOA/AAAAAAAA4D8AAAAAAADgPwAAAAAAAOA/AAAAAAAA4D8CAAAAjAAAAAEAAAAAAAAA////CP///wgAAAAAAAAAAAAAAAAAAAAAAAAAAAAAAAAAAAAAZAAAAAEAAABAAAAAAAAAAAAAAAAAAAAAAAAAAAAAAAAAAAAAAAAAAAAAAAAAAAAAAAAAAAAAAAAAAAAAAAAAAAAAAAAAAAAAAAAAAAAAAAAAAAAAAAAAAAAAAAAAAAAAFAAAADwAAAABAAAAAAAAAAAAAAkoAAAAAQAAABQAAAAUAAAAFAAAAAEAAAAAAAAAZAAAAGQAAAAAAAAAZAAAAGQAAAAVAAAAYAAAAAAAAAAAAAAADwAAACADAAAAAAAAAAAAAAEAAACgMgAAVgcAAKr4//8BAAAAf39/AAEAAABkAAAAAAAAABQAAABAHwAAAAAAACYAAAAAAAAAwOD//wAAAAAmAAAAZAAAABYAAABMAAAAAAAAAAAAAAAEAAAAAAAAAAEAAADy8vIKAAAAACgAAAAoAAAAZAAAAGQAAAAAAAAAzMzMAAAAAABQAAAAUAAAAGQAAABkAAAAAAAAABcAAAAUAAAAAAAAAAAAAAD/fwAA/38AAAAAAAAJAAAABAAAAAAAAAAMAAAAEAAAAAAAAAAAAAAAAAAAAAAAAAAeAAAAaAAAAAAAAAAAAAAAAAAAAAAAAAAAAAAAECcAABAnAAAAAAAAAAAAAAAAAAAAAAAAAAAAAAAAAAAAAAAAAAAAABQAAAAAAAAAwMD/AAAAAABkAAAAMgAAAAAAAABkAAAAAAAAAH9/fwAKAAAAHwAAAFQAAAD///8B////AQAAAAAAAAAAAAAAAAAAAAAAAAAAAAAAAAAAAAAAAAAAAAAAAn9/fwDy8vIDzMzMAMDA/wB/f38AAAAAAAAAAAAAAAAAAAAAAAAAAAAhAAAAGAAAABQAAADbCQAAsA4AAC1BAADPGAAAEAAAACYAAAAIAAAAAYAAAAAAAAA="/>
               </a:ext>
             </a:extLst>
           </p:cNvSpPr>
@@ -1104,7 +1104,7 @@
             <a:spLocks noGrp="1" noChangeArrowheads="1"/>
             <a:extLst>
               <a:ext uri="smNativeData">
-                <pr:smNativeData xmlns:pr="smNativeData" val="SMDATA_13_qYmVXhMAAAAlAAAAZAAAAA8BAAAAkAAAAEgAAACQAAAASAAAAAAAAAAAAAAAAAAAAAEAAABQAAAAAAAAAAAA4D8AAAAAAADgPwAAAAAAAOA/AAAAAAAA4D8AAAAAAADgPwAAAAAAAOA/AAAAAAAA4D8AAAAAAADgPwAAAAAAAOA/AAAAAAAA4D8CAAAAjAAAAAAAAAAAAAAAg8C6DP///wgAAAAAAAAAAAAAAAAAAAAAAAAAAAAAAAAAAAAAZAAAAAEAAABAAAAAAAAAAAAAAAAAAAAAAAAAAAAAAAAAAAAAAAAAAAAAAAAAAAAAAAAAAAAAAAAAAAAAAAAAAAAAAAAAAAAAAAAAAAAAAAAAAAAAAAAAAAAAAAAAAAAAFAAAADwAAAAAAAAAAAAAAAAAAAkUAAAAAQAAABQAAAAUAAAAFAAAAAEAAAAAAAAAZAAAAGQAAAAAAAAAZAAAAGQAAAAVAAAAYAAAAAAAAAAAAAAADwAAACADAAAAAAAAAAAAAAEAAACgMgAAVgcAAKr4//8BAAAAf39/AAEAAABkAAAAAAAAABQAAABAHwAAAAAAACYAAAAAAAAAwOD//wAAAAAmAAAAZAAAABYAAABMAAAAAAAAAAAAAAAEAAAAAAAAAAEAAADy8vIKAAAAACgAAAAoAAAAZAAAAGQAAAAAAAAAzMzMAAAAAABQAAAAUAAAAGQAAABkAAAAAAAAABcAAAAUAAAAAAAAAAAAAAD/fwAA/38AAAAAAAAJAAAABAAAAAAAAAAMAAAAEAAAAAAAAAAAAAAAAAAAAAAAAAAeAAAAaAAAAAAAAAAAAAAAAAAAAAAAAAAAAAAAECcAABAnAAAAAAAAAAAAAAAAAAAAAAAAAAAAAAAAAAAAAAAAAAAAABQAAAAAAAAAwMD/AAAAAABkAAAAMgAAAAAAAABkAAAAAAAAAH9/fwAKAAAAHwAAAFQAAACDwLoF////AQAAAAAAAAAAAAAAAAAAAAAAAAAAAAAAAAAAAAAAAAAAAAAAAn9/fwDy8vIDzMzMAMDA/wB/f38AAAAAAAAAAAAAAAAAAAAAAAAAAAAhAAAAGAAAABQAAACWEAAAxxoAAGs6AABlIgAAEAAAACYAAAAIAAAAAYAAAAAAAAA="/>
+                <pr:smNativeData xmlns:pr="smNativeData" val="SMDATA_13_TQCXXhMAAAAlAAAAZAAAAA8BAAAAkAAAAEgAAACQAAAASAAAAAAAAAAAAAAAAAAAAAEAAABQAAAAAAAAAAAA4D8AAAAAAADgPwAAAAAAAOA/AAAAAAAA4D8AAAAAAADgPwAAAAAAAOA/AAAAAAAA4D8AAAAAAADgPwAAAAAAAOA/AAAAAAAA4D8CAAAAjAAAAAAAAAAAAAAAg8C6DP///wgAAAAAAAAAAAAAAAAAAAAAAAAAAAAAAAAAAAAAZAAAAAEAAABAAAAAAAAAAAAAAAAAAAAAAAAAAAAAAAAAAAAAAAAAAAAAAAAAAAAAAAAAAAAAAAAAAAAAAAAAAAAAAAAAAAAAAAAAAAAAAAAAAAAAAAAAAAAAAAAAAAAAFAAAADwAAAAAAAAAAAAAAAAAAAkUAAAAAQAAABQAAAAUAAAAFAAAAAEAAAAAAAAAZAAAAGQAAAAAAAAAZAAAAGQAAAAVAAAAYAAAAAAAAAAAAAAADwAAACADAAAAAAAAAAAAAAEAAACgMgAAVgcAAKr4//8BAAAAf39/AAEAAABkAAAAAAAAABQAAABAHwAAAAAAACYAAAAAAAAAwOD//wAAAAAmAAAAZAAAABYAAABMAAAAAAAAAAAAAAAEAAAAAAAAAAEAAADy8vIKAAAAACgAAAAoAAAAZAAAAGQAAAAAAAAAzMzMAAAAAABQAAAAUAAAAGQAAABkAAAAAAAAABcAAAAUAAAAAAAAAAAAAAD/fwAA/38AAAAAAAAJAAAABAAAAAAAAAAMAAAAEAAAAAAAAAAAAAAAAAAAAAAAAAAeAAAAaAAAAAAAAAAAAAAAAAAAAAAAAAAAAAAAECcAABAnAAAAAAAAAAAAAAAAAAAAAAAAAAAAAAAAAAAAAAAAAAAAABQAAAAAAAAAwMD/AAAAAABkAAAAMgAAAAAAAABkAAAAAAAAAH9/fwAKAAAAHwAAAFQAAACDwLoF////AQAAAAAAAAAAAAAAAAAAAAAAAAAAAAAAAAAAAAAAAAAAAAAAAn9/fwDy8vIDzMzMAMDA/wB/f38AAAAAAAAAAAAAAAAAAAAAAAAAAAAhAAAAGAAAABQAAACWEAAAxxoAAGs6AABlIgAAEAAAACYAAAAIAAAAAYAAAAAAAAA="/>
               </a:ext>
             </a:extLst>
           </p:cNvSpPr>
@@ -1177,7 +1177,7 @@
             <a:spLocks noGrp="1" noChangeArrowheads="1"/>
             <a:extLst>
               <a:ext uri="smNativeData">
-                <pr:smNativeData xmlns:pr="smNativeData" val="SMDATA_13_qYmVXhMAAAAlAAAAZAAAAA8BAAAAkAAAAEgAAACQAAAASAAAAAAAAAAAAAAAAAAAAAEAAABQAAAAAAAAAAAA4D8AAAAAAADgPwAAAAAAAOA/AAAAAAAA4D8AAAAAAADgPwAAAAAAAOA/AAAAAAAA4D8AAAAAAADgPwAAAAAAAOA/AAAAAAAA4D8CAAAAjAAAAAAAAAAAAAAAg8C6DP///wgAAAAAAAAAAAAAAAAAAAAAAAAAAAAAAAAAAAAAZAAAAAEAAABAAAAAAAAAAAAAAAAAAAAAAAAAAAAAAAAAAAAAAAAAAAAAAAAAAAAAAAAAAAAAAAAAAAAAAAAAAAAAAAAAAAAAAAAAAAAAAAAAAAAAAAAAAAAAAAAAAAAAFAAAADwAAAAAAAAAAAAAAAAAAAkUAAAAAQAAABQAAAAUAAAAFAAAAAEAAAAAAAAAZAAAAGQAAAAAAAAAZAAAAGQAAAAVAAAAYAAAAAAAAAAAAAAADwAAACADAAAAAAAAAAAAAAEAAACgMgAAVgcAAKr4//8BAAAAf39/AAEAAABkAAAAAAAAABQAAABAHwAAAAAAACYAAAAAAAAAwOD//wAAAAAmAAAAZAAAABYAAABMAAAAAAAAAAAAAAAEAAAAAAAAAAEAAADy8vIKAAAAACgAAAAoAAAAZAAAAGQAAAAAAAAAzMzMAAAAAABQAAAAUAAAAGQAAABkAAAAAAAAABcAAAAUAAAAAAAAAAAAAAD/fwAA/38AAAAAAAAJAAAABAAAAIAAAAAMAAAAEAAAAAAAAAAAAAAAAAAAAAAAAAAeAAAAaAAAAAAAAAAAAAAAAAAAAAAAAAAAAAAAECcAABAnAAAAAAAAAAAAAAAAAAAAAAAAAAAAAAAAAAAAAAAAAAAAABQAAAAAAAAAwMD/AAAAAABkAAAAMgAAAAAAAABkAAAAAAAAAH9/fwAKAAAAHwAAAFQAAACDwLoF////AQAAAAAAAAAAAAAAAAAAAAAAAAAAAAAAAAAAAAAAAAAAAAAAAn9/fwDy8vIDzMzMAMDA/wB/f38AAAAAAAAAAAAAAAAAAAAAAAAAAAAhAAAAGAAAABQAAAAfMAAAYiYAABBBAABgKAAAEAAAACYAAAAIAAAAAIAAAAAAAAA="/>
+                <pr:smNativeData xmlns:pr="smNativeData" val="SMDATA_13_TQCXXhMAAAAlAAAAZAAAAA8BAAAAkAAAAEgAAACQAAAASAAAAAAAAAAAAAAAAAAAAAEAAABQAAAAAAAAAAAA4D8AAAAAAADgPwAAAAAAAOA/AAAAAAAA4D8AAAAAAADgPwAAAAAAAOA/AAAAAAAA4D8AAAAAAADgPwAAAAAAAOA/AAAAAAAA4D8CAAAAjAAAAAAAAAAAAAAAg8C6DP///wgAAAAAAAAAAAAAAAAAAAAAAAAAAAAAAAAAAAAAZAAAAAEAAABAAAAAAAAAAAAAAAAAAAAAAAAAAAAAAAAAAAAAAAAAAAAAAAAAAAAAAAAAAAAAAAAAAAAAAAAAAAAAAAAAAAAAAAAAAAAAAAAAAAAAAAAAAAAAAAAAAAAAFAAAADwAAAAAAAAAAAAAAAAAAAkUAAAAAQAAABQAAAAUAAAAFAAAAAEAAAAAAAAAZAAAAGQAAAAAAAAAZAAAAGQAAAAVAAAAYAAAAAAAAAAAAAAADwAAACADAAAAAAAAAAAAAAEAAACgMgAAVgcAAKr4//8BAAAAf39/AAEAAABkAAAAAAAAABQAAABAHwAAAAAAACYAAAAAAAAAwOD//wAAAAAmAAAAZAAAABYAAABMAAAAAAAAAAAAAAAEAAAAAAAAAAEAAADy8vIKAAAAACgAAAAoAAAAZAAAAGQAAAAAAAAAzMzMAAAAAABQAAAAUAAAAGQAAABkAAAAAAAAABcAAAAUAAAAAAAAAAAAAAD/fwAA/38AAAAAAAAJAAAABAAAAIAAAAAMAAAAEAAAAAAAAAAAAAAAAAAAAAAAAAAeAAAAaAAAAAAAAAAAAAAAAAAAAAAAAAAAAAAAECcAABAnAAAAAAAAAAAAAAAAAAAAAAAAAAAAAAAAAAAAAAAAAAAAABQAAAAAAAAAwMD/AAAAAABkAAAAMgAAAAAAAABkAAAAAAAAAH9/fwAKAAAAHwAAAFQAAACDwLoF////AQAAAAAAAAAAAAAAAAAAAAAAAAAAAAAAAAAAAAAAAAAAAAAAAn9/fwDy8vIDzMzMAMDA/wB/f38AAAAAAAAAAAAAAAAAAAAAAAAAAAAhAAAAGAAAABQAAAAfMAAAYiYAABBBAABgKAAAEAAAACYAAAAIAAAAAIAAAAAAAAA="/>
               </a:ext>
             </a:extLst>
           </p:cNvSpPr>
@@ -1199,7 +1199,7 @@
           </a:lstStyle>
           <a:p>
             <a:pPr/>
-            <a:fld id="{3EA2FE37-79D3-F708-9D1A-8F5DB0546BDA}" type="datetime1">
+            <a:fld id="{2C9D4986-C8C1-C8BF-8F25-3EEA076B796B}" type="datetime1">
               <a:t>{Date/Time}</a:t>
             </a:fld>
           </a:p>
@@ -1212,7 +1212,7 @@
             <a:spLocks noGrp="1" noChangeArrowheads="1"/>
             <a:extLst>
               <a:ext uri="smNativeData">
-                <pr:smNativeData xmlns:pr="smNativeData" val="SMDATA_13_qYmVXhMAAAAlAAAAZAAAAA8BAAAAkAAAAEgAAACQAAAASAAAAAAAAAAAAAAAAAAAAAEAAABQAAAAAAAAAAAA4D8AAAAAAADgPwAAAAAAAOA/AAAAAAAA4D8AAAAAAADgPwAAAAAAAOA/AAAAAAAA4D8AAAAAAADgPwAAAAAAAOA/AAAAAAAA4D8CAAAAjAAAAAAAAAAAAAAAg8C6DP///wgAAAAAAAAAAAAAAAAAAAAAAAAAAAAAAAAAAAAAZAAAAAEAAABAAAAAAAAAAAAAAAAAAAAAAAAAAAAAAAAAAAAAAAAAAAAAAAAAAAAAAAAAAAAAAAAAAAAAAAAAAAAAAAAAAAAAAAAAAAAAAAAAAAAAAAAAAAAAAAAAAAAAFAAAADwAAAAAAAAAAAAAAAAAAAkUAAAAAQAAABQAAAAUAAAAFAAAAAEAAAAAAAAAZAAAAGQAAAAAAAAAZAAAAGQAAAAVAAAAYAAAAAAAAAAAAAAADwAAACADAAAAAAAAAAAAAAEAAACgMgAAVgcAAKr4//8BAAAAf39/AAEAAABkAAAAAAAAABQAAABAHwAAAAAAACYAAAAAAAAAwOD//wAAAAAmAAAAZAAAABYAAABMAAAAAAAAAAAAAAAEAAAAAAAAAAEAAADy8vIKAAAAACgAAAAoAAAAZAAAAGQAAAAAAAAAzMzMAAAAAABQAAAAUAAAAGQAAABkAAAAAAAAABcAAAAUAAAAAAAAAAAAAAD/fwAA/38AAAAAAAAJAAAABAAAAAAAAAAMAAAAEAAAAAAAAAAAAAAAAAAAAAAAAAAeAAAAaAAAAAAAAAAAAAAAAAAAAAAAAAAAAAAAECcAABAnAAAAAAAAAAAAAAAAAAAAAAAAAAAAAAAAAAAAAAAAAAAAABQAAAAAAAAAwMD/AAAAAABkAAAAMgAAAAAAAABkAAAAAAAAAH9/fwAKAAAAHwAAAFQAAACDwLoF////AQAAAAAAAAAAAAAAAAAAAAAAAAAAAAAAAAAAAAAAAAAAAAAAAn9/fwDy8vIDzMzMAMDA/wB/f38AAAAAAAAAAAAAAAAAAAAAAAAAAAAhAAAAGAAAABQAAADcCQAAXCYAACguAABVKAAAEAAAACYAAAAIAAAAAIAAAAAAAAA="/>
+                <pr:smNativeData xmlns:pr="smNativeData" val="SMDATA_13_TQCXXhMAAAAlAAAAZAAAAA8BAAAAkAAAAEgAAACQAAAASAAAAAAAAAAAAAAAAAAAAAEAAABQAAAAAAAAAAAA4D8AAAAAAADgPwAAAAAAAOA/AAAAAAAA4D8AAAAAAADgPwAAAAAAAOA/AAAAAAAA4D8AAAAAAADgPwAAAAAAAOA/AAAAAAAA4D8CAAAAjAAAAAAAAAAAAAAAg8C6DP///wgAAAAAAAAAAAAAAAAAAAAAAAAAAAAAAAAAAAAAZAAAAAEAAABAAAAAAAAAAAAAAAAAAAAAAAAAAAAAAAAAAAAAAAAAAAAAAAAAAAAAAAAAAAAAAAAAAAAAAAAAAAAAAAAAAAAAAAAAAAAAAAAAAAAAAAAAAAAAAAAAAAAAFAAAADwAAAAAAAAAAAAAAAAAAAkUAAAAAQAAABQAAAAUAAAAFAAAAAEAAAAAAAAAZAAAAGQAAAAAAAAAZAAAAGQAAAAVAAAAYAAAAAAAAAAAAAAADwAAACADAAAAAAAAAAAAAAEAAACgMgAAVgcAAKr4//8BAAAAf39/AAEAAABkAAAAAAAAABQAAABAHwAAAAAAACYAAAAAAAAAwOD//wAAAAAmAAAAZAAAABYAAABMAAAAAAAAAAAAAAAEAAAAAAAAAAEAAADy8vIKAAAAACgAAAAoAAAAZAAAAGQAAAAAAAAAzMzMAAAAAABQAAAAUAAAAGQAAABkAAAAAAAAABcAAAAUAAAAAAAAAAAAAAD/fwAA/38AAAAAAAAJAAAABAAAAAAAAAAMAAAAEAAAAAAAAAAAAAAAAAAAAAAAAAAeAAAAaAAAAAAAAAAAAAAAAAAAAAAAAAAAAAAAECcAABAnAAAAAAAAAAAAAAAAAAAAAAAAAAAAAAAAAAAAAAAAAAAAABQAAAAAAAAAwMD/AAAAAABkAAAAMgAAAAAAAABkAAAAAAAAAH9/fwAKAAAAHwAAAFQAAACDwLoF////AQAAAAAAAAAAAAAAAAAAAAAAAAAAAAAAAAAAAAAAAAAAAAAAAn9/fwDy8vIDzMzMAMDA/wB/f38AAAAAAAAAAAAAAAAAAAAAAAAAAAAhAAAAGAAAABQAAADcCQAAXCYAACguAABVKAAAEAAAACYAAAAIAAAAAIAAAAAAAAA="/>
               </a:ext>
             </a:extLst>
           </p:cNvSpPr>
@@ -1247,7 +1247,7 @@
             <a:spLocks noGrp="1" noChangeArrowheads="1"/>
             <a:extLst>
               <a:ext uri="smNativeData">
-                <pr:smNativeData xmlns:pr="smNativeData" val="SMDATA_13_qYmVXhMAAAAlAAAAZAAAAA8BAAAAkAAAAEgAAACQAAAASAAAAAAAAAAAAAAAAAAAAAEAAABQAAAAAAAAAAAA4D8AAAAAAADgPwAAAAAAAOA/AAAAAAAA4D8AAAAAAADgPwAAAAAAAOA/AAAAAAAA4D8AAAAAAADgPwAAAAAAAOA/AAAAAAAA4D8CAAAAjAAAAAEAAAAAAAAAlmkU3f///wgAAAAAAAAAAAAAAAAAAAAAAAAAAAAAAAAAAAAAZAAAAAEAAABAAAAAAAAAAAAAAAAAAAAAAAAAAAAAAAAAAAAAAAAAAAAAAAAAAAAAAAAAAAAAAAAAAAAAAAAAAAAAAAAAAAAAAAAAAAAAAAAAAAAAAAAAAAAAAAAAAAAAFAAAADwAAAAAAAAAAAAAAAAAAAkUAAAAAQAAABQAAAAUAAAAFAAAAAEAAAAAAAAAZAAAAGQAAAAAAAAAZAAAAGQAAAAVAAAAYAAAAAAAAAAAAAAADwAAACADAAAAAAAAAAAAAAEAAACgMgAAVgcAAKr4//8BAAAAf39/AAEAAABkAAAAAAAAABQAAABAHwAAAAAAACYAAAAAAAAAwOD//wAAAAAmAAAAZAAAABYAAABMAAAAAAAAAAAAAAAEAAAAAAAAAAEAAADy8vIKAAAAACgAAAAoAAAAZAAAAGQAAAAAAAAAzMzMAAAAAABQAAAAUAAAAGQAAABkAAAAAAAAABcAAAAUAAAAAAAAAAAAAAD/fwAA/38AAAAAAAAJAAAABAAAABDYWr0MAAAAEAAAAAAAAAAAAAAAAAAAAAAAAAAeAAAAaAAAAAAAAAAAAAAAAAAAAAAAAAAAAAAAECcAABAnAAAAAAAAAAAAAAAAAAAAAAAAAAAAAAAAAAAAAAAAAAAAABQAAAAAAAAAwMD/AAAAAABkAAAAMgAAAAAAAABkAAAAAAAAAH9/fwAKAAAAHwAAAFQAAACWaRS2////AQAAAAAAAAAAAAAAAAAAAAAAAAAAAAAAAAAAAAAAAAAAAAAAAn9/fwDy8vIDzMzMAMDA/wB/f38AAAAAAAAAAAAAAAAAAAAAAAAAAAAhAAAAGAAAABQAAAAyQgAAYiYAAHdEAAAwKgAAEAAAACYAAAAIAAAAAAAAAAQAAAA="/>
+                <pr:smNativeData xmlns:pr="smNativeData" val="SMDATA_13_TQCXXhMAAAAlAAAAZAAAAA8BAAAAkAAAAEgAAACQAAAASAAAAAAAAAAAAAAAAAAAAAEAAABQAAAAAAAAAAAA4D8AAAAAAADgPwAAAAAAAOA/AAAAAAAA4D8AAAAAAADgPwAAAAAAAOA/AAAAAAAA4D8AAAAAAADgPwAAAAAAAOA/AAAAAAAA4D8CAAAAjAAAAAEAAAAAAAAAlmkU3f///wgAAAAAAAAAAAAAAAAAAAAAAAAAAAAAAAAAAAAAZAAAAAEAAABAAAAAAAAAAAAAAAAAAAAAAAAAAAAAAAAAAAAAAAAAAAAAAAAAAAAAAAAAAAAAAAAAAAAAAAAAAAAAAAAAAAAAAAAAAAAAAAAAAAAAAAAAAAAAAAAAAAAAFAAAADwAAAAAAAAAAAAAAAAAAAkUAAAAAQAAABQAAAAUAAAAFAAAAAEAAAAAAAAAZAAAAGQAAAAAAAAAZAAAAGQAAAAVAAAAYAAAAAAAAAAAAAAADwAAACADAAAAAAAAAAAAAAEAAACgMgAAVgcAAKr4//8BAAAAf39/AAEAAABkAAAAAAAAABQAAABAHwAAAAAAACYAAAAAAAAAwOD//wAAAAAmAAAAZAAAABYAAABMAAAAAAAAAAAAAAAEAAAAAAAAAAEAAADy8vIKAAAAACgAAAAoAAAAZAAAAGQAAAAAAAAAzMzMAAAAAABQAAAAUAAAAGQAAABkAAAAAAAAABcAAAAUAAAAAAAAAAAAAAD/fwAA/38AAAAAAAAJAAAABAAAABDYWr0MAAAAEAAAAAAAAAAAAAAAAAAAAAAAAAAeAAAAaAAAAAAAAAAAAAAAAAAAAAAAAAAAAAAAECcAABAnAAAAAAAAAAAAAAAAAAAAAAAAAAAAAAAAAAAAAAAAAAAAABQAAAAAAAAAwMD/AAAAAABkAAAAMgAAAAAAAABkAAAAAAAAAH9/fwAKAAAAHwAAAFQAAACWaRS2////AQAAAAAAAAAAAAAAAAAAAAAAAAAAAAAAAAAAAAAAAAAAAAAAAn9/fwDy8vIDzMzMAMDA/wB/f38AAAAAAAAAAAAAAAAAAAAAAAAAAAAhAAAAGAAAABQAAAAyQgAAYiYAAHdEAAAwKgAAEAAAACYAAAAIAAAAAAAAAAQAAAA="/>
               </a:ext>
             </a:extLst>
           </p:cNvSpPr>
@@ -1267,7 +1267,7 @@
           <a:lstStyle/>
           <a:p>
             <a:pPr/>
-            <a:fld id="{7FDE33F0-BE92-8BC5-DC66-48907D282A1D}" type="slidenum">
+            <a:fld id="{0FB85D67-29E2-EDAB-AC00-DFFE134E5A8A}" type="slidenum">
               <a:t>{Nr.}</a:t>
             </a:fld>
           </a:p>
@@ -1305,7 +1305,7 @@
             <a:spLocks noGrp="1" noChangeArrowheads="1"/>
             <a:extLst>
               <a:ext uri="smNativeData">
-                <pr:smNativeData xmlns:pr="smNativeData" val="SMDATA_13_qYmVXhMAAAAlAAAAZAAAAA8BAAAAkAAAAEgAAACQAAAASAAAAAAAAAABAAAAAAAAAAEAAABQAAAAAAAAAAAA4D8AAAAAAADgPwAAAAAAAOA/AAAAAAAA4D8AAAAAAADgPwAAAAAAAOA/AAAAAAAA4D8AAAAAAADgPwAAAAAAAOA/AAAAAAAA4D8CAAAAjAAAAAEAAAAAAAAA////CP///wgAAAAAAAAAAAAAAAAAAAAAAAAAAAAAAAAAAAAAZAAAAAEAAABAAAAAAAAAAAAAAAAAAAAAAAAAAAAAAAAAAAAAAAAAAAAAAAAAAAAAAAAAAAAAAAAAAAAAAAAAAAAAAAAAAAAAAAAAAAAAAAAAAAAAAAAAAAAAAAAAAAAAFAAAADwAAAABAAAAAAAAAAAAAAkoAAAAAQAAABQAAAAUAAAAFAAAAAEAAAAAAAAAZAAAAGQAAAAAAAAAZAAAAGQAAAAVAAAAYAAAAAAAAAAAAAAADwAAACADAAAAAAAAAAAAAAEAAACgMgAAVgcAAKr4//8BAAAAf39/AAEAAABkAAAAAAAAABQAAABAHwAAAAAAACYAAAAAAAAAwOD//wAAAAAmAAAAZAAAABYAAABMAAAAAAAAAAAAAAAEAAAAAAAAAAEAAADy8vIKAAAAACgAAAAoAAAAZAAAAGQAAAAAAAAAzMzMAAAAAABQAAAAUAAAAGQAAABkAAAAAAAAABcAAAAUAAAAAAAAAAAAAAD/fwAA/38AAAAAAAAJAAAABAAAAHIAZAAMAAAAEAAAAAAAAAAAAAAAAAAAAAAAAAAeAAAAaAAAAAAAAAAAAAAAAAAAAAAAAAAAAAAAECcAABAnAAAAAAAAAAAAAAAAAAAAAAAAAAAAAAAAAAAAAAAAAAAAABQAAAAAAAAAwMD/AAAAAABkAAAAMgAAAAAAAABkAAAAAAAAAH9/fwAKAAAAHwAAAFQAAAD///8B////AQAAAAAAAAAAAAAAAAAAAAAAAAAAAAAAAAAAAAAAAAAAAAAAAn9/fwDy8vIDzMzMAMDA/wB/f38AAAAAAAAAAAAAAAAAAAAAAAAAAAAhAAAAGAAAABQAAAC7DQAA7wUAAEc9AAA+DQAAEAAAACYAAAAIAAAAAAAAAAAAAAA="/>
+                <pr:smNativeData xmlns:pr="smNativeData" val="SMDATA_13_TQCXXhMAAAAlAAAAZAAAAA8BAAAAkAAAAEgAAACQAAAASAAAAAAAAAABAAAAAAAAAAEAAABQAAAAAAAAAAAA4D8AAAAAAADgPwAAAAAAAOA/AAAAAAAA4D8AAAAAAADgPwAAAAAAAOA/AAAAAAAA4D8AAAAAAADgPwAAAAAAAOA/AAAAAAAA4D8CAAAAjAAAAAEAAAAAAAAA////CP///wgAAAAAAAAAAAAAAAAAAAAAAAAAAAAAAAAAAAAAZAAAAAEAAABAAAAAAAAAAAAAAAAAAAAAAAAAAAAAAAAAAAAAAAAAAAAAAAAAAAAAAAAAAAAAAAAAAAAAAAAAAAAAAAAAAAAAAAAAAAAAAAAAAAAAAAAAAAAAAAAAAAAAFAAAADwAAAABAAAAAAAAAAAAAAkoAAAAAQAAABQAAAAUAAAAFAAAAAEAAAAAAAAAZAAAAGQAAAAAAAAAZAAAAGQAAAAVAAAAYAAAAAAAAAAAAAAADwAAACADAAAAAAAAAAAAAAEAAACgMgAAVgcAAKr4//8BAAAAf39/AAEAAABkAAAAAAAAABQAAABAHwAAAAAAACYAAAAAAAAAwOD//wAAAAAmAAAAZAAAABYAAABMAAAAAAAAAAAAAAAEAAAAAAAAAAEAAADy8vIKAAAAACgAAAAoAAAAZAAAAGQAAAAAAAAAzMzMAAAAAABQAAAAUAAAAGQAAABkAAAAAAAAABcAAAAUAAAAAAAAAAAAAAD/fwAA/38AAAAAAAAJAAAABAAAAHIAZAAMAAAAEAAAAAAAAAAAAAAAAAAAAAAAAAAeAAAAaAAAAAAAAAAAAAAAAAAAAAAAAAAAAAAAECcAABAnAAAAAAAAAAAAAAAAAAAAAAAAAAAAAAAAAAAAAAAAAAAAABQAAAAAAAAAwMD/AAAAAABkAAAAMgAAAAAAAABkAAAAAAAAAH9/fwAKAAAAHwAAAFQAAAD///8B////AQAAAAAAAAAAAAAAAAAAAAAAAAAAAAAAAAAAAAAAAAAAAAAAAn9/fwDy8vIDzMzMAMDA/wB/f38AAAAAAAAAAAAAAAAAAAAAAAAAAAAhAAAAGAAAABQAAAC7DQAA7wUAAEc9AAA+DQAAEAAAACYAAAAIAAAAAAAAAAAAAAA="/>
               </a:ext>
             </a:extLst>
           </p:cNvSpPr>
@@ -1334,7 +1334,7 @@
             <a:spLocks noGrp="1" noChangeArrowheads="1"/>
             <a:extLst>
               <a:ext uri="smNativeData">
-                <pr:smNativeData xmlns:pr="smNativeData" val="SMDATA_13_qYmVXhMAAAAlAAAAZAAAAA8BAAAAkAAAAEgAAACQAAAASAAAAAAAAAAAAAAAAAAAAAEAAABQAAAAAAAAAAAA4D8AAAAAAADgPwAAAAAAAOA/AAAAAAAA4D8AAAAAAADgPwAAAAAAAOA/AAAAAAAA4D8AAAAAAADgPwAAAAAAAOA/AAAAAAAA4D8CAAAAjAAAAAAAAAAAAAAAg8C6DP///wgAAAAAAAAAAAAAAAAAAAAAAAAAAAAAAAAAAAAAZAAAAAEAAABAAAAAAAAAAAAAAAAAAAAAAAAAAAAAAAAAAAAAAAAAAAAAAAAAAAAAAAAAAAAAAAAAAAAAAAAAAAAAAAAAAAAAAAAAAAAAAAAAAAAAAAAAAAAAAAAAAAAAFAAAADwAAAAAAAAAAAAAAAAAAAkUAAAAAQAAABQAAAAUAAAAFAAAAAEAAAAAAAAAZAAAAGQAAAAAAAAAZAAAAGQAAAAVAAAAYAAAAAAAAAAAAAAADwAAACADAAAAAAAAAAAAAAEAAACgMgAAVgcAAKr4//8BAAAAf39/AAEAAABkAAAAAAAAABQAAABAHwAAAAAAACYAAAAAAAAAwOD//wAAAAAmAAAAZAAAABYAAABMAAAAAAAAAAAAAAAEAAAAAAAAAAEAAADy8vIKAAAAACgAAAAoAAAAZAAAAGQAAAAAAAAAzMzMAAAAAABQAAAAUAAAAGQAAABkAAAAAAAAABcAAAAUAAAAAAAAAAAAAAD/fwAA/38AAAAAAAAJAAAABAAAAAAAAAAMAAAAEAAAAAAAAAAAAAAAAAAAAAAAAAAeAAAAaAAAAAAAAAAAAAAAAAAAAAAAAAAAAAAAECcAABAnAAAAAAAAAAAAAAAAAAAAAAAAAAAAAAAAAAAAAAAAAAAAABQAAAAAAAAAwMD/AAAAAABkAAAAMgAAAAAAAABkAAAAAAAAAH9/fwAKAAAAHwAAAFQAAACDwLoF////AQAAAAAAAAAAAAAAAAAAAAAAAAAAAAAAAAAAAAAAAAAAAAAAAn9/fwDy8vIDzMzMAMDA/wB/f38AAAAAAAAAAAAAAAAAAAAAAAAAAAAhAAAAGAAAABQAAAC5CQAAPBAAAAIkAABTIwAAEAAAACYAAAAIAAAAAYAAAAAAAAA="/>
+                <pr:smNativeData xmlns:pr="smNativeData" val="SMDATA_13_TQCXXhMAAAAlAAAAZAAAAA8BAAAAkAAAAEgAAACQAAAASAAAAAAAAAAAAAAAAAAAAAEAAABQAAAAAAAAAAAA4D8AAAAAAADgPwAAAAAAAOA/AAAAAAAA4D8AAAAAAADgPwAAAAAAAOA/AAAAAAAA4D8AAAAAAADgPwAAAAAAAOA/AAAAAAAA4D8CAAAAjAAAAAAAAAAAAAAAg8C6DP///wgAAAAAAAAAAAAAAAAAAAAAAAAAAAAAAAAAAAAAZAAAAAEAAABAAAAAAAAAAAAAAAAAAAAAAAAAAAAAAAAAAAAAAAAAAAAAAAAAAAAAAAAAAAAAAAAAAAAAAAAAAAAAAAAAAAAAAAAAAAAAAAAAAAAAAAAAAAAAAAAAAAAAFAAAADwAAAAAAAAAAAAAAAAAAAkUAAAAAQAAABQAAAAUAAAAFAAAAAEAAAAAAAAAZAAAAGQAAAAAAAAAZAAAAGQAAAAVAAAAYAAAAAAAAAAAAAAADwAAACADAAAAAAAAAAAAAAEAAACgMgAAVgcAAKr4//8BAAAAf39/AAEAAABkAAAAAAAAABQAAABAHwAAAAAAACYAAAAAAAAAwOD//wAAAAAmAAAAZAAAABYAAABMAAAAAAAAAAAAAAAEAAAAAAAAAAEAAADy8vIKAAAAACgAAAAoAAAAZAAAAGQAAAAAAAAAzMzMAAAAAABQAAAAUAAAAGQAAABkAAAAAAAAABcAAAAUAAAAAAAAAAAAAAD/fwAA/38AAAAAAAAJAAAABAAAAAAAAAAMAAAAEAAAAAAAAAAAAAAAAAAAAAAAAAAeAAAAaAAAAAAAAAAAAAAAAAAAAAAAAAAAAAAAECcAABAnAAAAAAAAAAAAAAAAAAAAAAAAAAAAAAAAAAAAAAAAAAAAABQAAAAAAAAAwMD/AAAAAABkAAAAMgAAAAAAAABkAAAAAAAAAH9/fwAKAAAAHwAAAFQAAACDwLoF////AQAAAAAAAAAAAAAAAAAAAAAAAAAAAAAAAAAAAAAAAAAAAAAAAn9/fwDy8vIDzMzMAMDA/wB/f38AAAAAAAAAAAAAAAAAAAAAAAAAAAAhAAAAGAAAABQAAAC5CQAAPBAAAAIkAABTIwAAEAAAACYAAAAIAAAAAYAAAAAAAAA="/>
               </a:ext>
             </a:extLst>
           </p:cNvSpPr>
@@ -1418,7 +1418,7 @@
             <a:spLocks noGrp="1" noChangeArrowheads="1"/>
             <a:extLst>
               <a:ext uri="smNativeData">
-                <pr:smNativeData xmlns:pr="smNativeData" val="SMDATA_13_qYmVXhMAAAAlAAAAZAAAAA8BAAAAkAAAAEgAAACQAAAASAAAAAAAAAAAAAAAAAAAAAEAAABQAAAAAAAAAAAA4D8AAAAAAADgPwAAAAAAAOA/AAAAAAAA4D8AAAAAAADgPwAAAAAAAOA/AAAAAAAA4D8AAAAAAADgPwAAAAAAAOA/AAAAAAAA4D8CAAAAjAAAAAAAAAAAAAAAg8C6DP///wgAAAAAAAAAAAAAAAAAAAAAAAAAAAAAAAAAAAAAZAAAAAEAAABAAAAAAAAAAAAAAAAAAAAAAAAAAAAAAAAAAAAAAAAAAAAAAAAAAAAAAAAAAAAAAAAAAAAAAAAAAAAAAAAAAAAAAAAAAAAAAAAAAAAAAAAAAAAAAAAAAAAAFAAAADwAAAAAAAAAAAAAAAAAAAkUAAAAAQAAABQAAAAUAAAAFAAAAAEAAAAAAAAAZAAAAGQAAAAAAAAAZAAAAGQAAAAVAAAAYAAAAAAAAAAAAAAADwAAACADAAAAAAAAAAAAAAEAAACgMgAAVgcAAKr4//8BAAAAf39/AAEAAABkAAAAAAAAABQAAABAHwAAAAAAACYAAAAAAAAAwOD//wAAAAAmAAAAZAAAABYAAABMAAAAAAAAAAAAAAAEAAAAAAAAAAEAAADy8vIKAAAAACgAAAAoAAAAZAAAAGQAAAAAAAAAzMzMAAAAAABQAAAAUAAAAGQAAABkAAAAAAAAABcAAAAUAAAAAAAAAAAAAAD/fwAA/38AAAAAAAAJAAAABAAAAJAAAAAMAAAAEAAAAAAAAAAAAAAAAAAAAAAAAAAeAAAAaAAAAAAAAAAAAAAAAAAAAAAAAAAAAAAAECcAABAnAAAAAAAAAAAAAAAAAAAAAAAAAAAAAAAAAAAAAAAAAAAAABQAAAAAAAAAwMD/AAAAAABkAAAAMgAAAAAAAABkAAAAAAAAAH9/fwAKAAAAHwAAAFQAAACDwLoF////AQAAAAAAAAAAAAAAAAAAAAAAAAAAAAAAAAAAAAAAAAAAAAAAAn9/fwDy8vIDzMzMAMDA/wB/f38AAAAAAAAAAAAAAAAAAAAAAAAAAAAhAAAAGAAAABQAAAAAJwAAPBAAAERBAABTIwAAEAAAACYAAAAIAAAAAYAAAAAAAAA="/>
+                <pr:smNativeData xmlns:pr="smNativeData" val="SMDATA_13_TQCXXhMAAAAlAAAAZAAAAA8BAAAAkAAAAEgAAACQAAAASAAAAAAAAAAAAAAAAAAAAAEAAABQAAAAAAAAAAAA4D8AAAAAAADgPwAAAAAAAOA/AAAAAAAA4D8AAAAAAADgPwAAAAAAAOA/AAAAAAAA4D8AAAAAAADgPwAAAAAAAOA/AAAAAAAA4D8CAAAAjAAAAAAAAAAAAAAAg8C6DP///wgAAAAAAAAAAAAAAAAAAAAAAAAAAAAAAAAAAAAAZAAAAAEAAABAAAAAAAAAAAAAAAAAAAAAAAAAAAAAAAAAAAAAAAAAAAAAAAAAAAAAAAAAAAAAAAAAAAAAAAAAAAAAAAAAAAAAAAAAAAAAAAAAAAAAAAAAAAAAAAAAAAAAFAAAADwAAAAAAAAAAAAAAAAAAAkUAAAAAQAAABQAAAAUAAAAFAAAAAEAAAAAAAAAZAAAAGQAAAAAAAAAZAAAAGQAAAAVAAAAYAAAAAAAAAAAAAAADwAAACADAAAAAAAAAAAAAAEAAACgMgAAVgcAAKr4//8BAAAAf39/AAEAAABkAAAAAAAAABQAAABAHwAAAAAAACYAAAAAAAAAwOD//wAAAAAmAAAAZAAAABYAAABMAAAAAAAAAAAAAAAEAAAAAAAAAAEAAADy8vIKAAAAACgAAAAoAAAAZAAAAGQAAAAAAAAAzMzMAAAAAABQAAAAUAAAAGQAAABkAAAAAAAAABcAAAAUAAAAAAAAAAAAAAD/fwAA/38AAAAAAAAJAAAABAAAAJAAAAAMAAAAEAAAAAAAAAAAAAAAAAAAAAAAAAAeAAAAaAAAAAAAAAAAAAAAAAAAAAAAAAAAAAAAECcAABAnAAAAAAAAAAAAAAAAAAAAAAAAAAAAAAAAAAAAAAAAAAAAABQAAAAAAAAAwMD/AAAAAABkAAAAMgAAAAAAAABkAAAAAAAAAH9/fwAKAAAAHwAAAFQAAACDwLoF////AQAAAAAAAAAAAAAAAAAAAAAAAAAAAAAAAAAAAAAAAAAAAAAAAn9/fwDy8vIDzMzMAMDA/wB/f38AAAAAAAAAAAAAAAAAAAAAAAAAAAAhAAAAGAAAABQAAAAAJwAAPBAAAERBAABTIwAAEAAAACYAAAAIAAAAAYAAAAAAAAA="/>
               </a:ext>
             </a:extLst>
           </p:cNvSpPr>
@@ -1502,7 +1502,7 @@
             <a:spLocks noGrp="1" noChangeArrowheads="1"/>
             <a:extLst>
               <a:ext uri="smNativeData">
-                <pr:smNativeData xmlns:pr="smNativeData" val="SMDATA_13_qYmVXhMAAAAlAAAAZAAAAA8BAAAAkAAAAEgAAACQAAAASAAAAAAAAAAAAAAAAAAAAAEAAABQAAAAAAAAAAAA4D8AAAAAAADgPwAAAAAAAOA/AAAAAAAA4D8AAAAAAADgPwAAAAAAAOA/AAAAAAAA4D8AAAAAAADgPwAAAAAAAOA/AAAAAAAA4D8CAAAAjAAAAAAAAAAAAAAAg8C6DP///wgAAAAAAAAAAAAAAAAAAAAAAAAAAAAAAAAAAAAAZAAAAAEAAABAAAAAAAAAAAAAAAAAAAAAAAAAAAAAAAAAAAAAAAAAAAAAAAAAAAAAAAAAAAAAAAAAAAAAAAAAAAAAAAAAAAAAAAAAAAAAAAAAAAAAAAAAAAAAAAAAAAAAFAAAADwAAAAAAAAAAAAAAAAAAAkUAAAAAQAAABQAAAAUAAAAFAAAAAEAAAAAAAAAZAAAAGQAAAAAAAAAZAAAAGQAAAAVAAAAYAAAAAAAAAAAAAAADwAAACADAAAAAAAAAAAAAAEAAACgMgAAVgcAAKr4//8BAAAAf39/AAEAAABkAAAAAAAAABQAAABAHwAAAAAAACYAAAAAAAAAwOD//wAAAAAmAAAAZAAAABYAAABMAAAAAAAAAAAAAAAEAAAAAAAAAAEAAADy8vIKAAAAACgAAAAoAAAAZAAAAGQAAAAAAAAAzMzMAAAAAABQAAAAUAAAAGQAAABkAAAAAAAAABcAAAAUAAAAAAAAAAAAAAD/fwAA/38AAAAAAAAJAAAABAAAAB7/HyAMAAAAEAAAAAAAAAAAAAAAAAAAAAAAAAAeAAAAaAAAAAAAAAAAAAAAAAAAAAAAAAAAAAAAECcAABAnAAAAAAAAAAAAAAAAAAAAAAAAAAAAAAAAAAAAAAAAAAAAABQAAAAAAAAAwMD/AAAAAABkAAAAMgAAAAAAAABkAAAAAAAAAH9/fwAKAAAAHwAAAFQAAACDwLoF////AQAAAAAAAAAAAAAAAAAAAAAAAAAAAAAAAAAAAAAAAAAAAAAAAn9/fwDy8vIDzMzMAMDA/wB/f38AAAAAAAAAAAAAAAAAAAAAAAAAAAAhAAAAGAAAABQAAAAfMAAAYiYAABBBAABgKAAAEAAAACYAAAAIAAAAAAAAAAAAAAA="/>
+                <pr:smNativeData xmlns:pr="smNativeData" val="SMDATA_13_TQCXXhMAAAAlAAAAZAAAAA8BAAAAkAAAAEgAAACQAAAASAAAAAAAAAAAAAAAAAAAAAEAAABQAAAAAAAAAAAA4D8AAAAAAADgPwAAAAAAAOA/AAAAAAAA4D8AAAAAAADgPwAAAAAAAOA/AAAAAAAA4D8AAAAAAADgPwAAAAAAAOA/AAAAAAAA4D8CAAAAjAAAAAAAAAAAAAAAg8C6DP///wgAAAAAAAAAAAAAAAAAAAAAAAAAAAAAAAAAAAAAZAAAAAEAAABAAAAAAAAAAAAAAAAAAAAAAAAAAAAAAAAAAAAAAAAAAAAAAAAAAAAAAAAAAAAAAAAAAAAAAAAAAAAAAAAAAAAAAAAAAAAAAAAAAAAAAAAAAAAAAAAAAAAAFAAAADwAAAAAAAAAAAAAAAAAAAkUAAAAAQAAABQAAAAUAAAAFAAAAAEAAAAAAAAAZAAAAGQAAAAAAAAAZAAAAGQAAAAVAAAAYAAAAAAAAAAAAAAADwAAACADAAAAAAAAAAAAAAEAAACgMgAAVgcAAKr4//8BAAAAf39/AAEAAABkAAAAAAAAABQAAABAHwAAAAAAACYAAAAAAAAAwOD//wAAAAAmAAAAZAAAABYAAABMAAAAAAAAAAAAAAAEAAAAAAAAAAEAAADy8vIKAAAAACgAAAAoAAAAZAAAAGQAAAAAAAAAzMzMAAAAAABQAAAAUAAAAGQAAABkAAAAAAAAABcAAAAUAAAAAAAAAAAAAAD/fwAA/38AAAAAAAAJAAAABAAAAB7/HyAMAAAAEAAAAAAAAAAAAAAAAAAAAAAAAAAeAAAAaAAAAAAAAAAAAAAAAAAAAAAAAAAAAAAAECcAABAnAAAAAAAAAAAAAAAAAAAAAAAAAAAAAAAAAAAAAAAAAAAAABQAAAAAAAAAwMD/AAAAAABkAAAAMgAAAAAAAABkAAAAAAAAAH9/fwAKAAAAHwAAAFQAAACDwLoF////AQAAAAAAAAAAAAAAAAAAAAAAAAAAAAAAAAAAAAAAAAAAAAAAAn9/fwDy8vIDzMzMAMDA/wB/f38AAAAAAAAAAAAAAAAAAAAAAAAAAAAhAAAAGAAAABQAAAAfMAAAYiYAABBBAABgKAAAEAAAACYAAAAIAAAAAAAAAAAAAAA="/>
               </a:ext>
             </a:extLst>
           </p:cNvSpPr>
@@ -1516,7 +1516,7 @@
           <a:lstStyle/>
           <a:p>
             <a:pPr/>
-            <a:fld id="{56EA03A6-E8BB-BFF5-F552-1EA04D1C034B}" type="datetime1">
+            <a:fld id="{0257C0FB-B5EF-0236-A1EF-43638EA15716}" type="datetime1">
               <a:t>{Date/Time}</a:t>
             </a:fld>
           </a:p>
@@ -1529,7 +1529,7 @@
             <a:spLocks noGrp="1" noChangeArrowheads="1"/>
             <a:extLst>
               <a:ext uri="smNativeData">
-                <pr:smNativeData xmlns:pr="smNativeData" val="SMDATA_13_qYmVXhMAAAAlAAAAZAAAAA8BAAAAkAAAAEgAAACQAAAASAAAAAAAAAAAAAAAAAAAAAEAAABQAAAAAAAAAAAA4D8AAAAAAADgPwAAAAAAAOA/AAAAAAAA4D8AAAAAAADgPwAAAAAAAOA/AAAAAAAA4D8AAAAAAADgPwAAAAAAAOA/AAAAAAAA4D8CAAAAjAAAAAAAAAAAAAAAg8C6DP///wgAAAAAAAAAAAAAAAAAAAAAAAAAAAAAAAAAAAAAZAAAAAEAAABAAAAAAAAAAAAAAAAAAAAAAAAAAAAAAAAAAAAAAAAAAAAAAAAAAAAAAAAAAAAAAAAAAAAAAAAAAAAAAAAAAAAAAAAAAAAAAAAAAAAAAAAAAAAAAAAAAAAAFAAAADwAAAAAAAAAAAAAAAAAAAkUAAAAAQAAABQAAAAUAAAAFAAAAAEAAAAAAAAAZAAAAGQAAAAAAAAAZAAAAGQAAAAVAAAAYAAAAAAAAAAAAAAADwAAACADAAAAAAAAAAAAAAEAAACgMgAAVgcAAKr4//8BAAAAf39/AAEAAABkAAAAAAAAABQAAABAHwAAAAAAACYAAAAAAAAAwOD//wAAAAAmAAAAZAAAABYAAABMAAAAAAAAAAAAAAAEAAAAAAAAAAEAAADy8vIKAAAAACgAAAAoAAAAZAAAAGQAAAAAAAAAzMzMAAAAAABQAAAAUAAAAGQAAABkAAAAAAAAABcAAAAUAAAAAAAAAAAAAAD/fwAA/38AAAAAAAAJAAAABAAAAJCsW70MAAAAEAAAAAAAAAAAAAAAAAAAAAAAAAAeAAAAaAAAAAAAAAAAAAAAAAAAAAAAAAAAAAAAECcAABAnAAAAAAAAAAAAAAAAAAAAAAAAAAAAAAAAAAAAAAAAAAAAABQAAAAAAAAAwMD/AAAAAABkAAAAMgAAAAAAAABkAAAAAAAAAH9/fwAKAAAAHwAAAFQAAACDwLoF////AQAAAAAAAAAAAAAAAAAAAAAAAAAAAAAAAAAAAAAAAAAAAAAAAn9/fwDy8vIDzMzMAMDA/wB/f38AAAAAAAAAAAAAAAAAAAAAAAAAAAAhAAAAGAAAABQAAADcCQAAXCYAACguAABVKAAAEAAAACYAAAAIAAAAAAAAAAAAAAA="/>
+                <pr:smNativeData xmlns:pr="smNativeData" val="SMDATA_13_TQCXXhMAAAAlAAAAZAAAAA8BAAAAkAAAAEgAAACQAAAASAAAAAAAAAAAAAAAAAAAAAEAAABQAAAAAAAAAAAA4D8AAAAAAADgPwAAAAAAAOA/AAAAAAAA4D8AAAAAAADgPwAAAAAAAOA/AAAAAAAA4D8AAAAAAADgPwAAAAAAAOA/AAAAAAAA4D8CAAAAjAAAAAAAAAAAAAAAg8C6DP///wgAAAAAAAAAAAAAAAAAAAAAAAAAAAAAAAAAAAAAZAAAAAEAAABAAAAAAAAAAAAAAAAAAAAAAAAAAAAAAAAAAAAAAAAAAAAAAAAAAAAAAAAAAAAAAAAAAAAAAAAAAAAAAAAAAAAAAAAAAAAAAAAAAAAAAAAAAAAAAAAAAAAAFAAAADwAAAAAAAAAAAAAAAAAAAkUAAAAAQAAABQAAAAUAAAAFAAAAAEAAAAAAAAAZAAAAGQAAAAAAAAAZAAAAGQAAAAVAAAAYAAAAAAAAAAAAAAADwAAACADAAAAAAAAAAAAAAEAAACgMgAAVgcAAKr4//8BAAAAf39/AAEAAABkAAAAAAAAABQAAABAHwAAAAAAACYAAAAAAAAAwOD//wAAAAAmAAAAZAAAABYAAABMAAAAAAAAAAAAAAAEAAAAAAAAAAEAAADy8vIKAAAAACgAAAAoAAAAZAAAAGQAAAAAAAAAzMzMAAAAAABQAAAAUAAAAGQAAABkAAAAAAAAABcAAAAUAAAAAAAAAAAAAAD/fwAA/38AAAAAAAAJAAAABAAAAJCsW70MAAAAEAAAAAAAAAAAAAAAAAAAAAAAAAAeAAAAaAAAAAAAAAAAAAAAAAAAAAAAAAAAAAAAECcAABAnAAAAAAAAAAAAAAAAAAAAAAAAAAAAAAAAAAAAAAAAAAAAABQAAAAAAAAAwMD/AAAAAABkAAAAMgAAAAAAAABkAAAAAAAAAH9/fwAKAAAAHwAAAFQAAACDwLoF////AQAAAAAAAAAAAAAAAAAAAAAAAAAAAAAAAAAAAAAAAAAAAAAAAn9/fwDy8vIDzMzMAMDA/wB/f38AAAAAAAAAAAAAAAAAAAAAAAAAAAAhAAAAGAAAABQAAADcCQAAXCYAACguAABVKAAAEAAAACYAAAAIAAAAAAAAAAAAAAA="/>
               </a:ext>
             </a:extLst>
           </p:cNvSpPr>
@@ -1556,7 +1556,7 @@
             <a:spLocks noGrp="1" noChangeArrowheads="1"/>
             <a:extLst>
               <a:ext uri="smNativeData">
-                <pr:smNativeData xmlns:pr="smNativeData" val="SMDATA_13_qYmVXhMAAAAlAAAAZAAAAA8BAAAAkAAAAEgAAACQAAAASAAAAAAAAAAAAAAAAAAAAAEAAABQAAAAAAAAAAAA4D8AAAAAAADgPwAAAAAAAOA/AAAAAAAA4D8AAAAAAADgPwAAAAAAAOA/AAAAAAAA4D8AAAAAAADgPwAAAAAAAOA/AAAAAAAA4D8CAAAAjAAAAAEAAAAAAAAAeHh4yv///wgAAAAAAAAAAAAAAAAAAAAAAAAAAAAAAAAAAAAAZAAAAAEAAABAAAAAAAAAAAAAAAAAAAAAAAAAAAAAAAAAAAAAAAAAAAAAAAAAAAAAAAAAAAAAAAAAAAAAAAAAAAAAAAAAAAAAAAAAAAAAAAAAAAAAAAAAAAAAAAAAAAAAFAAAADwAAAAAAAAAAAAAAAAAAAkUAAAAAQAAABQAAAAUAAAAFAAAAAEAAAAAAAAAZAAAAGQAAAAAAAAAZAAAAGQAAAAVAAAAYAAAAAAAAAAAAAAADwAAACADAAAAAAAAAAAAAAEAAACgMgAAVgcAAKr4//8BAAAAf39/AAEAAABkAAAAAAAAABQAAABAHwAAAAAAACYAAAAAAAAAwOD//wAAAAAmAAAAZAAAABYAAABMAAAAAAAAAAAAAAAEAAAAAAAAAAEAAADy8vIKAAAAACgAAAAoAAAAZAAAAGQAAAAAAAAAzMzMAAAAAABQAAAAUAAAAGQAAABkAAAAAAAAABcAAAAUAAAAAAAAAAAAAAD/fwAA/38AAAAAAAAJAAAABAAAAAAAAAAMAAAAEAAAAAAAAAAAAAAAAAAAAAAAAAAeAAAAaAAAAAAAAAAAAAAAAAAAAAAAAAAAAAAAECcAABAnAAAAAAAAAAAAAAAAAAAAAAAAAAAAAAAAAAAAAAAAAAAAABQAAAAAAAAAwMD/AAAAAABkAAAAMgAAAAAAAABkAAAAAAAAAH9/fwAKAAAAHwAAAFQAAAB4eHjD////AQAAAAAAAAAAAAAAAAAAAAAAAAAAAAAAAAAAAAAAAAAAAAAAAn9/fwDy8vIDzMzMAMDA/wB/f38AAAAAAAAAAAAAAAAAAAAAAAAAAAAhAAAAGAAAABQAAAAyQgAAYiYAAHdEAAAwKgAAEAAAACYAAAAIAAAAAAAAAAAAAAA="/>
+                <pr:smNativeData xmlns:pr="smNativeData" val="SMDATA_13_TQCXXhMAAAAlAAAAZAAAAA8BAAAAkAAAAEgAAACQAAAASAAAAAAAAAAAAAAAAAAAAAEAAABQAAAAAAAAAAAA4D8AAAAAAADgPwAAAAAAAOA/AAAAAAAA4D8AAAAAAADgPwAAAAAAAOA/AAAAAAAA4D8AAAAAAADgPwAAAAAAAOA/AAAAAAAA4D8CAAAAjAAAAAEAAAAAAAAAeHh4yv///wgAAAAAAAAAAAAAAAAAAAAAAAAAAAAAAAAAAAAAZAAAAAEAAABAAAAAAAAAAAAAAAAAAAAAAAAAAAAAAAAAAAAAAAAAAAAAAAAAAAAAAAAAAAAAAAAAAAAAAAAAAAAAAAAAAAAAAAAAAAAAAAAAAAAAAAAAAAAAAAAAAAAAFAAAADwAAAAAAAAAAAAAAAAAAAkUAAAAAQAAABQAAAAUAAAAFAAAAAEAAAAAAAAAZAAAAGQAAAAAAAAAZAAAAGQAAAAVAAAAYAAAAAAAAAAAAAAADwAAACADAAAAAAAAAAAAAAEAAACgMgAAVgcAAKr4//8BAAAAf39/AAEAAABkAAAAAAAAABQAAABAHwAAAAAAACYAAAAAAAAAwOD//wAAAAAmAAAAZAAAABYAAABMAAAAAAAAAAAAAAAEAAAAAAAAAAEAAADy8vIKAAAAACgAAAAoAAAAZAAAAGQAAAAAAAAAzMzMAAAAAABQAAAAUAAAAGQAAABkAAAAAAAAABcAAAAUAAAAAAAAAAAAAAD/fwAA/38AAAAAAAAJAAAABAAAAAAAAAAMAAAAEAAAAAAAAAAAAAAAAAAAAAAAAAAeAAAAaAAAAAAAAAAAAAAAAAAAAAAAAAAAAAAAECcAABAnAAAAAAAAAAAAAAAAAAAAAAAAAAAAAAAAAAAAAAAAAAAAABQAAAAAAAAAwMD/AAAAAABkAAAAMgAAAAAAAABkAAAAAAAAAH9/fwAKAAAAHwAAAFQAAAB4eHjD////AQAAAAAAAAAAAAAAAAAAAAAAAAAAAAAAAAAAAAAAAAAAAAAAAn9/fwDy8vIDzMzMAMDA/wB/f38AAAAAAAAAAAAAAAAAAAAAAAAAAAAhAAAAGAAAABQAAAAyQgAAYiYAAHdEAAAwKgAAEAAAACYAAAAIAAAAAAAAAAAAAAA="/>
               </a:ext>
             </a:extLst>
           </p:cNvSpPr>
@@ -1570,7 +1570,7 @@
           <a:lstStyle/>
           <a:p>
             <a:pPr/>
-            <a:fld id="{77295544-0A9A-7CA3-D491-FCF61BDF22A9}" type="slidenum">
+            <a:fld id="{32A3BCEA-A4DF-F64A-911B-521FF2556707}" type="slidenum">
               <a:t>{Nr.}</a:t>
             </a:fld>
           </a:p>
@@ -1608,7 +1608,7 @@
             <a:spLocks noGrp="1" noChangeArrowheads="1"/>
             <a:extLst>
               <a:ext uri="smNativeData">
-                <pr:smNativeData xmlns:pr="smNativeData" val="SMDATA_13_qYmVXhMAAAAlAAAAZAAAAA8BAAAAkAAAAEgAAACQAAAASAAAAAAAAAABAAAAAAAAAAEAAABQAAAAAAAAAAAA4D8AAAAAAADgPwAAAAAAAOA/AAAAAAAA4D8AAAAAAADgPwAAAAAAAOA/AAAAAAAA4D8AAAAAAADgPwAAAAAAAOA/AAAAAAAA4D8CAAAAjAAAAAEAAAAAAAAA////CP///wgAAAAAAAAAAAAAAAAAAAAAAAAAAAAAAAAAAAAAZAAAAAEAAABAAAAAAAAAAAAAAAAAAAAAAAAAAAAAAAAAAAAAAAAAAAAAAAAAAAAAAAAAAAAAAAAAAAAAAAAAAAAAAAAAAAAAAAAAAAAAAAAAAAAAAAAAAAAAAAAAAAAAFAAAADwAAAABAAAAAAAAAAAAAAkoAAAAAQAAABQAAAAUAAAAFAAAAAEAAAAAAAAAZAAAAGQAAAAAAAAAZAAAAGQAAAAVAAAAYAAAAAAAAAAAAAAADwAAACADAAAAAAAAAAAAAAEAAACgMgAAVgcAAKr4//8BAAAAf39/AAEAAABkAAAAAAAAABQAAABAHwAAAAAAACYAAAAAAAAAwOD//wAAAAAmAAAAZAAAABYAAABMAAAAAAAAAAAAAAAEAAAAAAAAAAEAAADy8vIKAAAAACgAAAAoAAAAZAAAAGQAAAAAAAAAzMzMAAAAAABQAAAAUAAAAGQAAABkAAAAAAAAABcAAAAUAAAAAAAAAAAAAAD/fwAA/38AAAAAAAAJAAAABAAAAAAAAAAMAAAAEAAAAAAAAAAAAAAAAAAAAAAAAAAeAAAAaAAAAAAAAAAAAAAAAAAAAAAAAAAAAAAAECcAABAnAAAAAAAAAAAAAAAAAAAAAAAAAAAAAAAAAAAAAAAAAAAAABQAAAAAAAAAwMD/AAAAAABkAAAAMgAAAAAAAABkAAAAAAAAAH9/fwAKAAAAHwAAAFQAAAD///8B////AQAAAAAAAAAAAAAAAAAAAAAAAAAAAAAAAAAAAAAAAAAAAAAAAn9/fwDy8vIDzMzMAMDA/wB/f38AAAAAAAAAAAAAAAAAAAAAAAAAAAAhAAAAGAAAABQAAAC7DQAA7wUAAEc9AAA+DQAAEAAAACYAAAAIAAAAAAAAAAAAAAA="/>
+                <pr:smNativeData xmlns:pr="smNativeData" val="SMDATA_13_TQCXXhMAAAAlAAAAZAAAAA8BAAAAkAAAAEgAAACQAAAASAAAAAAAAAABAAAAAAAAAAEAAABQAAAAAAAAAAAA4D8AAAAAAADgPwAAAAAAAOA/AAAAAAAA4D8AAAAAAADgPwAAAAAAAOA/AAAAAAAA4D8AAAAAAADgPwAAAAAAAOA/AAAAAAAA4D8CAAAAjAAAAAEAAAAAAAAA////CP///wgAAAAAAAAAAAAAAAAAAAAAAAAAAAAAAAAAAAAAZAAAAAEAAABAAAAAAAAAAAAAAAAAAAAAAAAAAAAAAAAAAAAAAAAAAAAAAAAAAAAAAAAAAAAAAAAAAAAAAAAAAAAAAAAAAAAAAAAAAAAAAAAAAAAAAAAAAAAAAAAAAAAAFAAAADwAAAABAAAAAAAAAAAAAAkoAAAAAQAAABQAAAAUAAAAFAAAAAEAAAAAAAAAZAAAAGQAAAAAAAAAZAAAAGQAAAAVAAAAYAAAAAAAAAAAAAAADwAAACADAAAAAAAAAAAAAAEAAACgMgAAVgcAAKr4//8BAAAAf39/AAEAAABkAAAAAAAAABQAAABAHwAAAAAAACYAAAAAAAAAwOD//wAAAAAmAAAAZAAAABYAAABMAAAAAAAAAAAAAAAEAAAAAAAAAAEAAADy8vIKAAAAACgAAAAoAAAAZAAAAGQAAAAAAAAAzMzMAAAAAABQAAAAUAAAAGQAAABkAAAAAAAAABcAAAAUAAAAAAAAAAAAAAD/fwAA/38AAAAAAAAJAAAABAAAAAAAAAAMAAAAEAAAAAAAAAAAAAAAAAAAAAAAAAAeAAAAaAAAAAAAAAAAAAAAAAAAAAAAAAAAAAAAECcAABAnAAAAAAAAAAAAAAAAAAAAAAAAAAAAAAAAAAAAAAAAAAAAABQAAAAAAAAAwMD/AAAAAABkAAAAMgAAAAAAAABkAAAAAAAAAH9/fwAKAAAAHwAAAFQAAAD///8B////AQAAAAAAAAAAAAAAAAAAAAAAAAAAAAAAAAAAAAAAAAAAAAAAAn9/fwDy8vIDzMzMAMDA/wB/f38AAAAAAAAAAAAAAAAAAAAAAAAAAAAhAAAAGAAAABQAAAC7DQAA7wUAAEc9AAA+DQAAEAAAACYAAAAIAAAAAAAAAAAAAAA="/>
               </a:ext>
             </a:extLst>
           </p:cNvSpPr>
@@ -1637,7 +1637,7 @@
             <a:spLocks noGrp="1" noChangeArrowheads="1"/>
             <a:extLst>
               <a:ext uri="smNativeData">
-                <pr:smNativeData xmlns:pr="smNativeData" val="SMDATA_13_qYmVXhMAAAAlAAAAZAAAAA8BAAAAkAAAAEgAAACQAAAASAAAAAAAAAACAAAAAAAAAAEAAABQAAAAAAAAAAAA4D8AAAAAAADgPwAAAAAAAOA/AAAAAAAA4D8AAAAAAADgPwAAAAAAAOA/AAAAAAAA4D8AAAAAAADgPwAAAAAAAOA/AAAAAAAA4D8CAAAAjAAAAAAAAAAAAAAAg8C6DP///wgAAAAAAAAAAAAAAAAAAAAAAAAAAAAAAAAAAAAAZAAAAAEAAABAAAAAAAAAAAAAAAAAAAAAAAAAAAAAAAAAAAAAAAAAAAAAAAAAAAAAAAAAAAAAAAAAAAAAAAAAAAAAAAAAAAAAAAAAAAAAAAAAAAAAAAAAAAAAAAAAAAAAFAAAADwAAAAAAAAAAAAAAAAAAAkUAAAAAQAAABQAAAAUAAAAFAAAAAEAAAAAAAAAZAAAAGQAAAAAAAAAZAAAAGQAAAAVAAAAYAAAAAAAAAAAAAAADwAAACADAAAAAAAAAAAAAAEAAACgMgAAVgcAAKr4//8BAAAAf39/AAEAAABkAAAAAAAAABQAAABAHwAAAAAAACYAAAAAAAAAwOD//wAAAAAmAAAAZAAAABYAAABMAAAAAAAAAAAAAAAEAAAAAAAAAAEAAADy8vIKAAAAACgAAAAoAAAAZAAAAGQAAAAAAAAAzMzMAAAAAABQAAAAUAAAAGQAAABkAAAAAAAAABcAAAAUAAAAAAAAAAAAAAD/fwAA/38AAAAAAAAJAAAABAAAAAAAAAAMAAAAEAAAAAAAAAAAAAAAAAAAAAAAAAAeAAAAaAAAAAAAAAAAAAAAAAAAAAAAAAAAAAAAECcAABAnAAAAAAAAAAAAAAAAAAAAAAAAAAAAAAAAAAAAAAAAAAAAABQAAAAAAAAAwMD/AAAAAABkAAAAMgAAAAAAAABkAAAAAAAAAH9/fwAKAAAAHwAAAFQAAACDwLoF////AQAAAAAAAAAAAAAAAAAAAAAAAAAAAAAAAAAAAAAAAAAAAAAAAn9/fwDy8vIDzMzMAMDA/wB/f38AAAAAAAAAAAAAAAAAAAAAAAAAAAAhAAAAGAAAABQAAAC+CQAAPQ4AAAIkAACUEgAAEAAAACYAAAAIAAAAgYAAAAAAAAA="/>
+                <pr:smNativeData xmlns:pr="smNativeData" val="SMDATA_13_TQCXXhMAAAAlAAAAZAAAAA8BAAAAkAAAAEgAAACQAAAASAAAAAAAAAACAAAAAAAAAAEAAABQAAAAAAAAAAAA4D8AAAAAAADgPwAAAAAAAOA/AAAAAAAA4D8AAAAAAADgPwAAAAAAAOA/AAAAAAAA4D8AAAAAAADgPwAAAAAAAOA/AAAAAAAA4D8CAAAAjAAAAAAAAAAAAAAAg8C6DP///wgAAAAAAAAAAAAAAAAAAAAAAAAAAAAAAAAAAAAAZAAAAAEAAABAAAAAAAAAAAAAAAAAAAAAAAAAAAAAAAAAAAAAAAAAAAAAAAAAAAAAAAAAAAAAAAAAAAAAAAAAAAAAAAAAAAAAAAAAAAAAAAAAAAAAAAAAAAAAAAAAAAAAFAAAADwAAAAAAAAAAAAAAAAAAAkUAAAAAQAAABQAAAAUAAAAFAAAAAEAAAAAAAAAZAAAAGQAAAAAAAAAZAAAAGQAAAAVAAAAYAAAAAAAAAAAAAAADwAAACADAAAAAAAAAAAAAAEAAACgMgAAVgcAAKr4//8BAAAAf39/AAEAAABkAAAAAAAAABQAAABAHwAAAAAAACYAAAAAAAAAwOD//wAAAAAmAAAAZAAAABYAAABMAAAAAAAAAAAAAAAEAAAAAAAAAAEAAADy8vIKAAAAACgAAAAoAAAAZAAAAGQAAAAAAAAAzMzMAAAAAABQAAAAUAAAAGQAAABkAAAAAAAAABcAAAAUAAAAAAAAAAAAAAD/fwAA/38AAAAAAAAJAAAABAAAAAAAAAAMAAAAEAAAAAAAAAAAAAAAAAAAAAAAAAAeAAAAaAAAAAAAAAAAAAAAAAAAAAAAAAAAAAAAECcAABAnAAAAAAAAAAAAAAAAAAAAAAAAAAAAAAAAAAAAAAAAAAAAABQAAAAAAAAAwMD/AAAAAABkAAAAMgAAAAAAAABkAAAAAAAAAH9/fwAKAAAAHwAAAFQAAACDwLoF////AQAAAAAAAAAAAAAAAAAAAAAAAAAAAAAAAAAAAAAAAAAAAAAAAn9/fwDy8vIDzMzMAMDA/wB/f38AAAAAAAAAAAAAAAAAAAAAAAAAAAAhAAAAGAAAABQAAAC+CQAAPQ4AAAIkAACUEgAAEAAAACYAAAAIAAAAgYAAAAAAAAA="/>
               </a:ext>
             </a:extLst>
           </p:cNvSpPr>
@@ -1714,7 +1714,7 @@
             <a:spLocks noGrp="1" noChangeArrowheads="1"/>
             <a:extLst>
               <a:ext uri="smNativeData">
-                <pr:smNativeData xmlns:pr="smNativeData" val="SMDATA_13_qYmVXhMAAAAlAAAAZAAAAA8BAAAAkAAAAEgAAACQAAAASAAAAAAAAAAAAAAAAAAAAAEAAABQAAAAAAAAAAAA4D8AAAAAAADgPwAAAAAAAOA/AAAAAAAA4D8AAAAAAADgPwAAAAAAAOA/AAAAAAAA4D8AAAAAAADgPwAAAAAAAOA/AAAAAAAA4D8CAAAAjAAAAAAAAAAAAAAAg8C6DP///wgAAAAAAAAAAAAAAAAAAAAAAAAAAAAAAAAAAAAAZAAAAAEAAABAAAAAAAAAAAAAAAAAAAAAAAAAAAAAAAAAAAAAAAAAAAAAAAAAAAAAAAAAAAAAAAAAAAAAAAAAAAAAAAAAAAAAAAAAAAAAAAAAAAAAAAAAAAAAAAAAAAAAFAAAADwAAAAAAAAAAAAAAAAAAAkUAAAAAQAAABQAAAAUAAAAFAAAAAEAAAAAAAAAZAAAAGQAAAAAAAAAZAAAAGQAAAAVAAAAYAAAAAAAAAAAAAAADwAAACADAAAAAAAAAAAAAAEAAACgMgAAVgcAAKr4//8BAAAAf39/AAEAAABkAAAAAAAAABQAAABAHwAAAAAAACYAAAAAAAAAwOD//wAAAAAmAAAAZAAAABYAAABMAAAAAAAAAAAAAAAEAAAAAAAAAAEAAADy8vIKAAAAACgAAAAoAAAAZAAAAGQAAAAAAAAAzMzMAAAAAABQAAAAUAAAAGQAAABkAAAAAAAAABcAAAAUAAAAAAAAAAAAAAD/fwAA/38AAAAAAAAJAAAABAAAAAAAAAAMAAAAEAAAAAAAAAAAAAAAAAAAAAAAAAAeAAAAaAAAAAAAAAAAAAAAAAAAAAAAAAAAAAAAECcAABAnAAAAAAAAAAAAAAAAAAAAAAAAAAAAAAAAAAAAAAAAAAAAABQAAAAAAAAAwMD/AAAAAABkAAAAMgAAAAAAAABkAAAAAAAAAH9/fwAKAAAAHwAAAFQAAACDwLoF////AQAAAAAAAAAAAAAAAAAAAAAAAAAAAAAAAAAAAAAAAAAAAAAAAn9/fwDy8vIDzMzMAMDA/wB/f38AAAAAAAAAAAAAAAAAAAAAAAAAAAAhAAAAGAAAABQAAAC+CQAAVRMAAAIkAABNIwAAEAAAACYAAAAIAAAAAYAAAAAAAAA="/>
+                <pr:smNativeData xmlns:pr="smNativeData" val="SMDATA_13_TQCXXhMAAAAlAAAAZAAAAA8BAAAAkAAAAEgAAACQAAAASAAAAAAAAAAAAAAAAAAAAAEAAABQAAAAAAAAAAAA4D8AAAAAAADgPwAAAAAAAOA/AAAAAAAA4D8AAAAAAADgPwAAAAAAAOA/AAAAAAAA4D8AAAAAAADgPwAAAAAAAOA/AAAAAAAA4D8CAAAAjAAAAAAAAAAAAAAAg8C6DP///wgAAAAAAAAAAAAAAAAAAAAAAAAAAAAAAAAAAAAAZAAAAAEAAABAAAAAAAAAAAAAAAAAAAAAAAAAAAAAAAAAAAAAAAAAAAAAAAAAAAAAAAAAAAAAAAAAAAAAAAAAAAAAAAAAAAAAAAAAAAAAAAAAAAAAAAAAAAAAAAAAAAAAFAAAADwAAAAAAAAAAAAAAAAAAAkUAAAAAQAAABQAAAAUAAAAFAAAAAEAAAAAAAAAZAAAAGQAAAAAAAAAZAAAAGQAAAAVAAAAYAAAAAAAAAAAAAAADwAAACADAAAAAAAAAAAAAAEAAACgMgAAVgcAAKr4//8BAAAAf39/AAEAAABkAAAAAAAAABQAAABAHwAAAAAAACYAAAAAAAAAwOD//wAAAAAmAAAAZAAAABYAAABMAAAAAAAAAAAAAAAEAAAAAAAAAAEAAADy8vIKAAAAACgAAAAoAAAAZAAAAGQAAAAAAAAAzMzMAAAAAABQAAAAUAAAAGQAAABkAAAAAAAAABcAAAAUAAAAAAAAAAAAAAD/fwAA/38AAAAAAAAJAAAABAAAAAAAAAAMAAAAEAAAAAAAAAAAAAAAAAAAAAAAAAAeAAAAaAAAAAAAAAAAAAAAAAAAAAAAAAAAAAAAECcAABAnAAAAAAAAAAAAAAAAAAAAAAAAAAAAAAAAAAAAAAAAAAAAABQAAAAAAAAAwMD/AAAAAABkAAAAMgAAAAAAAABkAAAAAAAAAH9/fwAKAAAAHwAAAFQAAACDwLoF////AQAAAAAAAAAAAAAAAAAAAAAAAAAAAAAAAAAAAAAAAAAAAAAAAn9/fwDy8vIDzMzMAMDA/wB/f38AAAAAAAAAAAAAAAAAAAAAAAAAAAAhAAAAGAAAABQAAAC+CQAAVRMAAAIkAABNIwAAEAAAACYAAAAIAAAAAYAAAAAAAAA="/>
               </a:ext>
             </a:extLst>
           </p:cNvSpPr>
@@ -1798,7 +1798,7 @@
             <a:spLocks noGrp="1" noChangeArrowheads="1"/>
             <a:extLst>
               <a:ext uri="smNativeData">
-                <pr:smNativeData xmlns:pr="smNativeData" val="SMDATA_13_qYmVXhMAAAAlAAAAZAAAAA8BAAAAkAAAAEgAAACQAAAASAAAAAAAAAACAAAAAAAAAAEAAABQAAAAAAAAAAAA4D8AAAAAAADgPwAAAAAAAOA/AAAAAAAA4D8AAAAAAADgPwAAAAAAAOA/AAAAAAAA4D8AAAAAAADgPwAAAAAAAOA/AAAAAAAA4D8CAAAAjAAAAAAAAAAAAAAAg8C6DP///wgAAAAAAAAAAAAAAAAAAAAAAAAAAAAAAAAAAAAAZAAAAAEAAABAAAAAAAAAAAAAAAAAAAAAAAAAAAAAAAAAAAAAAAAAAAAAAAAAAAAAAAAAAAAAAAAAAAAAAAAAAAAAAAAAAAAAAAAAAAAAAAAAAAAAAAAAAAAAAAAAAAAAFAAAADwAAAAAAAAAAAAAAAAAAAkUAAAAAQAAABQAAAAUAAAAFAAAAAEAAAAAAAAAZAAAAGQAAAAAAAAAZAAAAGQAAAAVAAAAYAAAAAAAAAAAAAAADwAAACADAAAAAAAAAAAAAAEAAACgMgAAVgcAAKr4//8BAAAAf39/AAEAAABkAAAAAAAAABQAAABAHwAAAAAAACYAAAAAAAAAwOD//wAAAAAmAAAAZAAAABYAAABMAAAAAAAAAAAAAAAEAAAAAAAAAAEAAADy8vIKAAAAACgAAAAoAAAAZAAAAGQAAAAAAAAAzMzMAAAAAABQAAAAUAAAAGQAAABkAAAAAAAAABcAAAAUAAAAAAAAAAAAAAD/fwAA/38AAAAAAAAJAAAABAAAAAAAAAAMAAAAEAAAAAAAAAAAAAAAAAAAAAAAAAAeAAAAaAAAAAAAAAAAAAAAAAAAAAAAAAAAAAAAECcAABAnAAAAAAAAAAAAAAAAAAAAAAAAAAAAAAAAAAAAAAAAAAAAABQAAAAAAAAAwMD/AAAAAABkAAAAMgAAAAAAAABkAAAAAAAAAH9/fwAKAAAAHwAAAFQAAACDwLoF////AQAAAAAAAAAAAAAAAAAAAAAAAAAAAAAAAAAAAAAAAAAAAAAAAn9/fwDy8vIDzMzMAMDA/wB/f38AAAAAAAAAAAAAAAAAAAAAAAAAAAAhAAAAGAAAABQAAAAAJwAAPQ4AAERBAACUEgAAEAAAACYAAAAIAAAAgYAAAAAAAAA="/>
+                <pr:smNativeData xmlns:pr="smNativeData" val="SMDATA_13_TQCXXhMAAAAlAAAAZAAAAA8BAAAAkAAAAEgAAACQAAAASAAAAAAAAAACAAAAAAAAAAEAAABQAAAAAAAAAAAA4D8AAAAAAADgPwAAAAAAAOA/AAAAAAAA4D8AAAAAAADgPwAAAAAAAOA/AAAAAAAA4D8AAAAAAADgPwAAAAAAAOA/AAAAAAAA4D8CAAAAjAAAAAAAAAAAAAAAg8C6DP///wgAAAAAAAAAAAAAAAAAAAAAAAAAAAAAAAAAAAAAZAAAAAEAAABAAAAAAAAAAAAAAAAAAAAAAAAAAAAAAAAAAAAAAAAAAAAAAAAAAAAAAAAAAAAAAAAAAAAAAAAAAAAAAAAAAAAAAAAAAAAAAAAAAAAAAAAAAAAAAAAAAAAAFAAAADwAAAAAAAAAAAAAAAAAAAkUAAAAAQAAABQAAAAUAAAAFAAAAAEAAAAAAAAAZAAAAGQAAAAAAAAAZAAAAGQAAAAVAAAAYAAAAAAAAAAAAAAADwAAACADAAAAAAAAAAAAAAEAAACgMgAAVgcAAKr4//8BAAAAf39/AAEAAABkAAAAAAAAABQAAABAHwAAAAAAACYAAAAAAAAAwOD//wAAAAAmAAAAZAAAABYAAABMAAAAAAAAAAAAAAAEAAAAAAAAAAEAAADy8vIKAAAAACgAAAAoAAAAZAAAAGQAAAAAAAAAzMzMAAAAAABQAAAAUAAAAGQAAABkAAAAAAAAABcAAAAUAAAAAAAAAAAAAAD/fwAA/38AAAAAAAAJAAAABAAAAAAAAAAMAAAAEAAAAAAAAAAAAAAAAAAAAAAAAAAeAAAAaAAAAAAAAAAAAAAAAAAAAAAAAAAAAAAAECcAABAnAAAAAAAAAAAAAAAAAAAAAAAAAAAAAAAAAAAAAAAAAAAAABQAAAAAAAAAwMD/AAAAAABkAAAAMgAAAAAAAABkAAAAAAAAAH9/fwAKAAAAHwAAAFQAAACDwLoF////AQAAAAAAAAAAAAAAAAAAAAAAAAAAAAAAAAAAAAAAAAAAAAAAAn9/fwDy8vIDzMzMAMDA/wB/f38AAAAAAAAAAAAAAAAAAAAAAAAAAAAhAAAAGAAAABQAAAAAJwAAPQ4AAERBAACUEgAAEAAAACYAAAAIAAAAgYAAAAAAAAA="/>
               </a:ext>
             </a:extLst>
           </p:cNvSpPr>
@@ -1875,7 +1875,7 @@
             <a:spLocks noGrp="1" noChangeArrowheads="1"/>
             <a:extLst>
               <a:ext uri="smNativeData">
-                <pr:smNativeData xmlns:pr="smNativeData" val="SMDATA_13_qYmVXhMAAAAlAAAAZAAAAA8BAAAAkAAAAEgAAACQAAAASAAAAAAAAAAAAAAAAAAAAAEAAABQAAAAAAAAAAAA4D8AAAAAAADgPwAAAAAAAOA/AAAAAAAA4D8AAAAAAADgPwAAAAAAAOA/AAAAAAAA4D8AAAAAAADgPwAAAAAAAOA/AAAAAAAA4D8CAAAAjAAAAAAAAAAAAAAAg8C6DP///wgAAAAAAAAAAAAAAAAAAAAAAAAAAAAAAAAAAAAAZAAAAAEAAABAAAAAAAAAAAAAAAAAAAAAAAAAAAAAAAAAAAAAAAAAAAAAAAAAAAAAAAAAAAAAAAAAAAAAAAAAAAAAAAAAAAAAAAAAAAAAAAAAAAAAAAAAAAAAAAAAAAAAFAAAADwAAAAAAAAAAAAAAAAAAAkUAAAAAQAAABQAAAAUAAAAFAAAAAEAAAAAAAAAZAAAAGQAAAAAAAAAZAAAAGQAAAAVAAAAYAAAAAAAAAAAAAAADwAAACADAAAAAAAAAAAAAAEAAACgMgAAVgcAAKr4//8BAAAAf39/AAEAAABkAAAAAAAAABQAAABAHwAAAAAAACYAAAAAAAAAwOD//wAAAAAmAAAAZAAAABYAAABMAAAAAAAAAAAAAAAEAAAAAAAAAAEAAADy8vIKAAAAACgAAAAoAAAAZAAAAGQAAAAAAAAAzMzMAAAAAABQAAAAUAAAAGQAAABkAAAAAAAAABcAAAAUAAAAAAAAAAAAAAD/fwAA/38AAAAAAAAJAAAABAAAAAAAAAAMAAAAEAAAAAAAAAAAAAAAAAAAAAAAAAAeAAAAaAAAAAAAAAAAAAAAAAAAAAAAAAAAAAAAECcAABAnAAAAAAAAAAAAAAAAAAAAAAAAAAAAAAAAAAAAAAAAAAAAABQAAAAAAAAAwMD/AAAAAABkAAAAMgAAAAAAAABkAAAAAAAAAH9/fwAKAAAAHwAAAFQAAACDwLoF////AQAAAAAAAAAAAAAAAAAAAAAAAAAAAAAAAAAAAAAAAAAAAAAAAn9/fwDy8vIDzMzMAMDA/wB/f38AAAAAAAAAAAAAAAAAAAAAAAAAAAAhAAAAGAAAABQAAAAAJwAAVRMAAC1BAABNIwAAEAAAACYAAAAIAAAAAYAAAAAAAAA="/>
+                <pr:smNativeData xmlns:pr="smNativeData" val="SMDATA_13_TQCXXhMAAAAlAAAAZAAAAA8BAAAAkAAAAEgAAACQAAAASAAAAAAAAAAAAAAAAAAAAAEAAABQAAAAAAAAAAAA4D8AAAAAAADgPwAAAAAAAOA/AAAAAAAA4D8AAAAAAADgPwAAAAAAAOA/AAAAAAAA4D8AAAAAAADgPwAAAAAAAOA/AAAAAAAA4D8CAAAAjAAAAAAAAAAAAAAAg8C6DP///wgAAAAAAAAAAAAAAAAAAAAAAAAAAAAAAAAAAAAAZAAAAAEAAABAAAAAAAAAAAAAAAAAAAAAAAAAAAAAAAAAAAAAAAAAAAAAAAAAAAAAAAAAAAAAAAAAAAAAAAAAAAAAAAAAAAAAAAAAAAAAAAAAAAAAAAAAAAAAAAAAAAAAFAAAADwAAAAAAAAAAAAAAAAAAAkUAAAAAQAAABQAAAAUAAAAFAAAAAEAAAAAAAAAZAAAAGQAAAAAAAAAZAAAAGQAAAAVAAAAYAAAAAAAAAAAAAAADwAAACADAAAAAAAAAAAAAAEAAACgMgAAVgcAAKr4//8BAAAAf39/AAEAAABkAAAAAAAAABQAAABAHwAAAAAAACYAAAAAAAAAwOD//wAAAAAmAAAAZAAAABYAAABMAAAAAAAAAAAAAAAEAAAAAAAAAAEAAADy8vIKAAAAACgAAAAoAAAAZAAAAGQAAAAAAAAAzMzMAAAAAABQAAAAUAAAAGQAAABkAAAAAAAAABcAAAAUAAAAAAAAAAAAAAD/fwAA/38AAAAAAAAJAAAABAAAAAAAAAAMAAAAEAAAAAAAAAAAAAAAAAAAAAAAAAAeAAAAaAAAAAAAAAAAAAAAAAAAAAAAAAAAAAAAECcAABAnAAAAAAAAAAAAAAAAAAAAAAAAAAAAAAAAAAAAAAAAAAAAABQAAAAAAAAAwMD/AAAAAABkAAAAMgAAAAAAAABkAAAAAAAAAH9/fwAKAAAAHwAAAFQAAACDwLoF////AQAAAAAAAAAAAAAAAAAAAAAAAAAAAAAAAAAAAAAAAAAAAAAAAn9/fwDy8vIDzMzMAMDA/wB/f38AAAAAAAAAAAAAAAAAAAAAAAAAAAAhAAAAGAAAABQAAAAAJwAAVRMAAC1BAABNIwAAEAAAACYAAAAIAAAAAYAAAAAAAAA="/>
               </a:ext>
             </a:extLst>
           </p:cNvSpPr>
@@ -1959,7 +1959,7 @@
             <a:spLocks noGrp="1" noChangeArrowheads="1"/>
             <a:extLst>
               <a:ext uri="smNativeData">
-                <pr:smNativeData xmlns:pr="smNativeData" val="SMDATA_13_qYmVXhMAAAAlAAAAZAAAAA8BAAAAkAAAAEgAAACQAAAASAAAAAAAAAAAAAAAAAAAAAEAAABQAAAAAAAAAAAA4D8AAAAAAADgPwAAAAAAAOA/AAAAAAAA4D8AAAAAAADgPwAAAAAAAOA/AAAAAAAA4D8AAAAAAADgPwAAAAAAAOA/AAAAAAAA4D8CAAAAjAAAAAAAAAAAAAAAg8C6DP///wgAAAAAAAAAAAAAAAAAAAAAAAAAAAAAAAAAAAAAZAAAAAEAAABAAAAAAAAAAAAAAAAAAAAAAAAAAAAAAAAAAAAAAAAAAAAAAAAAAAAAAAAAAAAAAAAAAAAAAAAAAAAAAAAAAAAAAAAAAAAAAAAAAAAAAAAAAAAAAAAAAAAAFAAAADwAAAAAAAAAAAAAAAAAAAkUAAAAAQAAABQAAAAUAAAAFAAAAAEAAAAAAAAAZAAAAGQAAAAAAAAAZAAAAGQAAAAVAAAAYAAAAAAAAAAAAAAADwAAACADAAAAAAAAAAAAAAEAAACgMgAAVgcAAKr4//8BAAAAf39/AAEAAABkAAAAAAAAABQAAABAHwAAAAAAACYAAAAAAAAAwOD//wAAAAAmAAAAZAAAABYAAABMAAAAAAAAAAAAAAAEAAAAAAAAAAEAAADy8vIKAAAAACgAAAAoAAAAZAAAAGQAAAAAAAAAzMzMAAAAAABQAAAAUAAAAGQAAABkAAAAAAAAABcAAAAUAAAAAAAAAAAAAAD/fwAA/38AAAAAAAAJAAAABAAAAHAAAAAMAAAAEAAAAAAAAAAAAAAAAAAAAAAAAAAeAAAAaAAAAAAAAAAAAAAAAAAAAAAAAAAAAAAAECcAABAnAAAAAAAAAAAAAAAAAAAAAAAAAAAAAAAAAAAAAAAAAAAAABQAAAAAAAAAwMD/AAAAAABkAAAAMgAAAAAAAABkAAAAAAAAAH9/fwAKAAAAHwAAAFQAAACDwLoF////AQAAAAAAAAAAAAAAAAAAAAAAAAAAAAAAAAAAAAAAAAAAAAAAAn9/fwDy8vIDzMzMAMDA/wB/f38AAAAAAAAAAAAAAAAAAAAAAAAAAAAhAAAAGAAAABQAAAAfMAAAYiYAABBBAABgKAAAEAAAACYAAAAIAAAAAAAAAAAAAAA="/>
+                <pr:smNativeData xmlns:pr="smNativeData" val="SMDATA_13_TQCXXhMAAAAlAAAAZAAAAA8BAAAAkAAAAEgAAACQAAAASAAAAAAAAAAAAAAAAAAAAAEAAABQAAAAAAAAAAAA4D8AAAAAAADgPwAAAAAAAOA/AAAAAAAA4D8AAAAAAADgPwAAAAAAAOA/AAAAAAAA4D8AAAAAAADgPwAAAAAAAOA/AAAAAAAA4D8CAAAAjAAAAAAAAAAAAAAAg8C6DP///wgAAAAAAAAAAAAAAAAAAAAAAAAAAAAAAAAAAAAAZAAAAAEAAABAAAAAAAAAAAAAAAAAAAAAAAAAAAAAAAAAAAAAAAAAAAAAAAAAAAAAAAAAAAAAAAAAAAAAAAAAAAAAAAAAAAAAAAAAAAAAAAAAAAAAAAAAAAAAAAAAAAAAFAAAADwAAAAAAAAAAAAAAAAAAAkUAAAAAQAAABQAAAAUAAAAFAAAAAEAAAAAAAAAZAAAAGQAAAAAAAAAZAAAAGQAAAAVAAAAYAAAAAAAAAAAAAAADwAAACADAAAAAAAAAAAAAAEAAACgMgAAVgcAAKr4//8BAAAAf39/AAEAAABkAAAAAAAAABQAAABAHwAAAAAAACYAAAAAAAAAwOD//wAAAAAmAAAAZAAAABYAAABMAAAAAAAAAAAAAAAEAAAAAAAAAAEAAADy8vIKAAAAACgAAAAoAAAAZAAAAGQAAAAAAAAAzMzMAAAAAABQAAAAUAAAAGQAAABkAAAAAAAAABcAAAAUAAAAAAAAAAAAAAD/fwAA/38AAAAAAAAJAAAABAAAAHAAAAAMAAAAEAAAAAAAAAAAAAAAAAAAAAAAAAAeAAAAaAAAAAAAAAAAAAAAAAAAAAAAAAAAAAAAECcAABAnAAAAAAAAAAAAAAAAAAAAAAAAAAAAAAAAAAAAAAAAAAAAABQAAAAAAAAAwMD/AAAAAABkAAAAMgAAAAAAAABkAAAAAAAAAH9/fwAKAAAAHwAAAFQAAACDwLoF////AQAAAAAAAAAAAAAAAAAAAAAAAAAAAAAAAAAAAAAAAAAAAAAAAn9/fwDy8vIDzMzMAMDA/wB/f38AAAAAAAAAAAAAAAAAAAAAAAAAAAAhAAAAGAAAABQAAAAfMAAAYiYAABBBAABgKAAAEAAAACYAAAAIAAAAAAAAAAAAAAA="/>
               </a:ext>
             </a:extLst>
           </p:cNvSpPr>
@@ -1973,7 +1973,7 @@
           <a:lstStyle/>
           <a:p>
             <a:pPr/>
-            <a:fld id="{0CD65A29-67E1-83AC-AF6E-91F9142059C4}" type="datetime1">
+            <a:fld id="{43EEAB7C-32AE-BB5D-E056-C408E5181691}" type="datetime1">
               <a:t>{Date/Time}</a:t>
             </a:fld>
           </a:p>
@@ -1986,7 +1986,7 @@
             <a:spLocks noGrp="1" noChangeArrowheads="1"/>
             <a:extLst>
               <a:ext uri="smNativeData">
-                <pr:smNativeData xmlns:pr="smNativeData" val="SMDATA_13_qYmVXhMAAAAlAAAAZAAAAA8BAAAAkAAAAEgAAACQAAAASAAAAAAAAAAAAAAAAAAAAAEAAABQAAAAAAAAAAAA4D8AAAAAAADgPwAAAAAAAOA/AAAAAAAA4D8AAAAAAADgPwAAAAAAAOA/AAAAAAAA4D8AAAAAAADgPwAAAAAAAOA/AAAAAAAA4D8CAAAAjAAAAAAAAAAAAAAAg8C6DP///wgAAAAAAAAAAAAAAAAAAAAAAAAAAAAAAAAAAAAAZAAAAAEAAABAAAAAAAAAAAAAAAAAAAAAAAAAAAAAAAAAAAAAAAAAAAAAAAAAAAAAAAAAAAAAAAAAAAAAAAAAAAAAAAAAAAAAAAAAAAAAAAAAAAAAAAAAAAAAAAAAAAAAFAAAADwAAAAAAAAAAAAAAAAAAAkUAAAAAQAAABQAAAAUAAAAFAAAAAEAAAAAAAAAZAAAAGQAAAAAAAAAZAAAAGQAAAAVAAAAYAAAAAAAAAAAAAAADwAAACADAAAAAAAAAAAAAAEAAACgMgAAVgcAAKr4//8BAAAAf39/AAEAAABkAAAAAAAAABQAAABAHwAAAAAAACYAAAAAAAAAwOD//wAAAAAmAAAAZAAAABYAAABMAAAAAAAAAAAAAAAEAAAAAAAAAAEAAADy8vIKAAAAACgAAAAoAAAAZAAAAGQAAAAAAAAAzMzMAAAAAABQAAAAUAAAAGQAAABkAAAAAAAAABcAAAAUAAAAAAAAAAAAAAD/fwAA/38AAAAAAAAJAAAABAAAAAAAAAAMAAAAEAAAAAAAAAAAAAAAAAAAAAAAAAAeAAAAaAAAAAAAAAAAAAAAAAAAAAAAAAAAAAAAECcAABAnAAAAAAAAAAAAAAAAAAAAAAAAAAAAAAAAAAAAAAAAAAAAABQAAAAAAAAAwMD/AAAAAABkAAAAMgAAAAAAAABkAAAAAAAAAH9/fwAKAAAAHwAAAFQAAACDwLoF////AQAAAAAAAAAAAAAAAAAAAAAAAAAAAAAAAAAAAAAAAAAAAAAAAn9/fwDy8vIDzMzMAMDA/wB/f38AAAAAAAAAAAAAAAAAAAAAAAAAAAAhAAAAGAAAABQAAADcCQAAXCYAACguAABVKAAAEAAAACYAAAAIAAAAAAAAAAAAAAA="/>
+                <pr:smNativeData xmlns:pr="smNativeData" val="SMDATA_13_TQCXXhMAAAAlAAAAZAAAAA8BAAAAkAAAAEgAAACQAAAASAAAAAAAAAAAAAAAAAAAAAEAAABQAAAAAAAAAAAA4D8AAAAAAADgPwAAAAAAAOA/AAAAAAAA4D8AAAAAAADgPwAAAAAAAOA/AAAAAAAA4D8AAAAAAADgPwAAAAAAAOA/AAAAAAAA4D8CAAAAjAAAAAAAAAAAAAAAg8C6DP///wgAAAAAAAAAAAAAAAAAAAAAAAAAAAAAAAAAAAAAZAAAAAEAAABAAAAAAAAAAAAAAAAAAAAAAAAAAAAAAAAAAAAAAAAAAAAAAAAAAAAAAAAAAAAAAAAAAAAAAAAAAAAAAAAAAAAAAAAAAAAAAAAAAAAAAAAAAAAAAAAAAAAAFAAAADwAAAAAAAAAAAAAAAAAAAkUAAAAAQAAABQAAAAUAAAAFAAAAAEAAAAAAAAAZAAAAGQAAAAAAAAAZAAAAGQAAAAVAAAAYAAAAAAAAAAAAAAADwAAACADAAAAAAAAAAAAAAEAAACgMgAAVgcAAKr4//8BAAAAf39/AAEAAABkAAAAAAAAABQAAABAHwAAAAAAACYAAAAAAAAAwOD//wAAAAAmAAAAZAAAABYAAABMAAAAAAAAAAAAAAAEAAAAAAAAAAEAAADy8vIKAAAAACgAAAAoAAAAZAAAAGQAAAAAAAAAzMzMAAAAAABQAAAAUAAAAGQAAABkAAAAAAAAABcAAAAUAAAAAAAAAAAAAAD/fwAA/38AAAAAAAAJAAAABAAAAAAAAAAMAAAAEAAAAAAAAAAAAAAAAAAAAAAAAAAeAAAAaAAAAAAAAAAAAAAAAAAAAAAAAAAAAAAAECcAABAnAAAAAAAAAAAAAAAAAAAAAAAAAAAAAAAAAAAAAAAAAAAAABQAAAAAAAAAwMD/AAAAAABkAAAAMgAAAAAAAABkAAAAAAAAAH9/fwAKAAAAHwAAAFQAAACDwLoF////AQAAAAAAAAAAAAAAAAAAAAAAAAAAAAAAAAAAAAAAAAAAAAAAAn9/fwDy8vIDzMzMAMDA/wB/f38AAAAAAAAAAAAAAAAAAAAAAAAAAAAhAAAAGAAAABQAAADcCQAAXCYAACguAABVKAAAEAAAACYAAAAIAAAAAAAAAAAAAAA="/>
               </a:ext>
             </a:extLst>
           </p:cNvSpPr>
@@ -2013,7 +2013,7 @@
             <a:spLocks noGrp="1" noChangeArrowheads="1"/>
             <a:extLst>
               <a:ext uri="smNativeData">
-                <pr:smNativeData xmlns:pr="smNativeData" val="SMDATA_13_qYmVXhMAAAAlAAAAZAAAAA8BAAAAkAAAAEgAAACQAAAASAAAAAAAAAAAAAAAAAAAAAEAAABQAAAAAAAAAAAA4D8AAAAAAADgPwAAAAAAAOA/AAAAAAAA4D8AAAAAAADgPwAAAAAAAOA/AAAAAAAA4D8AAAAAAADgPwAAAAAAAOA/AAAAAAAA4D8CAAAAjAAAAAEAAAAAAAAAeHh4yv///wgAAAAAAAAAAAAAAAAAAAAAAAAAAAAAAAAAAAAAZAAAAAEAAABAAAAAAAAAAAAAAAAAAAAAAAAAAAAAAAAAAAAAAAAAAAAAAAAAAAAAAAAAAAAAAAAAAAAAAAAAAAAAAAAAAAAAAAAAAAAAAAAAAAAAAAAAAAAAAAAAAAAAFAAAADwAAAAAAAAAAAAAAAAAAAkUAAAAAQAAABQAAAAUAAAAFAAAAAEAAAAAAAAAZAAAAGQAAAAAAAAAZAAAAGQAAAAVAAAAYAAAAAAAAAAAAAAADwAAACADAAAAAAAAAAAAAAEAAACgMgAAVgcAAKr4//8BAAAAf39/AAEAAABkAAAAAAAAABQAAABAHwAAAAAAACYAAAAAAAAAwOD//wAAAAAmAAAAZAAAABYAAABMAAAAAAAAAAAAAAAEAAAAAAAAAAEAAADy8vIKAAAAACgAAAAoAAAAZAAAAGQAAAAAAAAAzMzMAAAAAABQAAAAUAAAAGQAAABkAAAAAAAAABcAAAAUAAAAAAAAAAAAAAD/fwAA/38AAAAAAAAJAAAABAAAACACAAAMAAAAEAAAAAAAAAAAAAAAAAAAAAAAAAAeAAAAaAAAAAAAAAAAAAAAAAAAAAAAAAAAAAAAECcAABAnAAAAAAAAAAAAAAAAAAAAAAAAAAAAAAAAAAAAAAAAAAAAABQAAAAAAAAAwMD/AAAAAABkAAAAMgAAAAAAAABkAAAAAAAAAH9/fwAKAAAAHwAAAFQAAAB4eHjD////AQAAAAAAAAAAAAAAAAAAAAAAAAAAAAAAAAAAAAAAAAAAAAAAAn9/fwDy8vIDzMzMAMDA/wB/f38AAAAAAAAAAAAAAAAAAAAAAAAAAAAhAAAAGAAAABQAAAAyQgAAYiYAAHdEAAAwKgAAEAAAACYAAAAIAAAAAAAAAAAAAAA="/>
+                <pr:smNativeData xmlns:pr="smNativeData" val="SMDATA_13_TQCXXhMAAAAlAAAAZAAAAA8BAAAAkAAAAEgAAACQAAAASAAAAAAAAAAAAAAAAAAAAAEAAABQAAAAAAAAAAAA4D8AAAAAAADgPwAAAAAAAOA/AAAAAAAA4D8AAAAAAADgPwAAAAAAAOA/AAAAAAAA4D8AAAAAAADgPwAAAAAAAOA/AAAAAAAA4D8CAAAAjAAAAAEAAAAAAAAAeHh4yv///wgAAAAAAAAAAAAAAAAAAAAAAAAAAAAAAAAAAAAAZAAAAAEAAABAAAAAAAAAAAAAAAAAAAAAAAAAAAAAAAAAAAAAAAAAAAAAAAAAAAAAAAAAAAAAAAAAAAAAAAAAAAAAAAAAAAAAAAAAAAAAAAAAAAAAAAAAAAAAAAAAAAAAFAAAADwAAAAAAAAAAAAAAAAAAAkUAAAAAQAAABQAAAAUAAAAFAAAAAEAAAAAAAAAZAAAAGQAAAAAAAAAZAAAAGQAAAAVAAAAYAAAAAAAAAAAAAAADwAAACADAAAAAAAAAAAAAAEAAACgMgAAVgcAAKr4//8BAAAAf39/AAEAAABkAAAAAAAAABQAAABAHwAAAAAAACYAAAAAAAAAwOD//wAAAAAmAAAAZAAAABYAAABMAAAAAAAAAAAAAAAEAAAAAAAAAAEAAADy8vIKAAAAACgAAAAoAAAAZAAAAGQAAAAAAAAAzMzMAAAAAABQAAAAUAAAAGQAAABkAAAAAAAAABcAAAAUAAAAAAAAAAAAAAD/fwAA/38AAAAAAAAJAAAABAAAACACAAAMAAAAEAAAAAAAAAAAAAAAAAAAAAAAAAAeAAAAaAAAAAAAAAAAAAAAAAAAAAAAAAAAAAAAECcAABAnAAAAAAAAAAAAAAAAAAAAAAAAAAAAAAAAAAAAAAAAAAAAABQAAAAAAAAAwMD/AAAAAABkAAAAMgAAAAAAAABkAAAAAAAAAH9/fwAKAAAAHwAAAFQAAAB4eHjD////AQAAAAAAAAAAAAAAAAAAAAAAAAAAAAAAAAAAAAAAAAAAAAAAAn9/fwDy8vIDzMzMAMDA/wB/f38AAAAAAAAAAAAAAAAAAAAAAAAAAAAhAAAAGAAAABQAAAAyQgAAYiYAAHdEAAAwKgAAEAAAACYAAAAIAAAAAAAAAAAAAAA="/>
               </a:ext>
             </a:extLst>
           </p:cNvSpPr>
@@ -2027,7 +2027,7 @@
           <a:lstStyle/>
           <a:p>
             <a:pPr/>
-            <a:fld id="{700C64B9-F79D-5992-D3B4-01C72AFA2554}" type="slidenum">
+            <a:fld id="{49541E5E-10A4-01E8-EAEC-E6BD50A21CB3}" type="slidenum">
               <a:t>{Nr.}</a:t>
             </a:fld>
           </a:p>
@@ -2065,7 +2065,7 @@
             <a:spLocks noGrp="1" noChangeArrowheads="1"/>
             <a:extLst>
               <a:ext uri="smNativeData">
-                <pr:smNativeData xmlns:pr="smNativeData" val="SMDATA_13_qYmVXhMAAAAlAAAAZAAAAA8BAAAAkAAAAEgAAACQAAAASAAAAAAAAAABAAAAAAAAAAEAAABQAAAAAAAAAAAA4D8AAAAAAADgPwAAAAAAAOA/AAAAAAAA4D8AAAAAAADgPwAAAAAAAOA/AAAAAAAA4D8AAAAAAADgPwAAAAAAAOA/AAAAAAAA4D8CAAAAjAAAAAEAAAAAAAAA////CP///wgAAAAAAAAAAAAAAAAAAAAAAAAAAAAAAAAAAAAAZAAAAAEAAABAAAAAAAAAAAAAAAAAAAAAAAAAAAAAAAAAAAAAAAAAAAAAAAAAAAAAAAAAAAAAAAAAAAAAAAAAAAAAAAAAAAAAAAAAAAAAAAAAAAAAAAAAAAAAAAAAAAAAFAAAADwAAAABAAAAAAAAAAAAAAkoAAAAAQAAABQAAAAUAAAAFAAAAAEAAAAAAAAAZAAAAGQAAAAAAAAAZAAAAGQAAAAVAAAAYAAAAAAAAAAAAAAADwAAACADAAAAAAAAAAAAAAEAAACgMgAAVgcAAKr4//8BAAAAf39/AAEAAABkAAAAAAAAABQAAABAHwAAAAAAACYAAAAAAAAAwOD//wAAAAAmAAAAZAAAABYAAABMAAAAAAAAAAAAAAAEAAAAAAAAAAEAAADy8vIKAAAAACgAAAAoAAAAZAAAAGQAAAAAAAAAzMzMAAAAAABQAAAAUAAAAGQAAABkAAAAAAAAABcAAAAUAAAAAAAAAAAAAAD/fwAA/38AAAAAAAAJAAAABAAAABQAAAAMAAAAEAAAAAAAAAAAAAAAAAAAAAAAAAAeAAAAaAAAAAAAAAAAAAAAAAAAAAAAAAAAAAAAECcAABAnAAAAAAAAAAAAAAAAAAAAAAAAAAAAAAAAAAAAAAAAAAAAABQAAAAAAAAAwMD/AAAAAABkAAAAMgAAAAAAAABkAAAAAAAAAH9/fwAKAAAAHwAAAFQAAAD///8B////AQAAAAAAAAAAAAAAAAAAAAAAAAAAAAAAAAAAAAAAAAAAAAAAAn9/fwDy8vIDzMzMAMDA/wB/f38AAAAAAAAAAAAAAAAAAAAAAAAAAAAhAAAAGAAAABQAAAC7DQAA7wUAAEc9AAA+DQAAEAAAACYAAAAIAAAAAAAAAAAAAAA="/>
+                <pr:smNativeData xmlns:pr="smNativeData" val="SMDATA_13_TQCXXhMAAAAlAAAAZAAAAA8BAAAAkAAAAEgAAACQAAAASAAAAAAAAAABAAAAAAAAAAEAAABQAAAAAAAAAAAA4D8AAAAAAADgPwAAAAAAAOA/AAAAAAAA4D8AAAAAAADgPwAAAAAAAOA/AAAAAAAA4D8AAAAAAADgPwAAAAAAAOA/AAAAAAAA4D8CAAAAjAAAAAEAAAAAAAAA////CP///wgAAAAAAAAAAAAAAAAAAAAAAAAAAAAAAAAAAAAAZAAAAAEAAABAAAAAAAAAAAAAAAAAAAAAAAAAAAAAAAAAAAAAAAAAAAAAAAAAAAAAAAAAAAAAAAAAAAAAAAAAAAAAAAAAAAAAAAAAAAAAAAAAAAAAAAAAAAAAAAAAAAAAFAAAADwAAAABAAAAAAAAAAAAAAkoAAAAAQAAABQAAAAUAAAAFAAAAAEAAAAAAAAAZAAAAGQAAAAAAAAAZAAAAGQAAAAVAAAAYAAAAAAAAAAAAAAADwAAACADAAAAAAAAAAAAAAEAAACgMgAAVgcAAKr4//8BAAAAf39/AAEAAABkAAAAAAAAABQAAABAHwAAAAAAACYAAAAAAAAAwOD//wAAAAAmAAAAZAAAABYAAABMAAAAAAAAAAAAAAAEAAAAAAAAAAEAAADy8vIKAAAAACgAAAAoAAAAZAAAAGQAAAAAAAAAzMzMAAAAAABQAAAAUAAAAGQAAABkAAAAAAAAABcAAAAUAAAAAAAAAAAAAAD/fwAA/38AAAAAAAAJAAAABAAAABQAAAAMAAAAEAAAAAAAAAAAAAAAAAAAAAAAAAAeAAAAaAAAAAAAAAAAAAAAAAAAAAAAAAAAAAAAECcAABAnAAAAAAAAAAAAAAAAAAAAAAAAAAAAAAAAAAAAAAAAAAAAABQAAAAAAAAAwMD/AAAAAABkAAAAMgAAAAAAAABkAAAAAAAAAH9/fwAKAAAAHwAAAFQAAAD///8B////AQAAAAAAAAAAAAAAAAAAAAAAAAAAAAAAAAAAAAAAAAAAAAAAAn9/fwDy8vIDzMzMAMDA/wB/f38AAAAAAAAAAAAAAAAAAAAAAAAAAAAhAAAAGAAAABQAAAC7DQAA7wUAAEc9AAA+DQAAEAAAACYAAAAIAAAAAAAAAAAAAAA="/>
               </a:ext>
             </a:extLst>
           </p:cNvSpPr>
@@ -2094,7 +2094,7 @@
             <a:spLocks noGrp="1" noChangeArrowheads="1"/>
             <a:extLst>
               <a:ext uri="smNativeData">
-                <pr:smNativeData xmlns:pr="smNativeData" val="SMDATA_13_qYmVXhMAAAAlAAAAZAAAAA8BAAAAkAAAAEgAAACQAAAASAAAAAAAAAAAAAAAAAAAAAEAAABQAAAAAAAAAAAA4D8AAAAAAADgPwAAAAAAAOA/AAAAAAAA4D8AAAAAAADgPwAAAAAAAOA/AAAAAAAA4D8AAAAAAADgPwAAAAAAAOA/AAAAAAAA4D8CAAAAjAAAAAAAAAAAAAAAg8C6DP///wgAAAAAAAAAAAAAAAAAAAAAAAAAAAAAAAAAAAAAZAAAAAEAAABAAAAAAAAAAAAAAAAAAAAAAAAAAAAAAAAAAAAAAAAAAAAAAAAAAAAAAAAAAAAAAAAAAAAAAAAAAAAAAAAAAAAAAAAAAAAAAAAAAAAAAAAAAAAAAAAAAAAAFAAAADwAAAAAAAAAAAAAAAAAAAkUAAAAAQAAABQAAAAUAAAAFAAAAAEAAAAAAAAAZAAAAGQAAAAAAAAAZAAAAGQAAAAVAAAAYAAAAAAAAAAAAAAADwAAACADAAAAAAAAAAAAAAEAAACgMgAAVgcAAKr4//8BAAAAf39/AAEAAABkAAAAAAAAABQAAABAHwAAAAAAACYAAAAAAAAAwOD//wAAAAAmAAAAZAAAABYAAABMAAAAAAAAAAAAAAAEAAAAAAAAAAEAAADy8vIKAAAAACgAAAAoAAAAZAAAAGQAAAAAAAAAzMzMAAAAAABQAAAAUAAAAGQAAABkAAAAAAAAABcAAAAUAAAAAAAAAAAAAAD/fwAA/38AAAAAAAAJAAAABAAAAAAAAAAMAAAAEAAAAAAAAAAAAAAAAAAAAAAAAAAeAAAAaAAAAAAAAAAAAAAAAAAAAAAAAAAAAAAAECcAABAnAAAAAAAAAAAAAAAAAAAAAAAAAAAAAAAAAAAAAAAAAAAAABQAAAAAAAAAwMD/AAAAAABkAAAAMgAAAAAAAABkAAAAAAAAAH9/fwAKAAAAHwAAAFQAAACDwLoF////AQAAAAAAAAAAAAAAAAAAAAAAAAAAAAAAAAAAAAAAAAAAAAAAAn9/fwDy8vIDzMzMAMDA/wB/f38AAAAAAAAAAAAAAAAAAAAAAAAAAAAhAAAAGAAAABQAAAAfMAAAYiYAABBBAABgKAAAEAAAACYAAAAIAAAAAAAAAAAAAAA="/>
+                <pr:smNativeData xmlns:pr="smNativeData" val="SMDATA_13_TQCXXhMAAAAlAAAAZAAAAA8BAAAAkAAAAEgAAACQAAAASAAAAAAAAAAAAAAAAAAAAAEAAABQAAAAAAAAAAAA4D8AAAAAAADgPwAAAAAAAOA/AAAAAAAA4D8AAAAAAADgPwAAAAAAAOA/AAAAAAAA4D8AAAAAAADgPwAAAAAAAOA/AAAAAAAA4D8CAAAAjAAAAAAAAAAAAAAAg8C6DP///wgAAAAAAAAAAAAAAAAAAAAAAAAAAAAAAAAAAAAAZAAAAAEAAABAAAAAAAAAAAAAAAAAAAAAAAAAAAAAAAAAAAAAAAAAAAAAAAAAAAAAAAAAAAAAAAAAAAAAAAAAAAAAAAAAAAAAAAAAAAAAAAAAAAAAAAAAAAAAAAAAAAAAFAAAADwAAAAAAAAAAAAAAAAAAAkUAAAAAQAAABQAAAAUAAAAFAAAAAEAAAAAAAAAZAAAAGQAAAAAAAAAZAAAAGQAAAAVAAAAYAAAAAAAAAAAAAAADwAAACADAAAAAAAAAAAAAAEAAACgMgAAVgcAAKr4//8BAAAAf39/AAEAAABkAAAAAAAAABQAAABAHwAAAAAAACYAAAAAAAAAwOD//wAAAAAmAAAAZAAAABYAAABMAAAAAAAAAAAAAAAEAAAAAAAAAAEAAADy8vIKAAAAACgAAAAoAAAAZAAAAGQAAAAAAAAAzMzMAAAAAABQAAAAUAAAAGQAAABkAAAAAAAAABcAAAAUAAAAAAAAAAAAAAD/fwAA/38AAAAAAAAJAAAABAAAAAAAAAAMAAAAEAAAAAAAAAAAAAAAAAAAAAAAAAAeAAAAaAAAAAAAAAAAAAAAAAAAAAAAAAAAAAAAECcAABAnAAAAAAAAAAAAAAAAAAAAAAAAAAAAAAAAAAAAAAAAAAAAABQAAAAAAAAAwMD/AAAAAABkAAAAMgAAAAAAAABkAAAAAAAAAH9/fwAKAAAAHwAAAFQAAACDwLoF////AQAAAAAAAAAAAAAAAAAAAAAAAAAAAAAAAAAAAAAAAAAAAAAAAn9/fwDy8vIDzMzMAMDA/wB/f38AAAAAAAAAAAAAAAAAAAAAAAAAAAAhAAAAGAAAABQAAAAfMAAAYiYAABBBAABgKAAAEAAAACYAAAAIAAAAAAAAAAAAAAA="/>
               </a:ext>
             </a:extLst>
           </p:cNvSpPr>
@@ -2108,7 +2108,7 @@
           <a:lstStyle/>
           <a:p>
             <a:pPr/>
-            <a:fld id="{06F0304D-03EB-A5C6-A548-F5937E0653A0}" type="datetime1">
+            <a:fld id="{0A7B5A69-27E7-2EAC-A9C3-D1F9148D5F84}" type="datetime1">
               <a:t>{Date/Time}</a:t>
             </a:fld>
           </a:p>
@@ -2121,7 +2121,7 @@
             <a:spLocks noGrp="1" noChangeArrowheads="1"/>
             <a:extLst>
               <a:ext uri="smNativeData">
-                <pr:smNativeData xmlns:pr="smNativeData" val="SMDATA_13_qYmVXhMAAAAlAAAAZAAAAA8BAAAAkAAAAEgAAACQAAAASAAAAAAAAAAAAAAAAAAAAAEAAABQAAAAAAAAAAAA4D8AAAAAAADgPwAAAAAAAOA/AAAAAAAA4D8AAAAAAADgPwAAAAAAAOA/AAAAAAAA4D8AAAAAAADgPwAAAAAAAOA/AAAAAAAA4D8CAAAAjAAAAAAAAAAAAAAAg8C6DP///wgAAAAAAAAAAAAAAAAAAAAAAAAAAAAAAAAAAAAAZAAAAAEAAABAAAAAAAAAAAAAAAAAAAAAAAAAAAAAAAAAAAAAAAAAAAAAAAAAAAAAAAAAAAAAAAAAAAAAAAAAAAAAAAAAAAAAAAAAAAAAAAAAAAAAAAAAAAAAAAAAAAAAFAAAADwAAAAAAAAAAAAAAAAAAAkUAAAAAQAAABQAAAAUAAAAFAAAAAEAAAAAAAAAZAAAAGQAAAAAAAAAZAAAAGQAAAAVAAAAYAAAAAAAAAAAAAAADwAAACADAAAAAAAAAAAAAAEAAACgMgAAVgcAAKr4//8BAAAAf39/AAEAAABkAAAAAAAAABQAAABAHwAAAAAAACYAAAAAAAAAwOD//wAAAAAmAAAAZAAAABYAAABMAAAAAAAAAAAAAAAEAAAAAAAAAAEAAADy8vIKAAAAACgAAAAoAAAAZAAAAGQAAAAAAAAAzMzMAAAAAABQAAAAUAAAAGQAAABkAAAAAAAAABcAAAAUAAAAAAAAAAAAAAD/fwAA/38AAAAAAAAJAAAABAAAAGQAZQAMAAAAEAAAAAAAAAAAAAAAAAAAAAAAAAAeAAAAaAAAAAAAAAAAAAAAAAAAAAAAAAAAAAAAECcAABAnAAAAAAAAAAAAAAAAAAAAAAAAAAAAAAAAAAAAAAAAAAAAABQAAAAAAAAAwMD/AAAAAABkAAAAMgAAAAAAAABkAAAAAAAAAH9/fwAKAAAAHwAAAFQAAACDwLoF////AQAAAAAAAAAAAAAAAAAAAAAAAAAAAAAAAAAAAAAAAAAAAAAAAn9/fwDy8vIDzMzMAMDA/wB/f38AAAAAAAAAAAAAAAAAAAAAAAAAAAAhAAAAGAAAABQAAADcCQAAXCYAACguAABVKAAAEAAAACYAAAAIAAAAAAAAAAAAAAA="/>
+                <pr:smNativeData xmlns:pr="smNativeData" val="SMDATA_13_TQCXXhMAAAAlAAAAZAAAAA8BAAAAkAAAAEgAAACQAAAASAAAAAAAAAAAAAAAAAAAAAEAAABQAAAAAAAAAAAA4D8AAAAAAADgPwAAAAAAAOA/AAAAAAAA4D8AAAAAAADgPwAAAAAAAOA/AAAAAAAA4D8AAAAAAADgPwAAAAAAAOA/AAAAAAAA4D8CAAAAjAAAAAAAAAAAAAAAg8C6DP///wgAAAAAAAAAAAAAAAAAAAAAAAAAAAAAAAAAAAAAZAAAAAEAAABAAAAAAAAAAAAAAAAAAAAAAAAAAAAAAAAAAAAAAAAAAAAAAAAAAAAAAAAAAAAAAAAAAAAAAAAAAAAAAAAAAAAAAAAAAAAAAAAAAAAAAAAAAAAAAAAAAAAAFAAAADwAAAAAAAAAAAAAAAAAAAkUAAAAAQAAABQAAAAUAAAAFAAAAAEAAAAAAAAAZAAAAGQAAAAAAAAAZAAAAGQAAAAVAAAAYAAAAAAAAAAAAAAADwAAACADAAAAAAAAAAAAAAEAAACgMgAAVgcAAKr4//8BAAAAf39/AAEAAABkAAAAAAAAABQAAABAHwAAAAAAACYAAAAAAAAAwOD//wAAAAAmAAAAZAAAABYAAABMAAAAAAAAAAAAAAAEAAAAAAAAAAEAAADy8vIKAAAAACgAAAAoAAAAZAAAAGQAAAAAAAAAzMzMAAAAAABQAAAAUAAAAGQAAABkAAAAAAAAABcAAAAUAAAAAAAAAAAAAAD/fwAA/38AAAAAAAAJAAAABAAAAGQAZQAMAAAAEAAAAAAAAAAAAAAAAAAAAAAAAAAeAAAAaAAAAAAAAAAAAAAAAAAAAAAAAAAAAAAAECcAABAnAAAAAAAAAAAAAAAAAAAAAAAAAAAAAAAAAAAAAAAAAAAAABQAAAAAAAAAwMD/AAAAAABkAAAAMgAAAAAAAABkAAAAAAAAAH9/fwAKAAAAHwAAAFQAAACDwLoF////AQAAAAAAAAAAAAAAAAAAAAAAAAAAAAAAAAAAAAAAAAAAAAAAAn9/fwDy8vIDzMzMAMDA/wB/f38AAAAAAAAAAAAAAAAAAAAAAAAAAAAhAAAAGAAAABQAAADcCQAAXCYAACguAABVKAAAEAAAACYAAAAIAAAAAAAAAAAAAAA="/>
               </a:ext>
             </a:extLst>
           </p:cNvSpPr>
@@ -2148,7 +2148,7 @@
             <a:spLocks noGrp="1" noChangeArrowheads="1"/>
             <a:extLst>
               <a:ext uri="smNativeData">
-                <pr:smNativeData xmlns:pr="smNativeData" val="SMDATA_13_qYmVXhMAAAAlAAAAZAAAAA8BAAAAkAAAAEgAAACQAAAASAAAAAAAAAAAAAAAAAAAAAEAAABQAAAAAAAAAAAA4D8AAAAAAADgPwAAAAAAAOA/AAAAAAAA4D8AAAAAAADgPwAAAAAAAOA/AAAAAAAA4D8AAAAAAADgPwAAAAAAAOA/AAAAAAAA4D8CAAAAjAAAAAEAAAAAAAAAeHh4yv///wgAAAAAAAAAAAAAAAAAAAAAAAAAAAAAAAAAAAAAZAAAAAEAAABAAAAAAAAAAAAAAAAAAAAAAAAAAAAAAAAAAAAAAAAAAAAAAAAAAAAAAAAAAAAAAAAAAAAAAAAAAAAAAAAAAAAAAAAAAAAAAAAAAAAAAAAAAAAAAAAAAAAAFAAAADwAAAAAAAAAAAAAAAAAAAkUAAAAAQAAABQAAAAUAAAAFAAAAAEAAAAAAAAAZAAAAGQAAAAAAAAAZAAAAGQAAAAVAAAAYAAAAAAAAAAAAAAADwAAACADAAAAAAAAAAAAAAEAAACgMgAAVgcAAKr4//8BAAAAf39/AAEAAABkAAAAAAAAABQAAABAHwAAAAAAACYAAAAAAAAAwOD//wAAAAAmAAAAZAAAABYAAABMAAAAAAAAAAAAAAAEAAAAAAAAAAEAAADy8vIKAAAAACgAAAAoAAAAZAAAAGQAAAAAAAAAzMzMAAAAAABQAAAAUAAAAGQAAABkAAAAAAAAABcAAAAUAAAAAAAAAAAAAAD/fwAA/38AAAAAAAAJAAAABAAAAFYAdQAMAAAAEAAAAAAAAAAAAAAAAAAAAAAAAAAeAAAAaAAAAAAAAAAAAAAAAAAAAAAAAAAAAAAAECcAABAnAAAAAAAAAAAAAAAAAAAAAAAAAAAAAAAAAAAAAAAAAAAAABQAAAAAAAAAwMD/AAAAAABkAAAAMgAAAAAAAABkAAAAAAAAAH9/fwAKAAAAHwAAAFQAAAB4eHjD////AQAAAAAAAAAAAAAAAAAAAAAAAAAAAAAAAAAAAAAAAAAAAAAAAn9/fwDy8vIDzMzMAMDA/wB/f38AAAAAAAAAAAAAAAAAAAAAAAAAAAAhAAAAGAAAABQAAAAyQgAAYiYAAHdEAAAwKgAAEAAAACYAAAAIAAAAAAAAAAAAAAA="/>
+                <pr:smNativeData xmlns:pr="smNativeData" val="SMDATA_13_TQCXXhMAAAAlAAAAZAAAAA8BAAAAkAAAAEgAAACQAAAASAAAAAAAAAAAAAAAAAAAAAEAAABQAAAAAAAAAAAA4D8AAAAAAADgPwAAAAAAAOA/AAAAAAAA4D8AAAAAAADgPwAAAAAAAOA/AAAAAAAA4D8AAAAAAADgPwAAAAAAAOA/AAAAAAAA4D8CAAAAjAAAAAEAAAAAAAAAeHh4yv///wgAAAAAAAAAAAAAAAAAAAAAAAAAAAAAAAAAAAAAZAAAAAEAAABAAAAAAAAAAAAAAAAAAAAAAAAAAAAAAAAAAAAAAAAAAAAAAAAAAAAAAAAAAAAAAAAAAAAAAAAAAAAAAAAAAAAAAAAAAAAAAAAAAAAAAAAAAAAAAAAAAAAAFAAAADwAAAAAAAAAAAAAAAAAAAkUAAAAAQAAABQAAAAUAAAAFAAAAAEAAAAAAAAAZAAAAGQAAAAAAAAAZAAAAGQAAAAVAAAAYAAAAAAAAAAAAAAADwAAACADAAAAAAAAAAAAAAEAAACgMgAAVgcAAKr4//8BAAAAf39/AAEAAABkAAAAAAAAABQAAABAHwAAAAAAACYAAAAAAAAAwOD//wAAAAAmAAAAZAAAABYAAABMAAAAAAAAAAAAAAAEAAAAAAAAAAEAAADy8vIKAAAAACgAAAAoAAAAZAAAAGQAAAAAAAAAzMzMAAAAAABQAAAAUAAAAGQAAABkAAAAAAAAABcAAAAUAAAAAAAAAAAAAAD/fwAA/38AAAAAAAAJAAAABAAAAFYAdQAMAAAAEAAAAAAAAAAAAAAAAAAAAAAAAAAeAAAAaAAAAAAAAAAAAAAAAAAAAAAAAAAAAAAAECcAABAnAAAAAAAAAAAAAAAAAAAAAAAAAAAAAAAAAAAAAAAAAAAAABQAAAAAAAAAwMD/AAAAAABkAAAAMgAAAAAAAABkAAAAAAAAAH9/fwAKAAAAHwAAAFQAAAB4eHjD////AQAAAAAAAAAAAAAAAAAAAAAAAAAAAAAAAAAAAAAAAAAAAAAAAn9/fwDy8vIDzMzMAMDA/wB/f38AAAAAAAAAAAAAAAAAAAAAAAAAAAAhAAAAGAAAABQAAAAyQgAAYiYAAHdEAAAwKgAAEAAAACYAAAAIAAAAAAAAAAAAAAA="/>
               </a:ext>
             </a:extLst>
           </p:cNvSpPr>
@@ -2162,7 +2162,7 @@
           <a:lstStyle/>
           <a:p>
             <a:pPr/>
-            <a:fld id="{084B125C-12E5-1EE4-ABF3-E4B15CBD5DB1}" type="slidenum">
+            <a:fld id="{7C1DBED6-9891-4848-DFA5-6E1DF0EB293B}" type="slidenum">
               <a:t>{Nr.}</a:t>
             </a:fld>
           </a:p>
@@ -2200,7 +2200,7 @@
             <a:spLocks noGrp="1" noChangeArrowheads="1"/>
             <a:extLst>
               <a:ext uri="smNativeData">
-                <pr:smNativeData xmlns:pr="smNativeData" val="SMDATA_13_qYmVXhMAAAAlAAAAZAAAAA8BAAAAkAAAAEgAAACQAAAASAAAAAAAAAAAAAAAAAAAAAEAAABQAAAAAAAAAAAA4D8AAAAAAADgPwAAAAAAAOA/AAAAAAAA4D8AAAAAAADgPwAAAAAAAOA/AAAAAAAA4D8AAAAAAADgPwAAAAAAAOA/AAAAAAAA4D8CAAAAjAAAAAAAAAAAAAAAg8C6DP///wgAAAAAAAAAAAAAAAAAAAAAAAAAAAAAAAAAAAAAZAAAAAEAAABAAAAAAAAAAAAAAAAAAAAAAAAAAAAAAAAAAAAAAAAAAAAAAAAAAAAAAAAAAAAAAAAAAAAAAAAAAAAAAAAAAAAAAAAAAAAAAAAAAAAAAAAAAAAAAAAAAAAAFAAAADwAAAAAAAAAAAAAAAAAAAkUAAAAAQAAABQAAAAUAAAAFAAAAAEAAAAAAAAAZAAAAGQAAAAAAAAAZAAAAGQAAAAVAAAAYAAAAAAAAAAAAAAADwAAACADAAAAAAAAAAAAAAEAAACgMgAAVgcAAKr4//8BAAAAf39/AAEAAABkAAAAAAAAABQAAABAHwAAAAAAACYAAAAAAAAAwOD//wAAAAAmAAAAZAAAABYAAABMAAAAAAAAAAAAAAAEAAAAAAAAAAEAAADy8vIKAAAAACgAAAAoAAAAZAAAAGQAAAAAAAAAzMzMAAAAAABQAAAAUAAAAGQAAABkAAAAAAAAABcAAAAUAAAAAAAAAAAAAAD/fwAA/38AAAAAAAAJAAAABAAAAAAAAAAMAAAAEAAAAAAAAAAAAAAAAAAAAAAAAAAeAAAAaAAAAAAAAAAAAAAAAAAAAAAAAAAAAAAAECcAABAnAAAAAAAAAAAAAAAAAAAAAAAAAAAAAAAAAAAAAAAAAAAAABQAAAAAAAAAwMD/AAAAAABkAAAAMgAAAAAAAABkAAAAAAAAAH9/fwAKAAAAHwAAAFQAAACDwLoF////AQAAAAAAAAAAAAAAAAAAAAAAAAAAAAAAAAAAAAAAAAAAAAAAAn9/fwDy8vIDzMzMAMDA/wB/f38AAAAAAAAAAAAAAAAAAAAAAAAAAAAhAAAAGAAAABQAAAAfMAAAYiYAABBBAABgKAAAEAAAACYAAAAIAAAAAAAAAAAAAAA="/>
+                <pr:smNativeData xmlns:pr="smNativeData" val="SMDATA_13_TQCXXhMAAAAlAAAAZAAAAA8BAAAAkAAAAEgAAACQAAAASAAAAAAAAAAAAAAAAAAAAAEAAABQAAAAAAAAAAAA4D8AAAAAAADgPwAAAAAAAOA/AAAAAAAA4D8AAAAAAADgPwAAAAAAAOA/AAAAAAAA4D8AAAAAAADgPwAAAAAAAOA/AAAAAAAA4D8CAAAAjAAAAAAAAAAAAAAAg8C6DP///wgAAAAAAAAAAAAAAAAAAAAAAAAAAAAAAAAAAAAAZAAAAAEAAABAAAAAAAAAAAAAAAAAAAAAAAAAAAAAAAAAAAAAAAAAAAAAAAAAAAAAAAAAAAAAAAAAAAAAAAAAAAAAAAAAAAAAAAAAAAAAAAAAAAAAAAAAAAAAAAAAAAAAFAAAADwAAAAAAAAAAAAAAAAAAAkUAAAAAQAAABQAAAAUAAAAFAAAAAEAAAAAAAAAZAAAAGQAAAAAAAAAZAAAAGQAAAAVAAAAYAAAAAAAAAAAAAAADwAAACADAAAAAAAAAAAAAAEAAACgMgAAVgcAAKr4//8BAAAAf39/AAEAAABkAAAAAAAAABQAAABAHwAAAAAAACYAAAAAAAAAwOD//wAAAAAmAAAAZAAAABYAAABMAAAAAAAAAAAAAAAEAAAAAAAAAAEAAADy8vIKAAAAACgAAAAoAAAAZAAAAGQAAAAAAAAAzMzMAAAAAABQAAAAUAAAAGQAAABkAAAAAAAAABcAAAAUAAAAAAAAAAAAAAD/fwAA/38AAAAAAAAJAAAABAAAAAAAAAAMAAAAEAAAAAAAAAAAAAAAAAAAAAAAAAAeAAAAaAAAAAAAAAAAAAAAAAAAAAAAAAAAAAAAECcAABAnAAAAAAAAAAAAAAAAAAAAAAAAAAAAAAAAAAAAAAAAAAAAABQAAAAAAAAAwMD/AAAAAABkAAAAMgAAAAAAAABkAAAAAAAAAH9/fwAKAAAAHwAAAFQAAACDwLoF////AQAAAAAAAAAAAAAAAAAAAAAAAAAAAAAAAAAAAAAAAAAAAAAAAn9/fwDy8vIDzMzMAMDA/wB/f38AAAAAAAAAAAAAAAAAAAAAAAAAAAAhAAAAGAAAABQAAAAfMAAAYiYAABBBAABgKAAAEAAAACYAAAAIAAAAAAAAAAAAAAA="/>
               </a:ext>
             </a:extLst>
           </p:cNvSpPr>
@@ -2214,7 +2214,7 @@
           <a:lstStyle/>
           <a:p>
             <a:pPr/>
-            <a:fld id="{312E1E30-7EDC-7BE8-9296-88BD50D864DD}" type="datetime1">
+            <a:fld id="{5E14D311-5FB3-4125-FDAC-A9709DE20BFC}" type="datetime1">
               <a:t>{Date/Time}</a:t>
             </a:fld>
           </a:p>
@@ -2227,7 +2227,7 @@
             <a:spLocks noGrp="1" noChangeArrowheads="1"/>
             <a:extLst>
               <a:ext uri="smNativeData">
-                <pr:smNativeData xmlns:pr="smNativeData" val="SMDATA_13_qYmVXhMAAAAlAAAAZAAAAA8BAAAAkAAAAEgAAACQAAAASAAAAAAAAAAAAAAAAAAAAAEAAABQAAAAAAAAAAAA4D8AAAAAAADgPwAAAAAAAOA/AAAAAAAA4D8AAAAAAADgPwAAAAAAAOA/AAAAAAAA4D8AAAAAAADgPwAAAAAAAOA/AAAAAAAA4D8CAAAAjAAAAAAAAAAAAAAAg8C6DP///wgAAAAAAAAAAAAAAAAAAAAAAAAAAAAAAAAAAAAAZAAAAAEAAABAAAAAAAAAAAAAAAAAAAAAAAAAAAAAAAAAAAAAAAAAAAAAAAAAAAAAAAAAAAAAAAAAAAAAAAAAAAAAAAAAAAAAAAAAAAAAAAAAAAAAAAAAAAAAAAAAAAAAFAAAADwAAAAAAAAAAAAAAAAAAAkUAAAAAQAAABQAAAAUAAAAFAAAAAEAAAAAAAAAZAAAAGQAAAAAAAAAZAAAAGQAAAAVAAAAYAAAAAAAAAAAAAAADwAAACADAAAAAAAAAAAAAAEAAACgMgAAVgcAAKr4//8BAAAAf39/AAEAAABkAAAAAAAAABQAAABAHwAAAAAAACYAAAAAAAAAwOD//wAAAAAmAAAAZAAAABYAAABMAAAAAAAAAAAAAAAEAAAAAAAAAAEAAADy8vIKAAAAACgAAAAoAAAAZAAAAGQAAAAAAAAAzMzMAAAAAABQAAAAUAAAAGQAAABkAAAAAAAAABcAAAAUAAAAAAAAAAAAAAD/fwAA/38AAAAAAAAJAAAABAAAAAAAAAAMAAAAEAAAAAAAAAAAAAAAAAAAAAAAAAAeAAAAaAAAAAAAAAAAAAAAAAAAAAAAAAAAAAAAECcAABAnAAAAAAAAAAAAAAAAAAAAAAAAAAAAAAAAAAAAAAAAAAAAABQAAAAAAAAAwMD/AAAAAABkAAAAMgAAAAAAAABkAAAAAAAAAH9/fwAKAAAAHwAAAFQAAACDwLoF////AQAAAAAAAAAAAAAAAAAAAAAAAAAAAAAAAAAAAAAAAAAAAAAAAn9/fwDy8vIDzMzMAMDA/wB/f38AAAAAAAAAAAAAAAAAAAAAAAAAAAAhAAAAGAAAABQAAADcCQAAXCYAACguAABVKAAAEAAAACYAAAAIAAAAAAAAAAAAAAA="/>
+                <pr:smNativeData xmlns:pr="smNativeData" val="SMDATA_13_TQCXXhMAAAAlAAAAZAAAAA8BAAAAkAAAAEgAAACQAAAASAAAAAAAAAAAAAAAAAAAAAEAAABQAAAAAAAAAAAA4D8AAAAAAADgPwAAAAAAAOA/AAAAAAAA4D8AAAAAAADgPwAAAAAAAOA/AAAAAAAA4D8AAAAAAADgPwAAAAAAAOA/AAAAAAAA4D8CAAAAjAAAAAAAAAAAAAAAg8C6DP///wgAAAAAAAAAAAAAAAAAAAAAAAAAAAAAAAAAAAAAZAAAAAEAAABAAAAAAAAAAAAAAAAAAAAAAAAAAAAAAAAAAAAAAAAAAAAAAAAAAAAAAAAAAAAAAAAAAAAAAAAAAAAAAAAAAAAAAAAAAAAAAAAAAAAAAAAAAAAAAAAAAAAAFAAAADwAAAAAAAAAAAAAAAAAAAkUAAAAAQAAABQAAAAUAAAAFAAAAAEAAAAAAAAAZAAAAGQAAAAAAAAAZAAAAGQAAAAVAAAAYAAAAAAAAAAAAAAADwAAACADAAAAAAAAAAAAAAEAAACgMgAAVgcAAKr4//8BAAAAf39/AAEAAABkAAAAAAAAABQAAABAHwAAAAAAACYAAAAAAAAAwOD//wAAAAAmAAAAZAAAABYAAABMAAAAAAAAAAAAAAAEAAAAAAAAAAEAAADy8vIKAAAAACgAAAAoAAAAZAAAAGQAAAAAAAAAzMzMAAAAAABQAAAAUAAAAGQAAABkAAAAAAAAABcAAAAUAAAAAAAAAAAAAAD/fwAA/38AAAAAAAAJAAAABAAAAAAAAAAMAAAAEAAAAAAAAAAAAAAAAAAAAAAAAAAeAAAAaAAAAAAAAAAAAAAAAAAAAAAAAAAAAAAAECcAABAnAAAAAAAAAAAAAAAAAAAAAAAAAAAAAAAAAAAAAAAAAAAAABQAAAAAAAAAwMD/AAAAAABkAAAAMgAAAAAAAABkAAAAAAAAAH9/fwAKAAAAHwAAAFQAAACDwLoF////AQAAAAAAAAAAAAAAAAAAAAAAAAAAAAAAAAAAAAAAAAAAAAAAAn9/fwDy8vIDzMzMAMDA/wB/f38AAAAAAAAAAAAAAAAAAAAAAAAAAAAhAAAAGAAAABQAAADcCQAAXCYAACguAABVKAAAEAAAACYAAAAIAAAAAAAAAAAAAAA="/>
               </a:ext>
             </a:extLst>
           </p:cNvSpPr>
@@ -2254,7 +2254,7 @@
             <a:spLocks noGrp="1" noChangeArrowheads="1"/>
             <a:extLst>
               <a:ext uri="smNativeData">
-                <pr:smNativeData xmlns:pr="smNativeData" val="SMDATA_13_qYmVXhMAAAAlAAAAZAAAAA8BAAAAkAAAAEgAAACQAAAASAAAAAAAAAAAAAAAAAAAAAEAAABQAAAAAAAAAAAA4D8AAAAAAADgPwAAAAAAAOA/AAAAAAAA4D8AAAAAAADgPwAAAAAAAOA/AAAAAAAA4D8AAAAAAADgPwAAAAAAAOA/AAAAAAAA4D8CAAAAjAAAAAEAAAAAAAAAeHh4yv///wgAAAAAAAAAAAAAAAAAAAAAAAAAAAAAAAAAAAAAZAAAAAEAAABAAAAAAAAAAAAAAAAAAAAAAAAAAAAAAAAAAAAAAAAAAAAAAAAAAAAAAAAAAAAAAAAAAAAAAAAAAAAAAAAAAAAAAAAAAAAAAAAAAAAAAAAAAAAAAAAAAAAAFAAAADwAAAAAAAAAAAAAAAAAAAkUAAAAAQAAABQAAAAUAAAAFAAAAAEAAAAAAAAAZAAAAGQAAAAAAAAAZAAAAGQAAAAVAAAAYAAAAAAAAAAAAAAADwAAACADAAAAAAAAAAAAAAEAAACgMgAAVgcAAKr4//8BAAAAf39/AAEAAABkAAAAAAAAABQAAABAHwAAAAAAACYAAAAAAAAAwOD//wAAAAAmAAAAZAAAABYAAABMAAAAAAAAAAAAAAAEAAAAAAAAAAEAAADy8vIKAAAAACgAAAAoAAAAZAAAAGQAAAAAAAAAzMzMAAAAAABQAAAAUAAAAGQAAABkAAAAAAAAABcAAAAUAAAAAAAAAAAAAAD/fwAA/38AAAAAAAAJAAAABAAAAEEAYQAMAAAAEAAAAAAAAAAAAAAAAAAAAAAAAAAeAAAAaAAAAAAAAAAAAAAAAAAAAAAAAAAAAAAAECcAABAnAAAAAAAAAAAAAAAAAAAAAAAAAAAAAAAAAAAAAAAAAAAAABQAAAAAAAAAwMD/AAAAAABkAAAAMgAAAAAAAABkAAAAAAAAAH9/fwAKAAAAHwAAAFQAAAB4eHjD////AQAAAAAAAAAAAAAAAAAAAAAAAAAAAAAAAAAAAAAAAAAAAAAAAn9/fwDy8vIDzMzMAMDA/wB/f38AAAAAAAAAAAAAAAAAAAAAAAAAAAAhAAAAGAAAABQAAAAyQgAAYiYAAHdEAAAwKgAAEAAAACYAAAAIAAAAAAAAAAAAAAA="/>
+                <pr:smNativeData xmlns:pr="smNativeData" val="SMDATA_13_TQCXXhMAAAAlAAAAZAAAAA8BAAAAkAAAAEgAAACQAAAASAAAAAAAAAAAAAAAAAAAAAEAAABQAAAAAAAAAAAA4D8AAAAAAADgPwAAAAAAAOA/AAAAAAAA4D8AAAAAAADgPwAAAAAAAOA/AAAAAAAA4D8AAAAAAADgPwAAAAAAAOA/AAAAAAAA4D8CAAAAjAAAAAEAAAAAAAAAeHh4yv///wgAAAAAAAAAAAAAAAAAAAAAAAAAAAAAAAAAAAAAZAAAAAEAAABAAAAAAAAAAAAAAAAAAAAAAAAAAAAAAAAAAAAAAAAAAAAAAAAAAAAAAAAAAAAAAAAAAAAAAAAAAAAAAAAAAAAAAAAAAAAAAAAAAAAAAAAAAAAAAAAAAAAAFAAAADwAAAAAAAAAAAAAAAAAAAkUAAAAAQAAABQAAAAUAAAAFAAAAAEAAAAAAAAAZAAAAGQAAAAAAAAAZAAAAGQAAAAVAAAAYAAAAAAAAAAAAAAADwAAACADAAAAAAAAAAAAAAEAAACgMgAAVgcAAKr4//8BAAAAf39/AAEAAABkAAAAAAAAABQAAABAHwAAAAAAACYAAAAAAAAAwOD//wAAAAAmAAAAZAAAABYAAABMAAAAAAAAAAAAAAAEAAAAAAAAAAEAAADy8vIKAAAAACgAAAAoAAAAZAAAAGQAAAAAAAAAzMzMAAAAAABQAAAAUAAAAGQAAABkAAAAAAAAABcAAAAUAAAAAAAAAAAAAAD/fwAA/38AAAAAAAAJAAAABAAAAEEAYQAMAAAAEAAAAAAAAAAAAAAAAAAAAAAAAAAeAAAAaAAAAAAAAAAAAAAAAAAAAAAAAAAAAAAAECcAABAnAAAAAAAAAAAAAAAAAAAAAAAAAAAAAAAAAAAAAAAAAAAAABQAAAAAAAAAwMD/AAAAAABkAAAAMgAAAAAAAABkAAAAAAAAAH9/fwAKAAAAHwAAAFQAAAB4eHjD////AQAAAAAAAAAAAAAAAAAAAAAAAAAAAAAAAAAAAAAAAAAAAAAAAn9/fwDy8vIDzMzMAMDA/wB/f38AAAAAAAAAAAAAAAAAAAAAAAAAAAAhAAAAGAAAABQAAAAyQgAAYiYAAHdEAAAwKgAAEAAAACYAAAAIAAAAAAAAAAAAAAA="/>
               </a:ext>
             </a:extLst>
           </p:cNvSpPr>
@@ -2268,7 +2268,7 @@
           <a:lstStyle/>
           <a:p>
             <a:pPr/>
-            <a:fld id="{07CD54DB-95EA-98A2-A475-63F71A3B5236}" type="slidenum">
+            <a:fld id="{6CC8F22F-6181-9D04-CF70-9751BC3E39C2}" type="slidenum">
               <a:t>{Nr.}</a:t>
             </a:fld>
           </a:p>
@@ -2305,7 +2305,7 @@
           <p:cNvSpPr>
             <a:extLst>
               <a:ext uri="smNativeData">
-                <pr:smNativeData xmlns:pr="smNativeData" val="SMDATA_13_qYmVXhMAAAAlAAAAZAAAAA8BAAAAkAAAAEgAAACQAAAASAAAAAAAAAAAAAAAAAAAAAEAAABQAAAAAAAAAAAA4D8AAAAAAADgPwAAAAAAAOA/AAAAAAAA4D8AAAAAAADgPwAAAAAAAOA/AAAAAAAA4D8AAAAAAADgPwAAAAAAAOA/AAAAAAAA4D8CAAAAjAAAAAEAAAAAAAAAg8C6DP///wgAAAAAAAAAAAAAAAAAAAAAAAAAAAAAAAAAAAAAZAAAAAEAAABAAAAAAAAAAAAAAAAAAAAAAAAAAAAAAAAAAAAAAAAAAAAAAAAAAAAAAAAAAAAAAAAAAAAAAAAAAAAAAAAAAAAAAAAAAAAAAAAAAAAAAAAAAAAAAAAAAAAAFAAAADwAAAAAAAAAAAAAAAAAAAkUAAAAAQAAABQAAAAUAAAAFAAAAAEAAAAAAAAAZAAAAGQAAAAAAAAAZAAAAGQAAAAVAAAAYAAAAAAAAAAAAAAADwAAACADAAAAAAAAAAAAAAEAAACgMgAAVgcAAKr4//8BAAAAf39/AAEAAABkAAAAAAAAABQAAABAHwAAAAAAACYAAAAAAAAAwOD//wAAAAAmAAAAZAAAABYAAABMAAAAAAAAAAAAAAAEAAAAAAAAAAEAAADy8vIKAAAAACgAAAAoAAAAZAAAAGQAAAAAAAAAzMzMAAAAAABQAAAAUAAAAGQAAABkAAAAAAAAABcAAAAUAAAAAAAAAAAAAAD/fwAA/38AAAAAAAAJAAAABAAAAAAAAAAMAAAAEAAAAAAAAAAAAAAAAAAAAAAAAAAeAAAAaAAAAAAAAAAAAAAAAAAAAAAAAAAAAAAAECcAABAnAAAAAAAAAAAAAAAAAAAAAAAAAAAAAAAAAAAAAAAAAAAAABQAAAAAAAAAwMD/AAAAAABkAAAAMgAAAAAAAABkAAAAAAAAAH9/fwAKAAAAHwAAAFQAAACDwLoF////AQAAAAAAAAAAAAAAAAAAAAAAAAAAAAAAAAAAAAAAAAAAAAAAAn9/fwDy8vIDzMzMAMDA/wB/f38AAAAAAAAAAAAAAAAAAAAAAAAAAAAhAAAAGAAAABQAAAABAAAAAQAAAH8lAAAxKgAAEAAAACYAAAAIAAAA//////////8="/>
+                <pr:smNativeData xmlns:pr="smNativeData" val="SMDATA_13_TQCXXhMAAAAlAAAAZAAAAA8BAAAAkAAAAEgAAACQAAAASAAAAAAAAAAAAAAAAAAAAAEAAABQAAAAAAAAAAAA4D8AAAAAAADgPwAAAAAAAOA/AAAAAAAA4D8AAAAAAADgPwAAAAAAAOA/AAAAAAAA4D8AAAAAAADgPwAAAAAAAOA/AAAAAAAA4D8CAAAAjAAAAAEAAAAAAAAAg8C6DP///wgAAAAAAAAAAAAAAAAAAAAAAAAAAAAAAAAAAAAAZAAAAAEAAABAAAAAAAAAAAAAAAAAAAAAAAAAAAAAAAAAAAAAAAAAAAAAAAAAAAAAAAAAAAAAAAAAAAAAAAAAAAAAAAAAAAAAAAAAAAAAAAAAAAAAAAAAAAAAAAAAAAAAFAAAADwAAAAAAAAAAAAAAAAAAAkUAAAAAQAAABQAAAAUAAAAFAAAAAEAAAAAAAAAZAAAAGQAAAAAAAAAZAAAAGQAAAAVAAAAYAAAAAAAAAAAAAAADwAAACADAAAAAAAAAAAAAAEAAACgMgAAVgcAAKr4//8BAAAAf39/AAEAAABkAAAAAAAAABQAAABAHwAAAAAAACYAAAAAAAAAwOD//wAAAAAmAAAAZAAAABYAAABMAAAAAAAAAAAAAAAEAAAAAAAAAAEAAADy8vIKAAAAACgAAAAoAAAAZAAAAGQAAAAAAAAAzMzMAAAAAABQAAAAUAAAAGQAAABkAAAAAAAAABcAAAAUAAAAAAAAAAAAAAD/fwAA/38AAAAAAAAJAAAABAAAAAAAAAAMAAAAEAAAAAAAAAAAAAAAAAAAAAAAAAAeAAAAaAAAAAAAAAAAAAAAAAAAAAAAAAAAAAAAECcAABAnAAAAAAAAAAAAAAAAAAAAAAAAAAAAAAAAAAAAAAAAAAAAABQAAAAAAAAAwMD/AAAAAABkAAAAMgAAAAAAAABkAAAAAAAAAH9/fwAKAAAAHwAAAFQAAACDwLoF////AQAAAAAAAAAAAAAAAAAAAAAAAAAAAAAAAAAAAAAAAAAAAAAAAn9/fwDy8vIDzMzMAMDA/wB/f38AAAAAAAAAAAAAAAAAAAAAAAAAAAAhAAAAGAAAABQAAAABAAAAAQAAAH8lAAAxKgAAEAAAACYAAAAIAAAA//////////8="/>
               </a:ext>
             </a:extLst>
           </p:cNvSpPr>
@@ -2335,7 +2335,7 @@
             <a:spLocks noGrp="1" noChangeArrowheads="1"/>
             <a:extLst>
               <a:ext uri="smNativeData">
-                <pr:smNativeData xmlns:pr="smNativeData" val="SMDATA_13_qYmVXhMAAAAlAAAAZAAAAA8BAAAAkAAAAEgAAACQAAAASAAAAAAAAAABAAAAAAAAAAEAAABQAAAAAAAAAAAA4D8AAAAAAADgPwAAAAAAAOA/AAAAAAAA4D8AAAAAAADgPwAAAAAAAOA/AAAAAAAA4D8AAAAAAADgPwAAAAAAAOA/AAAAAAAA4D8CAAAAjAAAAAEAAAAAAAAA////CP///wgAAAAAAAAAAAAAAAAAAAAAAAAAAAAAAAAAAAAAZAAAAAEAAABAAAAAAAAAAAAAAAAAAAAAAAAAAAAAAAAAAAAAAAAAAAAAAAAAAAAAAAAAAAAAAAAAAAAAAAAAAAAAAAAAAAAAAAAAAAAAAAAAAAAAAAAAAAAAAAAAAAAAFAAAADwAAAABAAAAAAAAAAAAAAkoAAAAAQAAABQAAAAUAAAAFAAAAAEAAAAAAAAAZAAAAGQAAAAAAAAAZAAAAGQAAAAVAAAAYAAAAAAAAAAAAAAADwAAACADAAAAAAAAAAAAAAEAAACgMgAAVgcAAKr4//8BAAAAf39/AAEAAABkAAAAAAAAABQAAABAHwAAAAAAACYAAAAAAAAAwOD//wAAAAAmAAAAZAAAABYAAABMAAAAAAAAAAAAAAAEAAAAAAAAAAEAAADy8vIKAAAAACgAAAAoAAAAZAAAAGQAAAAAAAAAzMzMAAAAAABQAAAAUAAAAGQAAABkAAAAAAAAABcAAAAUAAAAAAAAAAAAAAD/fwAA/38AAAAAAAAJAAAABAAAAGcAdQAMAAAAEAAAAAAAAAAAAAAAAAAAAAAAAAAeAAAAaAAAAAAAAAAAAAAAAAAAAAAAAAAAAAAAECcAABAnAAAAAAAAAAAAAAAAAAAAAAAAAAAAAAAAAAAAAAAAAAAAABQAAAAAAAAAwMD/AAAAAABkAAAAMgAAAAAAAABkAAAAAAAAAH9/fwAKAAAAHwAAAFQAAAD///8B////AQAAAAAAAAAAAAAAAAAAAAAAAAAAAAAAAAAAAAAAAAAAAAAAAn9/fwDy8vIDzMzMAMDA/wB/f38AAAAAAAAAAAAAAAAAAAAAAAAAAAAhAAAAGAAAABQAAAD3BAAAzA0AAIkgAADRFAAAEAAAACYAAAAIAAAAAYAAAAAAAAA="/>
+                <pr:smNativeData xmlns:pr="smNativeData" val="SMDATA_13_TQCXXhMAAAAlAAAAZAAAAA8BAAAAkAAAAEgAAACQAAAASAAAAAAAAAABAAAAAAAAAAEAAABQAAAAAAAAAAAA4D8AAAAAAADgPwAAAAAAAOA/AAAAAAAA4D8AAAAAAADgPwAAAAAAAOA/AAAAAAAA4D8AAAAAAADgPwAAAAAAAOA/AAAAAAAA4D8CAAAAjAAAAAEAAAAAAAAA////CP///wgAAAAAAAAAAAAAAAAAAAAAAAAAAAAAAAAAAAAAZAAAAAEAAABAAAAAAAAAAAAAAAAAAAAAAAAAAAAAAAAAAAAAAAAAAAAAAAAAAAAAAAAAAAAAAAAAAAAAAAAAAAAAAAAAAAAAAAAAAAAAAAAAAAAAAAAAAAAAAAAAAAAAFAAAADwAAAABAAAAAAAAAAAAAAkoAAAAAQAAABQAAAAUAAAAFAAAAAEAAAAAAAAAZAAAAGQAAAAAAAAAZAAAAGQAAAAVAAAAYAAAAAAAAAAAAAAADwAAACADAAAAAAAAAAAAAAEAAACgMgAAVgcAAKr4//8BAAAAf39/AAEAAABkAAAAAAAAABQAAABAHwAAAAAAACYAAAAAAAAAwOD//wAAAAAmAAAAZAAAABYAAABMAAAAAAAAAAAAAAAEAAAAAAAAAAEAAADy8vIKAAAAACgAAAAoAAAAZAAAAGQAAAAAAAAAzMzMAAAAAABQAAAAUAAAAGQAAABkAAAAAAAAABcAAAAUAAAAAAAAAAAAAAD/fwAA/38AAAAAAAAJAAAABAAAAGcAdQAMAAAAEAAAAAAAAAAAAAAAAAAAAAAAAAAeAAAAaAAAAAAAAAAAAAAAAAAAAAAAAAAAAAAAECcAABAnAAAAAAAAAAAAAAAAAAAAAAAAAAAAAAAAAAAAAAAAAAAAABQAAAAAAAAAwMD/AAAAAABkAAAAMgAAAAAAAABkAAAAAAAAAH9/fwAKAAAAHwAAAFQAAAD///8B////AQAAAAAAAAAAAAAAAAAAAAAAAAAAAAAAAAAAAAAAAAAAAAAAAn9/fwDy8vIDzMzMAMDA/wB/f38AAAAAAAAAAAAAAAAAAAAAAAAAAAAhAAAAGAAAABQAAAD3BAAAzA0AAIkgAADRFAAAEAAAACYAAAAIAAAAAYAAAAAAAAA="/>
               </a:ext>
             </a:extLst>
           </p:cNvSpPr>
@@ -2373,7 +2373,7 @@
             <a:spLocks noGrp="1" noChangeArrowheads="1"/>
             <a:extLst>
               <a:ext uri="smNativeData">
-                <pr:smNativeData xmlns:pr="smNativeData" val="SMDATA_13_qYmVXhMAAAAlAAAAZAAAAA8BAAAAkAAAAEgAAACQAAAASAAAAAAAAAAAAAAAAAAAAAEAAABQAAAAAAAAAAAA4D8AAAAAAADgPwAAAAAAAOA/AAAAAAAA4D8AAAAAAADgPwAAAAAAAOA/AAAAAAAA4D8AAAAAAADgPwAAAAAAAOA/AAAAAAAA4D8CAAAAjAAAAAAAAAAAAAAAg8C6DP///wgAAAAAAAAAAAAAAAAAAAAAAAAAAAAAAAAAAAAAZAAAAAEAAABAAAAAAAAAAAAAAAAAAAAAAAAAAAAAAAAAAAAAAAAAAAAAAAAAAAAAAAAAAAAAAAAAAAAAAAAAAAAAAAAAAAAAAAAAAAAAAAAAAAAAAAAAAAAAAAAAAAAAFAAAADwAAAAAAAAAAAAAAAAAAAkUAAAAAQAAABQAAAAUAAAAFAAAAAEAAAAAAAAAZAAAAGQAAAAAAAAAZAAAAGQAAAAVAAAAYAAAAAAAAAAAAAAADwAAACADAAAAAAAAAAAAAAEAAACgMgAAVgcAAKr4//8BAAAAf39/AAEAAABkAAAAAAAAABQAAABAHwAAAAAAACYAAAAAAAAAwOD//wAAAAAmAAAAZAAAABYAAABMAAAAAAAAAAAAAAAEAAAAAAAAAAEAAADy8vIKAAAAACgAAAAoAAAAZAAAAGQAAAAAAAAAzMzMAAAAAABQAAAAUAAAAGQAAABkAAAAAAAAABcAAAAUAAAAAAAAAAAAAAD/fwAA/38AAAAAAAAJAAAABAAAAAAAAAAMAAAAEAAAAAAAAAAAAAAAAAAAAAAAAAAeAAAAaAAAAAAAAAAAAAAAAAAAAAAAAAAAAAAAECcAABAnAAAAAAAAAAAAAAAAAAAAAAAAAAAAAAAAAAAAAAAAAAAAABQAAAAAAAAAwMD/AAAAAABkAAAAMgAAAAAAAABkAAAAAAAAAH9/fwAKAAAAHwAAAFQAAACDwLoF////AQAAAAAAAAAAAAAAAAAAAAAAAAAAAAAAAAAAAAAAAAAAAAAAAn9/fwDy8vIDzMzMAMDA/wB/f38AAAAAAAAAAAAAAAAAAAAAAAAAAAAhAAAAGAAAABQAAABvKQAA9gQAABFHAABAJQAAEAAAACYAAAAIAAAAAYAAAAAAAAA="/>
+                <pr:smNativeData xmlns:pr="smNativeData" val="SMDATA_13_TQCXXhMAAAAlAAAAZAAAAA8BAAAAkAAAAEgAAACQAAAASAAAAAAAAAAAAAAAAAAAAAEAAABQAAAAAAAAAAAA4D8AAAAAAADgPwAAAAAAAOA/AAAAAAAA4D8AAAAAAADgPwAAAAAAAOA/AAAAAAAA4D8AAAAAAADgPwAAAAAAAOA/AAAAAAAA4D8CAAAAjAAAAAAAAAAAAAAAg8C6DP///wgAAAAAAAAAAAAAAAAAAAAAAAAAAAAAAAAAAAAAZAAAAAEAAABAAAAAAAAAAAAAAAAAAAAAAAAAAAAAAAAAAAAAAAAAAAAAAAAAAAAAAAAAAAAAAAAAAAAAAAAAAAAAAAAAAAAAAAAAAAAAAAAAAAAAAAAAAAAAAAAAAAAAFAAAADwAAAAAAAAAAAAAAAAAAAkUAAAAAQAAABQAAAAUAAAAFAAAAAEAAAAAAAAAZAAAAGQAAAAAAAAAZAAAAGQAAAAVAAAAYAAAAAAAAAAAAAAADwAAACADAAAAAAAAAAAAAAEAAACgMgAAVgcAAKr4//8BAAAAf39/AAEAAABkAAAAAAAAABQAAABAHwAAAAAAACYAAAAAAAAAwOD//wAAAAAmAAAAZAAAABYAAABMAAAAAAAAAAAAAAAEAAAAAAAAAAEAAADy8vIKAAAAACgAAAAoAAAAZAAAAGQAAAAAAAAAzMzMAAAAAABQAAAAUAAAAGQAAABkAAAAAAAAABcAAAAUAAAAAAAAAAAAAAD/fwAA/38AAAAAAAAJAAAABAAAAAAAAAAMAAAAEAAAAAAAAAAAAAAAAAAAAAAAAAAeAAAAaAAAAAAAAAAAAAAAAAAAAAAAAAAAAAAAECcAABAnAAAAAAAAAAAAAAAAAAAAAAAAAAAAAAAAAAAAAAAAAAAAABQAAAAAAAAAwMD/AAAAAABkAAAAMgAAAAAAAABkAAAAAAAAAH9/fwAKAAAAHwAAAFQAAACDwLoF////AQAAAAAAAAAAAAAAAAAAAAAAAAAAAAAAAAAAAAAAAAAAAAAAAn9/fwDy8vIDzMzMAMDA/wB/f38AAAAAAAAAAAAAAAAAAAAAAAAAAAAhAAAAGAAAABQAAABvKQAA9gQAABFHAABAJQAAEAAAACYAAAAIAAAAAYAAAAAAAAA="/>
               </a:ext>
             </a:extLst>
           </p:cNvSpPr>
@@ -2457,7 +2457,7 @@
             <a:spLocks noGrp="1" noChangeArrowheads="1"/>
             <a:extLst>
               <a:ext uri="smNativeData">
-                <pr:smNativeData xmlns:pr="smNativeData" val="SMDATA_13_qYmVXhMAAAAlAAAAZAAAAA8BAAAAkAAAAEgAAACQAAAASAAAAAAAAAAAAAAAAAAAAAEAAABQAAAAAAAAAAAA4D8AAAAAAADgPwAAAAAAAOA/AAAAAAAA4D8AAAAAAADgPwAAAAAAAOA/AAAAAAAA4D8AAAAAAADgPwAAAAAAAOA/AAAAAAAA4D8CAAAAjAAAAAAAAAAAAAAAg8C6DP///wgAAAAAAAAAAAAAAAAAAAAAAAAAAAAAAAAAAAAAZAAAAAEAAABAAAAAAAAAAAAAAAAAAAAAAAAAAAAAAAAAAAAAAAAAAAAAAAAAAAAAAAAAAAAAAAAAAAAAAAAAAAAAAAAAAAAAAAAAAAAAAAAAAAAAAAAAAAAAAAAAAAAAFAAAADwAAAAAAAAAAAAAAAAAAAkUAAAAAQAAABQAAAAUAAAAFAAAAAEAAAAAAAAAZAAAAGQAAAAAAAAAZAAAAGQAAAAVAAAAYAAAAAAAAAAAAAAADwAAACADAAAAAAAAAAAAAAEAAACgMgAAVgcAAKr4//8BAAAAf39/AAEAAABkAAAAAAAAABQAAABAHwAAAAAAACYAAAAAAAAAwOD//wAAAAAmAAAAZAAAABYAAABMAAAAAAAAAAAAAAAEAAAAAAAAAAEAAADy8vIKAAAAACgAAAAoAAAAZAAAAGQAAAAAAAAAzMzMAAAAAABQAAAAUAAAAGQAAABkAAAAAAAAABcAAAAUAAAAAAAAAAAAAAD/fwAA/38AAAAAAAAJAAAABAAAAAAAAAAMAAAAEAAAAAAAAAAAAAAAAAAAAAAAAAAeAAAAaAAAAAAAAAAAAAAAAAAAAAAAAAAAAAAAECcAABAnAAAAAAAAAAAAAAAAAAAAAAAAAAAAAAAAAAAAAAAAAAAAABQAAAAAAAAAwMD/AAAAAABkAAAAMgAAAAAAAABkAAAAAAAAAH9/fwAKAAAAHwAAAFQAAACDwLoF////AQAAAAAAAAAAAAAAAAAAAAAAAAAAAAAAAAAAAAAAAAAAAAAAAn9/fwDy8vIDzMzMAMDA/wB/f38AAAAAAAAAAAAAAAAAAAAAAAAAAAAhAAAAGAAAABQAAAARBwAA1hUAAG4eAABYIwAAEAAAACYAAAAIAAAAAYAAAAAAAAA="/>
+                <pr:smNativeData xmlns:pr="smNativeData" val="SMDATA_13_TQCXXhMAAAAlAAAAZAAAAA8BAAAAkAAAAEgAAACQAAAASAAAAAAAAAAAAAAAAAAAAAEAAABQAAAAAAAAAAAA4D8AAAAAAADgPwAAAAAAAOA/AAAAAAAA4D8AAAAAAADgPwAAAAAAAOA/AAAAAAAA4D8AAAAAAADgPwAAAAAAAOA/AAAAAAAA4D8CAAAAjAAAAAAAAAAAAAAAg8C6DP///wgAAAAAAAAAAAAAAAAAAAAAAAAAAAAAAAAAAAAAZAAAAAEAAABAAAAAAAAAAAAAAAAAAAAAAAAAAAAAAAAAAAAAAAAAAAAAAAAAAAAAAAAAAAAAAAAAAAAAAAAAAAAAAAAAAAAAAAAAAAAAAAAAAAAAAAAAAAAAAAAAAAAAFAAAADwAAAAAAAAAAAAAAAAAAAkUAAAAAQAAABQAAAAUAAAAFAAAAAEAAAAAAAAAZAAAAGQAAAAAAAAAZAAAAGQAAAAVAAAAYAAAAAAAAAAAAAAADwAAACADAAAAAAAAAAAAAAEAAACgMgAAVgcAAKr4//8BAAAAf39/AAEAAABkAAAAAAAAABQAAABAHwAAAAAAACYAAAAAAAAAwOD//wAAAAAmAAAAZAAAABYAAABMAAAAAAAAAAAAAAAEAAAAAAAAAAEAAADy8vIKAAAAACgAAAAoAAAAZAAAAGQAAAAAAAAAzMzMAAAAAABQAAAAUAAAAGQAAABkAAAAAAAAABcAAAAUAAAAAAAAAAAAAAD/fwAA/38AAAAAAAAJAAAABAAAAAAAAAAMAAAAEAAAAAAAAAAAAAAAAAAAAAAAAAAeAAAAaAAAAAAAAAAAAAAAAAAAAAAAAAAAAAAAECcAABAnAAAAAAAAAAAAAAAAAAAAAAAAAAAAAAAAAAAAAAAAAAAAABQAAAAAAAAAwMD/AAAAAABkAAAAMgAAAAAAAABkAAAAAAAAAH9/fwAKAAAAHwAAAFQAAACDwLoF////AQAAAAAAAAAAAAAAAAAAAAAAAAAAAAAAAAAAAAAAAAAAAAAAAn9/fwDy8vIDzMzMAMDA/wB/f38AAAAAAAAAAAAAAAAAAAAAAAAAAAAhAAAAGAAAABQAAAARBwAA1hUAAG4eAABYIwAAEAAAACYAAAAIAAAAAYAAAAAAAAA="/>
               </a:ext>
             </a:extLst>
           </p:cNvSpPr>
@@ -2530,7 +2530,7 @@
             <a:spLocks noGrp="1" noChangeArrowheads="1"/>
             <a:extLst>
               <a:ext uri="smNativeData">
-                <pr:smNativeData xmlns:pr="smNativeData" val="SMDATA_13_qYmVXhMAAAAlAAAAZAAAAA8BAAAAkAAAAEgAAACQAAAASAAAAAAAAAAAAAAAAAAAAAEAAABQAAAAAAAAAAAA4D8AAAAAAADgPwAAAAAAAOA/AAAAAAAA4D8AAAAAAADgPwAAAAAAAOA/AAAAAAAA4D8AAAAAAADgPwAAAAAAAOA/AAAAAAAA4D8CAAAAjAAAAAAAAAAAAAAAg8C6DP///wgAAAAAAAAAAAAAAAAAAAAAAAAAAAAAAAAAAAAAZAAAAAEAAABAAAAAAAAAAAAAAAAAAAAAAAAAAAAAAAAAAAAAAAAAAAAAAAAAAAAAAAAAAAAAAAAAAAAAAAAAAAAAAAAAAAAAAAAAAAAAAAAAAAAAAAAAAAAAAAAAAAAAFAAAADwAAAAAAAAAAAAAAAAAAAkUAAAAAQAAABQAAAAUAAAAFAAAAAEAAAAAAAAAZAAAAGQAAAAAAAAAZAAAAGQAAAAVAAAAYAAAAAAAAAAAAAAADwAAACADAAAAAAAAAAAAAAEAAACgMgAAVgcAAKr4//8BAAAAf39/AAEAAABkAAAAAAAAABQAAABAHwAAAAAAACYAAAAAAAAAwOD//wAAAAAmAAAAZAAAABYAAABMAAAAAAAAAAAAAAAEAAAAAAAAAAEAAADy8vIKAAAAACgAAAAoAAAAZAAAAGQAAAAAAAAAzMzMAAAAAABQAAAAUAAAAGQAAABkAAAAAAAAABcAAAAUAAAAAAAAAAAAAAD/fwAA/38AAAAAAAAJAAAABAAAAAAAAAAMAAAAEAAAAAAAAAAAAAAAAAAAAAAAAAAeAAAAaAAAAAAAAAAAAAAAAAAAAAAAAAAAAAAAECcAABAnAAAAAAAAAAAAAAAAAAAAAAAAAAAAAAAAAAAAAAAAAAAAABQAAAAAAAAAwMD/AAAAAABkAAAAMgAAAAAAAABkAAAAAAAAAH9/fwAKAAAAHwAAAFQAAACDwLoF////AQAAAAAAAAAAAAAAAAAAAAAAAAAAAAAAAAAAAAAAAAAAAAAAAn9/fwDy8vIDzMzMAMDA/wB/f38AAAAAAAAAAAAAAAAAAAAAAAAAAAAhAAAAGAAAABQAAAAfMAAAYiYAABBBAABgKAAAEAAAACYAAAAIAAAAAAAAAAAAAAA="/>
+                <pr:smNativeData xmlns:pr="smNativeData" val="SMDATA_13_TQCXXhMAAAAlAAAAZAAAAA8BAAAAkAAAAEgAAACQAAAASAAAAAAAAAAAAAAAAAAAAAEAAABQAAAAAAAAAAAA4D8AAAAAAADgPwAAAAAAAOA/AAAAAAAA4D8AAAAAAADgPwAAAAAAAOA/AAAAAAAA4D8AAAAAAADgPwAAAAAAAOA/AAAAAAAA4D8CAAAAjAAAAAAAAAAAAAAAg8C6DP///wgAAAAAAAAAAAAAAAAAAAAAAAAAAAAAAAAAAAAAZAAAAAEAAABAAAAAAAAAAAAAAAAAAAAAAAAAAAAAAAAAAAAAAAAAAAAAAAAAAAAAAAAAAAAAAAAAAAAAAAAAAAAAAAAAAAAAAAAAAAAAAAAAAAAAAAAAAAAAAAAAAAAAFAAAADwAAAAAAAAAAAAAAAAAAAkUAAAAAQAAABQAAAAUAAAAFAAAAAEAAAAAAAAAZAAAAGQAAAAAAAAAZAAAAGQAAAAVAAAAYAAAAAAAAAAAAAAADwAAACADAAAAAAAAAAAAAAEAAACgMgAAVgcAAKr4//8BAAAAf39/AAEAAABkAAAAAAAAABQAAABAHwAAAAAAACYAAAAAAAAAwOD//wAAAAAmAAAAZAAAABYAAABMAAAAAAAAAAAAAAAEAAAAAAAAAAEAAADy8vIKAAAAACgAAAAoAAAAZAAAAGQAAAAAAAAAzMzMAAAAAABQAAAAUAAAAGQAAABkAAAAAAAAABcAAAAUAAAAAAAAAAAAAAD/fwAA/38AAAAAAAAJAAAABAAAAAAAAAAMAAAAEAAAAAAAAAAAAAAAAAAAAAAAAAAeAAAAaAAAAAAAAAAAAAAAAAAAAAAAAAAAAAAAECcAABAnAAAAAAAAAAAAAAAAAAAAAAAAAAAAAAAAAAAAAAAAAAAAABQAAAAAAAAAwMD/AAAAAABkAAAAMgAAAAAAAABkAAAAAAAAAH9/fwAKAAAAHwAAAFQAAACDwLoF////AQAAAAAAAAAAAAAAAAAAAAAAAAAAAAAAAAAAAAAAAAAAAAAAAn9/fwDy8vIDzMzMAMDA/wB/f38AAAAAAAAAAAAAAAAAAAAAAAAAAAAhAAAAGAAAABQAAAAfMAAAYiYAABBBAABgKAAAEAAAACYAAAAIAAAAAAAAAAAAAAA="/>
               </a:ext>
             </a:extLst>
           </p:cNvSpPr>
@@ -2544,7 +2544,7 @@
           <a:lstStyle/>
           <a:p>
             <a:pPr/>
-            <a:fld id="{4033369F-D1AD-66C0-E38B-279578C51572}" type="datetime1">
+            <a:fld id="{3E04E189-C7D3-5117-9DBC-3142AFF26B64}" type="datetime1">
               <a:t>{Date/Time}</a:t>
             </a:fld>
           </a:p>
@@ -2557,7 +2557,7 @@
             <a:spLocks noGrp="1" noChangeArrowheads="1"/>
             <a:extLst>
               <a:ext uri="smNativeData">
-                <pr:smNativeData xmlns:pr="smNativeData" val="SMDATA_13_qYmVXhMAAAAlAAAAZAAAAA8BAAAAkAAAAEgAAACQAAAASAAAAAAAAAAAAAAAAAAAAAEAAABQAAAAAAAAAAAA4D8AAAAAAADgPwAAAAAAAOA/AAAAAAAA4D8AAAAAAADgPwAAAAAAAOA/AAAAAAAA4D8AAAAAAADgPwAAAAAAAOA/AAAAAAAA4D8CAAAAjAAAAAAAAAAAAAAAg8C6DP///wgAAAAAAAAAAAAAAAAAAAAAAAAAAAAAAAAAAAAAZAAAAAEAAABAAAAAAAAAAAAAAAAAAAAAAAAAAAAAAAAAAAAAAAAAAAAAAAAAAAAAAAAAAAAAAAAAAAAAAAAAAAAAAAAAAAAAAAAAAAAAAAAAAAAAAAAAAAAAAAAAAAAAFAAAADwAAAAAAAAAAAAAAAAAAAkUAAAAAQAAABQAAAAUAAAAFAAAAAEAAAAAAAAAZAAAAGQAAAAAAAAAZAAAAGQAAAAVAAAAYAAAAAAAAAAAAAAADwAAACADAAAAAAAAAAAAAAEAAACgMgAAVgcAAKr4//8BAAAAf39/AAEAAABkAAAAAAAAABQAAABAHwAAAAAAACYAAAAAAAAAwOD//wAAAAAmAAAAZAAAABYAAABMAAAAAAAAAAAAAAAEAAAAAAAAAAEAAADy8vIKAAAAACgAAAAoAAAAZAAAAGQAAAAAAAAAzMzMAAAAAABQAAAAUAAAAGQAAABkAAAAAAAAABcAAAAUAAAAAAAAAAAAAAD/fwAA/38AAAAAAAAJAAAABAAAAAAAAAAMAAAAEAAAAAAAAAAAAAAAAAAAAAAAAAAeAAAAaAAAAAAAAAAAAAAAAAAAAAAAAAAAAAAAECcAABAnAAAAAAAAAAAAAAAAAAAAAAAAAAAAAAAAAAAAAAAAAAAAABQAAAAAAAAAwMD/AAAAAABkAAAAMgAAAAAAAABkAAAAAAAAAH9/fwAKAAAAHwAAAFQAAACDwLoF////AQAAAAAAAAAAAAAAAAAAAAAAAAAAAAAAAAAAAAAAAAAAAAAAAn9/fwDy8vIDzMzMAMDA/wB/f38AAAAAAAAAAAAAAAAAAAAAAAAAAAAhAAAAGAAAABQAAADcCQAAXCYAAKQbAABVKAAAEAAAACYAAAAIAAAAAYAAAAAAAAA="/>
+                <pr:smNativeData xmlns:pr="smNativeData" val="SMDATA_13_TQCXXhMAAAAlAAAAZAAAAA8BAAAAkAAAAEgAAACQAAAASAAAAAAAAAAAAAAAAAAAAAEAAABQAAAAAAAAAAAA4D8AAAAAAADgPwAAAAAAAOA/AAAAAAAA4D8AAAAAAADgPwAAAAAAAOA/AAAAAAAA4D8AAAAAAADgPwAAAAAAAOA/AAAAAAAA4D8CAAAAjAAAAAAAAAAAAAAAg8C6DP///wgAAAAAAAAAAAAAAAAAAAAAAAAAAAAAAAAAAAAAZAAAAAEAAABAAAAAAAAAAAAAAAAAAAAAAAAAAAAAAAAAAAAAAAAAAAAAAAAAAAAAAAAAAAAAAAAAAAAAAAAAAAAAAAAAAAAAAAAAAAAAAAAAAAAAAAAAAAAAAAAAAAAAFAAAADwAAAAAAAAAAAAAAAAAAAkUAAAAAQAAABQAAAAUAAAAFAAAAAEAAAAAAAAAZAAAAGQAAAAAAAAAZAAAAGQAAAAVAAAAYAAAAAAAAAAAAAAADwAAACADAAAAAAAAAAAAAAEAAACgMgAAVgcAAKr4//8BAAAAf39/AAEAAABkAAAAAAAAABQAAABAHwAAAAAAACYAAAAAAAAAwOD//wAAAAAmAAAAZAAAABYAAABMAAAAAAAAAAAAAAAEAAAAAAAAAAEAAADy8vIKAAAAACgAAAAoAAAAZAAAAGQAAAAAAAAAzMzMAAAAAABQAAAAUAAAAGQAAABkAAAAAAAAABcAAAAUAAAAAAAAAAAAAAD/fwAA/38AAAAAAAAJAAAABAAAAAAAAAAMAAAAEAAAAAAAAAAAAAAAAAAAAAAAAAAeAAAAaAAAAAAAAAAAAAAAAAAAAAAAAAAAAAAAECcAABAnAAAAAAAAAAAAAAAAAAAAAAAAAAAAAAAAAAAAAAAAAAAAABQAAAAAAAAAwMD/AAAAAABkAAAAMgAAAAAAAABkAAAAAAAAAH9/fwAKAAAAHwAAAFQAAACDwLoF////AQAAAAAAAAAAAAAAAAAAAAAAAAAAAAAAAAAAAAAAAAAAAAAAAn9/fwDy8vIDzMzMAMDA/wB/f38AAAAAAAAAAAAAAAAAAAAAAAAAAAAhAAAAGAAAABQAAADcCQAAXCYAAKQbAABVKAAAEAAAACYAAAAIAAAAAYAAAAAAAAA="/>
               </a:ext>
             </a:extLst>
           </p:cNvSpPr>
@@ -2597,7 +2597,7 @@
             <a:spLocks noGrp="1" noChangeArrowheads="1"/>
             <a:extLst>
               <a:ext uri="smNativeData">
-                <pr:smNativeData xmlns:pr="smNativeData" val="SMDATA_13_qYmVXhMAAAAlAAAAZAAAAA8BAAAAkAAAAEgAAACQAAAASAAAAAAAAAAAAAAAAAAAAAEAAABQAAAAAAAAAAAA4D8AAAAAAADgPwAAAAAAAOA/AAAAAAAA4D8AAAAAAADgPwAAAAAAAOA/AAAAAAAA4D8AAAAAAADgPwAAAAAAAOA/AAAAAAAA4D8CAAAAjAAAAAEAAAAAAAAAeHh4yv///wgAAAAAAAAAAAAAAAAAAAAAAAAAAAAAAAAAAAAAZAAAAAEAAABAAAAAAAAAAAAAAAAAAAAAAAAAAAAAAAAAAAAAAAAAAAAAAAAAAAAAAAAAAAAAAAAAAAAAAAAAAAAAAAAAAAAAAAAAAAAAAAAAAAAAAAAAAAAAAAAAAAAAFAAAADwAAAAAAAAAAAAAAAAAAAkUAAAAAQAAABQAAAAUAAAAFAAAAAEAAAAAAAAAZAAAAGQAAAAAAAAAZAAAAGQAAAAVAAAAYAAAAAAAAAAAAAAADwAAACADAAAAAAAAAAAAAAEAAACgMgAAVgcAAKr4//8BAAAAf39/AAEAAABkAAAAAAAAABQAAABAHwAAAAAAACYAAAAAAAAAwOD//wAAAAAmAAAAZAAAABYAAABMAAAAAAAAAAAAAAAEAAAAAAAAAAEAAADy8vIKAAAAACgAAAAoAAAAZAAAAGQAAAAAAAAAzMzMAAAAAABQAAAAUAAAAGQAAABkAAAAAAAAABcAAAAUAAAAAAAAAAAAAAD/fwAA/38AAAAAAAAJAAAABAAAAAAAAAAMAAAAEAAAAAAAAAAAAAAAAAAAAAAAAAAeAAAAaAAAAAAAAAAAAAAAAAAAAAAAAAAAAAAAECcAABAnAAAAAAAAAAAAAAAAAAAAAAAAAAAAAAAAAAAAAAAAAAAAABQAAAAAAAAAwMD/AAAAAABkAAAAMgAAAAAAAABkAAAAAAAAAH9/fwAKAAAAHwAAAFQAAAB4eHjD////AQAAAAAAAAAAAAAAAAAAAAAAAAAAAAAAAAAAAAAAAAAAAAAAAn9/fwDy8vIDzMzMAMDA/wB/f38AAAAAAAAAAAAAAAAAAAAAAAAAAAAhAAAAGAAAABQAAAAyQgAAYiYAAHdEAAAwKgAAEAAAACYAAAAIAAAAAAAAAAAAAAA="/>
+                <pr:smNativeData xmlns:pr="smNativeData" val="SMDATA_13_TQCXXhMAAAAlAAAAZAAAAA8BAAAAkAAAAEgAAACQAAAASAAAAAAAAAAAAAAAAAAAAAEAAABQAAAAAAAAAAAA4D8AAAAAAADgPwAAAAAAAOA/AAAAAAAA4D8AAAAAAADgPwAAAAAAAOA/AAAAAAAA4D8AAAAAAADgPwAAAAAAAOA/AAAAAAAA4D8CAAAAjAAAAAEAAAAAAAAAeHh4yv///wgAAAAAAAAAAAAAAAAAAAAAAAAAAAAAAAAAAAAAZAAAAAEAAABAAAAAAAAAAAAAAAAAAAAAAAAAAAAAAAAAAAAAAAAAAAAAAAAAAAAAAAAAAAAAAAAAAAAAAAAAAAAAAAAAAAAAAAAAAAAAAAAAAAAAAAAAAAAAAAAAAAAAFAAAADwAAAAAAAAAAAAAAAAAAAkUAAAAAQAAABQAAAAUAAAAFAAAAAEAAAAAAAAAZAAAAGQAAAAAAAAAZAAAAGQAAAAVAAAAYAAAAAAAAAAAAAAADwAAACADAAAAAAAAAAAAAAEAAACgMgAAVgcAAKr4//8BAAAAf39/AAEAAABkAAAAAAAAABQAAABAHwAAAAAAACYAAAAAAAAAwOD//wAAAAAmAAAAZAAAABYAAABMAAAAAAAAAAAAAAAEAAAAAAAAAAEAAADy8vIKAAAAACgAAAAoAAAAZAAAAGQAAAAAAAAAzMzMAAAAAABQAAAAUAAAAGQAAABkAAAAAAAAABcAAAAUAAAAAAAAAAAAAAD/fwAA/38AAAAAAAAJAAAABAAAAAAAAAAMAAAAEAAAAAAAAAAAAAAAAAAAAAAAAAAeAAAAaAAAAAAAAAAAAAAAAAAAAAAAAAAAAAAAECcAABAnAAAAAAAAAAAAAAAAAAAAAAAAAAAAAAAAAAAAAAAAAAAAABQAAAAAAAAAwMD/AAAAAABkAAAAMgAAAAAAAABkAAAAAAAAAH9/fwAKAAAAHwAAAFQAAAB4eHjD////AQAAAAAAAAAAAAAAAAAAAAAAAAAAAAAAAAAAAAAAAAAAAAAAAn9/fwDy8vIDzMzMAMDA/wB/f38AAAAAAAAAAAAAAAAAAAAAAAAAAAAhAAAAGAAAABQAAAAyQgAAYiYAAHdEAAAwKgAAEAAAACYAAAAIAAAAAAAAAAAAAAA="/>
               </a:ext>
             </a:extLst>
           </p:cNvSpPr>
@@ -2611,7 +2611,7 @@
           <a:lstStyle/>
           <a:p>
             <a:pPr/>
-            <a:fld id="{44E92275-3BA9-BCD4-E751-CD816C1F1198}" type="slidenum">
+            <a:fld id="{4016396E-20AD-43CF-E3AE-D69A77E01583}" type="slidenum">
               <a:t>{Nr.}</a:t>
             </a:fld>
           </a:p>
@@ -2648,7 +2648,7 @@
           <p:cNvSpPr>
             <a:extLst>
               <a:ext uri="smNativeData">
-                <pr:smNativeData xmlns:pr="smNativeData" val="SMDATA_13_qYmVXhMAAAAlAAAAZAAAAA8BAAAAkAAAAEgAAACQAAAASAAAAAAAAAAAAAAAAAAAAAEAAABQAAAAAAAAAAAA4D8AAAAAAADgPwAAAAAAAOA/AAAAAAAA4D8AAAAAAADgPwAAAAAAAOA/AAAAAAAA4D8AAAAAAADgPwAAAAAAAOA/AAAAAAAA4D8CAAAAjAAAAAEAAAAAAAAAg8C6DP///wgAAAAAAAAAAAAAAAAAAAAAAAAAAAAAAAAAAAAAZAAAAAEAAABAAAAAAAAAAAAAAAAAAAAAAAAAAAAAAAAAAAAAAAAAAAAAAAAAAAAAAAAAAAAAAAAAAAAAAAAAAAAAAAAAAAAAAAAAAAAAAAAAAAAAAAAAAAAAAAAAAAAAFAAAADwAAAAAAAAAAAAAAAAAAAkUAAAAAQAAABQAAAAUAAAAFAAAAAEAAAAAAAAAZAAAAGQAAAAAAAAAZAAAAGQAAAAVAAAAYAAAAAAAAAAAAAAADwAAACADAAAAAAAAAAAAAAEAAACgMgAAVgcAAKr4//8BAAAAf39/AAEAAABkAAAAAAAAABQAAABAHwAAAAAAACYAAAAAAAAAwOD//wAAAAAmAAAAZAAAABYAAABMAAAAAAAAAAAAAAAEAAAAAAAAAAEAAADy8vIKAAAAACgAAAAoAAAAZAAAAGQAAAAAAAAAzMzMAAAAAABQAAAAUAAAAGQAAABkAAAAAAAAABcAAAAUAAAAAAAAAAAAAAD/fwAA/38AAAAAAAAJAAAABAAAAAAAAAAMAAAAEAAAAAAAAAAAAAAAAAAAAAAAAAAeAAAAaAAAAAAAAAAAAAAAAAAAAAAAAAAAAAAAECcAABAnAAAAAAAAAAAAAAAAAAAAAAAAAAAAAAAAAAAAAAAAAAAAABQAAAAAAAAAwMD/AAAAAABkAAAAMgAAAAAAAABkAAAAAAAAAH9/fwAKAAAAHwAAAFQAAACDwLoF////AQAAAAAAAAAAAAAAAAAAAAAAAAAAAAAAAAAAAAAAAAAAAAAAAn9/fwDy8vIDzMzMAMDA/wB/f38AAAAAAAAAAAAAAAAAAAAAAAAAAAAhAAAAGAAAABQAAAABAAAAAQAAAH8lAAAxKgAAEAAAACYAAAAIAAAA//////////8="/>
+                <pr:smNativeData xmlns:pr="smNativeData" val="SMDATA_13_TQCXXhMAAAAlAAAAZAAAAA8BAAAAkAAAAEgAAACQAAAASAAAAAAAAAAAAAAAAAAAAAEAAABQAAAAAAAAAAAA4D8AAAAAAADgPwAAAAAAAOA/AAAAAAAA4D8AAAAAAADgPwAAAAAAAOA/AAAAAAAA4D8AAAAAAADgPwAAAAAAAOA/AAAAAAAA4D8CAAAAjAAAAAEAAAAAAAAAg8C6DP///wgAAAAAAAAAAAAAAAAAAAAAAAAAAAAAAAAAAAAAZAAAAAEAAABAAAAAAAAAAAAAAAAAAAAAAAAAAAAAAAAAAAAAAAAAAAAAAAAAAAAAAAAAAAAAAAAAAAAAAAAAAAAAAAAAAAAAAAAAAAAAAAAAAAAAAAAAAAAAAAAAAAAAFAAAADwAAAAAAAAAAAAAAAAAAAkUAAAAAQAAABQAAAAUAAAAFAAAAAEAAAAAAAAAZAAAAGQAAAAAAAAAZAAAAGQAAAAVAAAAYAAAAAAAAAAAAAAADwAAACADAAAAAAAAAAAAAAEAAACgMgAAVgcAAKr4//8BAAAAf39/AAEAAABkAAAAAAAAABQAAABAHwAAAAAAACYAAAAAAAAAwOD//wAAAAAmAAAAZAAAABYAAABMAAAAAAAAAAAAAAAEAAAAAAAAAAEAAADy8vIKAAAAACgAAAAoAAAAZAAAAGQAAAAAAAAAzMzMAAAAAABQAAAAUAAAAGQAAABkAAAAAAAAABcAAAAUAAAAAAAAAAAAAAD/fwAA/38AAAAAAAAJAAAABAAAAAAAAAAMAAAAEAAAAAAAAAAAAAAAAAAAAAAAAAAeAAAAaAAAAAAAAAAAAAAAAAAAAAAAAAAAAAAAECcAABAnAAAAAAAAAAAAAAAAAAAAAAAAAAAAAAAAAAAAAAAAAAAAABQAAAAAAAAAwMD/AAAAAABkAAAAMgAAAAAAAABkAAAAAAAAAH9/fwAKAAAAHwAAAFQAAACDwLoF////AQAAAAAAAAAAAAAAAAAAAAAAAAAAAAAAAAAAAAAAAAAAAAAAAn9/fwDy8vIDzMzMAMDA/wB/f38AAAAAAAAAAAAAAAAAAAAAAAAAAAAhAAAAGAAAABQAAAABAAAAAQAAAH8lAAAxKgAAEAAAACYAAAAIAAAA//////////8="/>
               </a:ext>
             </a:extLst>
           </p:cNvSpPr>
@@ -2678,7 +2678,7 @@
             <a:spLocks noGrp="1" noChangeArrowheads="1"/>
             <a:extLst>
               <a:ext uri="smNativeData">
-                <pr:smNativeData xmlns:pr="smNativeData" val="SMDATA_13_qYmVXhMAAAAlAAAAZAAAAA8BAAAAkAAAAEgAAACQAAAASAAAAAAAAAABAAAAAAAAAAEAAABQAAAAAAAAAAAA4D8AAAAAAADgPwAAAAAAAOA/AAAAAAAA4D8AAAAAAADgPwAAAAAAAOA/AAAAAAAA4D8AAAAAAADgPwAAAAAAAOA/AAAAAAAA4D8CAAAAjAAAAAEAAAAAAAAA////CP///wgAAAAAAAAAAAAAAAAAAAAAAAAAAAAAAAAAAAAAZAAAAAEAAABAAAAAAAAAAAAAAAAAAAAAAAAAAAAAAAAAAAAAAAAAAAAAAAAAAAAAAAAAAAAAAAAAAAAAAAAAAAAAAAAAAAAAAAAAAAAAAAAAAAAAAAAAAAAAAAAAAAAAFAAAADwAAAABAAAAAAAAAAAAAAkoAAAAAQAAABQAAAAUAAAAFAAAAAEAAAAAAAAAZAAAAGQAAAAAAAAAZAAAAGQAAAAVAAAAYAAAAAAAAAAAAAAADwAAACADAAAAAAAAAAAAAAEAAACgMgAAVgcAAKr4//8BAAAAf39/AAEAAABkAAAAAAAAABQAAABAHwAAAAAAACYAAAAAAAAAwOD//wAAAAAmAAAAZAAAABYAAABMAAAAAAAAAAAAAAAEAAAAAAAAAAEAAADy8vIKAAAAACgAAAAoAAAAZAAAAGQAAAAAAAAAzMzMAAAAAABQAAAAUAAAAGQAAABkAAAAAAAAABcAAAAUAAAAAAAAAAAAAAD/fwAA/38AAAAAAAAJAAAABAAAAAEAAAAMAAAAEAAAAAAAAAAAAAAAAAAAAAAAAAAeAAAAaAAAAAAAAAAAAAAAAAAAAAAAAAAAAAAAECcAABAnAAAAAAAAAAAAAAAAAAAAAAAAAAAAAAAAAAAAAAAAAAAAABQAAAAAAAAAwMD/AAAAAABkAAAAMgAAAAAAAABkAAAAAAAAAH9/fwAKAAAAHwAAAFQAAAD///8B////AQAAAAAAAAAAAAAAAAAAAAAAAAAAAAAAAAAAAAAAAAAAAAAAAn9/fwDy8vIDzMzMAMDA/wB/f38AAAAAAAAAAAAAAAAAAAAAAAAAAAAhAAAAGAAAABQAAAD3BAAAzQ0AAIkgAADSFAAAEAAAACYAAAAIAAAAAYAAAAAAAAA="/>
+                <pr:smNativeData xmlns:pr="smNativeData" val="SMDATA_13_TQCXXhMAAAAlAAAAZAAAAA8BAAAAkAAAAEgAAACQAAAASAAAAAAAAAABAAAAAAAAAAEAAABQAAAAAAAAAAAA4D8AAAAAAADgPwAAAAAAAOA/AAAAAAAA4D8AAAAAAADgPwAAAAAAAOA/AAAAAAAA4D8AAAAAAADgPwAAAAAAAOA/AAAAAAAA4D8CAAAAjAAAAAEAAAAAAAAA////CP///wgAAAAAAAAAAAAAAAAAAAAAAAAAAAAAAAAAAAAAZAAAAAEAAABAAAAAAAAAAAAAAAAAAAAAAAAAAAAAAAAAAAAAAAAAAAAAAAAAAAAAAAAAAAAAAAAAAAAAAAAAAAAAAAAAAAAAAAAAAAAAAAAAAAAAAAAAAAAAAAAAAAAAFAAAADwAAAABAAAAAAAAAAAAAAkoAAAAAQAAABQAAAAUAAAAFAAAAAEAAAAAAAAAZAAAAGQAAAAAAAAAZAAAAGQAAAAVAAAAYAAAAAAAAAAAAAAADwAAACADAAAAAAAAAAAAAAEAAACgMgAAVgcAAKr4//8BAAAAf39/AAEAAABkAAAAAAAAABQAAABAHwAAAAAAACYAAAAAAAAAwOD//wAAAAAmAAAAZAAAABYAAABMAAAAAAAAAAAAAAAEAAAAAAAAAAEAAADy8vIKAAAAACgAAAAoAAAAZAAAAGQAAAAAAAAAzMzMAAAAAABQAAAAUAAAAGQAAABkAAAAAAAAABcAAAAUAAAAAAAAAAAAAAD/fwAA/38AAAAAAAAJAAAABAAAAAEAAAAMAAAAEAAAAAAAAAAAAAAAAAAAAAAAAAAeAAAAaAAAAAAAAAAAAAAAAAAAAAAAAAAAAAAAECcAABAnAAAAAAAAAAAAAAAAAAAAAAAAAAAAAAAAAAAAAAAAAAAAABQAAAAAAAAAwMD/AAAAAABkAAAAMgAAAAAAAABkAAAAAAAAAH9/fwAKAAAAHwAAAFQAAAD///8B////AQAAAAAAAAAAAAAAAAAAAAAAAAAAAAAAAAAAAAAAAAAAAAAAAn9/fwDy8vIDzMzMAMDA/wB/f38AAAAAAAAAAAAAAAAAAAAAAAAAAAAhAAAAGAAAABQAAAD3BAAAzQ0AAIkgAADSFAAAEAAAACYAAAAIAAAAAYAAAAAAAAA="/>
               </a:ext>
             </a:extLst>
           </p:cNvSpPr>
@@ -2716,7 +2716,7 @@
             <a:spLocks noGrp="1" noChangeArrowheads="1"/>
             <a:extLst>
               <a:ext uri="smNativeData">
-                <pr:smNativeData xmlns:pr="smNativeData" val="SMDATA_13_qYmVXhMAAAAlAAAAZAAAAA8BAAAAkAAAAEgAAACQAAAASAAAAAAAAAAAAAAAAAAAAAEAAABQAAAAAAAAAAAA4D8AAAAAAADgPwAAAAAAAOA/AAAAAAAA4D8AAAAAAADgPwAAAAAAAOA/AAAAAAAA4D8AAAAAAADgPwAAAAAAAOA/AAAAAAAA4D8CAAAAjAAAAAAAAAAAAAAAg8C6DP///wgAAAAAAAAAAAAAAAAAAAAAAAAAAAAAAAAAAAAAZAAAAAEAAABAAAAAAAAAAAAAAAAAAAAAAAAAAAAAAAAAAAAAAAAAAAAAAAAAAAAAAAAAAAAAAAAAAAAAAAAAAAAAAAAAAAAAAAAAAAAAAAAAAAAAAAAAAAAAAAAAAAAAFAAAADwAAAAAAAAAAAAAAAAAAAkUAAAAAQAAABQAAAAUAAAAFAAAAAEAAAAAAAAAZAAAAGQAAAAAAAAAZAAAAGQAAAAVAAAAYAAAAAAAAAAAAAAADwAAACADAAAAAAAAAAAAAAEAAACgMgAAVgcAAKr4//8BAAAAf39/AAEAAABkAAAAAAAAABQAAABAHwAAAAAAACYAAAAAAAAAwOD//wAAAAAmAAAAZAAAABYAAABMAAAAAAAAAAAAAAAEAAAAAAAAAAEAAADy8vIKAAAAACgAAAAoAAAAZAAAAGQAAAAAAAAAzMzMAAAAAABQAAAAUAAAAGQAAABkAAAAAAAAABcAAAAUAAAAAAAAAAAAAAD/fwAA/38AAAAAAAAJAAAABAAAAAAAAAAMAAAAEAAAAAAAAAAAAAAAAAAAAAAAAAAeAAAAaAAAAAAAAAAAAAAAAAAAAAAAAAAAAAAAECcAABAnAAAAAAAAAAAAAAAAAAAAAAAAAAAAAAAAAAAAAAAAAAAAABQAAAAAAAAAwMD/AAAAAABkAAAAMgAAAAAAAABkAAAAAAAAAH9/fwAKAAAAHwAAAFQAAACDwLoF////AQAAAAAAAAAAAAAAAAAAAAAAAAAAAAAAAAAAAAAAAAAAAAAAAn9/fwDy8vIDzMzMAMDA/wB/f38AAAAAAAAAAAAAAAAAAAAAAAAAAAAhAAAAGAAAABQAAAB+JQAAAAAAAPxKAAAwKgAAEAAAACYAAAAIAAAAAYAAAAAAAAA="/>
+                <pr:smNativeData xmlns:pr="smNativeData" val="SMDATA_13_TQCXXhMAAAAlAAAAZAAAAA8BAAAAkAAAAEgAAACQAAAASAAAAAAAAAAAAAAAAAAAAAEAAABQAAAAAAAAAAAA4D8AAAAAAADgPwAAAAAAAOA/AAAAAAAA4D8AAAAAAADgPwAAAAAAAOA/AAAAAAAA4D8AAAAAAADgPwAAAAAAAOA/AAAAAAAA4D8CAAAAjAAAAAAAAAAAAAAAg8C6DP///wgAAAAAAAAAAAAAAAAAAAAAAAAAAAAAAAAAAAAAZAAAAAEAAABAAAAAAAAAAAAAAAAAAAAAAAAAAAAAAAAAAAAAAAAAAAAAAAAAAAAAAAAAAAAAAAAAAAAAAAAAAAAAAAAAAAAAAAAAAAAAAAAAAAAAAAAAAAAAAAAAAAAAFAAAADwAAAAAAAAAAAAAAAAAAAkUAAAAAQAAABQAAAAUAAAAFAAAAAEAAAAAAAAAZAAAAGQAAAAAAAAAZAAAAGQAAAAVAAAAYAAAAAAAAAAAAAAADwAAACADAAAAAAAAAAAAAAEAAACgMgAAVgcAAKr4//8BAAAAf39/AAEAAABkAAAAAAAAABQAAABAHwAAAAAAACYAAAAAAAAAwOD//wAAAAAmAAAAZAAAABYAAABMAAAAAAAAAAAAAAAEAAAAAAAAAAEAAADy8vIKAAAAACgAAAAoAAAAZAAAAGQAAAAAAAAAzMzMAAAAAABQAAAAUAAAAGQAAABkAAAAAAAAABcAAAAUAAAAAAAAAAAAAAD/fwAA/38AAAAAAAAJAAAABAAAAAAAAAAMAAAAEAAAAAAAAAAAAAAAAAAAAAAAAAAeAAAAaAAAAAAAAAAAAAAAAAAAAAAAAAAAAAAAECcAABAnAAAAAAAAAAAAAAAAAAAAAAAAAAAAAAAAAAAAAAAAAAAAABQAAAAAAAAAwMD/AAAAAABkAAAAMgAAAAAAAABkAAAAAAAAAH9/fwAKAAAAHwAAAFQAAACDwLoF////AQAAAAAAAAAAAAAAAAAAAAAAAAAAAAAAAAAAAAAAAAAAAAAAAn9/fwDy8vIDzMzMAMDA/wB/f38AAAAAAAAAAAAAAAAAAAAAAAAAAAAhAAAAGAAAABQAAAB+JQAAAAAAAPxKAAAwKgAAEAAAACYAAAAIAAAAAYAAAAAAAAA="/>
               </a:ext>
             </a:extLst>
           </p:cNvSpPr>
@@ -2785,7 +2785,7 @@
             <a:spLocks noGrp="1" noChangeArrowheads="1"/>
             <a:extLst>
               <a:ext uri="smNativeData">
-                <pr:smNativeData xmlns:pr="smNativeData" val="SMDATA_13_qYmVXhMAAAAlAAAAZAAAAA8BAAAAkAAAAEgAAACQAAAASAAAAAAAAAAAAAAAAAAAAAEAAABQAAAAAAAAAAAA4D8AAAAAAADgPwAAAAAAAOA/AAAAAAAA4D8AAAAAAADgPwAAAAAAAOA/AAAAAAAA4D8AAAAAAADgPwAAAAAAAOA/AAAAAAAA4D8CAAAAjAAAAAAAAAAAAAAAg8C6DP///wgAAAAAAAAAAAAAAAAAAAAAAAAAAAAAAAAAAAAAZAAAAAEAAABAAAAAAAAAAAAAAAAAAAAAAAAAAAAAAAAAAAAAAAAAAAAAAAAAAAAAAAAAAAAAAAAAAAAAAAAAAAAAAAAAAAAAAAAAAAAAAAAAAAAAAAAAAAAAAAAAAAAAFAAAADwAAAAAAAAAAAAAAAAAAAkUAAAAAQAAABQAAAAUAAAAFAAAAAEAAAAAAAAAZAAAAGQAAAAAAAAAZAAAAGQAAAAVAAAAYAAAAAAAAAAAAAAADwAAACADAAAAAAAAAAAAAAEAAACgMgAAVgcAAKr4//8BAAAAf39/AAEAAABkAAAAAAAAABQAAABAHwAAAAAAACYAAAAAAAAAwOD//wAAAAAmAAAAZAAAABYAAABMAAAAAAAAAAAAAAAEAAAAAAAAAAEAAADy8vIKAAAAACgAAAAoAAAAZAAAAGQAAAAAAAAAzMzMAAAAAABQAAAAUAAAAGQAAABkAAAAAAAAABcAAAAUAAAAAAAAAAAAAAD/fwAA/38AAAAAAAAJAAAABAAAAAAAAAAMAAAAEAAAAAAAAAAAAAAAAAAAAAAAAAAeAAAAaAAAAAAAAAAAAAAAAAAAAAAAAAAAAAAAECcAABAnAAAAAAAAAAAAAAAAAAAAAAAAAAAAAAAAAAAAAAAAAAAAABQAAAAAAAAAwMD/AAAAAABkAAAAMgAAAAAAAABkAAAAAAAAAH9/fwAKAAAAHwAAAFQAAACDwLoF////AQAAAAAAAAAAAAAAAAAAAAAAAAAAAAAAAAAAAAAAAAAAAAAAAn9/fwDy8vIDzMzMAMDA/wB/f38AAAAAAAAAAAAAAAAAAAAAAAAAAAAhAAAAGAAAABQAAAASBwAA1xUAAG8eAABZIwAAEAAAACYAAAAIAAAAAYAAAAAAAAA="/>
+                <pr:smNativeData xmlns:pr="smNativeData" val="SMDATA_13_TQCXXhMAAAAlAAAAZAAAAA8BAAAAkAAAAEgAAACQAAAASAAAAAAAAAAAAAAAAAAAAAEAAABQAAAAAAAAAAAA4D8AAAAAAADgPwAAAAAAAOA/AAAAAAAA4D8AAAAAAADgPwAAAAAAAOA/AAAAAAAA4D8AAAAAAADgPwAAAAAAAOA/AAAAAAAA4D8CAAAAjAAAAAAAAAAAAAAAg8C6DP///wgAAAAAAAAAAAAAAAAAAAAAAAAAAAAAAAAAAAAAZAAAAAEAAABAAAAAAAAAAAAAAAAAAAAAAAAAAAAAAAAAAAAAAAAAAAAAAAAAAAAAAAAAAAAAAAAAAAAAAAAAAAAAAAAAAAAAAAAAAAAAAAAAAAAAAAAAAAAAAAAAAAAAFAAAADwAAAAAAAAAAAAAAAAAAAkUAAAAAQAAABQAAAAUAAAAFAAAAAEAAAAAAAAAZAAAAGQAAAAAAAAAZAAAAGQAAAAVAAAAYAAAAAAAAAAAAAAADwAAACADAAAAAAAAAAAAAAEAAACgMgAAVgcAAKr4//8BAAAAf39/AAEAAABkAAAAAAAAABQAAABAHwAAAAAAACYAAAAAAAAAwOD//wAAAAAmAAAAZAAAABYAAABMAAAAAAAAAAAAAAAEAAAAAAAAAAEAAADy8vIKAAAAACgAAAAoAAAAZAAAAGQAAAAAAAAAzMzMAAAAAABQAAAAUAAAAGQAAABkAAAAAAAAABcAAAAUAAAAAAAAAAAAAAD/fwAA/38AAAAAAAAJAAAABAAAAAAAAAAMAAAAEAAAAAAAAAAAAAAAAAAAAAAAAAAeAAAAaAAAAAAAAAAAAAAAAAAAAAAAAAAAAAAAECcAABAnAAAAAAAAAAAAAAAAAAAAAAAAAAAAAAAAAAAAAAAAAAAAABQAAAAAAAAAwMD/AAAAAABkAAAAMgAAAAAAAABkAAAAAAAAAH9/fwAKAAAAHwAAAFQAAACDwLoF////AQAAAAAAAAAAAAAAAAAAAAAAAAAAAAAAAAAAAAAAAAAAAAAAAn9/fwDy8vIDzMzMAMDA/wB/f38AAAAAAAAAAAAAAAAAAAAAAAAAAAAhAAAAGAAAABQAAAASBwAA1xUAAG8eAABZIwAAEAAAACYAAAAIAAAAAYAAAAAAAAA="/>
               </a:ext>
             </a:extLst>
           </p:cNvSpPr>
@@ -2858,7 +2858,7 @@
             <a:spLocks noGrp="1" noChangeArrowheads="1"/>
             <a:extLst>
               <a:ext uri="smNativeData">
-                <pr:smNativeData xmlns:pr="smNativeData" val="SMDATA_13_qYmVXhMAAAAlAAAAZAAAAA8BAAAAkAAAAEgAAACQAAAASAAAAAAAAAAAAAAAAAAAAAEAAABQAAAAAAAAAAAA4D8AAAAAAADgPwAAAAAAAOA/AAAAAAAA4D8AAAAAAADgPwAAAAAAAOA/AAAAAAAA4D8AAAAAAADgPwAAAAAAAOA/AAAAAAAA4D8CAAAAjAAAAAAAAAAAAAAAg8C6DP///wgAAAAAAAAAAAAAAAAAAAAAAAAAAAAAAAAAAAAAZAAAAAEAAABAAAAAAAAAAAAAAAAAAAAAAAAAAAAAAAAAAAAAAAAAAAAAAAAAAAAAAAAAAAAAAAAAAAAAAAAAAAAAAAAAAAAAAAAAAAAAAAAAAAAAAAAAAAAAAAAAAAAAFAAAADwAAAAAAAAAAAAAAAAAAAkUAAAAAQAAABQAAAAUAAAAFAAAAAEAAAAAAAAAZAAAAGQAAAAAAAAAZAAAAGQAAAAVAAAAYAAAAAAAAAAAAAAADwAAACADAAAAAAAAAAAAAAEAAACgMgAAVgcAAKr4//8BAAAAf39/AAEAAABkAAAAAAAAABQAAABAHwAAAAAAACYAAAAAAAAAwOD//wAAAAAmAAAAZAAAABYAAABMAAAAAAAAAAAAAAAEAAAAAAAAAAEAAADy8vIKAAAAACgAAAAoAAAAZAAAAGQAAAAAAAAAzMzMAAAAAABQAAAAUAAAAGQAAABkAAAAAAAAABcAAAAUAAAAAAAAAAAAAAD/fwAA/38AAAAAAAAJAAAABAAAABAdAAAMAAAAEAAAAAAAAAAAAAAAAAAAAAAAAAAeAAAAaAAAAAAAAAAAAAAAAAAAAAAAAAAAAAAAECcAABAnAAAAAAAAAAAAAAAAAAAAAAAAAAAAAAAAAAAAAAAAAAAAABQAAAAAAAAAwMD/AAAAAABkAAAAMgAAAAAAAABkAAAAAAAAAH9/fwAKAAAAHwAAAFQAAACDwLoF////AQAAAAAAAAAAAAAAAAAAAAAAAAAAAAAAAAAAAAAAAAAAAAAAAn9/fwDy8vIDzMzMAMDA/wB/f38AAAAAAAAAAAAAAAAAAAAAAAAAAAAhAAAAGAAAABQAAAAfMAAAYiYAABBBAABgKAAAEAAAACYAAAAIAAAAAAAAAAAAAAA="/>
+                <pr:smNativeData xmlns:pr="smNativeData" val="SMDATA_13_TQCXXhMAAAAlAAAAZAAAAA8BAAAAkAAAAEgAAACQAAAASAAAAAAAAAAAAAAAAAAAAAEAAABQAAAAAAAAAAAA4D8AAAAAAADgPwAAAAAAAOA/AAAAAAAA4D8AAAAAAADgPwAAAAAAAOA/AAAAAAAA4D8AAAAAAADgPwAAAAAAAOA/AAAAAAAA4D8CAAAAjAAAAAAAAAAAAAAAg8C6DP///wgAAAAAAAAAAAAAAAAAAAAAAAAAAAAAAAAAAAAAZAAAAAEAAABAAAAAAAAAAAAAAAAAAAAAAAAAAAAAAAAAAAAAAAAAAAAAAAAAAAAAAAAAAAAAAAAAAAAAAAAAAAAAAAAAAAAAAAAAAAAAAAAAAAAAAAAAAAAAAAAAAAAAFAAAADwAAAAAAAAAAAAAAAAAAAkUAAAAAQAAABQAAAAUAAAAFAAAAAEAAAAAAAAAZAAAAGQAAAAAAAAAZAAAAGQAAAAVAAAAYAAAAAAAAAAAAAAADwAAACADAAAAAAAAAAAAAAEAAACgMgAAVgcAAKr4//8BAAAAf39/AAEAAABkAAAAAAAAABQAAABAHwAAAAAAACYAAAAAAAAAwOD//wAAAAAmAAAAZAAAABYAAABMAAAAAAAAAAAAAAAEAAAAAAAAAAEAAADy8vIKAAAAACgAAAAoAAAAZAAAAGQAAAAAAAAAzMzMAAAAAABQAAAAUAAAAGQAAABkAAAAAAAAABcAAAAUAAAAAAAAAAAAAAD/fwAA/38AAAAAAAAJAAAABAAAABAdAAAMAAAAEAAAAAAAAAAAAAAAAAAAAAAAAAAeAAAAaAAAAAAAAAAAAAAAAAAAAAAAAAAAAAAAECcAABAnAAAAAAAAAAAAAAAAAAAAAAAAAAAAAAAAAAAAAAAAAAAAABQAAAAAAAAAwMD/AAAAAABkAAAAMgAAAAAAAABkAAAAAAAAAH9/fwAKAAAAHwAAAFQAAACDwLoF////AQAAAAAAAAAAAAAAAAAAAAAAAAAAAAAAAAAAAAAAAAAAAAAAAn9/fwDy8vIDzMzMAMDA/wB/f38AAAAAAAAAAAAAAAAAAAAAAAAAAAAhAAAAGAAAABQAAAAfMAAAYiYAABBBAABgKAAAEAAAACYAAAAIAAAAAAAAAAAAAAA="/>
               </a:ext>
             </a:extLst>
           </p:cNvSpPr>
@@ -2872,7 +2872,7 @@
           <a:lstStyle/>
           <a:p>
             <a:pPr/>
-            <a:fld id="{61485406-488C-1DA2-C2F0-BEF71ABE34EB}" type="datetime1">
+            <a:fld id="{4A3AC0F1-BFA7-6F36-E982-49638ECC1F1C}" type="datetime1">
               <a:t>{Date/Time}</a:t>
             </a:fld>
           </a:p>
@@ -2885,7 +2885,7 @@
             <a:spLocks noGrp="1" noChangeArrowheads="1"/>
             <a:extLst>
               <a:ext uri="smNativeData">
-                <pr:smNativeData xmlns:pr="smNativeData" val="SMDATA_13_qYmVXhMAAAAlAAAAZAAAAA8BAAAAkAAAAEgAAACQAAAASAAAAAAAAAAAAAAAAAAAAAEAAABQAAAAAAAAAAAA4D8AAAAAAADgPwAAAAAAAOA/AAAAAAAA4D8AAAAAAADgPwAAAAAAAOA/AAAAAAAA4D8AAAAAAADgPwAAAAAAAOA/AAAAAAAA4D8CAAAAjAAAAAAAAAAAAAAAg8C6DP///wgAAAAAAAAAAAAAAAAAAAAAAAAAAAAAAAAAAAAAZAAAAAEAAABAAAAAAAAAAAAAAAAAAAAAAAAAAAAAAAAAAAAAAAAAAAAAAAAAAAAAAAAAAAAAAAAAAAAAAAAAAAAAAAAAAAAAAAAAAAAAAAAAAAAAAAAAAAAAAAAAAAAAFAAAADwAAAAAAAAAAAAAAAAAAAkUAAAAAQAAABQAAAAUAAAAFAAAAAEAAAAAAAAAZAAAAGQAAAAAAAAAZAAAAGQAAAAVAAAAYAAAAAAAAAAAAAAADwAAACADAAAAAAAAAAAAAAEAAACgMgAAVgcAAKr4//8BAAAAf39/AAEAAABkAAAAAAAAABQAAABAHwAAAAAAACYAAAAAAAAAwOD//wAAAAAmAAAAZAAAABYAAABMAAAAAAAAAAAAAAAEAAAAAAAAAAEAAADy8vIKAAAAACgAAAAoAAAAZAAAAGQAAAAAAAAAzMzMAAAAAABQAAAAUAAAAGQAAABkAAAAAAAAABcAAAAUAAAAAAAAAAAAAAD/fwAA/38AAAAAAAAJAAAABAAAAAAAAAAMAAAAEAAAAAAAAAAAAAAAAAAAAAAAAAAeAAAAaAAAAAAAAAAAAAAAAAAAAAAAAAAAAAAAECcAABAnAAAAAAAAAAAAAAAAAAAAAAAAAAAAAAAAAAAAAAAAAAAAABQAAAAAAAAAwMD/AAAAAABkAAAAMgAAAAAAAABkAAAAAAAAAH9/fwAKAAAAHwAAAFQAAACDwLoF////AQAAAAAAAAAAAAAAAAAAAAAAAAAAAAAAAAAAAAAAAAAAAAAAAn9/fwDy8vIDzMzMAMDA/wB/f38AAAAAAAAAAAAAAAAAAAAAAAAAAAAhAAAAGAAAABQAAADcCQAAXCYAAKQbAABVKAAAEAAAACYAAAAIAAAAAYAAAAAAAAA="/>
+                <pr:smNativeData xmlns:pr="smNativeData" val="SMDATA_13_TQCXXhMAAAAlAAAAZAAAAA8BAAAAkAAAAEgAAACQAAAASAAAAAAAAAAAAAAAAAAAAAEAAABQAAAAAAAAAAAA4D8AAAAAAADgPwAAAAAAAOA/AAAAAAAA4D8AAAAAAADgPwAAAAAAAOA/AAAAAAAA4D8AAAAAAADgPwAAAAAAAOA/AAAAAAAA4D8CAAAAjAAAAAAAAAAAAAAAg8C6DP///wgAAAAAAAAAAAAAAAAAAAAAAAAAAAAAAAAAAAAAZAAAAAEAAABAAAAAAAAAAAAAAAAAAAAAAAAAAAAAAAAAAAAAAAAAAAAAAAAAAAAAAAAAAAAAAAAAAAAAAAAAAAAAAAAAAAAAAAAAAAAAAAAAAAAAAAAAAAAAAAAAAAAAFAAAADwAAAAAAAAAAAAAAAAAAAkUAAAAAQAAABQAAAAUAAAAFAAAAAEAAAAAAAAAZAAAAGQAAAAAAAAAZAAAAGQAAAAVAAAAYAAAAAAAAAAAAAAADwAAACADAAAAAAAAAAAAAAEAAACgMgAAVgcAAKr4//8BAAAAf39/AAEAAABkAAAAAAAAABQAAABAHwAAAAAAACYAAAAAAAAAwOD//wAAAAAmAAAAZAAAABYAAABMAAAAAAAAAAAAAAAEAAAAAAAAAAEAAADy8vIKAAAAACgAAAAoAAAAZAAAAGQAAAAAAAAAzMzMAAAAAABQAAAAUAAAAGQAAABkAAAAAAAAABcAAAAUAAAAAAAAAAAAAAD/fwAA/38AAAAAAAAJAAAABAAAAAAAAAAMAAAAEAAAAAAAAAAAAAAAAAAAAAAAAAAeAAAAaAAAAAAAAAAAAAAAAAAAAAAAAAAAAAAAECcAABAnAAAAAAAAAAAAAAAAAAAAAAAAAAAAAAAAAAAAAAAAAAAAABQAAAAAAAAAwMD/AAAAAABkAAAAMgAAAAAAAABkAAAAAAAAAH9/fwAKAAAAHwAAAFQAAACDwLoF////AQAAAAAAAAAAAAAAAAAAAAAAAAAAAAAAAAAAAAAAAAAAAAAAAn9/fwDy8vIDzMzMAMDA/wB/f38AAAAAAAAAAAAAAAAAAAAAAAAAAAAhAAAAGAAAABQAAADcCQAAXCYAAKQbAABVKAAAEAAAACYAAAAIAAAAAYAAAAAAAAA="/>
               </a:ext>
             </a:extLst>
           </p:cNvSpPr>
@@ -2925,7 +2925,7 @@
             <a:spLocks noGrp="1" noChangeArrowheads="1"/>
             <a:extLst>
               <a:ext uri="smNativeData">
-                <pr:smNativeData xmlns:pr="smNativeData" val="SMDATA_13_qYmVXhMAAAAlAAAAZAAAAA8BAAAAkAAAAEgAAACQAAAASAAAAAAAAAAAAAAAAAAAAAEAAABQAAAAAAAAAAAA4D8AAAAAAADgPwAAAAAAAOA/AAAAAAAA4D8AAAAAAADgPwAAAAAAAOA/AAAAAAAA4D8AAAAAAADgPwAAAAAAAOA/AAAAAAAA4D8CAAAAjAAAAAEAAAAAAAAAeHh4yv///wgAAAAAAAAAAAAAAAAAAAAAAAAAAAAAAAAAAAAAZAAAAAEAAABAAAAAAAAAAAAAAAAAAAAAAAAAAAAAAAAAAAAAAAAAAAAAAAAAAAAAAAAAAAAAAAAAAAAAAAAAAAAAAAAAAAAAAAAAAAAAAAAAAAAAAAAAAAAAAAAAAAAAFAAAADwAAAAAAAAAAAAAAAAAAAkUAAAAAQAAABQAAAAUAAAAFAAAAAEAAAAAAAAAZAAAAGQAAAAAAAAAZAAAAGQAAAAVAAAAYAAAAAAAAAAAAAAADwAAACADAAAAAAAAAAAAAAEAAACgMgAAVgcAAKr4//8BAAAAf39/AAEAAABkAAAAAAAAABQAAABAHwAAAAAAACYAAAAAAAAAwOD//wAAAAAmAAAAZAAAABYAAABMAAAAAAAAAAAAAAAEAAAAAAAAAAEAAADy8vIKAAAAACgAAAAoAAAAZAAAAGQAAAAAAAAAzMzMAAAAAABQAAAAUAAAAGQAAABkAAAAAAAAABcAAAAUAAAAAAAAAAAAAAD/fwAA/38AAAAAAAAJAAAABAAAAAAAAAAMAAAAEAAAAAAAAAAAAAAAAAAAAAAAAAAeAAAAaAAAAAAAAAAAAAAAAAAAAAAAAAAAAAAAECcAABAnAAAAAAAAAAAAAAAAAAAAAAAAAAAAAAAAAAAAAAAAAAAAABQAAAAAAAAAwMD/AAAAAABkAAAAMgAAAAAAAABkAAAAAAAAAH9/fwAKAAAAHwAAAFQAAAB4eHjD////AQAAAAAAAAAAAAAAAAAAAAAAAAAAAAAAAAAAAAAAAAAAAAAAAn9/fwDy8vIDzMzMAMDA/wB/f38AAAAAAAAAAAAAAAAAAAAAAAAAAAAhAAAAGAAAABQAAAAyQgAAYiYAAHdEAAAwKgAAEAAAACYAAAAIAAAAAAAAAAAAAAA="/>
+                <pr:smNativeData xmlns:pr="smNativeData" val="SMDATA_13_TQCXXhMAAAAlAAAAZAAAAA8BAAAAkAAAAEgAAACQAAAASAAAAAAAAAAAAAAAAAAAAAEAAABQAAAAAAAAAAAA4D8AAAAAAADgPwAAAAAAAOA/AAAAAAAA4D8AAAAAAADgPwAAAAAAAOA/AAAAAAAA4D8AAAAAAADgPwAAAAAAAOA/AAAAAAAA4D8CAAAAjAAAAAEAAAAAAAAAeHh4yv///wgAAAAAAAAAAAAAAAAAAAAAAAAAAAAAAAAAAAAAZAAAAAEAAABAAAAAAAAAAAAAAAAAAAAAAAAAAAAAAAAAAAAAAAAAAAAAAAAAAAAAAAAAAAAAAAAAAAAAAAAAAAAAAAAAAAAAAAAAAAAAAAAAAAAAAAAAAAAAAAAAAAAAFAAAADwAAAAAAAAAAAAAAAAAAAkUAAAAAQAAABQAAAAUAAAAFAAAAAEAAAAAAAAAZAAAAGQAAAAAAAAAZAAAAGQAAAAVAAAAYAAAAAAAAAAAAAAADwAAACADAAAAAAAAAAAAAAEAAACgMgAAVgcAAKr4//8BAAAAf39/AAEAAABkAAAAAAAAABQAAABAHwAAAAAAACYAAAAAAAAAwOD//wAAAAAmAAAAZAAAABYAAABMAAAAAAAAAAAAAAAEAAAAAAAAAAEAAADy8vIKAAAAACgAAAAoAAAAZAAAAGQAAAAAAAAAzMzMAAAAAABQAAAAUAAAAGQAAABkAAAAAAAAABcAAAAUAAAAAAAAAAAAAAD/fwAA/38AAAAAAAAJAAAABAAAAAAAAAAMAAAAEAAAAAAAAAAAAAAAAAAAAAAAAAAeAAAAaAAAAAAAAAAAAAAAAAAAAAAAAAAAAAAAECcAABAnAAAAAAAAAAAAAAAAAAAAAAAAAAAAAAAAAAAAAAAAAAAAABQAAAAAAAAAwMD/AAAAAABkAAAAMgAAAAAAAABkAAAAAAAAAH9/fwAKAAAAHwAAAFQAAAB4eHjD////AQAAAAAAAAAAAAAAAAAAAAAAAAAAAAAAAAAAAAAAAAAAAAAAAn9/fwDy8vIDzMzMAMDA/wB/f38AAAAAAAAAAAAAAAAAAAAAAAAAAAAhAAAAGAAAABQAAAAyQgAAYiYAAHdEAAAwKgAAEAAAACYAAAAIAAAAAAAAAAAAAAA="/>
               </a:ext>
             </a:extLst>
           </p:cNvSpPr>
@@ -2939,7 +2939,7 @@
           <a:lstStyle/>
           <a:p>
             <a:pPr/>
-            <a:fld id="{686C0EA6-E885-39F8-CBD4-1EAD409A3D4B}" type="slidenum">
+            <a:fld id="{4EE20472-3CA3-B7F2-ED5A-CAA74A141B9F}" type="slidenum">
               <a:t>{Nr.}</a:t>
             </a:fld>
           </a:p>
@@ -2985,7 +2985,7 @@
             <a:spLocks noGrp="1" noChangeArrowheads="1"/>
             <a:extLst>
               <a:ext uri="smNativeData">
-                <pr:smNativeData xmlns:pr="smNativeData" val="SMDATA_13_qYmVXhMAAAAlAAAAZAAAAA8BAAAAkAAAAEgAAACQAAAASAAAAAAAAAABAAAAAAAAAAEAAABQAAAAAAAAAAAA4D8AAAAAAADgPwAAAAAAAOA/AAAAAAAA4D8AAAAAAADgPwAAAAAAAOA/AAAAAAAA4D8AAAAAAADgPwAAAAAAAOA/AAAAAAAA4D8CAAAAjAAAAAEAAAAAAAAA////CP///wgAAAAAAAAAAAAAAAAAAAAAAAAAAAAAAAAAAAAAZAAAAAEAAABAAAAAAAAAAAAAAAAAAAAAAAAAAAAAAAAAAAAAAAAAAAAAAAAAAAAAAAAAAAAAAAAAAAAAAAAAAAAAAAAAAAAAAAAAAAAAAAAAAAAAAAAAAAAAAAAAAAAAFAAAADwAAAABAAAAAAAAAAAAAAkoAAAAAQAAABQAAAAUAAAAFAAAAAEAAAAAAAAAZAAAAGQAAAAAAAAAZAAAAGQAAAAVAAAAYAAAAAAAAAAAAAAADwAAACADAAAAAAAAAAAAAAEAAACgMgAAVgcAAKr4//8BAAAAf39/AAEAAABkAAAAAAAAABQAAABAHwAAAAAAACYAAAAAAAAAwOD//wAAAAAmAAAAZAAAABYAAABMAAAAAAAAAAAAAAAEAAAAAAAAAAEAAADy8vIKAAAAACgAAAAoAAAAZAAAAGQAAAAAAAAAzMzMAAAAAABQAAAAUAAAAGQAAABkAAAAAAAAABcAAAAUAAAAAAAAAAAAAAD/fwAA/38AAAAAAAAJAAAABAAAAGoAdQAMAAAAEAAAAAAAAAAAAAAAAAAAAAAAAAAeAAAAaAAAAAAAAAAAAAAAAAAAAAAAAAAAAAAAECcAABAnAAAAAAAAAAAAAAAAAAAAAAAAAAAAAAAAAAAAAAAAAAAAABQAAAAAAAAAwMD/AAAAAABkAAAAMgAAAAAAAABkAAAAAAAAAH9/fwAKAAAAHwAAAFQAAAD///8B////AQAAAAAAAAAAAAAAAAAAAAAAAAAAAAAAAAAAAAAAAAAAAAAAAn9/fwDy8vIDzMzMAMDA/wB/f38AAAAAAAAAAAAAAAAAAAAAAAAAAAAhAAAAGAAAABQAAAC7DQAA7wUAAEc9AAA+DQAAEAAAACYAAAAIAAAA//////////8="/>
+                <pr:smNativeData xmlns:pr="smNativeData" val="SMDATA_13_TQCXXhMAAAAlAAAAZAAAAA8BAAAAkAAAAEgAAACQAAAASAAAAAAAAAABAAAAAAAAAAEAAABQAAAAAAAAAAAA4D8AAAAAAADgPwAAAAAAAOA/AAAAAAAA4D8AAAAAAADgPwAAAAAAAOA/AAAAAAAA4D8AAAAAAADgPwAAAAAAAOA/AAAAAAAA4D8CAAAAjAAAAAEAAAAAAAAA////CP///wgAAAAAAAAAAAAAAAAAAAAAAAAAAAAAAAAAAAAAZAAAAAEAAABAAAAAAAAAAAAAAAAAAAAAAAAAAAAAAAAAAAAAAAAAAAAAAAAAAAAAAAAAAAAAAAAAAAAAAAAAAAAAAAAAAAAAAAAAAAAAAAAAAAAAAAAAAAAAAAAAAAAAFAAAADwAAAABAAAAAAAAAAAAAAkoAAAAAQAAABQAAAAUAAAAFAAAAAEAAAAAAAAAZAAAAGQAAAAAAAAAZAAAAGQAAAAVAAAAYAAAAAAAAAAAAAAADwAAACADAAAAAAAAAAAAAAEAAACgMgAAVgcAAKr4//8BAAAAf39/AAEAAABkAAAAAAAAABQAAABAHwAAAAAAACYAAAAAAAAAwOD//wAAAAAmAAAAZAAAABYAAABMAAAAAAAAAAAAAAAEAAAAAAAAAAEAAADy8vIKAAAAACgAAAAoAAAAZAAAAGQAAAAAAAAAzMzMAAAAAABQAAAAUAAAAGQAAABkAAAAAAAAABcAAAAUAAAAAAAAAAAAAAD/fwAA/38AAAAAAAAJAAAABAAAAGoAdQAMAAAAEAAAAAAAAAAAAAAAAAAAAAAAAAAeAAAAaAAAAAAAAAAAAAAAAAAAAAAAAAAAAAAAECcAABAnAAAAAAAAAAAAAAAAAAAAAAAAAAAAAAAAAAAAAAAAAAAAABQAAAAAAAAAwMD/AAAAAABkAAAAMgAAAAAAAABkAAAAAAAAAH9/fwAKAAAAHwAAAFQAAAD///8B////AQAAAAAAAAAAAAAAAAAAAAAAAAAAAAAAAAAAAAAAAAAAAAAAAn9/fwDy8vIDzMzMAMDA/wB/f38AAAAAAAAAAAAAAAAAAAAAAAAAAAAhAAAAGAAAABQAAAC7DQAA7wUAAEc9AAA+DQAAEAAAACYAAAAIAAAA//////////8="/>
               </a:ext>
             </a:extLst>
           </p:cNvSpPr>
@@ -3038,7 +3038,7 @@
             <a:spLocks noGrp="1" noChangeArrowheads="1"/>
             <a:extLst>
               <a:ext uri="smNativeData">
-                <pr:smNativeData xmlns:pr="smNativeData" val="SMDATA_13_qYmVXhMAAAAlAAAAZAAAAA8BAAAAkAAAAEgAAACQAAAASAAAAAAAAAAAAAAAAAAAAAEAAABQAAAAAAAAAAAA4D8AAAAAAADgPwAAAAAAAOA/AAAAAAAA4D8AAAAAAADgPwAAAAAAAOA/AAAAAAAA4D8AAAAAAADgPwAAAAAAAOA/AAAAAAAA4D8CAAAAjAAAAAAAAAAAAAAAg8C6DP///wgAAAAAAAAAAAAAAAAAAAAAAAAAAAAAAAAAAAAAZAAAAAEAAABAAAAAAAAAAAAAAAAAAAAAAAAAAAAAAAAAAAAAAAAAAAAAAAAAAAAAAAAAAAAAAAAAAAAAAAAAAAAAAAAAAAAAAAAAAAAAAAAAAAAAAAAAAAAAAAAAAAAAFAAAADwAAAAAAAAAAAAAAAAAAAkUAAAAAQAAABQAAAAUAAAAFAAAAAEAAAAAAAAAZAAAAGQAAAAAAAAAZAAAAGQAAAAVAAAAYAAAAAAAAAAAAAAADwAAACADAAAAAAAAAAAAAAEAAACgMgAAVgcAAKr4//8BAAAAf39/AAEAAABkAAAAAAAAABQAAABAHwAAAAAAACYAAAAAAAAAwOD//wAAAAAmAAAAZAAAABYAAABMAAAAAAAAAAAAAAAEAAAAAAAAAAEAAADy8vIKAAAAACgAAAAoAAAAZAAAAGQAAAAAAAAAzMzMAAAAAABQAAAAUAAAAGQAAABkAAAAAAAAABcAAAAUAAAAAAAAAAAAAAD/fwAA/38AAAAAAAAJAAAABAAAALiA5pwMAAAAEAAAAAAAAAAAAAAAAAAAAAAAAAAeAAAAaAAAAAAAAAAAAAAAAAAAAAAAAAAAAAAAECcAABAnAAAAAAAAAAAAAAAAAAAAAAAAAAAAAAAAAAAAAAAAAAAAABQAAAAAAAAAwMD/AAAAAABkAAAAMgAAAAAAAABkAAAAAAAAAH9/fwAKAAAAHwAAAFQAAACDwLoF////AQAAAAAAAAAAAAAAAAAAAAAAAAAAAAAAAAAAAAAAAAAAAAAAAn9/fwDy8vIDzMzMAMDA/wB/f38AAAAAAAAAAAAAAAAAAAAAAAAAAAAhAAAAGAAAABQAAAC7DQAAPBAAAEc9AABTIwAAEAAAACYAAAAIAAAA//////////8="/>
+                <pr:smNativeData xmlns:pr="smNativeData" val="SMDATA_13_TQCXXhMAAAAlAAAAZAAAAA8BAAAAkAAAAEgAAACQAAAASAAAAAAAAAAAAAAAAAAAAAEAAABQAAAAAAAAAAAA4D8AAAAAAADgPwAAAAAAAOA/AAAAAAAA4D8AAAAAAADgPwAAAAAAAOA/AAAAAAAA4D8AAAAAAADgPwAAAAAAAOA/AAAAAAAA4D8CAAAAjAAAAAAAAAAAAAAAg8C6DP///wgAAAAAAAAAAAAAAAAAAAAAAAAAAAAAAAAAAAAAZAAAAAEAAABAAAAAAAAAAAAAAAAAAAAAAAAAAAAAAAAAAAAAAAAAAAAAAAAAAAAAAAAAAAAAAAAAAAAAAAAAAAAAAAAAAAAAAAAAAAAAAAAAAAAAAAAAAAAAAAAAAAAAFAAAADwAAAAAAAAAAAAAAAAAAAkUAAAAAQAAABQAAAAUAAAAFAAAAAEAAAAAAAAAZAAAAGQAAAAAAAAAZAAAAGQAAAAVAAAAYAAAAAAAAAAAAAAADwAAACADAAAAAAAAAAAAAAEAAACgMgAAVgcAAKr4//8BAAAAf39/AAEAAABkAAAAAAAAABQAAABAHwAAAAAAACYAAAAAAAAAwOD//wAAAAAmAAAAZAAAABYAAABMAAAAAAAAAAAAAAAEAAAAAAAAAAEAAADy8vIKAAAAACgAAAAoAAAAZAAAAGQAAAAAAAAAzMzMAAAAAABQAAAAUAAAAGQAAABkAAAAAAAAABcAAAAUAAAAAAAAAAAAAAD/fwAA/38AAAAAAAAJAAAABAAAALiA5pwMAAAAEAAAAAAAAAAAAAAAAAAAAAAAAAAeAAAAaAAAAAAAAAAAAAAAAAAAAAAAAAAAAAAAECcAABAnAAAAAAAAAAAAAAAAAAAAAAAAAAAAAAAAAAAAAAAAAAAAABQAAAAAAAAAwMD/AAAAAABkAAAAMgAAAAAAAABkAAAAAAAAAH9/fwAKAAAAHwAAAFQAAACDwLoF////AQAAAAAAAAAAAAAAAAAAAAAAAAAAAAAAAAAAAAAAAAAAAAAAAn9/fwDy8vIDzMzMAMDA/wB/f38AAAAAAAAAAAAAAAAAAAAAAAAAAAAhAAAAGAAAABQAAAC7DQAAPBAAAEc9AABTIwAAEAAAACYAAAAIAAAA//////////8="/>
               </a:ext>
             </a:extLst>
           </p:cNvSpPr>
@@ -3106,7 +3106,7 @@
             <a:spLocks noGrp="1" noChangeArrowheads="1"/>
             <a:extLst>
               <a:ext uri="smNativeData">
-                <pr:smNativeData xmlns:pr="smNativeData" val="SMDATA_13_qYmVXhMAAAAlAAAAZAAAAA8BAAAAkAAAAEgAAACQAAAASAAAAAAAAAAAAAAAAAAAAAEAAABQAAAAAAAAAAAA4D8AAAAAAADgPwAAAAAAAOA/AAAAAAAA4D8AAAAAAADgPwAAAAAAAOA/AAAAAAAA4D8AAAAAAADgPwAAAAAAAOA/AAAAAAAA4D8CAAAAjAAAAAAAAAAAAAAAg8C6DP///wgAAAAAAAAAAAAAAAAAAAAAAAAAAAAAAAAAAAAAZAAAAAEAAABAAAAAAAAAAAAAAAAAAAAAAAAAAAAAAAAAAAAAAAAAAAAAAAAAAAAAAAAAAAAAAAAAAAAAAAAAAAAAAAAAAAAAAAAAAAAAAAAAAAAAAAAAAAAAAAAAAAAAFAAAADwAAAAAAAAAAAAAAAAAAAkUAAAAAQAAABQAAAAUAAAAFAAAAAEAAAAAAAAAZAAAAGQAAAAAAAAAZAAAAGQAAAAVAAAAYAAAAAAAAAAAAAAADwAAACADAAAAAAAAAAAAAAEAAACgMgAAVgcAAKr4//8BAAAAf39/AAEAAABkAAAAAAAAABQAAABAHwAAAAAAACYAAAAAAAAAwOD//wAAAAAmAAAAZAAAABYAAABMAAAAAAAAAAAAAAAEAAAAAAAAAAEAAADy8vIKAAAAACgAAAAoAAAAZAAAAGQAAAAAAAAAzMzMAAAAAABQAAAAUAAAAGQAAABkAAAAAAAAABcAAAAUAAAAAAAAAAAAAAD/fwAA/38AAAAAAAAJAAAABAAAAAAAAAAMAAAAEAAAAAAAAAAAAAAAAAAAAAAAAAAeAAAAaAAAAAAAAAAAAAAAAAAAAAAAAAAAAAAAECcAABAnAAAAAAAAAAAAAAAAAAAAAAAAAAAAAAAAAAAAAAAAAAAAABQAAAAAAAAAwMD/AAAAAABkAAAAMgAAAAAAAABkAAAAAAAAAH9/fwAKAAAAHwAAAFQAAACDwLoF////AQAAAAAAAAAAAAAAAAAAAAAAAAAAAAAAAAAAAAAAAAAAAAAAAn9/fwDy8vIDzMzMAMDA/wB/f38AAAAAAAAAAAAAAAAAAAAAAAAAAAAhAAAAGAAAABQAAAAfMAAAYiYAABBBAABgKAAAEAAAACYAAAAIAAAA//////////8="/>
+                <pr:smNativeData xmlns:pr="smNativeData" val="SMDATA_13_TQCXXhMAAAAlAAAAZAAAAA8BAAAAkAAAAEgAAACQAAAASAAAAAAAAAAAAAAAAAAAAAEAAABQAAAAAAAAAAAA4D8AAAAAAADgPwAAAAAAAOA/AAAAAAAA4D8AAAAAAADgPwAAAAAAAOA/AAAAAAAA4D8AAAAAAADgPwAAAAAAAOA/AAAAAAAA4D8CAAAAjAAAAAAAAAAAAAAAg8C6DP///wgAAAAAAAAAAAAAAAAAAAAAAAAAAAAAAAAAAAAAZAAAAAEAAABAAAAAAAAAAAAAAAAAAAAAAAAAAAAAAAAAAAAAAAAAAAAAAAAAAAAAAAAAAAAAAAAAAAAAAAAAAAAAAAAAAAAAAAAAAAAAAAAAAAAAAAAAAAAAAAAAAAAAFAAAADwAAAAAAAAAAAAAAAAAAAkUAAAAAQAAABQAAAAUAAAAFAAAAAEAAAAAAAAAZAAAAGQAAAAAAAAAZAAAAGQAAAAVAAAAYAAAAAAAAAAAAAAADwAAACADAAAAAAAAAAAAAAEAAACgMgAAVgcAAKr4//8BAAAAf39/AAEAAABkAAAAAAAAABQAAABAHwAAAAAAACYAAAAAAAAAwOD//wAAAAAmAAAAZAAAABYAAABMAAAAAAAAAAAAAAAEAAAAAAAAAAEAAADy8vIKAAAAACgAAAAoAAAAZAAAAGQAAAAAAAAAzMzMAAAAAABQAAAAUAAAAGQAAABkAAAAAAAAABcAAAAUAAAAAAAAAAAAAAD/fwAA/38AAAAAAAAJAAAABAAAAAAAAAAMAAAAEAAAAAAAAAAAAAAAAAAAAAAAAAAeAAAAaAAAAAAAAAAAAAAAAAAAAAAAAAAAAAAAECcAABAnAAAAAAAAAAAAAAAAAAAAAAAAAAAAAAAAAAAAAAAAAAAAABQAAAAAAAAAwMD/AAAAAABkAAAAMgAAAAAAAABkAAAAAAAAAH9/fwAKAAAAHwAAAFQAAACDwLoF////AQAAAAAAAAAAAAAAAAAAAAAAAAAAAAAAAAAAAAAAAAAAAAAAAn9/fwDy8vIDzMzMAMDA/wB/f38AAAAAAAAAAAAAAAAAAAAAAAAAAAAhAAAAGAAAABQAAAAfMAAAYiYAABBBAABgKAAAEAAAACYAAAAIAAAA//////////8="/>
               </a:ext>
             </a:extLst>
           </p:cNvSpPr>
@@ -3141,7 +3141,7 @@
           </a:lstStyle>
           <a:p>
             <a:pPr/>
-            <a:fld id="{422384E8-A6AF-7672-E19B-5027CAD51705}" type="datetime1">
+            <a:fld id="{0C093A59-17E1-5CCC-AFB1-E19974FF59B4}" type="datetime1">
               <a:t/>
             </a:fld>
           </a:p>
@@ -3154,7 +3154,7 @@
             <a:spLocks noGrp="1" noChangeArrowheads="1"/>
             <a:extLst>
               <a:ext uri="smNativeData">
-                <pr:smNativeData xmlns:pr="smNativeData" val="SMDATA_13_qYmVXhMAAAAlAAAAZAAAAA8BAAAAkAAAAEgAAACQAAAASAAAAAAAAAAAAAAAAAAAAAEAAABQAAAAAAAAAAAA4D8AAAAAAADgPwAAAAAAAOA/AAAAAAAA4D8AAAAAAADgPwAAAAAAAOA/AAAAAAAA4D8AAAAAAADgPwAAAAAAAOA/AAAAAAAA4D8CAAAAjAAAAAAAAAAAAAAAg8C6DP///wgAAAAAAAAAAAAAAAAAAAAAAAAAAAAAAAAAAAAAZAAAAAEAAABAAAAAAAAAAAAAAAAAAAAAAAAAAAAAAAAAAAAAAAAAAAAAAAAAAAAAAAAAAAAAAAAAAAAAAAAAAAAAAAAAAAAAAAAAAAAAAAAAAAAAAAAAAAAAAAAAAAAAFAAAADwAAAAAAAAAAAAAAAAAAAkUAAAAAQAAABQAAAAUAAAAFAAAAAEAAAAAAAAAZAAAAGQAAAAAAAAAZAAAAGQAAAAVAAAAYAAAAAAAAAAAAAAADwAAACADAAAAAAAAAAAAAAEAAACgMgAAVgcAAKr4//8BAAAAf39/AAEAAABkAAAAAAAAABQAAABAHwAAAAAAACYAAAAAAAAAwOD//wAAAAAmAAAAZAAAABYAAABMAAAAAAAAAAAAAAAEAAAAAAAAAAEAAADy8vIKAAAAACgAAAAoAAAAZAAAAGQAAAAAAAAAzMzMAAAAAABQAAAAUAAAAGQAAABkAAAAAAAAABcAAAAUAAAAAAAAAAAAAAD/fwAA/38AAAAAAAAJAAAABAAAAAAAAAAMAAAAEAAAAAAAAAAAAAAAAAAAAAAAAAAeAAAAaAAAAAAAAAAAAAAAAAAAAAAAAAAAAAAAECcAABAnAAAAAAAAAAAAAAAAAAAAAAAAAAAAAAAAAAAAAAAAAAAAABQAAAAAAAAAwMD/AAAAAABkAAAAMgAAAAAAAABkAAAAAAAAAH9/fwAKAAAAHwAAAFQAAACDwLoF////AQAAAAAAAAAAAAAAAAAAAAAAAAAAAAAAAAAAAAAAAAAAAAAAAn9/fwDy8vIDzMzMAMDA/wB/f38AAAAAAAAAAAAAAAAAAAAAAAAAAAAhAAAAGAAAABQAAADcCQAAXCYAACguAABVKAAAEAAAACYAAAAIAAAA//////////8="/>
+                <pr:smNativeData xmlns:pr="smNativeData" val="SMDATA_13_TQCXXhMAAAAlAAAAZAAAAA8BAAAAkAAAAEgAAACQAAAASAAAAAAAAAAAAAAAAAAAAAEAAABQAAAAAAAAAAAA4D8AAAAAAADgPwAAAAAAAOA/AAAAAAAA4D8AAAAAAADgPwAAAAAAAOA/AAAAAAAA4D8AAAAAAADgPwAAAAAAAOA/AAAAAAAA4D8CAAAAjAAAAAAAAAAAAAAAg8C6DP///wgAAAAAAAAAAAAAAAAAAAAAAAAAAAAAAAAAAAAAZAAAAAEAAABAAAAAAAAAAAAAAAAAAAAAAAAAAAAAAAAAAAAAAAAAAAAAAAAAAAAAAAAAAAAAAAAAAAAAAAAAAAAAAAAAAAAAAAAAAAAAAAAAAAAAAAAAAAAAAAAAAAAAFAAAADwAAAAAAAAAAAAAAAAAAAkUAAAAAQAAABQAAAAUAAAAFAAAAAEAAAAAAAAAZAAAAGQAAAAAAAAAZAAAAGQAAAAVAAAAYAAAAAAAAAAAAAAADwAAACADAAAAAAAAAAAAAAEAAACgMgAAVgcAAKr4//8BAAAAf39/AAEAAABkAAAAAAAAABQAAABAHwAAAAAAACYAAAAAAAAAwOD//wAAAAAmAAAAZAAAABYAAABMAAAAAAAAAAAAAAAEAAAAAAAAAAEAAADy8vIKAAAAACgAAAAoAAAAZAAAAGQAAAAAAAAAzMzMAAAAAABQAAAAUAAAAGQAAABkAAAAAAAAABcAAAAUAAAAAAAAAAAAAAD/fwAA/38AAAAAAAAJAAAABAAAAAAAAAAMAAAAEAAAAAAAAAAAAAAAAAAAAAAAAAAeAAAAaAAAAAAAAAAAAAAAAAAAAAAAAAAAAAAAECcAABAnAAAAAAAAAAAAAAAAAAAAAAAAAAAAAAAAAAAAAAAAAAAAABQAAAAAAAAAwMD/AAAAAABkAAAAMgAAAAAAAABkAAAAAAAAAH9/fwAKAAAAHwAAAFQAAACDwLoF////AQAAAAAAAAAAAAAAAAAAAAAAAAAAAAAAAAAAAAAAAAAAAAAAAn9/fwDy8vIDzMzMAMDA/wB/f38AAAAAAAAAAAAAAAAAAAAAAAAAAAAhAAAAGAAAABQAAADcCQAAXCYAACguAABVKAAAEAAAACYAAAAIAAAA//////////8="/>
               </a:ext>
             </a:extLst>
           </p:cNvSpPr>
@@ -3202,7 +3202,7 @@
             <a:spLocks noGrp="1" noChangeArrowheads="1"/>
             <a:extLst>
               <a:ext uri="smNativeData">
-                <pr:smNativeData xmlns:pr="smNativeData" val="SMDATA_13_qYmVXhMAAAAlAAAAZAAAAA8BAAAAkAAAAEgAAACQAAAASAAAAAAAAAAAAAAAAAAAAAEAAABQAAAAAAAAAAAA4D8AAAAAAADgPwAAAAAAAOA/AAAAAAAA4D8AAAAAAADgPwAAAAAAAOA/AAAAAAAA4D8AAAAAAADgPwAAAAAAAOA/AAAAAAAA4D8CAAAAjAAAAAEAAAAAAAAAeHh4yv///wgAAAAAAAAAAAAAAAAAAAAAAAAAAAAAAAAAAAAAZAAAAAEAAABAAAAAAAAAAAAAAAAAAAAAAAAAAAAAAAAAAAAAAAAAAAAAAAAAAAAAAAAAAAAAAAAAAAAAAAAAAAAAAAAAAAAAAAAAAAAAAAAAAAAAAAAAAAAAAAAAAAAAFAAAADwAAAAAAAAAAAAAAAAAAAkUAAAAAQAAABQAAAAUAAAAFAAAAAEAAAAAAAAAZAAAAGQAAAAAAAAAZAAAAGQAAAAVAAAAYAAAAAAAAAAAAAAADwAAACADAAAAAAAAAAAAAAEAAACgMgAAVgcAAKr4//8BAAAAf39/AAEAAABkAAAAAAAAABQAAABAHwAAAAAAACYAAAAAAAAAwOD//wAAAAAmAAAAZAAAABYAAABMAAAAAAAAAAAAAAAEAAAAAAAAAAEAAADy8vIKAAAAACgAAAAoAAAAZAAAAGQAAAAAAAAAzMzMAAAAAABQAAAAUAAAAGQAAABkAAAAAAAAABcAAAAUAAAAAAAAAAAAAAD/fwAA/38AAAAAAAAJAAAABAAAAAAAAAAMAAAAEAAAAAAAAAAAAAAAAAAAAAAAAAAeAAAAaAAAAAAAAAAAAAAAAAAAAAAAAAAAAAAAECcAABAnAAAAAAAAAAAAAAAAAAAAAAAAAAAAAAAAAAAAAAAAAAAAABQAAAAAAAAAwMD/AAAAAABkAAAAMgAAAAAAAABkAAAAAAAAAH9/fwAKAAAAHwAAAFQAAAB4eHjD////AQAAAAAAAAAAAAAAAAAAAAAAAAAAAAAAAAAAAAAAAAAAAAAAAn9/fwDy8vIDzMzMAMDA/wB/f38AAAAAAAAAAAAAAAAAAAAAAAAAAAAhAAAAGAAAABQAAAAyQgAAYiYAAHdEAAAwKgAAEAAAACYAAAAIAAAA//////////8="/>
+                <pr:smNativeData xmlns:pr="smNativeData" val="SMDATA_13_TQCXXhMAAAAlAAAAZAAAAA8BAAAAkAAAAEgAAACQAAAASAAAAAAAAAAAAAAAAAAAAAEAAABQAAAAAAAAAAAA4D8AAAAAAADgPwAAAAAAAOA/AAAAAAAA4D8AAAAAAADgPwAAAAAAAOA/AAAAAAAA4D8AAAAAAADgPwAAAAAAAOA/AAAAAAAA4D8CAAAAjAAAAAEAAAAAAAAAeHh4yv///wgAAAAAAAAAAAAAAAAAAAAAAAAAAAAAAAAAAAAAZAAAAAEAAABAAAAAAAAAAAAAAAAAAAAAAAAAAAAAAAAAAAAAAAAAAAAAAAAAAAAAAAAAAAAAAAAAAAAAAAAAAAAAAAAAAAAAAAAAAAAAAAAAAAAAAAAAAAAAAAAAAAAAFAAAADwAAAAAAAAAAAAAAAAAAAkUAAAAAQAAABQAAAAUAAAAFAAAAAEAAAAAAAAAZAAAAGQAAAAAAAAAZAAAAGQAAAAVAAAAYAAAAAAAAAAAAAAADwAAACADAAAAAAAAAAAAAAEAAACgMgAAVgcAAKr4//8BAAAAf39/AAEAAABkAAAAAAAAABQAAABAHwAAAAAAACYAAAAAAAAAwOD//wAAAAAmAAAAZAAAABYAAABMAAAAAAAAAAAAAAAEAAAAAAAAAAEAAADy8vIKAAAAACgAAAAoAAAAZAAAAGQAAAAAAAAAzMzMAAAAAABQAAAAUAAAAGQAAABkAAAAAAAAABcAAAAUAAAAAAAAAAAAAAD/fwAA/38AAAAAAAAJAAAABAAAAAAAAAAMAAAAEAAAAAAAAAAAAAAAAAAAAAAAAAAeAAAAaAAAAAAAAAAAAAAAAAAAAAAAAAAAAAAAECcAABAnAAAAAAAAAAAAAAAAAAAAAAAAAAAAAAAAAAAAAAAAAAAAABQAAAAAAAAAwMD/AAAAAABkAAAAMgAAAAAAAABkAAAAAAAAAH9/fwAKAAAAHwAAAFQAAAB4eHjD////AQAAAAAAAAAAAAAAAAAAAAAAAAAAAAAAAAAAAAAAAAAAAAAAAn9/fwDy8vIDzMzMAMDA/wB/f38AAAAAAAAAAAAAAAAAAAAAAAAAAAAhAAAAGAAAABQAAAAyQgAAYiYAAHdEAAAwKgAAEAAAACYAAAAIAAAA//////////8="/>
               </a:ext>
             </a:extLst>
           </p:cNvSpPr>
@@ -3245,7 +3245,7 @@
           </a:lstStyle>
           <a:p>
             <a:pPr/>
-            <a:fld id="{7F539566-2892-0663-DCEB-DE36DBA52A8B}" type="slidenum">
+            <a:fld id="{78B992F1-BF95-EC64-DB01-4931DC4F2D1C}" type="slidenum">
               <a:t/>
             </a:fld>
           </a:p>
@@ -3924,7 +3924,7 @@
             <a:spLocks noGrp="1" noChangeArrowheads="1"/>
             <a:extLst>
               <a:ext uri="smNativeData">
-                <pr:smNativeData xmlns:pr="smNativeData" val="SMDATA_13_qYmVXhMAAAAlAAAAZAAAAA8BAAAAkAAAAEgAAACQAAAASAAAAAAAAAABAAAAAAAAAAEAAABQAAAAAAAAAAAA4D8AAAAAAADgPwAAAAAAAOA/AAAAAAAA4D8AAAAAAADgPwAAAAAAAOA/AAAAAAAA4D8AAAAAAADgPwAAAAAAAOA/AAAAAAAA4D8CAAAAjAAAAAEAAAAAAAAA////CP///wgAAAAAAAAAAAAAAAAAAAAAAAAAAAAAAAAAAAAAZAAAAAEAAABAAAAAAAAAAAAAAAAAAAAAAAAAAAAAAAAAAAAAAAAAAAAAAAAAAAAAAAAAAAAAAAAAAAAAAAAAAAAAAAAAAAAAAAAAAAAAAAAAAAAAAAAAAAAAAAAAAAAAFAAAADwAAAABAAAAAAAAAAAAAAkoAAAAAQAAABQAAAAUAAAAFAAAAAEAAAAAAAAAZAAAAGQAAAAAAAAAZAAAAGQAAAAVAAAAYAAAAAAAAAAAAAAADwAAACADAAAAAAAAAAAAAAEAAACgMgAAVgcAAKr4//8BAAAAf39/AAEAAABkAAAAAAAAABQAAABAHwAAAAAAACYAAAAAAAAAwOD//wAAAAAmAAAAZAAAABYAAABMAAAAAAAAAAAAAAAEAAAAAAAAAAEAAADy8vIKAAAAACgAAAAoAAAAZAAAAGQAAAAAAAAAzMzMAAAAAABQAAAAUAAAAGQAAABkAAAAAAAAABcAAAAUAAAAAAAAAAAAAAD/fwAA/38AAAAAAAAJAAAABAAAAPQ/VJoMAAAAEAAAAAAAAAAAAAAAAAAAAAAAAAAeAAAAaAAAAAAAAAAAAAAAAAAAAAAAAAAAAAAAECcAABAnAAAAAAAAAAAAAAAAAAAAAAAAAAAAAAAAAAAAAAAAAAAAABQAAAAAAAAAwMD/AAAAAABkAAAAMgAAAAAAAABkAAAAAAAAAH9/fwAKAAAAHwAAAFQAAAD///8B////AQAAAAAAAAAAAAAAAAAAAAAAAAAAAAAAAAAAAAAAAAAAAAAAAn9/fwDy8vIDzMzMAMDA/wB/f38AAAAAAAAAAAAAAAAAAAAAAAAAAAAhAAAAGAAAABQAAADkCgAAVAoAAOgtAABoEAAAAAAAACYAAAAIAAAAAYAAAAAAAAA="/>
+                <pr:smNativeData xmlns:pr="smNativeData" val="SMDATA_13_TQCXXhMAAAAlAAAAZAAAAA8BAAAAkAAAAEgAAACQAAAASAAAAAAAAAABAAAAAAAAAAEAAABQAAAAAAAAAAAA4D8AAAAAAADgPwAAAAAAAOA/AAAAAAAA4D8AAAAAAADgPwAAAAAAAOA/AAAAAAAA4D8AAAAAAADgPwAAAAAAAOA/AAAAAAAA4D8CAAAAjAAAAAEAAAAAAAAA////CP///wgAAAAAAAAAAAAAAAAAAAAAAAAAAAAAAAAAAAAAZAAAAAEAAABAAAAAAAAAAAAAAAAAAAAAAAAAAAAAAAAAAAAAAAAAAAAAAAAAAAAAAAAAAAAAAAAAAAAAAAAAAAAAAAAAAAAAAAAAAAAAAAAAAAAAAAAAAAAAAAAAAAAAFAAAADwAAAABAAAAAAAAAAAAAAkoAAAAAQAAABQAAAAUAAAAFAAAAAEAAAAAAAAAZAAAAGQAAAAAAAAAZAAAAGQAAAAVAAAAYAAAAAAAAAAAAAAADwAAACADAAAAAAAAAAAAAAEAAACgMgAAVgcAAKr4//8BAAAAf39/AAEAAABkAAAAAAAAABQAAABAHwAAAAAAACYAAAAAAAAAwOD//wAAAAAmAAAAZAAAABYAAABMAAAAAAAAAAAAAAAEAAAAAAAAAAEAAADy8vIKAAAAACgAAAAoAAAAZAAAAGQAAAAAAAAAzMzMAAAAAABQAAAAUAAAAGQAAABkAAAAAAAAABcAAAAUAAAAAAAAAAAAAAD/fwAA/38AAAAAAAAJAAAABAAAAPQ/VJoMAAAAEAAAAAAAAAAAAAAAAAAAAAAAAAAeAAAAaAAAAAAAAAAAAAAAAAAAAAAAAAAAAAAAECcAABAnAAAAAAAAAAAAAAAAAAAAAAAAAAAAAAAAAAAAAAAAAAAAABQAAAAAAAAAwMD/AAAAAABkAAAAMgAAAAAAAABkAAAAAAAAAH9/fwAKAAAAHwAAAFQAAAD///8B////AQAAAAAAAAAAAAAAAAAAAAAAAAAAAAAAAAAAAAAAAAAAAAAAAn9/fwDy8vIDzMzMAMDA/wB/f38AAAAAAAAAAAAAAAAAAAAAAAAAAAAhAAAAGAAAABQAAADkCgAAVAoAAOgtAABoEAAAEAAAACYAAAAIAAAAAQAAAAAAAAA="/>
               </a:ext>
             </a:extLst>
           </p:cNvSpPr>
@@ -3968,7 +3968,7 @@
             <a:spLocks noGrp="1" noChangeArrowheads="1"/>
             <a:extLst>
               <a:ext uri="smNativeData">
-                <pr:smNativeData xmlns:pr="smNativeData" val="SMDATA_13_qYmVXhMAAAAlAAAAZAAAAA8BAAAAkAAAAEgAAACQAAAASAAAAAAAAAAAAAAAAAAAAAEAAABQAAAAAAAAAAAA4D8AAAAAAADgPwAAAAAAAOA/AAAAAAAA4D8AAAAAAADgPwAAAAAAAOA/AAAAAAAA4D8AAAAAAADgPwAAAAAAAOA/AAAAAAAA4D8CAAAAjAAAAAAAAAAAAAAAg8C6DP///wgAAAAAAAAAAAAAAAAAAAAAAAAAAAAAAAAAAAAAZAAAAAEAAABAAAAAAAAAAAAAAAAAAAAAAAAAAAAAAAAAAAAAAAAAAAAAAAAAAAAAAAAAAAAAAAAAAAAAAAAAAAAAAAAAAAAAAAAAAAAAAAAAAAAAAAAAAAAAAAAAAAAAFAAAADwAAAAAAAAAAAAAAAAAAAkUAAAAAQAAABQAAAAUAAAAFAAAAAEAAAAAAAAAZAAAAGQAAAAAAAAAZAAAAGQAAAAVAAAAYAAAAAAAAAAAAAAADwAAACADAAAAAAAAAAAAAAEAAACgMgAAVgcAAKr4//8BAAAAf39/AAEAAABkAAAAAAAAABQAAABAHwAAAAAAACYAAAAAAAAAwOD//wAAAAAmAAAAZAAAABYAAABMAAAAAAAAAAAAAAAEAAAAAAAAAAEAAADy8vIKAAAAACgAAAAoAAAAZAAAAGQAAAAAAAAAzMzMAAAAAABQAAAAUAAAAGQAAABkAAAAAAAAABcAAAAUAAAAAAAAAAAAAAD/fwAA/38AAAAAAAAJAAAABAAAAAAAAAAMAAAAEAAAAAAAAAAAAAAAAAAAAAAAAAAeAAAAaAAAAAAAAAAAAAAAAAAAAAAAAAAAAAAAECcAABAnAAAAAAAAAAAAAAAAAAAAAAAAAAAAAAAAAAAAAAAAAAAAABQAAAAAAAAAwMD/AAAAAABkAAAAMgAAAAAAAABkAAAAAAAAAH9/fwAKAAAAHwAAAFQAAACDwLoF////AQAAAAAAAAAAAAAAAAAAAAAAAAAAAAAAAAAAAAAAAAAAAAAAAn9/fwDy8vIDzMzMAMDA/wB/f38AAAAAAAAAAAAAAAAAAAAAAAAAAAAhAAAAGAAAABQAAACfBgAASA0AAHQwAADmFAAAAAAAACYAAAAIAAAAAQAAAAAAAAA="/>
+                <pr:smNativeData xmlns:pr="smNativeData" val="SMDATA_13_TQCXXhMAAAAlAAAAZAAAAA8BAAAAkAAAAEgAAACQAAAASAAAAAAAAAAAAAAAAAAAAAEAAABQAAAAAAAAAAAA4D8AAAAAAADgPwAAAAAAAOA/AAAAAAAA4D8AAAAAAADgPwAAAAAAAOA/AAAAAAAA4D8AAAAAAADgPwAAAAAAAOA/AAAAAAAA4D8CAAAAjAAAAAAAAAAAAAAAg8C6DP///wgAAAAAAAAAAAAAAAAAAAAAAAAAAAAAAAAAAAAAZAAAAAEAAABAAAAAAAAAAAAAAAAAAAAAAAAAAAAAAAAAAAAAAAAAAAAAAAAAAAAAAAAAAAAAAAAAAAAAAAAAAAAAAAAAAAAAAAAAAAAAAAAAAAAAAAAAAAAAAAAAAAAAFAAAADwAAAAAAAAAAAAAAAAAAAkUAAAAAQAAABQAAAAUAAAAFAAAAAEAAAAAAAAAZAAAAGQAAAAAAAAAZAAAAGQAAAAVAAAAYAAAAAAAAAAAAAAADwAAACADAAAAAAAAAAAAAAEAAACgMgAAVgcAAKr4//8BAAAAf39/AAEAAABkAAAAAAAAABQAAABAHwAAAAAAACYAAAAAAAAAwOD//wAAAAAmAAAAZAAAABYAAABMAAAAAAAAAAAAAAAEAAAAAAAAAAEAAADy8vIKAAAAACgAAAAoAAAAZAAAAGQAAAAAAAAAzMzMAAAAAABQAAAAUAAAAGQAAABkAAAAAAAAABcAAAAUAAAAAAAAAAAAAAD/fwAA/38AAAAAAAAJAAAABAAAAAAAAAAMAAAAEAAAAAAAAAAAAAAAAAAAAAAAAAAeAAAAaAAAAAAAAAAAAAAAAAAAAAAAAAAAAAAAECcAABAnAAAAAAAAAAAAAAAAAAAAAAAAAAAAAAAAAAAAAAAAAAAAABQAAAAAAAAAwMD/AAAAAABkAAAAMgAAAAAAAABkAAAAAAAAAH9/fwAKAAAAHwAAAFQAAACDwLoF////AQAAAAAAAAAAAAAAAAAAAAAAAAAAAAAAAAAAAAAAAAAAAAAAAn9/fwDy8vIDzMzMAMDA/wB/f38AAAAAAAAAAAAAAAAAAAAAAAAAAAAhAAAAGAAAABQAAACfBgAASA0AAHQwAADmFAAAEAAAACYAAAAIAAAAAQAAAAAAAAA="/>
               </a:ext>
             </a:extLst>
           </p:cNvSpPr>
@@ -4050,7 +4050,7 @@
             <a:spLocks noGrp="1" noChangeArrowheads="1"/>
             <a:extLst>
               <a:ext uri="smNativeData">
-                <pr:smNativeData xmlns:pr="smNativeData" val="SMDATA_13_qYmVXhMAAAAlAAAAZAAAAA8BAAAAkAAAAEgAAACQAAAASAAAAAAAAAABAAAAAAAAAAEAAABQAAAAAAAAAAAA4D8AAAAAAADgPwAAAAAAAOA/AAAAAAAA4D8AAAAAAADgPwAAAAAAAOA/AAAAAAAA4D8AAAAAAADgPwAAAAAAAOA/AAAAAAAA4D8CAAAAjAAAAAEAAAAAAAAA////CP///wgAAAAAAAAAAAAAAAAAAAAAAAAAAAAAAAAAAAAAZAAAAAEAAABAAAAAAAAAAAAAAAAAAAAAAAAAAAAAAAAAAAAAAAAAAAAAAAAAAAAAAAAAAAAAAAAAAAAAAAAAAAAAAAAAAAAAAAAAAAAAAAAAAAAAAAAAAAAAAAAAAAAAFAAAADwAAAABAAAAAAAAAAAAAAkoAAAAAQAAABQAAAAUAAAAFAAAAAEAAAAAAAAAZAAAAGQAAAAAAAAAZAAAAGQAAAAVAAAAYAAAAAAAAAAAAAAADwAAACADAAAAAAAAAAAAAAEAAACgMgAAVgcAAKr4//8BAAAAf39/AAEAAABkAAAAAAAAABQAAABAHwAAAAAAACYAAAAAAAAAwOD//wAAAAAmAAAAZAAAABYAAABMAAAAAAAAAAAAAAAEAAAAAAAAAAEAAADy8vIKAAAAACgAAAAoAAAAZAAAAGQAAAAAAAAAzMzMAAAAAABQAAAAUAAAAGQAAABkAAAAAAAAABcAAAAUAAAAAAAAAAAAAAD/fwAA/38AAAAAAAAJAAAABAAAAAAAAAAMAAAAEAAAAAAAAAAAAAAAAAAAAAAAAAAeAAAAaAAAAAAAAAAAAAAAAAAAAAAAAAAAAAAAECcAABAnAAAAAAAAAAAAAAAAAAAAAAAAAAAAAAAAAAAAAAAAAAAAABQAAAAAAAAAwMD/AAAAAABkAAAAMgAAAAAAAABkAAAAAAAAAH9/fwAKAAAAHwAAAFQAAAD///8B////AQAAAAAAAAAAAAAAAAAAAAAAAAAAAAAAAAAAAAAAAAAAAAAAAn9/fwDy8vIDzMzMAMDA/wB/f38AAAAAAAAAAAAAAAAAAAAAAAAAAAAhAAAAGAAAABQAAAD+BwAASQMAAJUsAAAQBwAAAAAAACYAAAAIAAAAAQAAAAAAAAA="/>
+                <pr:smNativeData xmlns:pr="smNativeData" val="SMDATA_13_TQCXXhMAAAAlAAAAZAAAAA8BAAAAkAAAAEgAAACQAAAASAAAAAAAAAABAAAAAAAAAAEAAABQAAAAAAAAAAAA4D8AAAAAAADgPwAAAAAAAOA/AAAAAAAA4D8AAAAAAADgPwAAAAAAAOA/AAAAAAAA4D8AAAAAAADgPwAAAAAAAOA/AAAAAAAA4D8CAAAAjAAAAAEAAAAAAAAA////CP///wgAAAAAAAAAAAAAAAAAAAAAAAAAAAAAAAAAAAAAZAAAAAEAAABAAAAAAAAAAAAAAAAAAAAAAAAAAAAAAAAAAAAAAAAAAAAAAAAAAAAAAAAAAAAAAAAAAAAAAAAAAAAAAAAAAAAAAAAAAAAAAAAAAAAAAAAAAAAAAAAAAAAAFAAAADwAAAABAAAAAAAAAAAAAAkoAAAAAQAAABQAAAAUAAAAFAAAAAEAAAAAAAAAZAAAAGQAAAAAAAAAZAAAAGQAAAAVAAAAYAAAAAAAAAAAAAAADwAAACADAAAAAAAAAAAAAAEAAACgMgAAVgcAAKr4//8BAAAAf39/AAEAAABkAAAAAAAAABQAAABAHwAAAAAAACYAAAAAAAAAwOD//wAAAAAmAAAAZAAAABYAAABMAAAAAAAAAAAAAAAEAAAAAAAAAAEAAADy8vIKAAAAACgAAAAoAAAAZAAAAGQAAAAAAAAAzMzMAAAAAABQAAAAUAAAAGQAAABkAAAAAAAAABcAAAAUAAAAAAAAAAAAAAD/fwAA/38AAAAAAAAJAAAABAAAAAAAAAAMAAAAEAAAAAAAAAAAAAAAAAAAAAAAAAAeAAAAaAAAAAAAAAAAAAAAAAAAAAAAAAAAAAAAECcAABAnAAAAAAAAAAAAAAAAAAAAAAAAAAAAAAAAAAAAAAAAAAAAABQAAAAAAAAAwMD/AAAAAABkAAAAMgAAAAAAAABkAAAAAAAAAH9/fwAKAAAAHwAAAFQAAAD///8B////AQAAAAAAAAAAAAAAAAAAAAAAAAAAAAAAAAAAAAAAAAAAAAAAAn9/fwDy8vIDzMzMAMDA/wB/f38AAAAAAAAAAAAAAAAAAAAAAAAAAAAhAAAAGAAAABQAAAD+BwAASQMAAJUsAAAQBwAAEAAAACYAAAAIAAAAAQAAAAAAAAA="/>
               </a:ext>
             </a:extLst>
           </p:cNvSpPr>
@@ -4084,7 +4084,7 @@
             <a:spLocks noGrp="1" noChangeArrowheads="1"/>
             <a:extLst>
               <a:ext uri="smNativeData">
-                <pr:smNativeData xmlns:pr="smNativeData" val="SMDATA_13_qYmVXhMAAAAlAAAAZAAAAA8BAAAAkAAAAEgAAACQAAAASAAAAAAAAAAAAAAAAAAAAAEAAABQAAAAAAAAAAAA4D8AAAAAAADgPwAAAAAAAOA/AAAAAAAA4D8AAAAAAADgPwAAAAAAAOA/AAAAAAAA4D8AAAAAAADgPwAAAAAAAOA/AAAAAAAA4D8CAAAAjAAAAAAAAAAAAAAAg8C6DP///wgAAAAAAAAAAAAAAAAAAAAAAAAAAAAAAAAAAAAAZAAAAAEAAABAAAAAAAAAAAAAAAAAAAAAAAAAAAAAAAAAAAAAAAAAAAAAAAAAAAAAAAAAAAAAAAAAAAAAAAAAAAAAAAAAAAAAAAAAAAAAAAAAAAAAAAAAAAAAAAAAAAAAFAAAADwAAAAAAAAAAAAAAAAAAAkUAAAAAQAAABQAAAAUAAAAFAAAAAEAAAAAAAAAZAAAAGQAAAAAAAAAZAAAAGQAAAAVAAAAYAAAAAAAAAAAAAAADwAAACADAAAAAAAAAAAAAAEAAACgMgAAVgcAAKr4//8BAAAAf39/AAEAAABkAAAAAAAAABQAAABAHwAAAAAAACYAAAAAAAAAwOD//wAAAAAmAAAAZAAAABYAAABMAAAAAAAAAAAAAAAEAAAAAAAAAAEAAADy8vIKAAAAACgAAAAoAAAAZAAAAGQAAAAAAAAAzMzMAAAAAABQAAAAUAAAAGQAAABkAAAAAAAAABcAAAAUAAAAAAAAAAAAAAD/fwAA/38AAAAAAAAJAAAABAAAAPBElAMMAAAAEAAAAAAAAAAAAAAAAAAAAAAAAAAeAAAAaAAAAAAAAAAAAAAAAAAAAAAAAAAAAAAAECcAABAnAAAAAAAAAAAAAAAAAAAAAAAAAAAAAAAAAAAAAAAAAAAAABQAAAAAAAAAwMD/AAAAAABkAAAAMgAAAAAAAABkAAAAAAAAAH9/fwAKAAAAHwAAAFQAAACDwLoF////AQAAAAAAAAAAAAAAAAAAAAAAAAAAAAAAAAAAAAAAAAAAAAAAAn9/fwDy8vIDzMzMAMDA/wB/f38AAAAAAAAAAAAAAAAAAAAAAAAAAAAhAAAAGAAAABQAAABMBQAAJwoAANg0AAA+HQAAAAAAACYAAAAIAAAAAQAAAAAAAAA="/>
+                <pr:smNativeData xmlns:pr="smNativeData" val="SMDATA_13_TQCXXhMAAAAlAAAAZAAAAA8BAAAAkAAAAEgAAACQAAAASAAAAAAAAAAAAAAAAAAAAAEAAABQAAAAAAAAAAAA4D8AAAAAAADgPwAAAAAAAOA/AAAAAAAA4D8AAAAAAADgPwAAAAAAAOA/AAAAAAAA4D8AAAAAAADgPwAAAAAAAOA/AAAAAAAA4D8CAAAAjAAAAAAAAAAAAAAAg8C6DP///wgAAAAAAAAAAAAAAAAAAAAAAAAAAAAAAAAAAAAAZAAAAAEAAABAAAAAAAAAAAAAAAAAAAAAAAAAAAAAAAAAAAAAAAAAAAAAAAAAAAAAAAAAAAAAAAAAAAAAAAAAAAAAAAAAAAAAAAAAAAAAAAAAAAAAAAAAAAAAAAAAAAAAFAAAADwAAAAAAAAAAAAAAAAAAAkUAAAAAQAAABQAAAAUAAAAFAAAAAEAAAAAAAAAZAAAAGQAAAAAAAAAZAAAAGQAAAAVAAAAYAAAAAAAAAAAAAAADwAAACADAAAAAAAAAAAAAAEAAACgMgAAVgcAAKr4//8BAAAAf39/AAEAAABkAAAAAAAAABQAAABAHwAAAAAAACYAAAAAAAAAwOD//wAAAAAmAAAAZAAAABYAAABMAAAAAAAAAAAAAAAEAAAAAAAAAAEAAADy8vIKAAAAACgAAAAoAAAAZAAAAGQAAAAAAAAAzMzMAAAAAABQAAAAUAAAAGQAAABkAAAAAAAAABcAAAAUAAAAAAAAAAAAAAD/fwAA/38AAAAAAAAJAAAABAAAAPBElAMMAAAAEAAAAAAAAAAAAAAAAAAAAAAAAAAeAAAAaAAAAAAAAAAAAAAAAAAAAAAAAAAAAAAAECcAABAnAAAAAAAAAAAAAAAAAAAAAAAAAAAAAAAAAAAAAAAAAAAAABQAAAAAAAAAwMD/AAAAAABkAAAAMgAAAAAAAABkAAAAAAAAAH9/fwAKAAAAHwAAAFQAAACDwLoF////AQAAAAAAAAAAAAAAAAAAAAAAAAAAAAAAAAAAAAAAAAAAAAAAAn9/fwDy8vIDzMzMAMDA/wB/f38AAAAAAAAAAAAAAAAAAAAAAAAAAAAhAAAAGAAAABQAAABMBQAAJwoAANg0AAA+HQAAEAAAACYAAAAIAAAAAQAAAAAAAAA="/>
               </a:ext>
             </a:extLst>
           </p:cNvSpPr>
@@ -4158,7 +4158,7 @@
             <a:spLocks noGrp="1" noChangeArrowheads="1"/>
             <a:extLst>
               <a:ext uri="smNativeData">
-                <pr:smNativeData xmlns:pr="smNativeData" val="SMDATA_13_qYmVXhMAAAAlAAAAZAAAAA8BAAAAkAAAAEgAAACQAAAASAAAAAAAAAABAAAAAAAAAAEAAABQAAAAAAAAAAAA4D8AAAAAAADgPwAAAAAAAOA/AAAAAAAA4D8AAAAAAADgPwAAAAAAAOA/AAAAAAAA4D8AAAAAAADgPwAAAAAAAOA/AAAAAAAA4D8CAAAAjAAAAAEAAAAAAAAA////CP///wgAAAAAAAAAAAAAAAAAAAAAAAAAAAAAAAAAAAAAZAAAAAEAAABAAAAAAAAAAAAAAAAAAAAAAAAAAAAAAAAAAAAAAAAAAAAAAAAAAAAAAAAAAAAAAAAAAAAAAAAAAAAAAAAAAAAAAAAAAAAAAAAAAAAAAAAAAAAAAAAAAAAAFAAAADwAAAABAAAAAAAAAAAAAAkoAAAAAQAAABQAAAAUAAAAFAAAAAEAAAAAAAAAZAAAAGQAAAAAAAAAZAAAAGQAAAAVAAAAYAAAAAAAAAAAAAAADwAAACADAAAAAAAAAAAAAAEAAACgMgAAVgcAAKr4//8BAAAAf39/AAEAAABkAAAAAAAAABQAAABAHwAAAAAAACYAAAAAAAAAwOD//wAAAAAmAAAAZAAAABYAAABMAAAAAAAAAAAAAAAEAAAAAAAAAAEAAADy8vIKAAAAACgAAAAoAAAAZAAAAGQAAAAAAAAAzMzMAAAAAABQAAAAUAAAAGQAAABkAAAAAAAAABcAAAAUAAAAAAAAAAAAAAD/fwAA/38AAAAAAAAJAAAABAAAAAAAAAAMAAAAEAAAAAAAAAAAAAAAAAAAAAAAAAAeAAAAaAAAAAAAAAAAAAAAAAAAAAAAAAAAAAAAECcAABAnAAAAAAAAAAAAAAAAAAAAAAAAAAAAAAAAAAAAAAAAAAAAABQAAAAAAAAAwMD/AAAAAABkAAAAMgAAAAAAAABkAAAAAAAAAH9/fwAKAAAAHwAAAFQAAAD///8B////AQAAAAAAAAAAAAAAAAAAAAAAAAAAAAAAAAAAAAAAAAAAAAAAAn9/fwDy8vIDzMzMAMDA/wB/f38AAAAAAAAAAAAAAAAAAAAAAAAAAAAhAAAAGAAAABQAAAD+BwAASQMAAJUsAAAQBwAAAAAAACYAAAAIAAAAAQAAAAAAAAA="/>
+                <pr:smNativeData xmlns:pr="smNativeData" val="SMDATA_13_TQCXXhMAAAAlAAAAZAAAAA8BAAAAkAAAAEgAAACQAAAASAAAAAAAAAABAAAAAAAAAAEAAABQAAAAAAAAAAAA4D8AAAAAAADgPwAAAAAAAOA/AAAAAAAA4D8AAAAAAADgPwAAAAAAAOA/AAAAAAAA4D8AAAAAAADgPwAAAAAAAOA/AAAAAAAA4D8CAAAAjAAAAAEAAAAAAAAA////CP///wgAAAAAAAAAAAAAAAAAAAAAAAAAAAAAAAAAAAAAZAAAAAEAAABAAAAAAAAAAAAAAAAAAAAAAAAAAAAAAAAAAAAAAAAAAAAAAAAAAAAAAAAAAAAAAAAAAAAAAAAAAAAAAAAAAAAAAAAAAAAAAAAAAAAAAAAAAAAAAAAAAAAAFAAAADwAAAABAAAAAAAAAAAAAAkoAAAAAQAAABQAAAAUAAAAFAAAAAEAAAAAAAAAZAAAAGQAAAAAAAAAZAAAAGQAAAAVAAAAYAAAAAAAAAAAAAAADwAAACADAAAAAAAAAAAAAAEAAACgMgAAVgcAAKr4//8BAAAAf39/AAEAAABkAAAAAAAAABQAAABAHwAAAAAAACYAAAAAAAAAwOD//wAAAAAmAAAAZAAAABYAAABMAAAAAAAAAAAAAAAEAAAAAAAAAAEAAADy8vIKAAAAACgAAAAoAAAAZAAAAGQAAAAAAAAAzMzMAAAAAABQAAAAUAAAAGQAAABkAAAAAAAAABcAAAAUAAAAAAAAAAAAAAD/fwAA/38AAAAAAAAJAAAABAAAAAAAAAAMAAAAEAAAAAAAAAAAAAAAAAAAAAAAAAAeAAAAaAAAAAAAAAAAAAAAAAAAAAAAAAAAAAAAECcAABAnAAAAAAAAAAAAAAAAAAAAAAAAAAAAAAAAAAAAAAAAAAAAABQAAAAAAAAAwMD/AAAAAABkAAAAMgAAAAAAAABkAAAAAAAAAH9/fwAKAAAAHwAAAFQAAAD///8B////AQAAAAAAAAAAAAAAAAAAAAAAAAAAAAAAAAAAAAAAAAAAAAAAAn9/fwDy8vIDzMzMAMDA/wB/f38AAAAAAAAAAAAAAAAAAAAAAAAAAAAhAAAAGAAAABQAAAD+BwAASQMAAJUsAAAQBwAAEAAAACYAAAAIAAAAAQAAAAAAAAA="/>
               </a:ext>
             </a:extLst>
           </p:cNvSpPr>
@@ -4192,7 +4192,7 @@
             <a:spLocks noGrp="1" noChangeArrowheads="1"/>
             <a:extLst>
               <a:ext uri="smNativeData">
-                <pr:smNativeData xmlns:pr="smNativeData" val="SMDATA_13_qYmVXhMAAAAlAAAAZAAAAA8BAAAAkAAAAEgAAACQAAAASAAAAAAAAAAAAAAAAAAAAAEAAABQAAAAAAAAAAAA4D8AAAAAAADgPwAAAAAAAOA/AAAAAAAA4D8AAAAAAADgPwAAAAAAAOA/AAAAAAAA4D8AAAAAAADgPwAAAAAAAOA/AAAAAAAA4D8CAAAAjAAAAAAAAAAAAAAAg8C6DP///wgAAAAAAAAAAAAAAAAAAAAAAAAAAAAAAAAAAAAAZAAAAAEAAABAAAAAAAAAAAAAAAAAAAAAAAAAAAAAAAAAAAAAAAAAAAAAAAAAAAAAAAAAAAAAAAAAAAAAAAAAAAAAAAAAAAAAAAAAAAAAAAAAAAAAAAAAAAAAAAAAAAAAFAAAADwAAAAAAAAAAAAAAAAAAAkUAAAAAQAAABQAAAAUAAAAFAAAAAEAAAAAAAAAZAAAAGQAAAAAAAAAZAAAAGQAAAAVAAAAYAAAAAAAAAAAAAAADwAAACADAAAAAAAAAAAAAAEAAACgMgAAVgcAAKr4//8BAAAAf39/AAEAAABkAAAAAAAAABQAAABAHwAAAAAAACYAAAAAAAAAwOD//wAAAAAmAAAAZAAAABYAAABMAAAAAAAAAAAAAAAEAAAAAAAAAAEAAADy8vIKAAAAACgAAAAoAAAAZAAAAGQAAAAAAAAAzMzMAAAAAABQAAAAUAAAAGQAAABkAAAAAAAAABcAAAAUAAAAAAAAAAAAAAD/fwAA/38AAAAAAAAJAAAABAAAAEwAaQAMAAAAEAAAAAAAAAAAAAAAAAAAAAAAAAAeAAAAaAAAAAAAAAAAAAAAAAAAAAAAAAAAAAAAECcAABAnAAAAAAAAAAAAAAAAAAAAAAAAAAAAAAAAAAAAAAAAAAAAABQAAAAAAAAAwMD/AAAAAABkAAAAMgAAAAAAAABkAAAAAAAAAH9/fwAKAAAAHwAAAFQAAACDwLoF////AQAAAAAAAAAAAAAAAAAAAAAAAAAAAAAAAAAAAAAAAAAAAAAAAn9/fwDy8vIDzMzMAMDA/wB/f38AAAAAAAAAAAAAAAAAAAAAAAAAAAAhAAAAGAAAABQAAABMBQAATxYAANg0AAAKHQAAAAAAACYAAAAIAAAAAQAAAAAAAAA="/>
+                <pr:smNativeData xmlns:pr="smNativeData" val="SMDATA_13_TQCXXhMAAAAlAAAAZAAAAA8BAAAAkAAAAEgAAACQAAAASAAAAAAAAAAAAAAAAAAAAAEAAABQAAAAAAAAAAAA4D8AAAAAAADgPwAAAAAAAOA/AAAAAAAA4D8AAAAAAADgPwAAAAAAAOA/AAAAAAAA4D8AAAAAAADgPwAAAAAAAOA/AAAAAAAA4D8CAAAAjAAAAAAAAAAAAAAAg8C6DP///wgAAAAAAAAAAAAAAAAAAAAAAAAAAAAAAAAAAAAAZAAAAAEAAABAAAAAAAAAAAAAAAAAAAAAAAAAAAAAAAAAAAAAAAAAAAAAAAAAAAAAAAAAAAAAAAAAAAAAAAAAAAAAAAAAAAAAAAAAAAAAAAAAAAAAAAAAAAAAAAAAAAAAFAAAADwAAAAAAAAAAAAAAAAAAAkUAAAAAQAAABQAAAAUAAAAFAAAAAEAAAAAAAAAZAAAAGQAAAAAAAAAZAAAAGQAAAAVAAAAYAAAAAAAAAAAAAAADwAAACADAAAAAAAAAAAAAAEAAACgMgAAVgcAAKr4//8BAAAAf39/AAEAAABkAAAAAAAAABQAAABAHwAAAAAAACYAAAAAAAAAwOD//wAAAAAmAAAAZAAAABYAAABMAAAAAAAAAAAAAAAEAAAAAAAAAAEAAADy8vIKAAAAACgAAAAoAAAAZAAAAGQAAAAAAAAAzMzMAAAAAABQAAAAUAAAAGQAAABkAAAAAAAAABcAAAAUAAAAAAAAAAAAAAD/fwAA/38AAAAAAAAJAAAABAAAAEwAaQAMAAAAEAAAAAAAAAAAAAAAAAAAAAAAAAAeAAAAaAAAAAAAAAAAAAAAAAAAAAAAAAAAAAAAECcAABAnAAAAAAAAAAAAAAAAAAAAAAAAAAAAAAAAAAAAAAAAAAAAABQAAAAAAAAAwMD/AAAAAABkAAAAMgAAAAAAAABkAAAAAAAAAH9/fwAKAAAAHwAAAFQAAACDwLoF////AQAAAAAAAAAAAAAAAAAAAAAAAAAAAAAAAAAAAAAAAAAAAAAAAn9/fwDy8vIDzMzMAMDA/wB/f38AAAAAAAAAAAAAAAAAAAAAAAAAAAAhAAAAGAAAABQAAABMBQAATxYAANg0AAAKHQAAEAAAACYAAAAIAAAAAQAAAAAAAAA="/>
               </a:ext>
             </a:extLst>
           </p:cNvSpPr>
@@ -4241,7 +4241,7 @@
           <p:cNvSpPr txBox="1">
             <a:extLst>
               <a:ext uri="smNativeData">
-                <pr:smNativeData xmlns:pr="smNativeData" val="SMDATA_13_qYmVXhMAAAAlAAAAEgAAAA8BAAAAkAAAAEgAAACQAAAASAAAAAAAAAAAAAAAAAAAAAEAAABQAAAAAAAAAAAA4D8AAAAAAADgPwAAAAAAAOA/AAAAAAAA4D8AAAAAAADgPwAAAAAAAOA/AAAAAAAA4D8AAAAAAADgPwAAAAAAAOA/AAAAAAAA4D8CAAAAjAAAAAAAAAAAAAAAg8C6DP///wgAAAAAAAAAAAAAAAAAAAAAAAAAAAAAAAAAAAAAZAAAAAEAAABAAAAAAAAAAAAAAAAAAAAAAAAAAAAAAAAAAAAAAAAAAAAAAAAAAAAAAAAAAAAAAAAAAAAAAAAAAAAAAAAAAAAAAAAAAAAAAAAAAAAAAAAAAAAAAAAAAAAAFAAAADwAAAAAAAAAAAAAAAAAAAkUAAAAAQAAABQAAAAUAAAAFAAAAAEAAAAAAAAAZAAAAGQAAAAAAAAAZAAAAGQAAAAVAAAAYAAAAAAAAAAAAAAADwAAACADAAAAAAAAAAAAAAEAAACgMgAAVgcAAKr4//8BAAAAf39/AAEAAABkAAAAAAAAABQAAABAHwAAAAAAACYAAAAAAAAAwOD//wAAAAAmAAAAZAAAABYAAABMAAAAAAAAAAAAAAAEAAAAAAAAAAEAAADy8vIKAAAAACgAAAAoAAAAZAAAAGQAAAAAAAAAzMzMAAAAAABQAAAAUAAAAGQAAABkAAAAAAAAABcAAAAUAAAAAAAAAAAAAAD/fwAA/38AAAAAAAAJAAAABAAAAAAAAAAMAAAAEAAAAAAAAAAAAAAAAAAAAAAAAAAeAAAAaAAAAAAAAAAAAAAAAAAAAAAAAAAAAAAAECcAABAnAAAAAAAAAAAAAAAAAAAAAAAAAAAAAAAAAAAAAAAAAAAAABQAAAAAAAAAwMD/AAAAAABkAAAAMgAAAAAAAABkAAAAAAAAAH9/fwAKAAAAHwAAAFQAAACDwLoF////AQAAAAAAAAAAAAAAAAAAAAAAAAAAAAAAAAAAAAAAAAAAAAAAAn9/fwDy8vIDzMzMAMDA/wB/f38AAAAAAAAAAAAAAAAAAAAAAAAAAAAhAAAAGAAAABQAAABMBQAA1gcAANg0AACRDgAAAAAAACYAAAAIAAAA//////////8="/>
+                <pr:smNativeData xmlns:pr="smNativeData" val="SMDATA_13_TQCXXhMAAAAlAAAAEgAAAA8BAAAAkAAAAEgAAACQAAAASAAAAAAAAAAAAAAAAAAAAAEAAABQAAAAAAAAAAAA4D8AAAAAAADgPwAAAAAAAOA/AAAAAAAA4D8AAAAAAADgPwAAAAAAAOA/AAAAAAAA4D8AAAAAAADgPwAAAAAAAOA/AAAAAAAA4D8CAAAAjAAAAAAAAAAAAAAAg8C6DP///wgAAAAAAAAAAAAAAAAAAAAAAAAAAAAAAAAAAAAAZAAAAAEAAABAAAAAAAAAAAAAAAAAAAAAAAAAAAAAAAAAAAAAAAAAAAAAAAAAAAAAAAAAAAAAAAAAAAAAAAAAAAAAAAAAAAAAAAAAAAAAAAAAAAAAAAAAAAAAAAAAAAAAFAAAADwAAAAAAAAAAAAAAAAAAAkUAAAAAQAAABQAAAAUAAAAFAAAAAEAAAAAAAAAZAAAAGQAAAAAAAAAZAAAAGQAAAAVAAAAYAAAAAAAAAAAAAAADwAAACADAAAAAAAAAAAAAAEAAACgMgAAVgcAAKr4//8BAAAAf39/AAEAAABkAAAAAAAAABQAAABAHwAAAAAAACYAAAAAAAAAwOD//wAAAAAmAAAAZAAAABYAAABMAAAAAAAAAAAAAAAEAAAAAAAAAAEAAADy8vIKAAAAACgAAAAoAAAAZAAAAGQAAAAAAAAAzMzMAAAAAABQAAAAUAAAAGQAAABkAAAAAAAAABcAAAAUAAAAAAAAAAAAAAD/fwAA/38AAAAAAAAJAAAABAAAAAAAAAAMAAAAEAAAAAAAAAAAAAAAAAAAAAAAAAAeAAAAaAAAAAAAAAAAAAAAAAAAAAAAAAAAAAAAECcAABAnAAAAAAAAAAAAAAAAAAAAAAAAAAAAAAAAAAAAAAAAAAAAABQAAAAAAAAAwMD/AAAAAABkAAAAMgAAAAAAAABkAAAAAAAAAH9/fwAKAAAAHwAAAFQAAACDwLoF////AQAAAAAAAAAAAAAAAAAAAAAAAAAAAAAAAAAAAAAAAAAAAAAAAn9/fwDy8vIDzMzMAMDA/wB/f38AAAAAAAAAAAAAAAAAAAAAAAAAAAAhAAAAGAAAABQAAABMBQAA1gcAANg0AACRDgAAEAAAACYAAAAIAAAA//////////8="/>
               </a:ext>
             </a:extLst>
           </p:cNvSpPr>
@@ -4340,7 +4340,7 @@
           <p:cNvSpPr txBox="1">
             <a:extLst>
               <a:ext uri="smNativeData">
-                <pr:smNativeData xmlns:pr="smNativeData" val="SMDATA_13_qYmVXhMAAAAlAAAAEgAAAA8BAAAAkAAAAEgAAACQAAAASAAAAAAAAAABAAAAAAAAAAEAAABQAAAAAAAAAAAA4D8AAAAAAADgPwAAAAAAAOA/AAAAAAAA4D8AAAAAAADgPwAAAAAAAOA/AAAAAAAA4D8AAAAAAADgPwAAAAAAAOA/AAAAAAAA4D8CAAAAjAAAAAEAAAAAAAAA////CP///wgAAAAAAAAAAAAAAAAAAAAAAAAAAAAAAAAAAAAAZAAAAAEAAABAAAAAAAAAAAAAAAAAAAAAAAAAAAAAAAAAAAAAAAAAAAAAAAAAAAAAAAAAAAAAAAAAAAAAAAAAAAAAAAAAAAAAAAAAAAAAAAAAAAAAAAAAAAAAAAAAAAAAFAAAADwAAAABAAAAAAAAAAAAAAkoAAAAAQAAABQAAAAUAAAAFAAAAAEAAAAAAAAAZAAAAGQAAAAAAAAAZAAAAGQAAAAVAAAAYAAAAAAAAAAAAAAADwAAACADAAAAAAAAAAAAAAEAAACgMgAAVgcAAKr4//8BAAAAf39/AAEAAABkAAAAAAAAABQAAABAHwAAAAAAACYAAAAAAAAAwOD//wAAAAAmAAAAZAAAABYAAABMAAAAAAAAAAAAAAAEAAAAAAAAAAEAAADy8vIKAAAAACgAAAAoAAAAZAAAAGQAAAAAAAAAzMzMAAAAAABQAAAAUAAAAGQAAABkAAAAAAAAABcAAAAUAAAAAAAAAAAAAAD/fwAA/38AAAAAAAAJAAAABAAAAAAAAAAMAAAAEAAAAAAAAAAAAAAAAAAAAAAAAAAeAAAAaAAAAAAAAAAAAAAAAAAAAAAAAAAAAAAAECcAABAnAAAAAAAAAAAAAAAAAAAAAAAAAAAAAAAAAAAAAAAAAAAAABQAAAAAAAAAwMD/AAAAAABkAAAAMgAAAAAAAABkAAAAAAAAAH9/fwAKAAAAHwAAAFQAAAD///8B////AQAAAAAAAAAAAAAAAAAAAAAAAAAAAAAAAAAAAAAAAAAAAAAAAn9/fwDy8vIDzMzMAMDA/wB/f38AAAAAAAAAAAAAAAAAAAAAAAAAAAAhAAAAGAAAABQAAADyBwAAyxEAAIksAACSFQAAAAAAACYAAAAIAAAA//////////8="/>
+                <pr:smNativeData xmlns:pr="smNativeData" val="SMDATA_13_TQCXXhMAAAAlAAAAEgAAAA8BAAAAkAAAAEgAAACQAAAASAAAAAAAAAABAAAAAAAAAAEAAABQAAAAAAAAAAAA4D8AAAAAAADgPwAAAAAAAOA/AAAAAAAA4D8AAAAAAADgPwAAAAAAAOA/AAAAAAAA4D8AAAAAAADgPwAAAAAAAOA/AAAAAAAA4D8CAAAAjAAAAAEAAAAAAAAA////CP///wgAAAAAAAAAAAAAAAAAAAAAAAAAAAAAAAAAAAAAZAAAAAEAAABAAAAAAAAAAAAAAAAAAAAAAAAAAAAAAAAAAAAAAAAAAAAAAAAAAAAAAAAAAAAAAAAAAAAAAAAAAAAAAAAAAAAAAAAAAAAAAAAAAAAAAAAAAAAAAAAAAAAAFAAAADwAAAABAAAAAAAAAAAAAAkoAAAAAQAAABQAAAAUAAAAFAAAAAEAAAAAAAAAZAAAAGQAAAAAAAAAZAAAAGQAAAAVAAAAYAAAAAAAAAAAAAAADwAAACADAAAAAAAAAAAAAAEAAACgMgAAVgcAAKr4//8BAAAAf39/AAEAAABkAAAAAAAAABQAAABAHwAAAAAAACYAAAAAAAAAwOD//wAAAAAmAAAAZAAAABYAAABMAAAAAAAAAAAAAAAEAAAAAAAAAAEAAADy8vIKAAAAACgAAAAoAAAAZAAAAGQAAAAAAAAAzMzMAAAAAABQAAAAUAAAAGQAAABkAAAAAAAAABcAAAAUAAAAAAAAAAAAAAD/fwAA/38AAAAAAAAJAAAABAAAAAAAAAAMAAAAEAAAAAAAAAAAAAAAAAAAAAAAAAAeAAAAaAAAAAAAAAAAAAAAAAAAAAAAAAAAAAAAECcAABAnAAAAAAAAAAAAAAAAAAAAAAAAAAAAAAAAAAAAAAAAAAAAABQAAAAAAAAAwMD/AAAAAABkAAAAMgAAAAAAAABkAAAAAAAAAH9/fwAKAAAAHwAAAFQAAAD///8B////AQAAAAAAAAAAAAAAAAAAAAAAAAAAAAAAAAAAAAAAAAAAAAAAAn9/fwDy8vIDzMzMAMDA/wB/f38AAAAAAAAAAAAAAAAAAAAAAAAAAAAhAAAAGAAAABQAAADyBwAAyxEAAIksAACSFQAAEAAAACYAAAAIAAAA//////////8="/>
               </a:ext>
             </a:extLst>
           </p:cNvSpPr>
@@ -4427,7 +4427,7 @@
             <a:spLocks noGrp="1" noChangeArrowheads="1"/>
             <a:extLst>
               <a:ext uri="smNativeData">
-                <pr:smNativeData xmlns:pr="smNativeData" val="SMDATA_13_qYmVXhMAAAAlAAAAZAAAAA8BAAAAkAAAAEgAAACQAAAASAAAAAAAAAABAAAAAAAAAAEAAABQAAAAAAAAAAAA4D8AAAAAAADgPwAAAAAAAOA/AAAAAAAA4D8AAAAAAADgPwAAAAAAAOA/AAAAAAAA4D8AAAAAAADgPwAAAAAAAOA/AAAAAAAA4D8CAAAAjAAAAAEAAAAAAAAA////CP///wgAAAAAAAAAAAAAAAAAAAAAAAAAAAAAAAAAAAAAZAAAAAEAAABAAAAAAAAAAAAAAAAAAAAAAAAAAAAAAAAAAAAAAAAAAAAAAAAAAAAAAAAAAAAAAAAAAAAAAAAAAAAAAAAAAAAAAAAAAAAAAAAAAAAAAAAAAAAAAAAAAAAAFAAAADwAAAABAAAAAAAAAAAAAAkoAAAAAQAAABQAAAAUAAAAFAAAAAEAAAAAAAAAZAAAAGQAAAAAAAAAZAAAAGQAAAAVAAAAYAAAAAAAAAAAAAAADwAAACADAAAAAAAAAAAAAAEAAACgMgAAVgcAAKr4//8BAAAAf39/AAEAAABkAAAAAAAAABQAAABAHwAAAAAAACYAAAAAAAAAwOD//wAAAAAmAAAAZAAAABYAAABMAAAAAAAAAAAAAAAEAAAAAAAAAAEAAADy8vIKAAAAACgAAAAoAAAAZAAAAGQAAAAAAAAAzMzMAAAAAABQAAAAUAAAAGQAAABkAAAAAAAAABcAAAAUAAAAAAAAAAAAAAD/fwAA/38AAAAAAAAJAAAABAAAAAAAAAAMAAAAEAAAAAAAAAAAAAAAAAAAAAAAAAAeAAAAaAAAAAAAAAAAAAAAAAAAAAAAAAAAAAAAECcAABAnAAAAAAAAAAAAAAAAAAAAAAAAAAAAAAAAAAAAAAAAAAAAABQAAAAAAAAAwMD/AAAAAABkAAAAMgAAAAAAAABkAAAAAAAAAH9/fwAKAAAAHwAAAFQAAAD///8B////AQAAAAAAAAAAAAAAAAAAAAAAAAAAAAAAAAAAAAAAAAAAAAAAAn9/fwDy8vIDzMzMAMDA/wB/f38AAAAAAAAAAAAAAAAAAAAAAAAAAAAhAAAAGAAAABQAAAD+BwAASQMAAJUsAAAQBwAAAAAAACYAAAAIAAAAAQAAAAAAAAA="/>
+                <pr:smNativeData xmlns:pr="smNativeData" val="SMDATA_13_TQCXXhMAAAAlAAAAZAAAAA8BAAAAkAAAAEgAAACQAAAASAAAAAAAAAABAAAAAAAAAAEAAABQAAAAAAAAAAAA4D8AAAAAAADgPwAAAAAAAOA/AAAAAAAA4D8AAAAAAADgPwAAAAAAAOA/AAAAAAAA4D8AAAAAAADgPwAAAAAAAOA/AAAAAAAA4D8CAAAAjAAAAAEAAAAAAAAA////CP///wgAAAAAAAAAAAAAAAAAAAAAAAAAAAAAAAAAAAAAZAAAAAEAAABAAAAAAAAAAAAAAAAAAAAAAAAAAAAAAAAAAAAAAAAAAAAAAAAAAAAAAAAAAAAAAAAAAAAAAAAAAAAAAAAAAAAAAAAAAAAAAAAAAAAAAAAAAAAAAAAAAAAAFAAAADwAAAABAAAAAAAAAAAAAAkoAAAAAQAAABQAAAAUAAAAFAAAAAEAAAAAAAAAZAAAAGQAAAAAAAAAZAAAAGQAAAAVAAAAYAAAAAAAAAAAAAAADwAAACADAAAAAAAAAAAAAAEAAACgMgAAVgcAAKr4//8BAAAAf39/AAEAAABkAAAAAAAAABQAAABAHwAAAAAAACYAAAAAAAAAwOD//wAAAAAmAAAAZAAAABYAAABMAAAAAAAAAAAAAAAEAAAAAAAAAAEAAADy8vIKAAAAACgAAAAoAAAAZAAAAGQAAAAAAAAAzMzMAAAAAABQAAAAUAAAAGQAAABkAAAAAAAAABcAAAAUAAAAAAAAAAAAAAD/fwAA/38AAAAAAAAJAAAABAAAAAAAAAAMAAAAEAAAAAAAAAAAAAAAAAAAAAAAAAAeAAAAaAAAAAAAAAAAAAAAAAAAAAAAAAAAAAAAECcAABAnAAAAAAAAAAAAAAAAAAAAAAAAAAAAAAAAAAAAAAAAAAAAABQAAAAAAAAAwMD/AAAAAABkAAAAMgAAAAAAAABkAAAAAAAAAH9/fwAKAAAAHwAAAFQAAAD///8B////AQAAAAAAAAAAAAAAAAAAAAAAAAAAAAAAAAAAAAAAAAAAAAAAAn9/fwDy8vIDzMzMAMDA/wB/f38AAAAAAAAAAAAAAAAAAAAAAAAAAAAhAAAAGAAAABQAAAD+BwAASQMAAJUsAAAQBwAAEAAAACYAAAAIAAAAAQAAAAAAAAA="/>
               </a:ext>
             </a:extLst>
           </p:cNvSpPr>
@@ -4461,7 +4461,7 @@
             <a:spLocks noGrp="1" noChangeArrowheads="1"/>
             <a:extLst>
               <a:ext uri="smNativeData">
-                <pr:smNativeData xmlns:pr="smNativeData" val="SMDATA_13_qYmVXhMAAAAlAAAAZAAAAA8BAAAAkAAAAEgAAACQAAAASAAAAAAAAAAAAAAAAAAAAAEAAABQAAAAAAAAAAAA4D8AAAAAAADgPwAAAAAAAOA/AAAAAAAA4D8AAAAAAADgPwAAAAAAAOA/AAAAAAAA4D8AAAAAAADgPwAAAAAAAOA/AAAAAAAA4D8CAAAAjAAAAAAAAAAAAAAAg8C6DP///wgAAAAAAAAAAAAAAAAAAAAAAAAAAAAAAAAAAAAAZAAAAAEAAABAAAAAAAAAAAAAAAAAAAAAAAAAAAAAAAAAAAAAAAAAAAAAAAAAAAAAAAAAAAAAAAAAAAAAAAAAAAAAAAAAAAAAAAAAAAAAAAAAAAAAAAAAAAAAAAAAAAAAFAAAADwAAAAAAAAAAAAAAAAAAAkUAAAAAQAAABQAAAAUAAAAFAAAAAEAAAAAAAAAZAAAAGQAAAAAAAAAZAAAAGQAAAAVAAAAYAAAAAAAAAAAAAAADwAAACADAAAAAAAAAAAAAAEAAACgMgAAVgcAAKr4//8BAAAAf39/AAEAAABkAAAAAAAAABQAAABAHwAAAAAAACYAAAAAAAAAwOD//wAAAAAmAAAAZAAAABYAAABMAAAAAAAAAAAAAAAEAAAAAAAAAAEAAADy8vIKAAAAACgAAAAoAAAAZAAAAGQAAAAAAAAAzMzMAAAAAABQAAAAUAAAAGQAAABkAAAAAAAAABcAAAAUAAAAAAAAAAAAAAD/fwAA/38AAAAAAAAJAAAABAAAAAAAAAAMAAAAEAAAAAAAAAAAAAAAAAAAAAAAAAAeAAAAaAAAAAAAAAAAAAAAAAAAAAAAAAAAAAAAECcAABAnAAAAAAAAAAAAAAAAAAAAAAAAAAAAAAAAAAAAAAAAAAAAABQAAAAAAAAAwMD/AAAAAABkAAAAMgAAAAAAAABkAAAAAAAAAH9/fwAKAAAAHwAAAFQAAACDwLoF////AQAAAAAAAAAAAAAAAAAAAAAAAAAAAAAAAAAAAAAAAAAAAAAAAn9/fwDy8vIDzMzMAMDA/wB/f38AAAAAAAAAAAAAAAAAAAAAAAAAAAAhAAAAGAAAABQAAABMBQAAJwoAANg0AAA+HQAAAAAAACYAAAAIAAAAAQAAAAAAAAA="/>
+                <pr:smNativeData xmlns:pr="smNativeData" val="SMDATA_13_TQCXXhMAAAAlAAAAZAAAAA8BAAAAkAAAAEgAAACQAAAASAAAAAAAAAAAAAAAAAAAAAEAAABQAAAAAAAAAAAA4D8AAAAAAADgPwAAAAAAAOA/AAAAAAAA4D8AAAAAAADgPwAAAAAAAOA/AAAAAAAA4D8AAAAAAADgPwAAAAAAAOA/AAAAAAAA4D8CAAAAjAAAAAAAAAAAAAAAg8C6DP///wgAAAAAAAAAAAAAAAAAAAAAAAAAAAAAAAAAAAAAZAAAAAEAAABAAAAAAAAAAAAAAAAAAAAAAAAAAAAAAAAAAAAAAAAAAAAAAAAAAAAAAAAAAAAAAAAAAAAAAAAAAAAAAAAAAAAAAAAAAAAAAAAAAAAAAAAAAAAAAAAAAAAAFAAAADwAAAAAAAAAAAAAAAAAAAkUAAAAAQAAABQAAAAUAAAAFAAAAAEAAAAAAAAAZAAAAGQAAAAAAAAAZAAAAGQAAAAVAAAAYAAAAAAAAAAAAAAADwAAACADAAAAAAAAAAAAAAEAAACgMgAAVgcAAKr4//8BAAAAf39/AAEAAABkAAAAAAAAABQAAABAHwAAAAAAACYAAAAAAAAAwOD//wAAAAAmAAAAZAAAABYAAABMAAAAAAAAAAAAAAAEAAAAAAAAAAEAAADy8vIKAAAAACgAAAAoAAAAZAAAAGQAAAAAAAAAzMzMAAAAAABQAAAAUAAAAGQAAABkAAAAAAAAABcAAAAUAAAAAAAAAAAAAAD/fwAA/38AAAAAAAAJAAAABAAAAAAAAAAMAAAAEAAAAAAAAAAAAAAAAAAAAAAAAAAeAAAAaAAAAAAAAAAAAAAAAAAAAAAAAAAAAAAAECcAABAnAAAAAAAAAAAAAAAAAAAAAAAAAAAAAAAAAAAAAAAAAAAAABQAAAAAAAAAwMD/AAAAAABkAAAAMgAAAAAAAABkAAAAAAAAAH9/fwAKAAAAHwAAAFQAAACDwLoF////AQAAAAAAAAAAAAAAAAAAAAAAAAAAAAAAAAAAAAAAAAAAAAAAAn9/fwDy8vIDzMzMAMDA/wB/f38AAAAAAAAAAAAAAAAAAAAAAAAAAAAhAAAAGAAAABQAAABMBQAAJwoAANg0AAA+HQAAEAAAACYAAAAIAAAAAQAAAAAAAAA="/>
               </a:ext>
             </a:extLst>
           </p:cNvSpPr>
@@ -4500,6 +4500,1467 @@
             </a:pPr>
             <a:r>
               <a:t>Cascading db entry updates</a:t>
+            </a:r>
+          </a:p>
+        </p:txBody>
+      </p:sp>
+      <p:sp>
+        <p:nvSpPr>
+          <p:cNvPr id="4" name="AutoShape1"/>
+          <p:cNvSpPr>
+            <a:extLst>
+              <a:ext uri="smNativeData">
+                <pr:smNativeData xmlns:pr="smNativeData" val="SMDATA_13_TQCXXhMAAAAlAAAAZQAAAA8BAAAAkAAAAEgAAACQAAAASAAAAAAAAAAAAAAAAAAAAAEAAABQAAAAVFVVVVVV1T8AAAAAAADgPwAAAAAAAOA/AAAAAAAA4D8AAAAAAADgPwAAAAAAAOA/AAAAAAAA4D8AAAAAAADgPwAAAAAAAOA/AAAAAAAA4D8CAAAAjAAAAAEAAAAAAAAAAJmZDv///wgAAAAAAAAAAAAAAAAAAAAAAAAAAAAAAAAAAAAAZAAAAAEAAABAAAAAAAAAAAAAAAAAAAAAAAAAAAAAAAAAAAAAAAAAAAAAAAAAAAAAAAAAAAAAAAAAAAAAAAAAAAAAAAAAAAAAAAAAAAAAAAAAAAAAAAAAAAAAAAAAAAAAFAAAADwAAAAAAAAAAAAAAP8A/wAUAAAAAQAAABQAAAAUAAAAFAAAAAEAAAAAAAAAZAAAAGQAAAAAAAAAZAAAAGQAAAAVAAAAYAAAAAAAAAAAAAAADwAAACADAAAAAAAAAAAAAAEAAACgMgAAVgcAAKr4//8BAAAAf39/AAEAAABkAAAAAAAAABQAAABAHwAAAAAAACYAAAAAAAAAwOD//wAAAAAmAAAAZAAAABYAAABMAAAAAAAAAAAAAAAEAAAAAAAAAAEAAADy8vIKAAAAACgAAAAoAAAAZAAAAGQAAAAAAAAAzMzMAAAAAABQAAAAUAAAAGQAAABkAAAAAAAAABcAAAAUAAAAAAAAAAAAAAD/fwAA/38AAAAAAAAJAAAABAAAAJAGAAAMAAAAEAAAAAAAAAAAAAAAAAAAAAAAAAAeAAAAaAAAAAAAAAAAAAAAAAAAAAAAAAAAAAAAECcAABAnAAAAAAAAAAAAAAAAAAAAAAAAAAAAAAAAAAAAAAAAAAAAABQAAAAAAAAAwMD/AAAAAABkAAAAMgAAAAAAAABkAAAAAAAAAH9/fwAKAAAAHwAAAFQAAAAAmZkH////AQAAAAAAAAAAAAAAAAAAAAAAAAAAAAAAAAAAAAAAAAAA/wD/AH9/fwDy8vIDzMzMAMDA/wB/f38AAAAAAAAAAAAAAAAAAAAAAAAAAAAhAAAAGAAAABQAAAD1BAAAyRIAAPsxAAB/HAAAAAAAACYAAAAIAAAA//////////8="/>
+              </a:ext>
+            </a:extLst>
+          </p:cNvSpPr>
+          <p:nvPr/>
+        </p:nvSpPr>
+        <p:spPr>
+          <a:xfrm>
+            <a:off x="805815" y="3053715"/>
+            <a:ext cx="7319010" cy="1578610"/>
+          </a:xfrm>
+          <a:prstGeom prst="roundRect">
+            <a:avLst>
+              <a:gd name="adj" fmla="val 16667"/>
+            </a:avLst>
+          </a:prstGeom>
+          <a:solidFill>
+            <a:schemeClr val="hlink"/>
+          </a:solidFill>
+          <a:ln>
+            <a:noFill/>
+          </a:ln>
+          <a:effectLst/>
+        </p:spPr>
+      </p:sp>
+      <p:sp>
+        <p:nvSpPr>
+          <p:cNvPr id="5" name="AutoShape2"/>
+          <p:cNvSpPr>
+            <a:extLst>
+              <a:ext uri="smNativeData">
+                <pr:smNativeData xmlns:pr="smNativeData" val="SMDATA_13_TQCXXhMAAAAlAAAAZQAAAA8BAAAAkAAAAEgAAACQAAAASAAAAAAAAAAAAAAAAAAAAAEAAABQAAAAVFVVVVVV1T8AAAAAAADgPwAAAAAAAOA/AAAAAAAA4D8AAAAAAADgPwAAAAAAAOA/AAAAAAAA4D8AAAAAAADgPwAAAAAAAOA/AAAAAAAA4D8CAAAAjAAAAAEAAAAAAAAAU1N5AP///wgAAAAAAAAAAAAAAAAAAAAAAAAAAAAAAAAAAAAAZAAAAAEAAABAAAAAAAAAAAAAAAAAAAAAAAAAAAAAAAAAAAAAAAAAAAAAAAAAAAAAAAAAAAAAAAAAAAAAAAAAAAAAAAAAAAAAAAAAAAAAAAAAAAAAAAAAAAAAAAAAAAAAFAAAADwAAAAAAAAAAAAAAP8A/wAUAAAAAQAAABQAAAAUAAAAFAAAAAEAAAAAAAAAZAAAAGQAAAAAAAAAZAAAAGQAAAAVAAAAYAAAAAAAAAAAAAAADwAAACADAAAAAAAAAAAAAAEAAACgMgAAVgcAAKr4//8BAAAAf39/AAEAAABkAAAAAAAAABQAAABAHwAAAAAAACYAAAAAAAAAwOD//wAAAAAmAAAAZAAAABYAAABMAAAAAAAAAAAAAAAEAAAAAAAAAAEAAADy8vIKAAAAACgAAAAoAAAAZAAAAGQAAAAAAAAAzMzMAAAAAABQAAAAUAAAAGQAAABkAAAAAAAAABcAAAAUAAAAAAAAAAAAAAD/fwAA/38AAAAAAAAJAAAABAAAAFEeAAAMAAAAEAAAAAAAAAAAAAAAAAAAAAAAAAAeAAAAaAAAAAAAAAAAAAAAAAAAAAAAAAAAAAAAECcAABAnAAAAAAAAAAAAAAAAAAAAAAAAAAAAAAAAAAAAAAAAAAAAABQAAAAAAAAAwMD/AAAAAABkAAAAMgAAAAAAAABkAAAAAAAAAH9/fwAKAAAAHwAAAFQAAABTU3kJ////AQAAAAAAAAAAAAAAAAAAAAAAAAAAAAAAAAAAAAAAAAAA/wD/AH9/fwDy8vIDzMzMAMDA/wB/f38AAAAAAAAAAAAAAAAAAAAAAAAAAAAhAAAAGAAAABQAAAC5BgAAMBUAAIYTAADPGwAAAAAAACYAAAAIAAAA//////////8="/>
+              </a:ext>
+            </a:extLst>
+          </p:cNvSpPr>
+          <p:nvPr/>
+        </p:nvSpPr>
+        <p:spPr>
+          <a:xfrm>
+            <a:off x="1092835" y="3444240"/>
+            <a:ext cx="2080895" cy="1076325"/>
+          </a:xfrm>
+          <a:prstGeom prst="roundRect">
+            <a:avLst>
+              <a:gd name="adj" fmla="val 16667"/>
+            </a:avLst>
+          </a:prstGeom>
+          <a:solidFill>
+            <a:schemeClr val="accent3"/>
+          </a:solidFill>
+          <a:ln>
+            <a:noFill/>
+          </a:ln>
+          <a:effectLst/>
+        </p:spPr>
+      </p:sp>
+      <p:sp>
+        <p:nvSpPr>
+          <p:cNvPr id="6" name="AutoShape3"/>
+          <p:cNvSpPr>
+            <a:extLst>
+              <a:ext uri="smNativeData">
+                <pr:smNativeData xmlns:pr="smNativeData" val="SMDATA_13_TQCXXhMAAAAlAAAAZQAAAA8BAAAAkAAAAEgAAACQAAAASAAAAAAAAAAAAAAAAAAAAAEAAABQAAAAVFVVVVVV1T8AAAAAAADgPwAAAAAAAOA/AAAAAAAA4D8AAAAAAADgPwAAAAAAAOA/AAAAAAAA4D8AAAAAAADgPwAAAAAAAOA/AAAAAAAA4D8CAAAAjAAAAAEAAAAAAAAAU1N5AP///wgAAAAAAAAAAAAAAAAAAAAAAAAAAAAAAAAAAAAAZAAAAAEAAABAAAAAAAAAAAAAAAAAAAAAAAAAAAAAAAAAAAAAAAAAAAAAAAAAAAAAAAAAAAAAAAAAAAAAAAAAAAAAAAAAAAAAAAAAAAAAAAAAAAAAAAAAAAAAAAAAAAAAFAAAADwAAAAAAAAAAAAAAP8A/wAUAAAAAQAAABQAAAAUAAAAFAAAAAEAAAAAAAAAZAAAAGQAAAAAAAAAZAAAAGQAAAAVAAAAYAAAAAAAAAAAAAAADwAAACADAAAAAAAAAAAAAAEAAACgMgAAVgcAAKr4//8BAAAAf39/AAEAAABkAAAAAAAAABQAAABAHwAAAAAAACYAAAAAAAAAwOD//wAAAAAmAAAAZAAAABYAAABMAAAAAAAAAAAAAAAEAAAAAAAAAAEAAADy8vIKAAAAACgAAAAoAAAAZAAAAGQAAAAAAAAAzMzMAAAAAABQAAAAUAAAAGQAAABkAAAAAAAAABcAAAAUAAAAAAAAAAAAAAD/fwAA/38AAAAAAAAJAAAABAAAAOwEAAAMAAAAEAAAAAAAAAAAAAAAAAAAAAAAAAAeAAAAaAAAAAAAAAAAAAAAAAAAAAAAAAAAAAAAECcAABAnAAAAAAAAAAAAAAAAAAAAAAAAAAAAAAAAAAAAAAAAAAAAABQAAAAAAAAAwMD/AAAAAABkAAAAMgAAAAAAAABkAAAAAAAAAH9/fwAKAAAAHwAAAFQAAABTU3kJ////AQAAAAAAAAAAAAAAAAAAAAAAAAAAAAAAAAAAAAAAAAAA/wD/AH9/fwDy8vIDzMzMAMDA/wB/f38AAAAAAAAAAAAAAAAAAAAAAAAAAAAhAAAAGAAAABQAAAC7FQAAMBUAAIgiAADPGwAAAAAAACYAAAAIAAAA//////////8="/>
+              </a:ext>
+            </a:extLst>
+          </p:cNvSpPr>
+          <p:nvPr/>
+        </p:nvSpPr>
+        <p:spPr>
+          <a:xfrm>
+            <a:off x="3532505" y="3444240"/>
+            <a:ext cx="2080895" cy="1076325"/>
+          </a:xfrm>
+          <a:prstGeom prst="roundRect">
+            <a:avLst>
+              <a:gd name="adj" fmla="val 16667"/>
+            </a:avLst>
+          </a:prstGeom>
+          <a:solidFill>
+            <a:schemeClr val="accent3"/>
+          </a:solidFill>
+          <a:ln>
+            <a:noFill/>
+          </a:ln>
+          <a:effectLst/>
+        </p:spPr>
+      </p:sp>
+      <p:sp>
+        <p:nvSpPr>
+          <p:cNvPr id="7" name="AutoShape4"/>
+          <p:cNvSpPr>
+            <a:extLst>
+              <a:ext uri="smNativeData">
+                <pr:smNativeData xmlns:pr="smNativeData" val="SMDATA_13_TQCXXhMAAAAlAAAAZQAAAA8BAAAAkAAAAEgAAACQAAAASAAAAAAAAAAAAAAAAAAAAAEAAABQAAAAVFVVVVVV1T8AAAAAAADgPwAAAAAAAOA/AAAAAAAA4D8AAAAAAADgPwAAAAAAAOA/AAAAAAAA4D8AAAAAAADgPwAAAAAAAOA/AAAAAAAA4D8CAAAAjAAAAAEAAAAAAAAAU1N5AP///wgAAAAAAAAAAAAAAAAAAAAAAAAAAAAAAAAAAAAAZAAAAAEAAABAAAAAAAAAAAAAAAAAAAAAAAAAAAAAAAAAAAAAAAAAAAAAAAAAAAAAAAAAAAAAAAAAAAAAAAAAAAAAAAAAAAAAAAAAAAAAAAAAAAAAAAAAAAAAAAAAAAAAFAAAADwAAAAAAAAAAAAAAP8A/wAUAAAAAQAAABQAAAAUAAAAFAAAAAEAAAAAAAAAZAAAAGQAAAAAAAAAZAAAAGQAAAAVAAAAYAAAAAAAAAAAAAAADwAAACADAAAAAAAAAAAAAAEAAACgMgAAVgcAAKr4//8BAAAAf39/AAEAAABkAAAAAAAAABQAAABAHwAAAAAAACYAAAAAAAAAwOD//wAAAAAmAAAAZAAAABYAAABMAAAAAAAAAAAAAAAEAAAAAAAAAAEAAADy8vIKAAAAACgAAAAoAAAAZAAAAGQAAAAAAAAAzMzMAAAAAABQAAAAUAAAAGQAAABkAAAAAAAAABcAAAAUAAAAAAAAAAAAAAD/fwAA/38AAAAAAAAJAAAABAAAAAAAAAAMAAAAEAAAAAAAAAAAAAAAAAAAAAAAAAAeAAAAaAAAAAAAAAAAAAAAAAAAAAAAAAAAAAAAECcAABAnAAAAAAAAAAAAAAAAAAAAAAAAAAAAAAAAAAAAAAAAAAAAABQAAAAAAAAAwMD/AAAAAABkAAAAMgAAAAAAAABkAAAAAAAAAH9/fwAKAAAAHwAAAFQAAABTU3kJ////AQAAAAAAAAAAAAAAAAAAAAAAAAAAAAAAAAAAAAAAAAAA/wD/AH9/fwDy8vIDzMzMAMDA/wB/f38AAAAAAAAAAAAAAAAAAAAAAAAAAAAhAAAAGAAAABQAAADbIwAAVRUAAKgwAADPGwAAAAAAACYAAAAIAAAA//////////8="/>
+              </a:ext>
+            </a:extLst>
+          </p:cNvSpPr>
+          <p:nvPr/>
+        </p:nvSpPr>
+        <p:spPr>
+          <a:xfrm>
+            <a:off x="5828665" y="3467735"/>
+            <a:ext cx="2080895" cy="1052830"/>
+          </a:xfrm>
+          <a:prstGeom prst="roundRect">
+            <a:avLst>
+              <a:gd name="adj" fmla="val 16667"/>
+            </a:avLst>
+          </a:prstGeom>
+          <a:solidFill>
+            <a:schemeClr val="accent3"/>
+          </a:solidFill>
+          <a:ln>
+            <a:noFill/>
+          </a:ln>
+          <a:effectLst/>
+        </p:spPr>
+      </p:sp>
+      <p:sp>
+        <p:nvSpPr>
+          <p:cNvPr id="8" name="Textbox1"/>
+          <p:cNvSpPr txBox="1">
+            <a:extLst>
+              <a:ext uri="smNativeData">
+                <pr:smNativeData xmlns:pr="smNativeData" val="SMDATA_13_TQCXXhMAAAAlAAAAEgAAAA8BAAAAkAAAAEgAAACQAAAASAAAAAAAAAAAAAAAAAAAAAEAAABQAAAAAAAAAAAA4D8AAAAAAADgPwAAAAAAAOA/AAAAAAAA4D8AAAAAAADgPwAAAAAAAOA/AAAAAAAA4D8AAAAAAADgPwAAAAAAAOA/AAAAAAAA4D8CAAAAjAAAAAAAAAAAAAAAg8C6DP///wgAAAAAAAAAAAAAAAAAAAAAAAAAAAAAAAAAAAAAZAAAAAEAAABAAAAAAAAAAAAAAAAAAAAAAAAAAAAAAAAAAAAAAAAAAAAAAAAAAAAAAAAAAAAAAAAAAAAAAAAAAAAAAAAAAAAAAAAAAAAAAAAAAAAAAAAAAAAAAAAAAAAAFAAAADwAAAAAAAAAAAAAAAAAAAkUAAAAAQAAABQAAAAUAAAAFAAAAAEAAAAAAAAAZAAAAGQAAAAAAAAAZAAAAGQAAAAVAAAAYAAAAAAAAAAAAAAADwAAACADAAAAAAAAAAAAAAEAAACgMgAAVgcAAKr4//8BAAAAf39/AAEAAABkAAAAAAAAABQAAABAHwAAAAAAACYAAAAAAAAAwOD//wAAAAAmAAAAZAAAABYAAABMAAAAAAAAAAAAAAAEAAAAAAAAAAEAAADy8vIKAAAAACgAAAAoAAAAZAAAAGQAAAAAAAAAzMzMAAAAAABQAAAAUAAAAGQAAABkAAAAAAAAABcAAAAUAAAAAAAAAAAAAAD/fwAA/38AAAAAAAAJAAAABAAAAAAAAAAMAAAAEAAAAAAAAAAAAAAAAAAAAAAAAAAeAAAAaAAAAAAAAAAAAAAAAAAAAAAAAAAAAAAAECcAABAnAAAAAAAAAAAAAAAAAAAAAAAAAAAAAAAAAAAAAAAAAAAAABQAAAAAAAAAwMD/AAAAAABkAAAAMgAAAAAAAABkAAAAAAAAAH9/fwAKAAAAHwAAAFQAAACDwLoF////AQAAAAAAAAAAAAAAAAAAAAAAAAAAAAAAAAAAAAAAAAAAAAAAAn9/fwDy8vIDzMzMAMDA/wB/f38AAAAAAAAAAAAAAAAAAAAAAAAAAAAhAAAAGAAAABQAAAAqBwAA+xcAALIKAADbGQAAAAAAACYAAAAIAAAA//////////8="/>
+              </a:ext>
+            </a:extLst>
+          </p:cNvSpPr>
+          <p:nvPr/>
+        </p:nvSpPr>
+        <p:spPr>
+          <a:xfrm>
+            <a:off x="1164590" y="3898265"/>
+            <a:ext cx="574040" cy="304800"/>
+          </a:xfrm>
+          <a:prstGeom prst="rect">
+            <a:avLst/>
+          </a:prstGeom>
+          <a:noFill/>
+          <a:ln>
+            <a:noFill/>
+          </a:ln>
+          <a:effectLst/>
+        </p:spPr>
+        <p:txBody>
+          <a:bodyPr vert="horz" wrap="square" numCol="1" spcCol="215900" anchor="t"/>
+          <a:lstStyle/>
+          <a:p>
+            <a:pPr marL="0" indent="0" defTabSz="449580">
+              <a:spcBef>
+                <a:spcPts val="1000"/>
+              </a:spcBef>
+              <a:buNone/>
+              <a:tabLst/>
+              <a:defRPr sz="1000">
+                <a:latin typeface="Manjari" pitchFamily="1" charset="0"/>
+                <a:ea typeface="Manjari" pitchFamily="1" charset="0"/>
+                <a:cs typeface="Manjari" pitchFamily="1" charset="0"/>
+              </a:defRPr>
+            </a:pPr>
+            <a:r>
+              <a:t>Task 1</a:t>
+            </a:r>
+          </a:p>
+        </p:txBody>
+      </p:sp>
+      <p:sp>
+        <p:nvSpPr>
+          <p:cNvPr id="9" name="Textbox2"/>
+          <p:cNvSpPr txBox="1">
+            <a:extLst>
+              <a:ext uri="smNativeData">
+                <pr:smNativeData xmlns:pr="smNativeData" val="SMDATA_13_TQCXXhMAAAAlAAAAEgAAAA8BAAAAkAAAAEgAAACQAAAASAAAAAAAAAAAAAAAAAAAAAEAAABQAAAAAAAAAAAA4D8AAAAAAADgPwAAAAAAAOA/AAAAAAAA4D8AAAAAAADgPwAAAAAAAOA/AAAAAAAA4D8AAAAAAADgPwAAAAAAAOA/AAAAAAAA4D8CAAAAjAAAAAAAAAAAAAAAg8C6DP///wgAAAAAAAAAAAAAAAAAAAAAAAAAAAAAAAAAAAAAZAAAAAEAAABAAAAAAAAAAAAAAAAAAAAAAAAAAAAAAAAAAAAAAAAAAAAAAAAAAAAAAAAAAAAAAAAAAAAAAAAAAAAAAAAAAAAAAAAAAAAAAAAAAAAAAAAAAAAAAAAAAAAAFAAAADwAAAAAAAAAAAAAAAAAAAkUAAAAAQAAABQAAAAUAAAAFAAAAAEAAAAAAAAAZAAAAGQAAAAAAAAAZAAAAGQAAAAVAAAAYAAAAAAAAAAAAAAADwAAACADAAAAAAAAAAAAAAEAAACgMgAAVgcAAKr4//8BAAAAf39/AAEAAABkAAAAAAAAABQAAABAHwAAAAAAACYAAAAAAAAAwOD//wAAAAAmAAAAZAAAABYAAABMAAAAAAAAAAAAAAAEAAAAAAAAAAEAAADy8vIKAAAAACgAAAAoAAAAZAAAAGQAAAAAAAAAzMzMAAAAAABQAAAAUAAAAGQAAABkAAAAAAAAABcAAAAUAAAAAAAAAAAAAAD/fwAA/38AAAAAAAAJAAAABAAAAAAAAAAMAAAAEAAAAAAAAAAAAAAAAAAAAAAAAAAeAAAAaAAAAAAAAAAAAAAAAAAAAAAAAAAAAAAAECcAABAnAAAAAAAAAAAAAAAAAAAAAAAAAAAAAAAAAAAAAAAAAAAAABQAAAAAAAAAwMD/AAAAAABkAAAAMgAAAAAAAABkAAAAAAAAAH9/fwAKAAAAHwAAAFQAAACDwLoF////AQAAAAAAAAAAAAAAAAAAAAAAAAAAAAAAAAAAAAAAAAAAAAAAAn9/fwDy8vIDzMzMAMDA/wB/f38AAAAAAAAAAAAAAAAAAAAAAAAAAAAhAAAAGAAAABQAAABvCwAAERgAAPcOAADxGQAAAAAAACYAAAAIAAAA//////////8="/>
+              </a:ext>
+            </a:extLst>
+          </p:cNvSpPr>
+          <p:nvPr/>
+        </p:nvSpPr>
+        <p:spPr>
+          <a:xfrm>
+            <a:off x="1858645" y="3912235"/>
+            <a:ext cx="574040" cy="304800"/>
+          </a:xfrm>
+          <a:prstGeom prst="rect">
+            <a:avLst/>
+          </a:prstGeom>
+          <a:noFill/>
+          <a:ln>
+            <a:noFill/>
+          </a:ln>
+          <a:effectLst/>
+        </p:spPr>
+        <p:txBody>
+          <a:bodyPr vert="horz" wrap="square" numCol="1" spcCol="215900" anchor="t"/>
+          <a:lstStyle/>
+          <a:p>
+            <a:pPr marL="0" indent="0" defTabSz="449580">
+              <a:spcBef>
+                <a:spcPts val="1000"/>
+              </a:spcBef>
+              <a:buNone/>
+              <a:tabLst/>
+              <a:defRPr sz="1000">
+                <a:latin typeface="Manjari" pitchFamily="1" charset="0"/>
+                <a:ea typeface="Manjari" pitchFamily="1" charset="0"/>
+                <a:cs typeface="Manjari" pitchFamily="1" charset="0"/>
+              </a:defRPr>
+            </a:pPr>
+            <a:r>
+              <a:t>Task 2</a:t>
+            </a:r>
+          </a:p>
+        </p:txBody>
+      </p:sp>
+      <p:sp>
+        <p:nvSpPr>
+          <p:cNvPr id="10" name="Textbox3"/>
+          <p:cNvSpPr txBox="1">
+            <a:extLst>
+              <a:ext uri="smNativeData">
+                <pr:smNativeData xmlns:pr="smNativeData" val="SMDATA_13_TQCXXhMAAAAlAAAAEgAAAA8BAAAAkAAAAEgAAACQAAAASAAAAAAAAAAAAAAAAAAAAAEAAABQAAAAAAAAAAAA4D8AAAAAAADgPwAAAAAAAOA/AAAAAAAA4D8AAAAAAADgPwAAAAAAAOA/AAAAAAAA4D8AAAAAAADgPwAAAAAAAOA/AAAAAAAA4D8CAAAAjAAAAAAAAAAAAAAAg8C6DP///wgAAAAAAAAAAAAAAAAAAAAAAAAAAAAAAAAAAAAAZAAAAAEAAABAAAAAAAAAAAAAAAAAAAAAAAAAAAAAAAAAAAAAAAAAAAAAAAAAAAAAAAAAAAAAAAAAAAAAAAAAAAAAAAAAAAAAAAAAAAAAAAAAAAAAAAAAAAAAAAAAAAAAFAAAADwAAAAAAAAAAAAAAAAAAAkUAAAAAQAAABQAAAAUAAAAFAAAAAEAAAAAAAAAZAAAAGQAAAAAAAAAZAAAAGQAAAAVAAAAYAAAAAAAAAAAAAAADwAAACADAAAAAAAAAAAAAAEAAACgMgAAVgcAAKr4//8BAAAAf39/AAEAAABkAAAAAAAAABQAAABAHwAAAAAAACYAAAAAAAAAwOD//wAAAAAmAAAAZAAAABYAAABMAAAAAAAAAAAAAAAEAAAAAAAAAAEAAADy8vIKAAAAACgAAAAoAAAAZAAAAGQAAAAAAAAAzMzMAAAAAABQAAAAUAAAAGQAAABkAAAAAAAAABcAAAAUAAAAAAAAAAAAAAD/fwAA/38AAAAAAAAJAAAABAAAAAkAAAAMAAAAEAAAAAAAAAAAAAAAAAAAAAAAAAAeAAAAaAAAAAAAAAAAAAAAAAAAAAAAAAAAAAAAECcAABAnAAAAAAAAAAAAAAAAAAAAAAAAAAAAAAAAAAAAAAAAAAAAABQAAAAAAAAAwMD/AAAAAABkAAAAMgAAAAAAAABkAAAAAAAAAH9/fwAKAAAAHwAAAFQAAACDwLoF////AQAAAAAAAAAAAAAAAAAAAAAAAAAAAAAAAAAAAAAAAAAAAAAAAn9/fwDy8vIDzMzMAMDA/wB/f38AAAAAAAAAAAAAAAAAAAAAAAAAAAAhAAAAGAAAABQAAAD+DwAA+xcAAIYTAADbGQAAAAAAACYAAAAIAAAA//////////8="/>
+              </a:ext>
+            </a:extLst>
+          </p:cNvSpPr>
+          <p:nvPr/>
+        </p:nvSpPr>
+        <p:spPr>
+          <a:xfrm>
+            <a:off x="2599690" y="3898265"/>
+            <a:ext cx="574040" cy="304800"/>
+          </a:xfrm>
+          <a:prstGeom prst="rect">
+            <a:avLst/>
+          </a:prstGeom>
+          <a:noFill/>
+          <a:ln>
+            <a:noFill/>
+          </a:ln>
+          <a:effectLst/>
+        </p:spPr>
+        <p:txBody>
+          <a:bodyPr vert="horz" wrap="square" numCol="1" spcCol="215900" anchor="t"/>
+          <a:lstStyle/>
+          <a:p>
+            <a:pPr marL="0" indent="0" defTabSz="449580">
+              <a:spcBef>
+                <a:spcPts val="1000"/>
+              </a:spcBef>
+              <a:buNone/>
+              <a:tabLst/>
+              <a:defRPr sz="1000">
+                <a:latin typeface="Manjari" pitchFamily="1" charset="0"/>
+                <a:ea typeface="Manjari" pitchFamily="1" charset="0"/>
+                <a:cs typeface="Manjari" pitchFamily="1" charset="0"/>
+              </a:defRPr>
+            </a:pPr>
+            <a:r>
+              <a:t>Task 3</a:t>
+            </a:r>
+          </a:p>
+        </p:txBody>
+      </p:sp>
+      <p:sp>
+        <p:nvSpPr>
+          <p:cNvPr id="11" name="Line1"/>
+          <p:cNvSpPr>
+            <a:extLst>
+              <a:ext uri="smNativeData">
+                <pr:smNativeData xmlns:pr="smNativeData" val="SMDATA_13_TQCXXhMAAAAlAAAACgAAAA8BAAAAkAAAAEgAAACQAAAASAAAAAAAAAAAAAAAAAAAAAEAAABQAAAAAAAAAAAA4D8AAAAAAADgPwAAAAAAAOA/AAAAAAAA4D8AAAAAAADgPwAAAAAAAOA/AAAAAAAA4D8AAAAAAADgPwAAAAAAAOA/AAAAAAAA4D8CAAAAjAAAAAAAAAAAAAAAg8C6DP///wgAAAAAAAAAAAAAAAAAAAAAAAAAAAAAAAAAAAAAZAAAAAEAAABAAAAAAAAAAAAAAAAAAAAAAAAAAAAAAAAAAAAAAAAAAAAAAAAAAAAAAAAAAAAAAAAAAAAAAAAAAAAAAAAAAAAAAAAAAAAAAAAAAAAAAAAAAAAAAAAAAAAAFAAAADwAAAABAAAAAAAAAAD/AAAoAAAAAQAAABQAAAAUAAAAFAAAAAEAAAAAAAAAZAAAAGQAAAABAAAAlgAAAJYAAAAVAAAAYAAAAAAAAAAAAAAADwAAACADAAAAAAAAAAAAAAEAAACgMgAAVgcAAKr4//8BAAAAf39/AAEAAABkAAAAAAAAABQAAABAHwAAAAAAACYAAAAAAAAAwOD//wAAAAAmAAAAZAAAABYAAABMAAAAAAAAAAAAAAAEAAAAAAAAAAEAAADy8vIKAAAAACgAAAAoAAAAZAAAAGQAAAAAAAAAzMzMAAAAAABQAAAAUAAAAGQAAABkAAAAAAAAABcAAAAUAAAAAAAAAAAAAAD/fwAA/38AAAAAAAAJAAAABAAAAAABAAEMAAAAEAAAAAAAAAAAAAAAAAAAAAAAAAAeAAAAaAAAAAAAAAAAAAAAAAAAAAAAAAAAAAAAECcAABAnAAAAAAAAAAAAAAAAAAAAAAAAAAAAAAAAAAAAAAAAAAAAABQAAAAAAAAAwMD/AAAAAABkAAAAMgAAAAAAAABkAAAAAAAAAH9/fwAKAAAAHwAAAFQAAACDwLoF////AQAAAAAAAAAAAAAAAAAAAAAAAAAAAAAAAAAAAAAAAAAAAP8AAH9/fwDy8vIDzMzMAMDA/wB/f38AAAAAAAAAAAAAAAAAAAAAAAAAAAAhAAAAGAAAABQAAABBCgAAnRgAAJQLAACfGAAAAAAAACYAAAAIAAAA//////////8="/>
+              </a:ext>
+            </a:extLst>
+          </p:cNvSpPr>
+          <p:nvPr/>
+        </p:nvSpPr>
+        <p:spPr>
+          <a:xfrm>
+            <a:off x="1666875" y="4001135"/>
+            <a:ext cx="215265" cy="1270"/>
+          </a:xfrm>
+          <a:prstGeom prst="line">
+            <a:avLst/>
+          </a:prstGeom>
+          <a:noFill/>
+          <a:ln w="25400" cap="flat" cmpd="sng" algn="ctr">
+            <a:solidFill>
+              <a:srgbClr val="00FF00"/>
+            </a:solidFill>
+            <a:prstDash val="solid"/>
+            <a:headEnd type="none"/>
+            <a:tailEnd type="stealth" w="lg" len="lg"/>
+          </a:ln>
+          <a:effectLst/>
+        </p:spPr>
+      </p:sp>
+      <p:sp>
+        <p:nvSpPr>
+          <p:cNvPr id="12" name="Line2"/>
+          <p:cNvSpPr>
+            <a:extLst>
+              <a:ext uri="smNativeData">
+                <pr:smNativeData xmlns:pr="smNativeData" val="SMDATA_13_TQCXXhMAAAAlAAAACgAAAA8BAAAAkAAAAEgAAACQAAAASAAAAAAAAAAAAAAAAAAAAAEAAABQAAAAAAAAAAAA4D8AAAAAAADgPwAAAAAAAOA/AAAAAAAA4D8AAAAAAADgPwAAAAAAAOA/AAAAAAAA4D8AAAAAAADgPwAAAAAAAOA/AAAAAAAA4D8CAAAAjAAAAAAAAAAAAAAAg8C6DP///wgAAAAAAAAAAAAAAAAAAAAAAAAAAAAAAAAAAAAAZAAAAAEAAABAAAAAAAAAAAAAAAAAAAAAAAAAAAAAAAAAAAAAAAAAAAAAAAAAAAAAAAAAAAAAAAAAAAAAAAAAAAAAAAAAAAAAAAAAAAAAAAAAAAAAAAAAAAAAAAAAAAAAFAAAADwAAAABAAAAAAAAAP8AAAAoAAAAAQAAABQAAAAUAAAAFAAAAAEAAAABAAAAlgAAAJYAAAAAAAAAZAAAAGQAAAAVAAAAYAAAAAAAAAAAAAAADwAAACADAAAAAAAAAAAAAAEAAACgMgAAVgcAAKr4//8BAAAAf39/AAEAAABkAAAAAAAAABQAAABAHwAAAAAAACYAAAAAAAAAwOD//wAAAAAmAAAAZAAAABYAAABMAAAAAAAAAAAAAAAEAAAAAAAAAAEAAADy8vIKAAAAACgAAAAoAAAAZAAAAGQAAAAAAAAAzMzMAAAAAABQAAAAUAAAAGQAAABkAAAAAAAAABcAAAAUAAAAAAAAAAAAAAD/fwAA/38AAAAAAAAJAAAABAAAAABVAAAMAAAAEAAAAAAAAAAAAAAAAAAAAAAAAAAeAAAAaAAAAAAAAAAAAAAAAAAAAAAAAAAAAAAAECcAABAnAAAAAAAAAAAAAAAAAAAAAAAAAAAAAAAAAAAAAAAAAAAAABQAAAAAAAAAwMD/AAAAAABkAAAAMgAAAAAAAABkAAAAAAAAAH9/fwAKAAAAHwAAAFQAAACDwLoF////AQAAAAAAAAAAAAAAAAAAAAAAAAAAAAAAAAAAAAAAAAAA/wAAAH9/fwDy8vIDzMzMAMDA/wB/f38AAAAAAAAAAAAAAAAAAAAAAAAAAAAhAAAAGAAAABQAAAAPCgAAMxkAAGILAAA1GQAAAAAAACYAAAAIAAAA//////////8="/>
+              </a:ext>
+            </a:extLst>
+          </p:cNvSpPr>
+          <p:nvPr/>
+        </p:nvSpPr>
+        <p:spPr>
+          <a:xfrm>
+            <a:off x="1635125" y="4096385"/>
+            <a:ext cx="215265" cy="1270"/>
+          </a:xfrm>
+          <a:prstGeom prst="line">
+            <a:avLst/>
+          </a:prstGeom>
+          <a:noFill/>
+          <a:ln w="25400" cap="flat" cmpd="sng" algn="ctr">
+            <a:solidFill>
+              <a:srgbClr val="FF0000"/>
+            </a:solidFill>
+            <a:prstDash val="solid"/>
+            <a:headEnd type="stealth" w="lg" len="lg"/>
+            <a:tailEnd type="none"/>
+          </a:ln>
+          <a:effectLst/>
+        </p:spPr>
+      </p:sp>
+      <p:sp>
+        <p:nvSpPr>
+          <p:cNvPr id="13" name="Line3"/>
+          <p:cNvSpPr>
+            <a:extLst>
+              <a:ext uri="smNativeData">
+                <pr:smNativeData xmlns:pr="smNativeData" val="SMDATA_13_TQCXXhMAAAAlAAAACgAAAA8BAAAAkAAAAEgAAACQAAAASAAAAAAAAAAAAAAAAAAAAAEAAABQAAAAAAAAAAAA4D8AAAAAAADgPwAAAAAAAOA/AAAAAAAA4D8AAAAAAADgPwAAAAAAAOA/AAAAAAAA4D8AAAAAAADgPwAAAAAAAOA/AAAAAAAA4D8CAAAAjAAAAAAAAAAAAAAAg8C6DP///wgAAAAAAAAAAAAAAAAAAAAAAAAAAAAAAAAAAAAAZAAAAAEAAABAAAAAAAAAAAAAAAAAAAAAAAAAAAAAAAAAAAAAAAAAAAAAAAAAAAAAAAAAAAAAAAAAAAAAAAAAAAAAAAAAAAAAAAAAAAAAAAAAAAAAAAAAAAAAAAAAAAAAFAAAADwAAAABAAAAAAAAAAD/AAAoAAAAAQAAABQAAAAUAAAAFAAAAAEAAAAAAAAAZAAAAGQAAAABAAAAlgAAAJYAAAAVAAAAYAAAAAAAAAAAAAAADwAAACADAAAAAAAAAAAAAAEAAACgMgAAVgcAAKr4//8BAAAAf39/AAEAAABkAAAAAAAAABQAAABAHwAAAAAAACYAAAAAAAAAwOD//wAAAAAmAAAAZAAAABYAAABMAAAAAAAAAAAAAAAEAAAAAAAAAAEAAADy8vIKAAAAACgAAAAoAAAAZAAAAGQAAAAAAAAAzMzMAAAAAABQAAAAUAAAAGQAAABkAAAAAAAAABcAAAAUAAAAAAAAAAAAAAD/fwAA/38AAAAAAAAJAAAABAAAAAABAAEMAAAAEAAAAAAAAAAAAAAAAAAAAAAAAAAeAAAAaAAAAAAAAAAAAAAAAAAAAAAAAAAAAAAAECcAABAnAAAAAAAAAAAAAAAAAAAAAAAAAAAAAAAAAAAAAAAAAAAAABQAAAAAAAAAwMD/AAAAAABkAAAAMgAAAAAAAABkAAAAAAAAAH9/fwAKAAAAHwAAAFQAAACDwLoF////AQAAAAAAAAAAAAAAAAAAAAAAAAAAAAAAAAAAAAAAAAAAAP8AAH9/fwDy8vIDzMzMAMDA/wB/f38AAAAAAAAAAAAAAAAAAAAAAAAAAAAhAAAAGAAAABQAAADxDgAAnRgAAEQQAACfGAAAAAAAACYAAAAIAAAA//////////8="/>
+              </a:ext>
+            </a:extLst>
+          </p:cNvSpPr>
+          <p:nvPr/>
+        </p:nvSpPr>
+        <p:spPr>
+          <a:xfrm>
+            <a:off x="2428875" y="4001135"/>
+            <a:ext cx="215265" cy="1270"/>
+          </a:xfrm>
+          <a:prstGeom prst="line">
+            <a:avLst/>
+          </a:prstGeom>
+          <a:noFill/>
+          <a:ln w="25400" cap="flat" cmpd="sng" algn="ctr">
+            <a:solidFill>
+              <a:srgbClr val="00FF00"/>
+            </a:solidFill>
+            <a:prstDash val="solid"/>
+            <a:headEnd type="none"/>
+            <a:tailEnd type="stealth" w="lg" len="lg"/>
+          </a:ln>
+          <a:effectLst/>
+        </p:spPr>
+      </p:sp>
+      <p:sp>
+        <p:nvSpPr>
+          <p:cNvPr id="14" name="Line4"/>
+          <p:cNvSpPr>
+            <a:extLst>
+              <a:ext uri="smNativeData">
+                <pr:smNativeData xmlns:pr="smNativeData" val="SMDATA_13_TQCXXhMAAAAlAAAACgAAAA8BAAAAkAAAAEgAAACQAAAASAAAAAAAAAAAAAAAAAAAAAEAAABQAAAAAAAAAAAA4D8AAAAAAADgPwAAAAAAAOA/AAAAAAAA4D8AAAAAAADgPwAAAAAAAOA/AAAAAAAA4D8AAAAAAADgPwAAAAAAAOA/AAAAAAAA4D8CAAAAjAAAAAAAAAAAAAAAg8C6DP///wgAAAAAAAAAAAAAAAAAAAAAAAAAAAAAAAAAAAAAZAAAAAEAAABAAAAAAAAAAAAAAAAAAAAAAAAAAAAAAAAAAAAAAAAAAAAAAAAAAAAAAAAAAAAAAAAAAAAAAAAAAAAAAAAAAAAAAAAAAAAAAAAAAAAAAAAAAAAAAAAAAAAAFAAAADwAAAABAAAAAAAAAP8AAAAoAAAAAQAAABQAAAAUAAAAFAAAAAEAAAABAAAAlgAAAJYAAAAAAAAAZAAAAGQAAAAVAAAAYAAAAAAAAAAAAAAADwAAACADAAAAAAAAAAAAAAEAAACgMgAAVgcAAKr4//8BAAAAf39/AAEAAABkAAAAAAAAABQAAABAHwAAAAAAACYAAAAAAAAAwOD//wAAAAAmAAAAZAAAABYAAABMAAAAAAAAAAAAAAAEAAAAAAAAAAEAAADy8vIKAAAAACgAAAAoAAAAZAAAAGQAAAAAAAAAzMzMAAAAAABQAAAAUAAAAGQAAABkAAAAAAAAABcAAAAUAAAAAAAAAAAAAAD/fwAA/38AAAAAAAAJAAAABAAAAAABAAEMAAAAEAAAAAAAAAAAAAAAAAAAAAAAAAAeAAAAaAAAAAAAAAAAAAAAAAAAAAAAAAAAAAAAECcAABAnAAAAAAAAAAAAAAAAAAAAAAAAAAAAAAAAAAAAAAAAAAAAABQAAAAAAAAAwMD/AAAAAABkAAAAMgAAAAAAAABkAAAAAAAAAH9/fwAKAAAAHwAAAFQAAACDwLoF////AQAAAAAAAAAAAAAAAAAAAAAAAAAAAAAAAAAAAAAAAAAA/wAAAH9/fwDy8vIDzMzMAMDA/wB/f38AAAAAAAAAAAAAAAAAAAAAAAAAAAAhAAAAGAAAABQAAAC/DgAAMxkAABIQAAA1GQAAAAAAACYAAAAIAAAA//////////8="/>
+              </a:ext>
+            </a:extLst>
+          </p:cNvSpPr>
+          <p:nvPr/>
+        </p:nvSpPr>
+        <p:spPr>
+          <a:xfrm>
+            <a:off x="2397125" y="4096385"/>
+            <a:ext cx="215265" cy="1270"/>
+          </a:xfrm>
+          <a:prstGeom prst="line">
+            <a:avLst/>
+          </a:prstGeom>
+          <a:noFill/>
+          <a:ln w="25400" cap="flat" cmpd="sng" algn="ctr">
+            <a:solidFill>
+              <a:srgbClr val="FF0000"/>
+            </a:solidFill>
+            <a:prstDash val="solid"/>
+            <a:headEnd type="stealth" w="lg" len="lg"/>
+            <a:tailEnd type="none"/>
+          </a:ln>
+          <a:effectLst/>
+        </p:spPr>
+      </p:sp>
+      <p:sp>
+        <p:nvSpPr>
+          <p:cNvPr id="15" name="Textbox4"/>
+          <p:cNvSpPr txBox="1">
+            <a:extLst>
+              <a:ext uri="smNativeData">
+                <pr:smNativeData xmlns:pr="smNativeData" val="SMDATA_13_TQCXXhMAAAAlAAAAEgAAAA8BAAAAkAAAAEgAAACQAAAASAAAAAAAAAAAAAAAAAAAAAEAAABQAAAAAAAAAAAA4D8AAAAAAADgPwAAAAAAAOA/AAAAAAAA4D8AAAAAAADgPwAAAAAAAOA/AAAAAAAA4D8AAAAAAADgPwAAAAAAAOA/AAAAAAAA4D8CAAAAjAAAAAAAAAAAAAAAg8C6DP///wgAAAAAAAAAAAAAAAAAAAAAAAAAAAAAAAAAAAAAZAAAAAEAAABAAAAAAAAAAAAAAAAAAAAAAAAAAAAAAAAAAAAAAAAAAAAAAAAAAAAAAAAAAAAAAAAAAAAAAAAAAAAAAAAAAAAAAAAAAAAAAAAAAAAAAAAAAAAAAAAAAAAAFAAAADwAAAAAAAAAAAAAAAAAAAkUAAAAAQAAABQAAAAUAAAAFAAAAAEAAAAAAAAAZAAAAGQAAAAAAAAAZAAAAGQAAAAVAAAAYAAAAAAAAAAAAAAADwAAACADAAAAAAAAAAAAAAEAAACgMgAAVgcAAKr4//8BAAAAf39/AAEAAABkAAAAAAAAABQAAABAHwAAAAAAACYAAAAAAAAAwOD//wAAAAAmAAAAZAAAABYAAABMAAAAAAAAAAAAAAAEAAAAAAAAAAEAAADy8vIKAAAAACgAAAAoAAAAZAAAAGQAAAAAAAAAzMzMAAAAAABQAAAAUAAAAGQAAABkAAAAAAAAABcAAAAUAAAAAAAAAAAAAAD/fwAA/38AAAAAAAAJAAAABAAAAHlsZT4MAAAAEAAAAAAAAAAAAAAAAAAAAAAAAAAeAAAAaAAAAAAAAAAAAAAAAAAAAAAAAAAAAAAAECcAABAnAAAAAAAAAAAAAAAAAAAAAAAAAAAAAAAAAAAAAAAAAAAAABQAAAAAAAAAwMD/AAAAAABkAAAAMgAAAAAAAABkAAAAAAAAAH9/fwAKAAAAHwAAAFQAAACDwLoF////AQAAAAAAAAAAAAAAAAAAAAAAAAAAAAAAAAAAAAAAAAAAAAAAAn9/fwDy8vIDzMzMAMDA/wB/f38AAAAAAAAAAAAAAAAAAAAAAAAAAAAhAAAAGAAAABQAAAASJAAA+xcAAJonAADbGQAAAAAAACYAAAAIAAAA//////////8="/>
+              </a:ext>
+            </a:extLst>
+          </p:cNvSpPr>
+          <p:nvPr/>
+        </p:nvSpPr>
+        <p:spPr>
+          <a:xfrm>
+            <a:off x="5863590" y="3898265"/>
+            <a:ext cx="574040" cy="304800"/>
+          </a:xfrm>
+          <a:prstGeom prst="rect">
+            <a:avLst/>
+          </a:prstGeom>
+          <a:noFill/>
+          <a:ln>
+            <a:noFill/>
+          </a:ln>
+          <a:effectLst/>
+        </p:spPr>
+        <p:txBody>
+          <a:bodyPr vert="horz" wrap="square" numCol="1" spcCol="215900" anchor="t"/>
+          <a:lstStyle/>
+          <a:p>
+            <a:pPr marL="0" indent="0" defTabSz="449580">
+              <a:spcBef>
+                <a:spcPts val="1000"/>
+              </a:spcBef>
+              <a:buNone/>
+              <a:tabLst/>
+              <a:defRPr sz="1000">
+                <a:latin typeface="Manjari" pitchFamily="1" charset="0"/>
+                <a:ea typeface="Manjari" pitchFamily="1" charset="0"/>
+                <a:cs typeface="Manjari" pitchFamily="1" charset="0"/>
+              </a:defRPr>
+            </a:pPr>
+            <a:r>
+              <a:t>Task 1</a:t>
+            </a:r>
+          </a:p>
+        </p:txBody>
+      </p:sp>
+      <p:sp>
+        <p:nvSpPr>
+          <p:cNvPr id="16" name="Textbox5"/>
+          <p:cNvSpPr txBox="1">
+            <a:extLst>
+              <a:ext uri="smNativeData">
+                <pr:smNativeData xmlns:pr="smNativeData" val="SMDATA_13_TQCXXhMAAAAlAAAAEgAAAA8BAAAAkAAAAEgAAACQAAAASAAAAAAAAAAAAAAAAAAAAAEAAABQAAAAAAAAAAAA4D8AAAAAAADgPwAAAAAAAOA/AAAAAAAA4D8AAAAAAADgPwAAAAAAAOA/AAAAAAAA4D8AAAAAAADgPwAAAAAAAOA/AAAAAAAA4D8CAAAAjAAAAAAAAAAAAAAAg8C6DP///wgAAAAAAAAAAAAAAAAAAAAAAAAAAAAAAAAAAAAAZAAAAAEAAABAAAAAAAAAAAAAAAAAAAAAAAAAAAAAAAAAAAAAAAAAAAAAAAAAAAAAAAAAAAAAAAAAAAAAAAAAAAAAAAAAAAAAAAAAAAAAAAAAAAAAAAAAAAAAAAAAAAAAFAAAADwAAAAAAAAAAAAAAAAAAAkUAAAAAQAAABQAAAAUAAAAFAAAAAEAAAAAAAAAZAAAAGQAAAAAAAAAZAAAAGQAAAAVAAAAYAAAAAAAAAAAAAAADwAAACADAAAAAAAAAAAAAAEAAACgMgAAVgcAAKr4//8BAAAAf39/AAEAAABkAAAAAAAAABQAAABAHwAAAAAAACYAAAAAAAAAwOD//wAAAAAmAAAAZAAAABYAAABMAAAAAAAAAAAAAAAEAAAAAAAAAAEAAADy8vIKAAAAACgAAAAoAAAAZAAAAGQAAAAAAAAAzMzMAAAAAABQAAAAUAAAAGQAAABkAAAAAAAAABcAAAAUAAAAAAAAAAAAAAD/fwAA/38AAAAAAAAJAAAABAAAALgxAAAMAAAAEAAAAAAAAAAAAAAAAAAAAAAAAAAeAAAAaAAAAAAAAAAAAAAAAAAAAAAAAAAAAAAAECcAABAnAAAAAAAAAAAAAAAAAAAAAAAAAAAAAAAAAAAAAAAAAAAAABQAAAAAAAAAwMD/AAAAAABkAAAAMgAAAAAAAABkAAAAAAAAAH9/fwAKAAAAHwAAAFQAAACDwLoF////AQAAAAAAAAAAAAAAAAAAAAAAAAAAAAAAAAAAAAAAAAAAAAAAAn9/fwDy8vIDzMzMAMDA/wB/f38AAAAAAAAAAAAAAAAAAAAAAAAAAAAhAAAAGAAAABQAAABXKAAAERgAAN8rAADxGQAAAAAAACYAAAAIAAAA//////////8="/>
+              </a:ext>
+            </a:extLst>
+          </p:cNvSpPr>
+          <p:nvPr/>
+        </p:nvSpPr>
+        <p:spPr>
+          <a:xfrm>
+            <a:off x="6557645" y="3912235"/>
+            <a:ext cx="574040" cy="304800"/>
+          </a:xfrm>
+          <a:prstGeom prst="rect">
+            <a:avLst/>
+          </a:prstGeom>
+          <a:noFill/>
+          <a:ln>
+            <a:noFill/>
+          </a:ln>
+          <a:effectLst/>
+        </p:spPr>
+        <p:txBody>
+          <a:bodyPr vert="horz" wrap="square" numCol="1" spcCol="215900" anchor="t"/>
+          <a:lstStyle/>
+          <a:p>
+            <a:pPr marL="0" indent="0" defTabSz="449580">
+              <a:spcBef>
+                <a:spcPts val="1000"/>
+              </a:spcBef>
+              <a:buNone/>
+              <a:tabLst/>
+              <a:defRPr sz="1000">
+                <a:latin typeface="Manjari" pitchFamily="1" charset="0"/>
+                <a:ea typeface="Manjari" pitchFamily="1" charset="0"/>
+                <a:cs typeface="Manjari" pitchFamily="1" charset="0"/>
+              </a:defRPr>
+            </a:pPr>
+            <a:r>
+              <a:t>Task 2</a:t>
+            </a:r>
+          </a:p>
+        </p:txBody>
+      </p:sp>
+      <p:sp>
+        <p:nvSpPr>
+          <p:cNvPr id="17" name="Textbox6"/>
+          <p:cNvSpPr txBox="1">
+            <a:extLst>
+              <a:ext uri="smNativeData">
+                <pr:smNativeData xmlns:pr="smNativeData" val="SMDATA_13_TQCXXhMAAAAlAAAAEgAAAA8BAAAAkAAAAEgAAACQAAAASAAAAAAAAAAAAAAAAAAAAAEAAABQAAAAAAAAAAAA4D8AAAAAAADgPwAAAAAAAOA/AAAAAAAA4D8AAAAAAADgPwAAAAAAAOA/AAAAAAAA4D8AAAAAAADgPwAAAAAAAOA/AAAAAAAA4D8CAAAAjAAAAAAAAAAAAAAAg8C6DP///wgAAAAAAAAAAAAAAAAAAAAAAAAAAAAAAAAAAAAAZAAAAAEAAABAAAAAAAAAAAAAAAAAAAAAAAAAAAAAAAAAAAAAAAAAAAAAAAAAAAAAAAAAAAAAAAAAAAAAAAAAAAAAAAAAAAAAAAAAAAAAAAAAAAAAAAAAAAAAAAAAAAAAFAAAADwAAAAAAAAAAAAAAAAAAAkUAAAAAQAAABQAAAAUAAAAFAAAAAEAAAAAAAAAZAAAAGQAAAAAAAAAZAAAAGQAAAAVAAAAYAAAAAAAAAAAAAAADwAAACADAAAAAAAAAAAAAAEAAACgMgAAVgcAAKr4//8BAAAAf39/AAEAAABkAAAAAAAAABQAAABAHwAAAAAAACYAAAAAAAAAwOD//wAAAAAmAAAAZAAAABYAAABMAAAAAAAAAAAAAAAEAAAAAAAAAAEAAADy8vIKAAAAACgAAAAoAAAAZAAAAGQAAAAAAAAAzMzMAAAAAABQAAAAUAAAAGQAAABkAAAAAAAAABcAAAAUAAAAAAAAAAAAAAD/fwAA/38AAAAAAAAJAAAABAAAAAAAAAAMAAAAEAAAAAAAAAAAAAAAAAAAAAAAAAAeAAAAaAAAAAAAAAAAAAAAAAAAAAAAAAAAAAAAECcAABAnAAAAAAAAAAAAAAAAAAAAAAAAAAAAAAAAAAAAAAAAAAAAABQAAAAAAAAAwMD/AAAAAABkAAAAMgAAAAAAAABkAAAAAAAAAH9/fwAKAAAAHwAAAFQAAACDwLoF////AQAAAAAAAAAAAAAAAAAAAAAAAAAAAAAAAAAAAAAAAAAAAAAAAn9/fwDy8vIDzMzMAMDA/wB/f38AAAAAAAAAAAAAAAAAAAAAAAAAAAAhAAAAGAAAABQAAADmLAAA+xcAAG4wAADbGQAAAAAAACYAAAAIAAAA//////////8="/>
+              </a:ext>
+            </a:extLst>
+          </p:cNvSpPr>
+          <p:nvPr/>
+        </p:nvSpPr>
+        <p:spPr>
+          <a:xfrm>
+            <a:off x="7298690" y="3898265"/>
+            <a:ext cx="574040" cy="304800"/>
+          </a:xfrm>
+          <a:prstGeom prst="rect">
+            <a:avLst/>
+          </a:prstGeom>
+          <a:noFill/>
+          <a:ln>
+            <a:noFill/>
+          </a:ln>
+          <a:effectLst/>
+        </p:spPr>
+        <p:txBody>
+          <a:bodyPr vert="horz" wrap="square" numCol="1" spcCol="215900" anchor="t"/>
+          <a:lstStyle/>
+          <a:p>
+            <a:pPr marL="0" indent="0" defTabSz="449580">
+              <a:spcBef>
+                <a:spcPts val="1000"/>
+              </a:spcBef>
+              <a:buNone/>
+              <a:tabLst/>
+              <a:defRPr sz="1000">
+                <a:latin typeface="Manjari" pitchFamily="1" charset="0"/>
+                <a:ea typeface="Manjari" pitchFamily="1" charset="0"/>
+                <a:cs typeface="Manjari" pitchFamily="1" charset="0"/>
+              </a:defRPr>
+            </a:pPr>
+            <a:r>
+              <a:t>Task 3</a:t>
+            </a:r>
+          </a:p>
+        </p:txBody>
+      </p:sp>
+      <p:sp>
+        <p:nvSpPr>
+          <p:cNvPr id="18" name="Line5"/>
+          <p:cNvSpPr>
+            <a:extLst>
+              <a:ext uri="smNativeData">
+                <pr:smNativeData xmlns:pr="smNativeData" val="SMDATA_13_TQCXXhMAAAAlAAAACgAAAA8BAAAAkAAAAEgAAACQAAAASAAAAAAAAAAAAAAAAAAAAAEAAABQAAAAAAAAAAAA4D8AAAAAAADgPwAAAAAAAOA/AAAAAAAA4D8AAAAAAADgPwAAAAAAAOA/AAAAAAAA4D8AAAAAAADgPwAAAAAAAOA/AAAAAAAA4D8CAAAAjAAAAAAAAAAAAAAAg8C6DP///wgAAAAAAAAAAAAAAAAAAAAAAAAAAAAAAAAAAAAAZAAAAAEAAABAAAAAAAAAAAAAAAAAAAAAAAAAAAAAAAAAAAAAAAAAAAAAAAAAAAAAAAAAAAAAAAAAAAAAAAAAAAAAAAAAAAAAAAAAAAAAAAAAAAAAAAAAAAAAAAAAAAAAFAAAADwAAAABAAAAAAAAAAD/AAAoAAAAAQAAABQAAAAUAAAAFAAAAAEAAAAAAAAAZAAAAGQAAAABAAAAlgAAAJYAAAAVAAAAYAAAAAAAAAAAAAAADwAAACADAAAAAAAAAAAAAAEAAACgMgAAVgcAAKr4//8BAAAAf39/AAEAAABkAAAAAAAAABQAAABAHwAAAAAAACYAAAAAAAAAwOD//wAAAAAmAAAAZAAAABYAAABMAAAAAAAAAAAAAAAEAAAAAAAAAAEAAADy8vIKAAAAACgAAAAoAAAAZAAAAGQAAAAAAAAAzMzMAAAAAABQAAAAUAAAAGQAAABkAAAAAAAAABcAAAAUAAAAAAAAAAAAAAD/fwAA/38AAAAAAAAJAAAABAAAAAABAAEMAAAAEAAAAAAAAAAAAAAAAAAAAAAAAAAeAAAAaAAAAAAAAAAAAAAAAAAAAAAAAAAAAAAAECcAABAnAAAAAAAAAAAAAAAAAAAAAAAAAAAAAAAAAAAAAAAAAAAAABQAAAAAAAAAwMD/AAAAAABkAAAAMgAAAAAAAABkAAAAAAAAAH9/fwAKAAAAHwAAAFQAAACDwLoF////AQAAAAAAAAAAAAAAAAAAAAAAAAAAAAAAAAAAAAAAAAAAAP8AAH9/fwDy8vIDzMzMAMDA/wB/f38AAAAAAAAAAAAAAAAAAAAAAAAAAAAhAAAAGAAAABQAAAApJwAAnRgAAHwoAACfGAAAAAAAACYAAAAIAAAA//////////8="/>
+              </a:ext>
+            </a:extLst>
+          </p:cNvSpPr>
+          <p:nvPr/>
+        </p:nvSpPr>
+        <p:spPr>
+          <a:xfrm>
+            <a:off x="6365875" y="4001135"/>
+            <a:ext cx="215265" cy="1270"/>
+          </a:xfrm>
+          <a:prstGeom prst="line">
+            <a:avLst/>
+          </a:prstGeom>
+          <a:noFill/>
+          <a:ln w="25400" cap="flat" cmpd="sng" algn="ctr">
+            <a:solidFill>
+              <a:srgbClr val="00FF00"/>
+            </a:solidFill>
+            <a:prstDash val="solid"/>
+            <a:headEnd type="none"/>
+            <a:tailEnd type="stealth" w="lg" len="lg"/>
+          </a:ln>
+          <a:effectLst/>
+        </p:spPr>
+      </p:sp>
+      <p:sp>
+        <p:nvSpPr>
+          <p:cNvPr id="19" name="Line6"/>
+          <p:cNvSpPr>
+            <a:extLst>
+              <a:ext uri="smNativeData">
+                <pr:smNativeData xmlns:pr="smNativeData" val="SMDATA_13_TQCXXhMAAAAlAAAACgAAAA8BAAAAkAAAAEgAAACQAAAASAAAAAAAAAAAAAAAAAAAAAEAAABQAAAAAAAAAAAA4D8AAAAAAADgPwAAAAAAAOA/AAAAAAAA4D8AAAAAAADgPwAAAAAAAOA/AAAAAAAA4D8AAAAAAADgPwAAAAAAAOA/AAAAAAAA4D8CAAAAjAAAAAAAAAAAAAAAg8C6DP///wgAAAAAAAAAAAAAAAAAAAAAAAAAAAAAAAAAAAAAZAAAAAEAAABAAAAAAAAAAAAAAAAAAAAAAAAAAAAAAAAAAAAAAAAAAAAAAAAAAAAAAAAAAAAAAAAAAAAAAAAAAAAAAAAAAAAAAAAAAAAAAAAAAAAAAAAAAAAAAAAAAAAAFAAAADwAAAABAAAAAAAAAP8AAAAoAAAAAQAAABQAAAAUAAAAFAAAAAEAAAABAAAAlgAAAJYAAAAAAAAAZAAAAGQAAAAVAAAAYAAAAAAAAAAAAAAADwAAACADAAAAAAAAAAAAAAEAAACgMgAAVgcAAKr4//8BAAAAf39/AAEAAABkAAAAAAAAABQAAABAHwAAAAAAACYAAAAAAAAAwOD//wAAAAAmAAAAZAAAABYAAABMAAAAAAAAAAAAAAAEAAAAAAAAAAEAAADy8vIKAAAAACgAAAAoAAAAZAAAAGQAAAAAAAAAzMzMAAAAAABQAAAAUAAAAGQAAABkAAAAAAAAABcAAAAUAAAAAAAAAAAAAAD/fwAA/38AAAAAAAAJAAAABAAAAAABAAEMAAAAEAAAAAAAAAAAAAAAAAAAAAAAAAAeAAAAaAAAAAAAAAAAAAAAAAAAAAAAAAAAAAAAECcAABAnAAAAAAAAAAAAAAAAAAAAAAAAAAAAAAAAAAAAAAAAAAAAABQAAAAAAAAAwMD/AAAAAABkAAAAMgAAAAAAAABkAAAAAAAAAH9/fwAKAAAAHwAAAFQAAACDwLoF////AQAAAAAAAAAAAAAAAAAAAAAAAAAAAAAAAAAAAAAAAAAA/wAAAH9/fwDy8vIDzMzMAMDA/wB/f38AAAAAAAAAAAAAAAAAAAAAAAAAAAAhAAAAGAAAABQAAAD3JgAAMxkAAEooAAA1GQAAAAAAACYAAAAIAAAA//////////8="/>
+              </a:ext>
+            </a:extLst>
+          </p:cNvSpPr>
+          <p:nvPr/>
+        </p:nvSpPr>
+        <p:spPr>
+          <a:xfrm>
+            <a:off x="6334125" y="4096385"/>
+            <a:ext cx="215265" cy="1270"/>
+          </a:xfrm>
+          <a:prstGeom prst="line">
+            <a:avLst/>
+          </a:prstGeom>
+          <a:noFill/>
+          <a:ln w="25400" cap="flat" cmpd="sng" algn="ctr">
+            <a:solidFill>
+              <a:srgbClr val="FF0000"/>
+            </a:solidFill>
+            <a:prstDash val="solid"/>
+            <a:headEnd type="stealth" w="lg" len="lg"/>
+            <a:tailEnd type="none"/>
+          </a:ln>
+          <a:effectLst/>
+        </p:spPr>
+      </p:sp>
+      <p:sp>
+        <p:nvSpPr>
+          <p:cNvPr id="20" name="Line7"/>
+          <p:cNvSpPr>
+            <a:extLst>
+              <a:ext uri="smNativeData">
+                <pr:smNativeData xmlns:pr="smNativeData" val="SMDATA_13_TQCXXhMAAAAlAAAACgAAAA8BAAAAkAAAAEgAAACQAAAASAAAAAAAAAAAAAAAAAAAAAEAAABQAAAAAAAAAAAA4D8AAAAAAADgPwAAAAAAAOA/AAAAAAAA4D8AAAAAAADgPwAAAAAAAOA/AAAAAAAA4D8AAAAAAADgPwAAAAAAAOA/AAAAAAAA4D8CAAAAjAAAAAAAAAAAAAAAg8C6DP///wgAAAAAAAAAAAAAAAAAAAAAAAAAAAAAAAAAAAAAZAAAAAEAAABAAAAAAAAAAAAAAAAAAAAAAAAAAAAAAAAAAAAAAAAAAAAAAAAAAAAAAAAAAAAAAAAAAAAAAAAAAAAAAAAAAAAAAAAAAAAAAAAAAAAAAAAAAAAAAAAAAAAAFAAAADwAAAABAAAAAAAAAAD/AAAoAAAAAQAAABQAAAAUAAAAFAAAAAEAAAAAAAAAZAAAAGQAAAABAAAAlgAAAJYAAAAVAAAAYAAAAAAAAAAAAAAADwAAACADAAAAAAAAAAAAAAEAAACgMgAAVgcAAKr4//8BAAAAf39/AAEAAABkAAAAAAAAABQAAABAHwAAAAAAACYAAAAAAAAAwOD//wAAAAAmAAAAZAAAABYAAABMAAAAAAAAAAAAAAAEAAAAAAAAAAEAAADy8vIKAAAAACgAAAAoAAAAZAAAAGQAAAAAAAAAzMzMAAAAAABQAAAAUAAAAGQAAABkAAAAAAAAABcAAAAUAAAAAAAAAAAAAAD/fwAA/38AAAAAAAAJAAAABAAAAAAAAAAMAAAAEAAAAAAAAAAAAAAAAAAAAAAAAAAeAAAAaAAAAAAAAAAAAAAAAAAAAAAAAAAAAAAAECcAABAnAAAAAAAAAAAAAAAAAAAAAAAAAAAAAAAAAAAAAAAAAAAAABQAAAAAAAAAwMD/AAAAAABkAAAAMgAAAAAAAABkAAAAAAAAAH9/fwAKAAAAHwAAAFQAAACDwLoF////AQAAAAAAAAAAAAAAAAAAAAAAAAAAAAAAAAAAAAAAAAAAAP8AAH9/fwDy8vIDzMzMAMDA/wB/f38AAAAAAAAAAAAAAAAAAAAAAAAAAAAhAAAAGAAAABQAAADZKwAAnRgAACwtAACfGAAAAAAAACYAAAAIAAAA//////////8="/>
+              </a:ext>
+            </a:extLst>
+          </p:cNvSpPr>
+          <p:nvPr/>
+        </p:nvSpPr>
+        <p:spPr>
+          <a:xfrm>
+            <a:off x="7127875" y="4001135"/>
+            <a:ext cx="215265" cy="1270"/>
+          </a:xfrm>
+          <a:prstGeom prst="line">
+            <a:avLst/>
+          </a:prstGeom>
+          <a:noFill/>
+          <a:ln w="25400" cap="flat" cmpd="sng" algn="ctr">
+            <a:solidFill>
+              <a:srgbClr val="00FF00"/>
+            </a:solidFill>
+            <a:prstDash val="solid"/>
+            <a:headEnd type="none"/>
+            <a:tailEnd type="stealth" w="lg" len="lg"/>
+          </a:ln>
+          <a:effectLst/>
+        </p:spPr>
+      </p:sp>
+      <p:sp>
+        <p:nvSpPr>
+          <p:cNvPr id="21" name="Line8"/>
+          <p:cNvSpPr>
+            <a:extLst>
+              <a:ext uri="smNativeData">
+                <pr:smNativeData xmlns:pr="smNativeData" val="SMDATA_13_TQCXXhMAAAAlAAAACgAAAA8BAAAAkAAAAEgAAACQAAAASAAAAAAAAAAAAAAAAAAAAAEAAABQAAAAAAAAAAAA4D8AAAAAAADgPwAAAAAAAOA/AAAAAAAA4D8AAAAAAADgPwAAAAAAAOA/AAAAAAAA4D8AAAAAAADgPwAAAAAAAOA/AAAAAAAA4D8CAAAAjAAAAAAAAAAAAAAAg8C6DP///wgAAAAAAAAAAAAAAAAAAAAAAAAAAAAAAAAAAAAAZAAAAAEAAABAAAAAAAAAAAAAAAAAAAAAAAAAAAAAAAAAAAAAAAAAAAAAAAAAAAAAAAAAAAAAAAAAAAAAAAAAAAAAAAAAAAAAAAAAAAAAAAAAAAAAAAAAAAAAAAAAAAAAFAAAADwAAAABAAAAAAAAAP8AAAAoAAAAAQAAABQAAAAUAAAAFAAAAAEAAAABAAAAlgAAAJYAAAAAAAAAZAAAAGQAAAAVAAAAYAAAAAAAAAAAAAAADwAAACADAAAAAAAAAAAAAAEAAACgMgAAVgcAAKr4//8BAAAAf39/AAEAAABkAAAAAAAAABQAAABAHwAAAAAAACYAAAAAAAAAwOD//wAAAAAmAAAAZAAAABYAAABMAAAAAAAAAAAAAAAEAAAAAAAAAAEAAADy8vIKAAAAACgAAAAoAAAAZAAAAGQAAAAAAAAAzMzMAAAAAABQAAAAUAAAAGQAAABkAAAAAAAAABcAAAAUAAAAAAAAAAAAAAD/fwAA/38AAAAAAAAJAAAABAAAAAEAAAAMAAAAEAAAAAAAAAAAAAAAAAAAAAAAAAAeAAAAaAAAAAAAAAAAAAAAAAAAAAAAAAAAAAAAECcAABAnAAAAAAAAAAAAAAAAAAAAAAAAAAAAAAAAAAAAAAAAAAAAABQAAAAAAAAAwMD/AAAAAABkAAAAMgAAAAAAAABkAAAAAAAAAH9/fwAKAAAAHwAAAFQAAACDwLoF////AQAAAAAAAAAAAAAAAAAAAAAAAAAAAAAAAAAAAAAAAAAA/wAAAH9/fwDy8vIDzMzMAMDA/wB/f38AAAAAAAAAAAAAAAAAAAAAAAAAAAAhAAAAGAAAABQAAACnKwAAMxkAAPosAAA1GQAAAAAAACYAAAAIAAAA//////////8="/>
+              </a:ext>
+            </a:extLst>
+          </p:cNvSpPr>
+          <p:nvPr/>
+        </p:nvSpPr>
+        <p:spPr>
+          <a:xfrm>
+            <a:off x="7096125" y="4096385"/>
+            <a:ext cx="215265" cy="1270"/>
+          </a:xfrm>
+          <a:prstGeom prst="line">
+            <a:avLst/>
+          </a:prstGeom>
+          <a:noFill/>
+          <a:ln w="25400" cap="flat" cmpd="sng" algn="ctr">
+            <a:solidFill>
+              <a:srgbClr val="FF0000"/>
+            </a:solidFill>
+            <a:prstDash val="solid"/>
+            <a:headEnd type="stealth" w="lg" len="lg"/>
+            <a:tailEnd type="none"/>
+          </a:ln>
+          <a:effectLst/>
+        </p:spPr>
+      </p:sp>
+      <p:sp>
+        <p:nvSpPr>
+          <p:cNvPr id="22" name="Textbox7"/>
+          <p:cNvSpPr txBox="1">
+            <a:extLst>
+              <a:ext uri="smNativeData">
+                <pr:smNativeData xmlns:pr="smNativeData" val="SMDATA_13_TQCXXhMAAAAlAAAAEgAAAA8BAAAAkAAAAEgAAACQAAAASAAAAAAAAAAAAAAAAAAAAAEAAABQAAAAAAAAAAAA4D8AAAAAAADgPwAAAAAAAOA/AAAAAAAA4D8AAAAAAADgPwAAAAAAAOA/AAAAAAAA4D8AAAAAAADgPwAAAAAAAOA/AAAAAAAA4D8CAAAAjAAAAAAAAAAAAAAAg8C6DP///wgAAAAAAAAAAAAAAAAAAAAAAAAAAAAAAAAAAAAAZAAAAAEAAABAAAAAAAAAAAAAAAAAAAAAAAAAAAAAAAAAAAAAAAAAAAAAAAAAAAAAAAAAAAAAAAAAAAAAAAAAAAAAAAAAAAAAAAAAAAAAAAAAAAAAAAAAAAAAAAAAAAAAFAAAADwAAAAAAAAAAAAAAAAAAAkUAAAAAQAAABQAAAAUAAAAFAAAAAEAAAAAAAAAZAAAAGQAAAAAAAAAZAAAAGQAAAAVAAAAYAAAAAAAAAAAAAAADwAAACADAAAAAAAAAAAAAAEAAACgMgAAVgcAAKr4//8BAAAAf39/AAEAAABkAAAAAAAAABQAAABAHwAAAAAAACYAAAAAAAAAwOD//wAAAAAmAAAAZAAAABYAAABMAAAAAAAAAAAAAAAEAAAAAAAAAAEAAADy8vIKAAAAACgAAAAoAAAAZAAAAGQAAAAAAAAAzMzMAAAAAABQAAAAUAAAAGQAAABkAAAAAAAAABcAAAAUAAAAAAAAAAAAAAD/fwAA/38AAAAAAAAJAAAABAAAAHlsZT4MAAAAEAAAAAAAAAAAAAAAAAAAAAAAAAAeAAAAaAAAAAAAAAAAAAAAAAAAAAAAAAAAAAAAECcAABAnAAAAAAAAAAAAAAAAAAAAAAAAAAAAAAAAAAAAAAAAAAAAABQAAAAAAAAAwMD/AAAAAABkAAAAMgAAAAAAAABkAAAAAAAAAH9/fwAKAAAAHwAAAFQAAACDwLoF////AQAAAAAAAAAAAAAAAAAAAAAAAAAAAAAAAAAAAAAAAAAAAAAAAn9/fwDy8vIDzMzMAMDA/wB/f38AAAAAAAAAAAAAAAAAAAAAAAAAAAAhAAAAGAAAABQAAAACFgAA+xcAAIoZAADbGQAAAAAAACYAAAAIAAAA//////////8="/>
+              </a:ext>
+            </a:extLst>
+          </p:cNvSpPr>
+          <p:nvPr/>
+        </p:nvSpPr>
+        <p:spPr>
+          <a:xfrm>
+            <a:off x="3577590" y="3898265"/>
+            <a:ext cx="574040" cy="304800"/>
+          </a:xfrm>
+          <a:prstGeom prst="rect">
+            <a:avLst/>
+          </a:prstGeom>
+          <a:noFill/>
+          <a:ln>
+            <a:noFill/>
+          </a:ln>
+          <a:effectLst/>
+        </p:spPr>
+        <p:txBody>
+          <a:bodyPr vert="horz" wrap="square" numCol="1" spcCol="215900" anchor="t"/>
+          <a:lstStyle/>
+          <a:p>
+            <a:pPr marL="0" indent="0" defTabSz="449580">
+              <a:spcBef>
+                <a:spcPts val="1000"/>
+              </a:spcBef>
+              <a:buNone/>
+              <a:tabLst/>
+              <a:defRPr sz="1000">
+                <a:latin typeface="Manjari" pitchFamily="1" charset="0"/>
+                <a:ea typeface="Manjari" pitchFamily="1" charset="0"/>
+                <a:cs typeface="Manjari" pitchFamily="1" charset="0"/>
+              </a:defRPr>
+            </a:pPr>
+            <a:r>
+              <a:t>Task 1</a:t>
+            </a:r>
+          </a:p>
+        </p:txBody>
+      </p:sp>
+      <p:sp>
+        <p:nvSpPr>
+          <p:cNvPr id="23" name="Textbox8"/>
+          <p:cNvSpPr txBox="1">
+            <a:extLst>
+              <a:ext uri="smNativeData">
+                <pr:smNativeData xmlns:pr="smNativeData" val="SMDATA_13_TQCXXhMAAAAlAAAAEgAAAA8BAAAAkAAAAEgAAACQAAAASAAAAAAAAAAAAAAAAAAAAAEAAABQAAAAAAAAAAAA4D8AAAAAAADgPwAAAAAAAOA/AAAAAAAA4D8AAAAAAADgPwAAAAAAAOA/AAAAAAAA4D8AAAAAAADgPwAAAAAAAOA/AAAAAAAA4D8CAAAAjAAAAAAAAAAAAAAAg8C6DP///wgAAAAAAAAAAAAAAAAAAAAAAAAAAAAAAAAAAAAAZAAAAAEAAABAAAAAAAAAAAAAAAAAAAAAAAAAAAAAAAAAAAAAAAAAAAAAAAAAAAAAAAAAAAAAAAAAAAAAAAAAAAAAAAAAAAAAAAAAAAAAAAAAAAAAAAAAAAAAAAAAAAAAFAAAADwAAAAAAAAAAAAAAAAAAAkUAAAAAQAAABQAAAAUAAAAFAAAAAEAAAAAAAAAZAAAAGQAAAAAAAAAZAAAAGQAAAAVAAAAYAAAAAAAAAAAAAAADwAAACADAAAAAAAAAAAAAAEAAACgMgAAVgcAAKr4//8BAAAAf39/AAEAAABkAAAAAAAAABQAAABAHwAAAAAAACYAAAAAAAAAwOD//wAAAAAmAAAAZAAAABYAAABMAAAAAAAAAAAAAAAEAAAAAAAAAAEAAADy8vIKAAAAACgAAAAoAAAAZAAAAGQAAAAAAAAAzMzMAAAAAABQAAAAUAAAAGQAAABkAAAAAAAAABcAAAAUAAAAAAAAAAAAAAD/fwAA/38AAAAAAAAJAAAABAAAAAAAAAAMAAAAEAAAAAAAAAAAAAAAAAAAAAAAAAAeAAAAaAAAAAAAAAAAAAAAAAAAAAAAAAAAAAAAECcAABAnAAAAAAAAAAAAAAAAAAAAAAAAAAAAAAAAAAAAAAAAAAAAABQAAAAAAAAAwMD/AAAAAABkAAAAMgAAAAAAAABkAAAAAAAAAH9/fwAKAAAAHwAAAFQAAACDwLoF////AQAAAAAAAAAAAAAAAAAAAAAAAAAAAAAAAAAAAAAAAAAAAAAAAn9/fwDy8vIDzMzMAMDA/wB/f38AAAAAAAAAAAAAAAAAAAAAAAAAAAAhAAAAGAAAABQAAABHGgAAERgAAM8dAADxGQAAAAAAACYAAAAIAAAA//////////8="/>
+              </a:ext>
+            </a:extLst>
+          </p:cNvSpPr>
+          <p:nvPr/>
+        </p:nvSpPr>
+        <p:spPr>
+          <a:xfrm>
+            <a:off x="4271645" y="3912235"/>
+            <a:ext cx="574040" cy="304800"/>
+          </a:xfrm>
+          <a:prstGeom prst="rect">
+            <a:avLst/>
+          </a:prstGeom>
+          <a:noFill/>
+          <a:ln>
+            <a:noFill/>
+          </a:ln>
+          <a:effectLst/>
+        </p:spPr>
+        <p:txBody>
+          <a:bodyPr vert="horz" wrap="square" numCol="1" spcCol="215900" anchor="t"/>
+          <a:lstStyle/>
+          <a:p>
+            <a:pPr marL="0" indent="0" defTabSz="449580">
+              <a:spcBef>
+                <a:spcPts val="1000"/>
+              </a:spcBef>
+              <a:buNone/>
+              <a:tabLst/>
+              <a:defRPr sz="1000">
+                <a:latin typeface="Manjari" pitchFamily="1" charset="0"/>
+                <a:ea typeface="Manjari" pitchFamily="1" charset="0"/>
+                <a:cs typeface="Manjari" pitchFamily="1" charset="0"/>
+              </a:defRPr>
+            </a:pPr>
+            <a:r>
+              <a:t>Task 2</a:t>
+            </a:r>
+          </a:p>
+        </p:txBody>
+      </p:sp>
+      <p:sp>
+        <p:nvSpPr>
+          <p:cNvPr id="24" name="Textbox9"/>
+          <p:cNvSpPr txBox="1">
+            <a:extLst>
+              <a:ext uri="smNativeData">
+                <pr:smNativeData xmlns:pr="smNativeData" val="SMDATA_13_TQCXXhMAAAAlAAAAEgAAAA8BAAAAkAAAAEgAAACQAAAASAAAAAAAAAAAAAAAAAAAAAEAAABQAAAAAAAAAAAA4D8AAAAAAADgPwAAAAAAAOA/AAAAAAAA4D8AAAAAAADgPwAAAAAAAOA/AAAAAAAA4D8AAAAAAADgPwAAAAAAAOA/AAAAAAAA4D8CAAAAjAAAAAAAAAAAAAAAg8C6DP///wgAAAAAAAAAAAAAAAAAAAAAAAAAAAAAAAAAAAAAZAAAAAEAAABAAAAAAAAAAAAAAAAAAAAAAAAAAAAAAAAAAAAAAAAAAAAAAAAAAAAAAAAAAAAAAAAAAAAAAAAAAAAAAAAAAAAAAAAAAAAAAAAAAAAAAAAAAAAAAAAAAAAAFAAAADwAAAAAAAAAAAAAAAAAAAkUAAAAAQAAABQAAAAUAAAAFAAAAAEAAAAAAAAAZAAAAGQAAAAAAAAAZAAAAGQAAAAVAAAAYAAAAAAAAAAAAAAADwAAACADAAAAAAAAAAAAAAEAAACgMgAAVgcAAKr4//8BAAAAf39/AAEAAABkAAAAAAAAABQAAABAHwAAAAAAACYAAAAAAAAAwOD//wAAAAAmAAAAZAAAABYAAABMAAAAAAAAAAAAAAAEAAAAAAAAAAEAAADy8vIKAAAAACgAAAAoAAAAZAAAAGQAAAAAAAAAzMzMAAAAAABQAAAAUAAAAGQAAABkAAAAAAAAABcAAAAUAAAAAAAAAAAAAAD/fwAA/38AAAAAAAAJAAAABAAAAAAAAAAMAAAAEAAAAAAAAAAAAAAAAAAAAAAAAAAeAAAAaAAAAAAAAAAAAAAAAAAAAAAAAAAAAAAAECcAABAnAAAAAAAAAAAAAAAAAAAAAAAAAAAAAAAAAAAAAAAAAAAAABQAAAAAAAAAwMD/AAAAAABkAAAAMgAAAAAAAABkAAAAAAAAAH9/fwAKAAAAHwAAAFQAAACDwLoF////AQAAAAAAAAAAAAAAAAAAAAAAAAAAAAAAAAAAAAAAAAAAAAAAAn9/fwDy8vIDzMzMAMDA/wB/f38AAAAAAAAAAAAAAAAAAAAAAAAAAAAhAAAAGAAAABQAAADWHgAA+xcAAF4iAADbGQAAAAAAACYAAAAIAAAA//////////8="/>
+              </a:ext>
+            </a:extLst>
+          </p:cNvSpPr>
+          <p:nvPr/>
+        </p:nvSpPr>
+        <p:spPr>
+          <a:xfrm>
+            <a:off x="5012690" y="3898265"/>
+            <a:ext cx="574040" cy="304800"/>
+          </a:xfrm>
+          <a:prstGeom prst="rect">
+            <a:avLst/>
+          </a:prstGeom>
+          <a:noFill/>
+          <a:ln>
+            <a:noFill/>
+          </a:ln>
+          <a:effectLst/>
+        </p:spPr>
+        <p:txBody>
+          <a:bodyPr vert="horz" wrap="square" numCol="1" spcCol="215900" anchor="t"/>
+          <a:lstStyle/>
+          <a:p>
+            <a:pPr marL="0" indent="0" defTabSz="449580">
+              <a:spcBef>
+                <a:spcPts val="1000"/>
+              </a:spcBef>
+              <a:buNone/>
+              <a:tabLst/>
+              <a:defRPr sz="1000">
+                <a:latin typeface="Manjari" pitchFamily="1" charset="0"/>
+                <a:ea typeface="Manjari" pitchFamily="1" charset="0"/>
+                <a:cs typeface="Manjari" pitchFamily="1" charset="0"/>
+              </a:defRPr>
+            </a:pPr>
+            <a:r>
+              <a:t>Task 3</a:t>
+            </a:r>
+          </a:p>
+        </p:txBody>
+      </p:sp>
+      <p:sp>
+        <p:nvSpPr>
+          <p:cNvPr id="25" name="Line9"/>
+          <p:cNvSpPr>
+            <a:extLst>
+              <a:ext uri="smNativeData">
+                <pr:smNativeData xmlns:pr="smNativeData" val="SMDATA_13_TQCXXhMAAAAlAAAACgAAAA8BAAAAkAAAAEgAAACQAAAASAAAAAAAAAAAAAAAAAAAAAEAAABQAAAAAAAAAAAA4D8AAAAAAADgPwAAAAAAAOA/AAAAAAAA4D8AAAAAAADgPwAAAAAAAOA/AAAAAAAA4D8AAAAAAADgPwAAAAAAAOA/AAAAAAAA4D8CAAAAjAAAAAAAAAAAAAAAg8C6DP///wgAAAAAAAAAAAAAAAAAAAAAAAAAAAAAAAAAAAAAZAAAAAEAAABAAAAAAAAAAAAAAAAAAAAAAAAAAAAAAAAAAAAAAAAAAAAAAAAAAAAAAAAAAAAAAAAAAAAAAAAAAAAAAAAAAAAAAAAAAAAAAAAAAAAAAAAAAAAAAAAAAAAAFAAAADwAAAABAAAAAAAAAAD/AAAoAAAAAQAAABQAAAAUAAAAFAAAAAEAAAAAAAAAZAAAAGQAAAABAAAAlgAAAJYAAAAVAAAAYAAAAAAAAAAAAAAADwAAACADAAAAAAAAAAAAAAEAAACgMgAAVgcAAKr4//8BAAAAf39/AAEAAABkAAAAAAAAABQAAABAHwAAAAAAACYAAAAAAAAAwOD//wAAAAAmAAAAZAAAABYAAABMAAAAAAAAAAAAAAAEAAAAAAAAAAEAAADy8vIKAAAAACgAAAAoAAAAZAAAAGQAAAAAAAAAzMzMAAAAAABQAAAAUAAAAGQAAABkAAAAAAAAABcAAAAUAAAAAAAAAAAAAAD/fwAA/38AAAAAAAAJAAAABAAAAAABAAEMAAAAEAAAAAAAAAAAAAAAAAAAAAAAAAAeAAAAaAAAAAAAAAAAAAAAAAAAAAAAAAAAAAAAECcAABAnAAAAAAAAAAAAAAAAAAAAAAAAAAAAAAAAAAAAAAAAAAAAABQAAAAAAAAAwMD/AAAAAABkAAAAMgAAAAAAAABkAAAAAAAAAH9/fwAKAAAAHwAAAFQAAACDwLoF////AQAAAAAAAAAAAAAAAAAAAAAAAAAAAAAAAAAAAAAAAAAAAP8AAH9/fwDy8vIDzMzMAMDA/wB/f38AAAAAAAAAAAAAAAAAAAAAAAAAAAAhAAAAGAAAABQAAAAZGQAAnRgAAGwaAACfGAAAAAAAACYAAAAIAAAA//////////8="/>
+              </a:ext>
+            </a:extLst>
+          </p:cNvSpPr>
+          <p:nvPr/>
+        </p:nvSpPr>
+        <p:spPr>
+          <a:xfrm>
+            <a:off x="4079875" y="4001135"/>
+            <a:ext cx="215265" cy="1270"/>
+          </a:xfrm>
+          <a:prstGeom prst="line">
+            <a:avLst/>
+          </a:prstGeom>
+          <a:noFill/>
+          <a:ln w="25400" cap="flat" cmpd="sng" algn="ctr">
+            <a:solidFill>
+              <a:srgbClr val="00FF00"/>
+            </a:solidFill>
+            <a:prstDash val="solid"/>
+            <a:headEnd type="none"/>
+            <a:tailEnd type="stealth" w="lg" len="lg"/>
+          </a:ln>
+          <a:effectLst/>
+        </p:spPr>
+      </p:sp>
+      <p:sp>
+        <p:nvSpPr>
+          <p:cNvPr id="26" name="Line10"/>
+          <p:cNvSpPr>
+            <a:extLst>
+              <a:ext uri="smNativeData">
+                <pr:smNativeData xmlns:pr="smNativeData" val="SMDATA_13_TQCXXhMAAAAlAAAACgAAAA8BAAAAkAAAAEgAAACQAAAASAAAAAAAAAAAAAAAAAAAAAEAAABQAAAAAAAAAAAA4D8AAAAAAADgPwAAAAAAAOA/AAAAAAAA4D8AAAAAAADgPwAAAAAAAOA/AAAAAAAA4D8AAAAAAADgPwAAAAAAAOA/AAAAAAAA4D8CAAAAjAAAAAAAAAAAAAAAg8C6DP///wgAAAAAAAAAAAAAAAAAAAAAAAAAAAAAAAAAAAAAZAAAAAEAAABAAAAAAAAAAAAAAAAAAAAAAAAAAAAAAAAAAAAAAAAAAAAAAAAAAAAAAAAAAAAAAAAAAAAAAAAAAAAAAAAAAAAAAAAAAAAAAAAAAAAAAAAAAAAAAAAAAAAAFAAAADwAAAABAAAAAAAAAP8AAAAoAAAAAQAAABQAAAAUAAAAFAAAAAEAAAABAAAAlgAAAJYAAAAAAAAAZAAAAGQAAAAVAAAAYAAAAAAAAAAAAAAADwAAACADAAAAAAAAAAAAAAEAAACgMgAAVgcAAKr4//8BAAAAf39/AAEAAABkAAAAAAAAABQAAABAHwAAAAAAACYAAAAAAAAAwOD//wAAAAAmAAAAZAAAABYAAABMAAAAAAAAAAAAAAAEAAAAAAAAAAEAAADy8vIKAAAAACgAAAAoAAAAZAAAAGQAAAAAAAAAzMzMAAAAAABQAAAAUAAAAGQAAABkAAAAAAAAABcAAAAUAAAAAAAAAAAAAAD/fwAA/38AAAAAAAAJAAAABAAAAGEGAAAMAAAAEAAAAAAAAAAAAAAAAAAAAAAAAAAeAAAAaAAAAAAAAAAAAAAAAAAAAAAAAAAAAAAAECcAABAnAAAAAAAAAAAAAAAAAAAAAAAAAAAAAAAAAAAAAAAAAAAAABQAAAAAAAAAwMD/AAAAAABkAAAAMgAAAAAAAABkAAAAAAAAAH9/fwAKAAAAHwAAAFQAAACDwLoF////AQAAAAAAAAAAAAAAAAAAAAAAAAAAAAAAAAAAAAAAAAAA/wAAAH9/fwDy8vIDzMzMAMDA/wB/f38AAAAAAAAAAAAAAAAAAAAAAAAAAAAhAAAAGAAAABQAAADnGAAAMxkAADoaAAA1GQAAAAAAACYAAAAIAAAA//////////8="/>
+              </a:ext>
+            </a:extLst>
+          </p:cNvSpPr>
+          <p:nvPr/>
+        </p:nvSpPr>
+        <p:spPr>
+          <a:xfrm>
+            <a:off x="4048125" y="4096385"/>
+            <a:ext cx="215265" cy="1270"/>
+          </a:xfrm>
+          <a:prstGeom prst="line">
+            <a:avLst/>
+          </a:prstGeom>
+          <a:noFill/>
+          <a:ln w="25400" cap="flat" cmpd="sng" algn="ctr">
+            <a:solidFill>
+              <a:srgbClr val="FF0000"/>
+            </a:solidFill>
+            <a:prstDash val="solid"/>
+            <a:headEnd type="stealth" w="lg" len="lg"/>
+            <a:tailEnd type="none"/>
+          </a:ln>
+          <a:effectLst/>
+        </p:spPr>
+      </p:sp>
+      <p:sp>
+        <p:nvSpPr>
+          <p:cNvPr id="27" name="Line11"/>
+          <p:cNvSpPr>
+            <a:extLst>
+              <a:ext uri="smNativeData">
+                <pr:smNativeData xmlns:pr="smNativeData" val="SMDATA_13_TQCXXhMAAAAlAAAACgAAAA8BAAAAkAAAAEgAAACQAAAASAAAAAAAAAAAAAAAAAAAAAEAAABQAAAAAAAAAAAA4D8AAAAAAADgPwAAAAAAAOA/AAAAAAAA4D8AAAAAAADgPwAAAAAAAOA/AAAAAAAA4D8AAAAAAADgPwAAAAAAAOA/AAAAAAAA4D8CAAAAjAAAAAAAAAAAAAAAg8C6DP///wgAAAAAAAAAAAAAAAAAAAAAAAAAAAAAAAAAAAAAZAAAAAEAAABAAAAAAAAAAAAAAAAAAAAAAAAAAAAAAAAAAAAAAAAAAAAAAAAAAAAAAAAAAAAAAAAAAAAAAAAAAAAAAAAAAAAAAAAAAAAAAAAAAAAAAAAAAAAAAAAAAAAAFAAAADwAAAABAAAAAAAAAAD/AAAoAAAAAQAAABQAAAAUAAAAFAAAAAEAAAAAAAAAZAAAAGQAAAABAAAAlgAAAJYAAAAVAAAAYAAAAAAAAAAAAAAADwAAACADAAAAAAAAAAAAAAEAAACgMgAAVgcAAKr4//8BAAAAf39/AAEAAABkAAAAAAAAABQAAABAHwAAAAAAACYAAAAAAAAAwOD//wAAAAAmAAAAZAAAABYAAABMAAAAAAAAAAAAAAAEAAAAAAAAAAEAAADy8vIKAAAAACgAAAAoAAAAZAAAAGQAAAAAAAAAzMzMAAAAAABQAAAAUAAAAGQAAABkAAAAAAAAABcAAAAUAAAAAAAAAAAAAAD/fwAA/38AAAAAAAAJAAAABAAAAAAAAAAMAAAAEAAAAAAAAAAAAAAAAAAAAAAAAAAeAAAAaAAAAAAAAAAAAAAAAAAAAAAAAAAAAAAAECcAABAnAAAAAAAAAAAAAAAAAAAAAAAAAAAAAAAAAAAAAAAAAAAAABQAAAAAAAAAwMD/AAAAAABkAAAAMgAAAAAAAABkAAAAAAAAAH9/fwAKAAAAHwAAAFQAAACDwLoF////AQAAAAAAAAAAAAAAAAAAAAAAAAAAAAAAAAAAAAAAAAAAAP8AAH9/fwDy8vIDzMzMAMDA/wB/f38AAAAAAAAAAAAAAAAAAAAAAAAAAAAhAAAAGAAAABQAAADJHQAAnRgAABwfAACfGAAAAAAAACYAAAAIAAAA//////////8="/>
+              </a:ext>
+            </a:extLst>
+          </p:cNvSpPr>
+          <p:nvPr/>
+        </p:nvSpPr>
+        <p:spPr>
+          <a:xfrm>
+            <a:off x="4841875" y="4001135"/>
+            <a:ext cx="215265" cy="1270"/>
+          </a:xfrm>
+          <a:prstGeom prst="line">
+            <a:avLst/>
+          </a:prstGeom>
+          <a:noFill/>
+          <a:ln w="25400" cap="flat" cmpd="sng" algn="ctr">
+            <a:solidFill>
+              <a:srgbClr val="00FF00"/>
+            </a:solidFill>
+            <a:prstDash val="solid"/>
+            <a:headEnd type="none"/>
+            <a:tailEnd type="stealth" w="lg" len="lg"/>
+          </a:ln>
+          <a:effectLst/>
+        </p:spPr>
+      </p:sp>
+      <p:sp>
+        <p:nvSpPr>
+          <p:cNvPr id="28" name="Line12"/>
+          <p:cNvSpPr>
+            <a:extLst>
+              <a:ext uri="smNativeData">
+                <pr:smNativeData xmlns:pr="smNativeData" val="SMDATA_13_TQCXXhMAAAAlAAAACgAAAA8BAAAAkAAAAEgAAACQAAAASAAAAAAAAAAAAAAAAAAAAAEAAABQAAAAAAAAAAAA4D8AAAAAAADgPwAAAAAAAOA/AAAAAAAA4D8AAAAAAADgPwAAAAAAAOA/AAAAAAAA4D8AAAAAAADgPwAAAAAAAOA/AAAAAAAA4D8CAAAAjAAAAAAAAAAAAAAAg8C6DP///wgAAAAAAAAAAAAAAAAAAAAAAAAAAAAAAAAAAAAAZAAAAAEAAABAAAAAAAAAAAAAAAAAAAAAAAAAAAAAAAAAAAAAAAAAAAAAAAAAAAAAAAAAAAAAAAAAAAAAAAAAAAAAAAAAAAAAAAAAAAAAAAAAAAAAAAAAAAAAAAAAAAAAFAAAADwAAAABAAAAAAAAAP8AAAAoAAAAAQAAABQAAAAUAAAAFAAAAAEAAAABAAAAlgAAAJYAAAAAAAAAZAAAAGQAAAAVAAAAYAAAAAAAAAAAAAAADwAAACADAAAAAAAAAAAAAAEAAACgMgAAVgcAAKr4//8BAAAAf39/AAEAAABkAAAAAAAAABQAAABAHwAAAAAAACYAAAAAAAAAwOD//wAAAAAmAAAAZAAAABYAAABMAAAAAAAAAAAAAAAEAAAAAAAAAAEAAADy8vIKAAAAACgAAAAoAAAAZAAAAGQAAAAAAAAAzMzMAAAAAABQAAAAUAAAAGQAAABkAAAAAAAAABcAAAAUAAAAAAAAAAAAAAD/fwAA/38AAAAAAAAJAAAABAAAAOJB5EUMAAAAEAAAAAAAAAAAAAAAAAAAAAAAAAAeAAAAaAAAAAAAAAAAAAAAAAAAAAAAAAAAAAAAECcAABAnAAAAAAAAAAAAAAAAAAAAAAAAAAAAAAAAAAAAAAAAAAAAABQAAAAAAAAAwMD/AAAAAABkAAAAMgAAAAAAAABkAAAAAAAAAH9/fwAKAAAAHwAAAFQAAACDwLoF////AQAAAAAAAAAAAAAAAAAAAAAAAAAAAAAAAAAAAAAAAAAA/wAAAH9/fwDy8vIDzMzMAMDA/wB/f38AAAAAAAAAAAAAAAAAAAAAAAAAAAAhAAAAGAAAABQAAAB2HQAARBkAAMkeAABGGQAAAAAAACYAAAAIAAAA//////////8="/>
+              </a:ext>
+            </a:extLst>
+          </p:cNvSpPr>
+          <p:nvPr/>
+        </p:nvSpPr>
+        <p:spPr>
+          <a:xfrm>
+            <a:off x="4789170" y="4107180"/>
+            <a:ext cx="215265" cy="1270"/>
+          </a:xfrm>
+          <a:prstGeom prst="line">
+            <a:avLst/>
+          </a:prstGeom>
+          <a:noFill/>
+          <a:ln w="25400" cap="flat" cmpd="sng" algn="ctr">
+            <a:solidFill>
+              <a:srgbClr val="FF0000"/>
+            </a:solidFill>
+            <a:prstDash val="solid"/>
+            <a:headEnd type="stealth" w="lg" len="lg"/>
+            <a:tailEnd type="none"/>
+          </a:ln>
+          <a:effectLst/>
+        </p:spPr>
+      </p:sp>
+      <p:cxnSp>
+        <p:nvCxnSpPr>
+          <p:cNvPr id="29" name="Connector1"/>
+          <p:cNvCxnSpPr>
+            <a:extLst>
+              <a:ext uri="smNativeData">
+                <pr:smNativeData xmlns:pr="smNativeData" val="SMDATA_13_TQCXXhMAAAAlAAAADgAAAA8BAAAAkAAAAEgAAACQAAAASAAAAAAAAAAAAAAAAAAAAAEAAABQAAAAFMIlOiFc8r9VVVVVVVUFQAAAAAAAAOA/AAAAAAAA4D8AAAAAAADgPwAAAAAAAOA/AAAAAAAA4D8AAAAAAADgPwAAAAAAAOA/AAAAAAAA4D8CAAAAjAAAAAAAAAAAAAAAg8C6DP///wgAAAAAAAAAAAAAAAAAAAAAAAAAAAAAAAAAAAAAZAAAAAEAAABAAAAAAAAAAAAAAAAAAAAAAAAAAAAAAAAAAAAAAAAAAAAAAAAAAAAAAAAAAAAAAAAAAAAAAAAAAAAAAAAAAAAAAAAAAAAAAAAAAAAAAAAAAAAAAAAAAAAAFAAAADwAAAABAAAAAAAAAP8AAAAoAAAAAQAAABQAAAAUAAAAFAAAAAEAAAAAAAAAZAAAAGQAAAABAAAAlgAAAJYAAAAVAAAAYAAAAAAAAAAAAAAADwAAACADAAAAAAAAAAAAAAEAAACgMgAAVgcAAKr4//8BAAAAf39/AAEAAABkAAAAAAAAABQAAABAHwAAAAAAACYAAAAAAAAAwOD//wAAAAAmAAAAZAAAABYAAABMAAAAAAAAAAAAAAAEAAAAAAAAAAEAAADy8vIKAAAAACgAAAAoAAAAZAAAAGQAAAAAAAAAzMzMAAAAAABQAAAAUAAAAGQAAABkAAAAAAAAABcAAAAUAAAAAAAAAAAAAAD/fwAA/38AAAAAAAAJAAAABAAAAAABAAEMAAAAEAAAAAAAAAAAAAAAAAAAAAAAAAAeAAAAaAAAAAAAAAAAAAAAAAAAAAAAAAAAAAAAECcAABAnAAAAAAAAAAAAAAAAAAAAAAAAAAAAAAAAAAAAAAAAAAAAABQAAAAAAAAAwMD/AAAAAABkAAAAMgAAAAAAAABkAAAAAAAAAH9/fwAKAAAAHwAAAFQAAACDwLoF////AQAAAAAAAAAAAAAAAAAAAAAAAAAAAAAAAAAAAAAAAAAA/wAAAH9/fwDy8vIDzMzMAMDA/wB/f38AAAAAAAAAAAAAAAAAAAAAAAAAAAAhAAAAGAAAABQAAADuCAAAHRkAAIYTAAANGgAAAAAAACYAAAAIAAAA//////////8="/>
+              </a:ext>
+            </a:extLst>
+          </p:cNvCxnSpPr>
+          <p:nvPr/>
+        </p:nvCxnSpPr>
+        <p:spPr>
+          <a:xfrm rot="10800000">
+            <a:off x="1451610" y="4082415"/>
+            <a:ext cx="1722120" cy="152400"/>
+          </a:xfrm>
+          <a:prstGeom prst="bentConnector4">
+            <a:avLst>
+              <a:gd name="adj1" fmla="val -7375"/>
+              <a:gd name="adj2" fmla="val 183333"/>
+            </a:avLst>
+          </a:prstGeom>
+          <a:noFill/>
+          <a:ln w="25400" cap="flat" cmpd="sng" algn="ctr">
+            <a:solidFill>
+              <a:srgbClr val="FF0000"/>
+            </a:solidFill>
+            <a:prstDash val="solid"/>
+            <a:headEnd type="none"/>
+            <a:tailEnd type="stealth" w="lg" len="lg"/>
+          </a:ln>
+          <a:effectLst/>
+        </p:spPr>
+      </p:cxnSp>
+      <p:cxnSp>
+        <p:nvCxnSpPr>
+          <p:cNvPr id="30" name="Connector2"/>
+          <p:cNvCxnSpPr>
+            <a:extLst>
+              <a:ext uri="smNativeData">
+                <pr:smNativeData xmlns:pr="smNativeData" val="SMDATA_13_TQCXXhMAAAAlAAAADgAAAA8BAAAAkAAAAEgAAACQAAAASAAAAAAAAAAAAAAAAAAAAAEAAABQAAAAFMIlOiFc8r9VVVVVVVUFQAAAAAAAAOA/AAAAAAAA4D8AAAAAAADgPwAAAAAAAOA/AAAAAAAA4D8AAAAAAADgPwAAAAAAAOA/AAAAAAAA4D8CAAAAjAAAAAAAAAAAAAAAg8C6DP///wgAAAAAAAAAAAAAAAAAAAAAAAAAAAAAAAAAAAAAZAAAAAEAAABAAAAAAAAAAAAAAAAAAAAAAAAAAAAAAAAAAAAAAAAAAAAAAAAAAAAAAAAAAAAAAAAAAAAAAAAAAAAAAAAAAAAAAAAAAAAAAAAAAAAAAAAAAAAAAAAAAAAAFAAAADwAAAABAAAAAAAAAP8AAAAoAAAAAQAAABQAAAAUAAAAFAAAAAEAAAAAAAAAZAAAAGQAAAABAAAAlgAAAJYAAAAVAAAAYAAAAAAAAAAAAAAADwAAACADAAAAAAAAAAAAAAEAAACgMgAAVgcAAKr4//8BAAAAf39/AAEAAABkAAAAAAAAABQAAABAHwAAAAAAACYAAAAAAAAAwOD//wAAAAAmAAAAZAAAABYAAABMAAAAAAAAAAAAAAAEAAAAAAAAAAEAAADy8vIKAAAAACgAAAAoAAAAZAAAAGQAAAAAAAAAzMzMAAAAAABQAAAAUAAAAGQAAABkAAAAAAAAABcAAAAUAAAAAAAAAAAAAAD/fwAA/38AAAAAAAAJAAAABAAAAAABAAEMAAAAEAAAAAAAAAAAAAAAAAAAAAAAAAAeAAAAaAAAAAAAAAAAAAAAAAAAAAAAAAAAAAAAECcAABAnAAAAAAAAAAAAAAAAAAAAAAAAAAAAAAAAAAAAAAAAAAAAABQAAAAAAAAAwMD/AAAAAABkAAAAMgAAAAAAAABkAAAAAAAAAH9/fwAKAAAAHwAAAFQAAACDwLoF////AQAAAAAAAAAAAAAAAAAAAAAAAAAAAAAAAAAAAAAAAAAA/wAAAH9/fwDy8vIDzMzMAMDA/wB/f38AAAAAAAAAAAAAAAAAAAAAAAAAAAAhAAAAGAAAABQAAADGFwAAHRkAAF4iAAANGgAAAAAAACYAAAAIAAAA//////////8="/>
+              </a:ext>
+            </a:extLst>
+          </p:cNvCxnSpPr>
+          <p:nvPr/>
+        </p:nvCxnSpPr>
+        <p:spPr>
+          <a:xfrm rot="10800000">
+            <a:off x="3864610" y="4082415"/>
+            <a:ext cx="1722120" cy="152400"/>
+          </a:xfrm>
+          <a:prstGeom prst="bentConnector4">
+            <a:avLst>
+              <a:gd name="adj1" fmla="val -7375"/>
+              <a:gd name="adj2" fmla="val 183333"/>
+            </a:avLst>
+          </a:prstGeom>
+          <a:noFill/>
+          <a:ln w="25400" cap="flat" cmpd="sng" algn="ctr">
+            <a:solidFill>
+              <a:srgbClr val="FF0000"/>
+            </a:solidFill>
+            <a:prstDash val="solid"/>
+            <a:headEnd type="none"/>
+            <a:tailEnd type="stealth" w="lg" len="lg"/>
+          </a:ln>
+          <a:effectLst/>
+        </p:spPr>
+      </p:cxnSp>
+      <p:cxnSp>
+        <p:nvCxnSpPr>
+          <p:cNvPr id="31" name="Connector3"/>
+          <p:cNvCxnSpPr>
+            <a:extLst>
+              <a:ext uri="smNativeData">
+                <pr:smNativeData xmlns:pr="smNativeData" val="SMDATA_13_TQCXXhMAAAAlAAAADgAAAA8BAAAAkAAAAEgAAACQAAAASAAAAAAAAAAAAAAAAAAAAAEAAABQAAAAFMIlOiFc8r9VVVVVVVUFQAAAAAAAAOA/AAAAAAAA4D8AAAAAAADgPwAAAAAAAOA/AAAAAAAA4D8AAAAAAADgPwAAAAAAAOA/AAAAAAAA4D8CAAAAjAAAAAAAAAAAAAAAg8C6DP///wgAAAAAAAAAAAAAAAAAAAAAAAAAAAAAAAAAAAAAZAAAAAEAAABAAAAAAAAAAAAAAAAAAAAAAAAAAAAAAAAAAAAAAAAAAAAAAAAAAAAAAAAAAAAAAAAAAAAAAAAAAAAAAAAAAAAAAAAAAAAAAAAAAAAAAAAAAAAAAAAAAAAAFAAAADwAAAABAAAAAAAAAP8AAAAoAAAAAQAAABQAAAAUAAAAFAAAAAEAAAAAAAAAZAAAAGQAAAABAAAAlgAAAJYAAAAVAAAAYAAAAAAAAAAAAAAADwAAACADAAAAAAAAAAAAAAEAAACgMgAAVgcAAKr4//8BAAAAf39/AAEAAABkAAAAAAAAABQAAABAHwAAAAAAACYAAAAAAAAAwOD//wAAAAAmAAAAZAAAABYAAABMAAAAAAAAAAAAAAAEAAAAAAAAAAEAAADy8vIKAAAAACgAAAAoAAAAZAAAAGQAAAAAAAAAzMzMAAAAAABQAAAAUAAAAGQAAABkAAAAAAAAABcAAAAUAAAAAAAAAAAAAAD/fwAA/38AAAAAAAAJAAAABAAAAAABAAEMAAAAEAAAAAAAAAAAAAAAAAAAAAAAAAAeAAAAaAAAAAAAAAAAAAAAAAAAAAAAAAAAAAAAECcAABAnAAAAAAAAAAAAAAAAAAAAAAAAAAAAAAAAAAAAAAAAAAAAABQAAAAAAAAAwMD/AAAAAABkAAAAMgAAAAAAAABkAAAAAAAAAH9/fwAKAAAAHwAAAFQAAACDwLoF////AQAAAAAAAAAAAAAAAAAAAAAAAAAAAAAAAAAAAAAAAAAA/wAAAH9/fwDy8vIDzMzMAMDA/wB/f38AAAAAAAAAAAAAAAAAAAAAAAAAAAAhAAAAGAAAABQAAADnJQAALhkAAH8wAAAeGgAAAAAAACYAAAAIAAAA//////////8="/>
+              </a:ext>
+            </a:extLst>
+          </p:cNvCxnSpPr>
+          <p:nvPr/>
+        </p:nvCxnSpPr>
+        <p:spPr>
+          <a:xfrm rot="10800000">
+            <a:off x="6161405" y="4093210"/>
+            <a:ext cx="1722120" cy="152400"/>
+          </a:xfrm>
+          <a:prstGeom prst="bentConnector4">
+            <a:avLst>
+              <a:gd name="adj1" fmla="val -7375"/>
+              <a:gd name="adj2" fmla="val 183333"/>
+            </a:avLst>
+          </a:prstGeom>
+          <a:noFill/>
+          <a:ln w="25400" cap="flat" cmpd="sng" algn="ctr">
+            <a:solidFill>
+              <a:srgbClr val="FF0000"/>
+            </a:solidFill>
+            <a:prstDash val="solid"/>
+            <a:headEnd type="none"/>
+            <a:tailEnd type="stealth" w="lg" len="lg"/>
+          </a:ln>
+          <a:effectLst/>
+        </p:spPr>
+      </p:cxnSp>
+      <p:sp>
+        <p:nvSpPr>
+          <p:cNvPr id="32" name="Line13"/>
+          <p:cNvSpPr>
+            <a:extLst>
+              <a:ext uri="smNativeData">
+                <pr:smNativeData xmlns:pr="smNativeData" val="SMDATA_13_TQCXXhMAAAAlAAAACgAAAA8BAAAAkAAAAEgAAACQAAAASAAAAAAAAAAAAAAAAAAAAAEAAABQAAAAAAAAAAAA4D8AAAAAAADgPwAAAAAAAOA/AAAAAAAA4D8AAAAAAADgPwAAAAAAAOA/AAAAAAAA4D8AAAAAAADgPwAAAAAAAOA/AAAAAAAA4D8CAAAAjAAAAAAAAAAAAAAAg8C6DP///wgAAAAAAAAAAAAAAAAAAAAAAAAAAAAAAAAAAAAAZAAAAAEAAABAAAAAAAAAAAAAAAAAAAAAAAAAAAAAAAAAAAAAAAAAAAAAAAAAAAAAAAAAAAAAAAAAAAAAAAAAAAAAAAAAAAAAAAAAAAAAAAAAAAAAAAAAAAAAAAAAAAAAFAAAADwAAAABAAAAAAAAAAD/AAAoAAAAAQAAABQAAAAUAAAAFAAAAAEAAAAAAAAAZAAAAGQAAAABAAAAlgAAAJYAAAAVAAAAYAAAAAAAAAAAAAAADwAAACADAAAAAAAAAAAAAAEAAACgMgAAVgcAAKr4//8BAAAAf39/AAEAAABkAAAAAAAAABQAAABAHwAAAAAAACYAAAAAAAAAwOD//wAAAAAmAAAAZAAAABYAAABMAAAAAAAAAAAAAAAEAAAAAAAAAAEAAADy8vIKAAAAACgAAAAoAAAAZAAAAGQAAAAAAAAAzMzMAAAAAABQAAAAUAAAAGQAAABkAAAAAAAAABcAAAAUAAAAAAAAAAAAAAD/fwAA/38AAAAAAAAJAAAABAAAAAABAAEMAAAAEAAAAAAAAAAAAAAAAAAAAAAAAAAeAAAAaAAAAAAAAAAAAAAAAAAAAAAAAAAAAAAAECcAABAnAAAAAAAAAAAAAAAAAAAAAAAAAAAAAAAAAAAAAAAAAAAAABQAAAAAAAAAwMD/AAAAAABkAAAAMgAAAAAAAABkAAAAAAAAAH9/fwAKAAAAHwAAAFQAAACDwLoF////AQAAAAAAAAAAAAAAAAAAAAAAAAAAAAAAAAAAAAAAAAAAAP8AAH9/fwDy8vIDzMzMAMDA/wB/f38AAAAAAAAAAAAAAAAAAAAAAAAAAAAhAAAAGAAAABQAAABvEwAAnBgAALsVAACeGAAAAAAAACYAAAAIAAAA//////////8="/>
+              </a:ext>
+            </a:extLst>
+          </p:cNvSpPr>
+          <p:nvPr/>
+        </p:nvSpPr>
+        <p:spPr>
+          <a:xfrm flipV="1">
+            <a:off x="3159125" y="4000500"/>
+            <a:ext cx="373380" cy="1270"/>
+          </a:xfrm>
+          <a:prstGeom prst="line">
+            <a:avLst/>
+          </a:prstGeom>
+          <a:noFill/>
+          <a:ln w="25400" cap="flat" cmpd="sng" algn="ctr">
+            <a:solidFill>
+              <a:srgbClr val="00FF00"/>
+            </a:solidFill>
+            <a:prstDash val="solid"/>
+            <a:headEnd type="none"/>
+            <a:tailEnd type="stealth" w="lg" len="lg"/>
+          </a:ln>
+          <a:effectLst/>
+        </p:spPr>
+      </p:sp>
+      <p:sp>
+        <p:nvSpPr>
+          <p:cNvPr id="33" name="Line14"/>
+          <p:cNvSpPr>
+            <a:extLst>
+              <a:ext uri="smNativeData">
+                <pr:smNativeData xmlns:pr="smNativeData" val="SMDATA_13_TQCXXhMAAAAlAAAACgAAAA8BAAAAkAAAAEgAAACQAAAASAAAAAAAAAAAAAAAAAAAAAEAAABQAAAAAAAAAAAA4D8AAAAAAADgPwAAAAAAAOA/AAAAAAAA4D8AAAAAAADgPwAAAAAAAOA/AAAAAAAA4D8AAAAAAADgPwAAAAAAAOA/AAAAAAAA4D8CAAAAjAAAAAAAAAAAAAAAg8C6DP///wgAAAAAAAAAAAAAAAAAAAAAAAAAAAAAAAAAAAAAZAAAAAEAAABAAAAAAAAAAAAAAAAAAAAAAAAAAAAAAAAAAAAAAAAAAAAAAAAAAAAAAAAAAAAAAAAAAAAAAAAAAAAAAAAAAAAAAAAAAAAAAAAAAAAAAAAAAAAAAAAAAAAAFAAAADwAAAABAAAAAAAAAAD/AAAoAAAAAQAAABQAAAAUAAAAFAAAAAEAAAAAAAAAZAAAAGQAAAABAAAAlgAAAJYAAAAVAAAAYAAAAAAAAAAAAAAADwAAACADAAAAAAAAAAAAAAEAAACgMgAAVgcAAKr4//8BAAAAf39/AAEAAABkAAAAAAAAABQAAABAHwAAAAAAACYAAAAAAAAAwOD//wAAAAAmAAAAZAAAABYAAABMAAAAAAAAAAAAAAAEAAAAAAAAAAEAAADy8vIKAAAAACgAAAAoAAAAZAAAAGQAAAAAAAAAzMzMAAAAAABQAAAAUAAAAGQAAABkAAAAAAAAABcAAAAUAAAAAAAAAAAAAAD/fwAA/38AAAAAAAAJAAAABAAAAAABAAEMAAAAEAAAAAAAAAAAAAAAAAAAAAAAAAAeAAAAaAAAAAAAAAAAAAAAAAAAAAAAAAAAAAAAECcAABAnAAAAAAAAAAAAAAAAAAAAAAAAAAAAAAAAAAAAAAAAAAAAABQAAAAAAAAAwMD/AAAAAABkAAAAMgAAAAAAAABkAAAAAAAAAH9/fwAKAAAAHwAAAFQAAACDwLoF////AQAAAAAAAAAAAAAAAAAAAAAAAAAAAAAAAAAAAAAAAAAAAP8AAH9/fwDy8vIDzMzMAMDA/wB/f38AAAAAAAAAAAAAAAAAAAAAAAAAAAAhAAAAGAAAABQAAAAVIgAAnBgAAGEkAACeGAAAAAAAACYAAAAIAAAA//////////8="/>
+              </a:ext>
+            </a:extLst>
+          </p:cNvSpPr>
+          <p:nvPr/>
+        </p:nvSpPr>
+        <p:spPr>
+          <a:xfrm flipV="1">
+            <a:off x="5540375" y="4000500"/>
+            <a:ext cx="373380" cy="1270"/>
+          </a:xfrm>
+          <a:prstGeom prst="line">
+            <a:avLst/>
+          </a:prstGeom>
+          <a:noFill/>
+          <a:ln w="25400" cap="flat" cmpd="sng" algn="ctr">
+            <a:solidFill>
+              <a:srgbClr val="00FF00"/>
+            </a:solidFill>
+            <a:prstDash val="solid"/>
+            <a:headEnd type="none"/>
+            <a:tailEnd type="stealth" w="lg" len="lg"/>
+          </a:ln>
+          <a:effectLst/>
+        </p:spPr>
+      </p:sp>
+      <p:sp>
+        <p:nvSpPr>
+          <p:cNvPr id="34" name="Line15"/>
+          <p:cNvSpPr>
+            <a:extLst>
+              <a:ext uri="smNativeData">
+                <pr:smNativeData xmlns:pr="smNativeData" val="SMDATA_13_TQCXXhMAAAAlAAAACgAAAA8BAAAAkAAAAEgAAACQAAAASAAAAAAAAAAAAAAAAAAAAAEAAABQAAAAAAAAAAAA4D8AAAAAAADgPwAAAAAAAOA/AAAAAAAA4D8AAAAAAADgPwAAAAAAAOA/AAAAAAAA4D8AAAAAAADgPwAAAAAAAOA/AAAAAAAA4D8CAAAAjAAAAAAAAAAAAAAAg8C6DP///wgAAAAAAAAAAAAAAAAAAAAAAAAAAAAAAAAAAAAAZAAAAAEAAABAAAAAAAAAAAAAAAAAAAAAAAAAAAAAAAAAAAAAAAAAAAAAAAAAAAAAAAAAAAAAAAAAAAAAAAAAAAAAAAAAAAAAAAAAAAAAAAAAAAAAAAAAAAAAAAAAAAAAFAAAADwAAAABAAAAAAAAAAD/AAAoAAAAAQAAABQAAAAUAAAAFAAAAAEAAAAAAAAAZAAAAGQAAAABAAAAlgAAAJYAAAAVAAAAYAAAAAAAAAAAAAAADwAAACADAAAAAAAAAAAAAAEAAACgMgAAVgcAAKr4//8BAAAAf39/AAEAAABkAAAAAAAAABQAAABAHwAAAAAAACYAAAAAAAAAwOD//wAAAAAmAAAAZAAAABYAAABMAAAAAAAAAAAAAAAEAAAAAAAAAAEAAADy8vIKAAAAACgAAAAoAAAAZAAAAGQAAAAAAAAAzMzMAAAAAABQAAAAUAAAAGQAAABkAAAAAAAAABcAAAAUAAAAAAAAAAAAAAD/fwAA/38AAAAAAAAJAAAABAAAAAABAAEMAAAAEAAAAAAAAAAAAAAAAAAAAAAAAAAeAAAAaAAAAAAAAAAAAAAAAAAAAAAAAAAAAAAAECcAABAnAAAAAAAAAAAAAAAAAAAAAAAAAAAAAAAAAAAAAAAAAAAAABQAAAAAAAAAwMD/AAAAAABkAAAAMgAAAAAAAABkAAAAAAAAAH9/fwAKAAAAHwAAAFQAAACDwLoF////AQAAAAAAAAAAAAAAAAAAAAAAAAAAAAAAAAAAAAAAAAAAAP8AAH9/fwDy8vIDzMzMAMDA/wB/f38AAAAAAAAAAAAAAAAAAAAAAAAAAAAhAAAAGAAAABQAAACJMAAAnBgAANUyAACeGAAAAAAAACYAAAAIAAAA//////////8="/>
+              </a:ext>
+            </a:extLst>
+          </p:cNvSpPr>
+          <p:nvPr/>
+        </p:nvSpPr>
+        <p:spPr>
+          <a:xfrm flipV="1">
+            <a:off x="7889875" y="4000500"/>
+            <a:ext cx="373380" cy="1270"/>
+          </a:xfrm>
+          <a:prstGeom prst="line">
+            <a:avLst/>
+          </a:prstGeom>
+          <a:noFill/>
+          <a:ln w="25400" cap="flat" cmpd="sng" algn="ctr">
+            <a:solidFill>
+              <a:srgbClr val="00FF00"/>
+            </a:solidFill>
+            <a:prstDash val="solid"/>
+            <a:headEnd type="none"/>
+            <a:tailEnd type="stealth" w="lg" len="lg"/>
+          </a:ln>
+          <a:effectLst/>
+        </p:spPr>
+      </p:sp>
+      <p:sp>
+        <p:nvSpPr>
+          <p:cNvPr id="35" name="Line16"/>
+          <p:cNvSpPr>
+            <a:extLst>
+              <a:ext uri="smNativeData">
+                <pr:smNativeData xmlns:pr="smNativeData" val="SMDATA_13_TQCXXhMAAAAlAAAACgAAAA8BAAAAkAAAAEgAAACQAAAASAAAAAAAAAAAAAAAAAAAAAEAAABQAAAAAAAAAAAA4D8AAAAAAADgPwAAAAAAAOA/AAAAAAAA4D8AAAAAAADgPwAAAAAAAOA/AAAAAAAA4D8AAAAAAADgPwAAAAAAAOA/AAAAAAAA4D8CAAAAjAAAAAAAAAAAAAAAg8C6DP///wgAAAAAAAAAAAAAAAAAAAAAAAAAAAAAAAAAAAAAZAAAAAEAAABAAAAAAAAAAAAAAAAAAAAAAAAAAAAAAAAAAAAAAAAAAAAAAAAAAAAAAAAAAAAAAAAAAAAAAAAAAAAAAAAAAAAAAAAAAAAAAAAAAAAAAAAAAAAAAAAAAAAAFAAAADwAAAABAAAAAAAAAAD/AAAoAAAAAQAAABQAAAAUAAAAFAAAAAEAAAAAAAAAZAAAAGQAAAABAAAAlgAAAJYAAAAVAAAAYAAAAAAAAAAAAAAADwAAACADAAAAAAAAAAAAAAEAAACgMgAAVgcAAKr4//8BAAAAf39/AAEAAABkAAAAAAAAABQAAABAHwAAAAAAACYAAAAAAAAAwOD//wAAAAAmAAAAZAAAABYAAABMAAAAAAAAAAAAAAAEAAAAAAAAAAEAAADy8vIKAAAAACgAAAAoAAAAZAAAAGQAAAAAAAAAzMzMAAAAAABQAAAAUAAAAGQAAABkAAAAAAAAABcAAAAUAAAAAAAAAAAAAAD/fwAA/38AAAAAAAAJAAAABAAAAAABAAEMAAAAEAAAAAAAAAAAAAAAAAAAAAAAAAAeAAAAaAAAAAAAAAAAAAAAAAAAAAAAAAAAAAAAECcAABAnAAAAAAAAAAAAAAAAAAAAAAAAAAAAAAAAAAAAAAAAAAAAABQAAAAAAAAAwMD/AAAAAABkAAAAMgAAAAAAAABkAAAAAAAAAH9/fwAKAAAAHwAAAFQAAACDwLoF////AQAAAAAAAAAAAAAAAAAAAAAAAAAAAAAAAAAAAAAAAAAAAP8AAH9/fwDy8vIDzMzMAMDA/wB/f38AAAAAAAAAAAAAAAAAAAAAAAAAAAAhAAAAGAAAABQAAADJBAAAnBgAABUHAACeGAAAAAAAACYAAAAIAAAA//////////8="/>
+              </a:ext>
+            </a:extLst>
+          </p:cNvSpPr>
+          <p:nvPr/>
+        </p:nvSpPr>
+        <p:spPr>
+          <a:xfrm flipV="1">
+            <a:off x="777875" y="4000500"/>
+            <a:ext cx="373380" cy="1270"/>
+          </a:xfrm>
+          <a:prstGeom prst="line">
+            <a:avLst/>
+          </a:prstGeom>
+          <a:noFill/>
+          <a:ln w="25400" cap="flat" cmpd="sng" algn="ctr">
+            <a:solidFill>
+              <a:srgbClr val="00FF00"/>
+            </a:solidFill>
+            <a:prstDash val="solid"/>
+            <a:headEnd type="none"/>
+            <a:tailEnd type="stealth" w="lg" len="lg"/>
+          </a:ln>
+          <a:effectLst/>
+        </p:spPr>
+      </p:sp>
+      <p:sp>
+        <p:nvSpPr>
+          <p:cNvPr id="36" name="Textbox10"/>
+          <p:cNvSpPr txBox="1">
+            <a:extLst>
+              <a:ext uri="smNativeData">
+                <pr:smNativeData xmlns:pr="smNativeData" val="SMDATA_13_TQCXXhMAAAAlAAAAEgAAAA8BAAAAkAAAAEgAAACQAAAASAAAAAAAAAAAAAAAAAAAAAEAAABQAAAAAAAAAAAA4D8AAAAAAADgPwAAAAAAAOA/AAAAAAAA4D8AAAAAAADgPwAAAAAAAOA/AAAAAAAA4D8AAAAAAADgPwAAAAAAAOA/AAAAAAAA4D8CAAAAjAAAAAAAAAAAAAAAg8C6DP///wgAAAAAAAAAAAAAAAAAAAAAAAAAAAAAAAAAAAAAZAAAAAEAAABAAAAAAAAAAAAAAAAAAAAAAAAAAAAAAAAAAAAAAAAAAAAAAAAAAAAAAAAAAAAAAAAAAAAAAAAAAAAAAAAAAAAAAAAAAAAAAAAAAAAAAAAAAAAAAAAAAAAAFAAAADwAAAAAAAAAAAAAAAAAAAkUAAAAAQAAABQAAAAUAAAAFAAAAAEAAAAAAAAAZAAAAGQAAAAAAAAAZAAAAGQAAAAVAAAAYAAAAAAAAAAAAAAADwAAACADAAAAAAAAAAAAAAEAAACgMgAAVgcAAKr4//8BAAAAf39/AAEAAABkAAAAAAAAABQAAABAHwAAAAAAACYAAAAAAAAAwOD//wAAAAAmAAAAZAAAABYAAABMAAAAAAAAAAAAAAAEAAAAAAAAAAEAAADy8vIKAAAAACgAAAAoAAAAZAAAAGQAAAAAAAAAzMzMAAAAAABQAAAAUAAAAGQAAABkAAAAAAAAABcAAAAUAAAAAAAAAAAAAAD/fwAA/38AAAAAAAAJAAAABAAAAHlsZT4MAAAAEAAAAAAAAAAAAAAAAAAAAAAAAAAeAAAAaAAAAAAAAAAAAAAAAAAAAAAAAAAAAAAAECcAABAnAAAAAAAAAAAAAAAAAAAAAAAAAAAAAAAAAAAAAAAAAAAAABQAAAAAAAAAwMD/AAAAAABkAAAAMgAAAAAAAABkAAAAAAAAAH9/fwAKAAAAHwAAAFQAAACDwLoF////AQAAAAAAAAAAAAAAAAAAAAAAAAAAAAAAAAAAAAAAAAAAAAAAAn9/fwDy8vIDzMzMAMDA/wB/f38AAAAAAAAAAAAAAAAAAAAAAAAAAAAhAAAAGAAAABQAAAAVCQAAhxUAAFERAABnFwAAAAAAACYAAAAIAAAA//////////8="/>
+              </a:ext>
+            </a:extLst>
+          </p:cNvSpPr>
+          <p:nvPr/>
+        </p:nvSpPr>
+        <p:spPr>
+          <a:xfrm>
+            <a:off x="1476375" y="3499485"/>
+            <a:ext cx="1338580" cy="304800"/>
+          </a:xfrm>
+          <a:prstGeom prst="rect">
+            <a:avLst/>
+          </a:prstGeom>
+          <a:noFill/>
+          <a:ln>
+            <a:noFill/>
+          </a:ln>
+          <a:effectLst/>
+        </p:spPr>
+        <p:txBody>
+          <a:bodyPr vert="horz" wrap="square" numCol="1" spcCol="215900" anchor="t"/>
+          <a:lstStyle/>
+          <a:p>
+            <a:pPr marL="0" indent="0" algn="ctr" defTabSz="449580">
+              <a:spcBef>
+                <a:spcPts val="1000"/>
+              </a:spcBef>
+              <a:buNone/>
+              <a:tabLst/>
+              <a:defRPr sz="1400" b="1">
+                <a:latin typeface="Manjari" pitchFamily="1" charset="0"/>
+                <a:ea typeface="Manjari" pitchFamily="1" charset="0"/>
+                <a:cs typeface="Manjari" pitchFamily="1" charset="0"/>
+              </a:defRPr>
+            </a:pPr>
+            <a:r>
+              <a:t>Phase 1</a:t>
+            </a:r>
+          </a:p>
+        </p:txBody>
+      </p:sp>
+      <p:sp>
+        <p:nvSpPr>
+          <p:cNvPr id="37" name="Textbox11"/>
+          <p:cNvSpPr txBox="1">
+            <a:extLst>
+              <a:ext uri="smNativeData">
+                <pr:smNativeData xmlns:pr="smNativeData" val="SMDATA_13_TQCXXhMAAAAlAAAAEgAAAA8BAAAAkAAAAEgAAACQAAAASAAAAAAAAAAAAAAAAAAAAAEAAABQAAAAAAAAAAAA4D8AAAAAAADgPwAAAAAAAOA/AAAAAAAA4D8AAAAAAADgPwAAAAAAAOA/AAAAAAAA4D8AAAAAAADgPwAAAAAAAOA/AAAAAAAA4D8CAAAAjAAAAAAAAAAAAAAAg8C6DP///wgAAAAAAAAAAAAAAAAAAAAAAAAAAAAAAAAAAAAAZAAAAAEAAABAAAAAAAAAAAAAAAAAAAAAAAAAAAAAAAAAAAAAAAAAAAAAAAAAAAAAAAAAAAAAAAAAAAAAAAAAAAAAAAAAAAAAAAAAAAAAAAAAAAAAAAAAAAAAAAAAAAAAFAAAADwAAAAAAAAAAAAAAAAAAAkUAAAAAQAAABQAAAAUAAAAFAAAAAEAAAAAAAAAZAAAAGQAAAAAAAAAZAAAAGQAAAAVAAAAYAAAAAAAAAAAAAAADwAAACADAAAAAAAAAAAAAAEAAACgMgAAVgcAAKr4//8BAAAAf39/AAEAAABkAAAAAAAAABQAAABAHwAAAAAAACYAAAAAAAAAwOD//wAAAAAmAAAAZAAAABYAAABMAAAAAAAAAAAAAAAEAAAAAAAAAAEAAADy8vIKAAAAACgAAAAoAAAAZAAAAGQAAAAAAAAAzMzMAAAAAABQAAAAUAAAAGQAAABkAAAAAAAAABcAAAAUAAAAAAAAAAAAAAD/fwAA/38AAAAAAAAJAAAABAAAAHlsZT4MAAAAEAAAAAAAAAAAAAAAAAAAAAAAAAAeAAAAaAAAAAAAAAAAAAAAAAAAAAAAAAAAAAAAECcAABAnAAAAAAAAAAAAAAAAAAAAAAAAAAAAAAAAAAAAAAAAAAAAABQAAAAAAAAAwMD/AAAAAABkAAAAMgAAAAAAAABkAAAAAAAAAH9/fwAKAAAAHwAAAFQAAACDwLoF////AQAAAAAAAAAAAAAAAAAAAAAAAAAAAAAAAAAAAAAAAAAAAAAAAn9/fwDy8vIDzMzMAMDA/wB/f38AAAAAAAAAAAAAAAAAAAAAAAAAAAAhAAAAGAAAABQAAAAfGAAAhxUAAFsgAABnFwAAAAAAACYAAAAIAAAA//////////8="/>
+              </a:ext>
+            </a:extLst>
+          </p:cNvSpPr>
+          <p:nvPr/>
+        </p:nvSpPr>
+        <p:spPr>
+          <a:xfrm>
+            <a:off x="3921125" y="3499485"/>
+            <a:ext cx="1338580" cy="304800"/>
+          </a:xfrm>
+          <a:prstGeom prst="rect">
+            <a:avLst/>
+          </a:prstGeom>
+          <a:noFill/>
+          <a:ln>
+            <a:noFill/>
+          </a:ln>
+          <a:effectLst/>
+        </p:spPr>
+        <p:txBody>
+          <a:bodyPr vert="horz" wrap="square" numCol="1" spcCol="215900" anchor="t"/>
+          <a:lstStyle/>
+          <a:p>
+            <a:pPr marL="0" indent="0" algn="ctr" defTabSz="449580">
+              <a:spcBef>
+                <a:spcPts val="1000"/>
+              </a:spcBef>
+              <a:buNone/>
+              <a:tabLst/>
+              <a:defRPr sz="1400" b="1">
+                <a:latin typeface="Manjari" pitchFamily="1" charset="0"/>
+                <a:ea typeface="Manjari" pitchFamily="1" charset="0"/>
+                <a:cs typeface="Manjari" pitchFamily="1" charset="0"/>
+              </a:defRPr>
+            </a:pPr>
+            <a:r>
+              <a:t>Phase 2</a:t>
+            </a:r>
+          </a:p>
+        </p:txBody>
+      </p:sp>
+      <p:sp>
+        <p:nvSpPr>
+          <p:cNvPr id="38" name="Textbox12"/>
+          <p:cNvSpPr txBox="1">
+            <a:extLst>
+              <a:ext uri="smNativeData">
+                <pr:smNativeData xmlns:pr="smNativeData" val="SMDATA_13_TQCXXhMAAAAlAAAAEgAAAA8BAAAAkAAAAEgAAACQAAAASAAAAAAAAAAAAAAAAAAAAAEAAABQAAAAAAAAAAAA4D8AAAAAAADgPwAAAAAAAOA/AAAAAAAA4D8AAAAAAADgPwAAAAAAAOA/AAAAAAAA4D8AAAAAAADgPwAAAAAAAOA/AAAAAAAA4D8CAAAAjAAAAAAAAAAAAAAAg8C6DP///wgAAAAAAAAAAAAAAAAAAAAAAAAAAAAAAAAAAAAAZAAAAAEAAABAAAAAAAAAAAAAAAAAAAAAAAAAAAAAAAAAAAAAAAAAAAAAAAAAAAAAAAAAAAAAAAAAAAAAAAAAAAAAAAAAAAAAAAAAAAAAAAAAAAAAAAAAAAAAAAAAAAAAFAAAADwAAAAAAAAAAAAAAAAAAAkUAAAAAQAAABQAAAAUAAAAFAAAAAEAAAAAAAAAZAAAAGQAAAAAAAAAZAAAAGQAAAAVAAAAYAAAAAAAAAAAAAAADwAAACADAAAAAAAAAAAAAAEAAACgMgAAVgcAAKr4//8BAAAAf39/AAEAAABkAAAAAAAAABQAAABAHwAAAAAAACYAAAAAAAAAwOD//wAAAAAmAAAAZAAAABYAAABMAAAAAAAAAAAAAAAEAAAAAAAAAAEAAADy8vIKAAAAACgAAAAoAAAAZAAAAGQAAAAAAAAAzMzMAAAAAABQAAAAUAAAAGQAAABkAAAAAAAAABcAAAAUAAAAAAAAAAAAAAD/fwAA/38AAAAAAAAJAAAABAAAAHlsZT4MAAAAEAAAAAAAAAAAAAAAAAAAAAAAAAAeAAAAaAAAAAAAAAAAAAAAAAAAAAAAAAAAAAAAECcAABAnAAAAAAAAAAAAAAAAAAAAAAAAAAAAAAAAAAAAAAAAAAAAABQAAAAAAAAAwMD/AAAAAABkAAAAMgAAAAAAAABkAAAAAAAAAH9/fwAKAAAAHwAAAFQAAACDwLoF////AQAAAAAAAAAAAAAAAAAAAAAAAAAAAAAAAAAAAAAAAAAAAAAAAn9/fwDy8vIDzMzMAMDA/wB/f38AAAAAAAAAAAAAAAAAAAAAAAAAAAAhAAAAGAAAABQAAABhJgAAhxUAAJ0uAABnFwAAAAAAACYAAAAIAAAA//////////8="/>
+              </a:ext>
+            </a:extLst>
+          </p:cNvSpPr>
+          <p:nvPr/>
+        </p:nvSpPr>
+        <p:spPr>
+          <a:xfrm>
+            <a:off x="6238875" y="3499485"/>
+            <a:ext cx="1338580" cy="304800"/>
+          </a:xfrm>
+          <a:prstGeom prst="rect">
+            <a:avLst/>
+          </a:prstGeom>
+          <a:noFill/>
+          <a:ln>
+            <a:noFill/>
+          </a:ln>
+          <a:effectLst/>
+        </p:spPr>
+        <p:txBody>
+          <a:bodyPr vert="horz" wrap="square" numCol="1" spcCol="215900" anchor="t"/>
+          <a:lstStyle/>
+          <a:p>
+            <a:pPr marL="0" indent="0" algn="ctr" defTabSz="449580">
+              <a:spcBef>
+                <a:spcPts val="1000"/>
+              </a:spcBef>
+              <a:buNone/>
+              <a:tabLst/>
+              <a:defRPr sz="1400" b="1">
+                <a:latin typeface="Manjari" pitchFamily="1" charset="0"/>
+                <a:ea typeface="Manjari" pitchFamily="1" charset="0"/>
+                <a:cs typeface="Manjari" pitchFamily="1" charset="0"/>
+              </a:defRPr>
+            </a:pPr>
+            <a:r>
+              <a:t>Phase 3</a:t>
+            </a:r>
+          </a:p>
+        </p:txBody>
+      </p:sp>
+      <p:sp>
+        <p:nvSpPr>
+          <p:cNvPr id="39" name="Textbox13"/>
+          <p:cNvSpPr txBox="1">
+            <a:extLst>
+              <a:ext uri="smNativeData">
+                <pr:smNativeData xmlns:pr="smNativeData" val="SMDATA_13_TQCXXhMAAAAlAAAAEgAAAA8BAAAAkAAAAEgAAACQAAAASAAAAAAAAAAAAAAAAAAAAAEAAABQAAAAAAAAAAAA4D8AAAAAAADgPwAAAAAAAOA/AAAAAAAA4D8AAAAAAADgPwAAAAAAAOA/AAAAAAAA4D8AAAAAAADgPwAAAAAAAOA/AAAAAAAA4D8CAAAAjAAAAAAAAAAAAAAAg8C6DP///wgAAAAAAAAAAAAAAAAAAAAAAAAAAAAAAAAAAAAAZAAAAAEAAABAAAAAAAAAAAAAAAAAAAAAAAAAAAAAAAAAAAAAAAAAAAAAAAAAAAAAAAAAAAAAAAAAAAAAAAAAAAAAAAAAAAAAAAAAAAAAAAAAAAAAAAAAAAAAAAAAAAAAFAAAADwAAAAAAAAAAAAAAAAAAAkUAAAAAQAAABQAAAAUAAAAFAAAAAEAAAAAAAAAZAAAAGQAAAAAAAAAZAAAAGQAAAAVAAAAYAAAAAAAAAAAAAAADwAAACADAAAAAAAAAAAAAAEAAACgMgAAVgcAAKr4//8BAAAAf39/AAEAAABkAAAAAAAAABQAAABAHwAAAAAAACYAAAAAAAAAwOD//wAAAAAmAAAAZAAAABYAAABMAAAAAAAAAAAAAAAEAAAAAAAAAAEAAADy8vIKAAAAACgAAAAoAAAAZAAAAGQAAAAAAAAAzMzMAAAAAABQAAAAUAAAAGQAAABkAAAAAAAAABcAAAAUAAAAAAAAAAAAAAD/fwAA/38AAAAAAAAJAAAABAAAAIAAAAAMAAAAEAAAAAAAAAAAAAAAAAAAAAAAAAAeAAAAaAAAAAAAAAAAAAAAAAAAAAAAAAAAAAAAECcAABAnAAAAAAAAAAAAAAAAAAAAAAAAAAAAAAAAAAAAAAAAAAAAABQAAAAAAAAAwMD/AAAAAABkAAAAMgAAAAAAAABkAAAAAAAAAH9/fwAKAAAAHwAAAFQAAACDwLoF////AQAAAAAAAAAAAAAAAAAAAAAAAAAAAAAAAAAAAAAAAAAAAAAAAn9/fwDy8vIDzMzMAMDA/wB/f38AAAAAAAAAAAAAAAAAAAAAAAAAAAAhAAAAGAAAABQAAAC7FQAA7hIAAPcdAADOFAAAAAAAACYAAAAIAAAA//////////8="/>
+              </a:ext>
+            </a:extLst>
+          </p:cNvSpPr>
+          <p:nvPr/>
+        </p:nvSpPr>
+        <p:spPr>
+          <a:xfrm>
+            <a:off x="3532505" y="3077210"/>
+            <a:ext cx="1338580" cy="304800"/>
+          </a:xfrm>
+          <a:prstGeom prst="rect">
+            <a:avLst/>
+          </a:prstGeom>
+          <a:noFill/>
+          <a:ln>
+            <a:noFill/>
+          </a:ln>
+          <a:effectLst/>
+        </p:spPr>
+        <p:txBody>
+          <a:bodyPr vert="horz" wrap="square" numCol="1" spcCol="215900" anchor="t"/>
+          <a:lstStyle/>
+          <a:p>
+            <a:pPr marL="0" indent="0" algn="ctr" defTabSz="449580">
+              <a:spcBef>
+                <a:spcPts val="1000"/>
+              </a:spcBef>
+              <a:buNone/>
+              <a:tabLst/>
+              <a:defRPr sz="1400" b="1">
+                <a:latin typeface="Manjari" pitchFamily="1" charset="0"/>
+                <a:ea typeface="Manjari" pitchFamily="1" charset="0"/>
+                <a:cs typeface="Manjari" pitchFamily="1" charset="0"/>
+              </a:defRPr>
+            </a:pPr>
+            <a:r>
+              <a:t>Project</a:t>
+            </a:r>
+          </a:p>
+        </p:txBody>
+      </p:sp>
+      <p:sp>
+        <p:nvSpPr>
+          <p:cNvPr id="40" name="Textbox14"/>
+          <p:cNvSpPr txBox="1">
+            <a:extLst>
+              <a:ext uri="smNativeData">
+                <pr:smNativeData xmlns:pr="smNativeData" val="SMDATA_13_TQCXXhMAAAAlAAAAEgAAAA8BAAAAkAAAAEgAAACQAAAASAAAAAAAAAAAAAAAAAAAAAEAAABQAAAAAAAAAAAA4D8AAAAAAADgPwAAAAAAAOA/AAAAAAAA4D8AAAAAAADgPwAAAAAAAOA/AAAAAAAA4D8AAAAAAADgPwAAAAAAAOA/AAAAAAAA4D8CAAAAjAAAAAAAAAAAAAAAg8C6DP///wgAAAAAAAAAAAAAAAAAAAAAAAAAAAAAAAAAAAAAZAAAAAEAAABAAAAAAAAAAAAAAAAAAAAAAAAAAAAAAAAAAAAAAAAAAAAAAAAAAAAAAAAAAAAAAAAAAAAAAAAAAAAAAAAAAAAAAAAAAAAAAAAAAAAAAAAAAAAAAAAAAAAAFAAAADwAAAAAAAAAAAAAAAAAAAkUAAAAAQAAABQAAAAUAAAAFAAAAAEAAAAAAAAAZAAAAGQAAAAAAAAAZAAAAGQAAAAVAAAAYAAAAAAAAAAAAAAADwAAACADAAAAAAAAAAAAAAEAAACgMgAAVgcAAKr4//8BAAAAf39/AAEAAABkAAAAAAAAABQAAABAHwAAAAAAACYAAAAAAAAAwOD//wAAAAAmAAAAZAAAABYAAABMAAAAAAAAAAAAAAAEAAAAAAAAAAEAAADy8vIKAAAAACgAAAAoAAAAZAAAAGQAAAAAAAAAzMzMAAAAAABQAAAAUAAAAGQAAABkAAAAAAAAABcAAAAUAAAAAAAAAAAAAAD/fwAA/38AAAAAAAAJAAAABAAAAHlsZT4MAAAAEAAAAAAAAAAAAAAAAAAAAAAAAAAeAAAAaAAAAAAAAAAAAAAAAAAAAAAAAAAAAAAAECcAABAnAAAAAAAAAAAAAAAAAAAAAAAAAAAAAAAAAAAAAAAAAAAAABQAAAAAAAAAwMD/AAAAAABkAAAAMgAAAAAAAABkAAAAAAAAAH9/fwAKAAAAHwAAAFQAAACDwLoF////AQAAAAAAAAAAAAAAAAAAAAAAAAAAAAAAAAAAAAAAAAAAAAAAAn9/fwDy8vIDzMzMAMDA/wB/f38AAAAAAAAAAAAAAAAAAAAAAAAAAAAhAAAAGAAAABQAAABMAAAAQBcAAHIFAADmGQAAAAAAACYAAAAIAAAA//////////8="/>
+              </a:ext>
+            </a:extLst>
+          </p:cNvSpPr>
+          <p:nvPr/>
+        </p:nvSpPr>
+        <p:spPr>
+          <a:xfrm>
+            <a:off x="48260" y="3779520"/>
+            <a:ext cx="836930" cy="430530"/>
+          </a:xfrm>
+          <a:prstGeom prst="rect">
+            <a:avLst/>
+          </a:prstGeom>
+          <a:noFill/>
+          <a:ln>
+            <a:noFill/>
+          </a:ln>
+          <a:effectLst/>
+        </p:spPr>
+        <p:txBody>
+          <a:bodyPr vert="horz" wrap="square" numCol="1" spcCol="215900" anchor="t"/>
+          <a:lstStyle/>
+          <a:p>
+            <a:pPr marL="0" indent="0" algn="ctr" defTabSz="449580">
+              <a:spcBef>
+                <a:spcPts val="1000"/>
+              </a:spcBef>
+              <a:buNone/>
+              <a:tabLst/>
+              <a:defRPr sz="1200" b="1">
+                <a:latin typeface="Manjari" pitchFamily="1" charset="0"/>
+                <a:ea typeface="Manjari" pitchFamily="1" charset="0"/>
+                <a:cs typeface="Manjari" pitchFamily="1" charset="0"/>
+              </a:defRPr>
+            </a:pPr>
+            <a:r>
+              <a:t>Project start</a:t>
+            </a:r>
+          </a:p>
+        </p:txBody>
+      </p:sp>
+      <p:sp>
+        <p:nvSpPr>
+          <p:cNvPr id="41" name="Textbox15"/>
+          <p:cNvSpPr txBox="1">
+            <a:extLst>
+              <a:ext uri="smNativeData">
+                <pr:smNativeData xmlns:pr="smNativeData" val="SMDATA_13_TQCXXhMAAAAlAAAAEgAAAA8BAAAAkAAAAEgAAACQAAAASAAAAAAAAAAAAAAAAAAAAAEAAABQAAAAAAAAAAAA4D8AAAAAAADgPwAAAAAAAOA/AAAAAAAA4D8AAAAAAADgPwAAAAAAAOA/AAAAAAAA4D8AAAAAAADgPwAAAAAAAOA/AAAAAAAA4D8CAAAAjAAAAAAAAAAAAAAAg8C6DP///wgAAAAAAAAAAAAAAAAAAAAAAAAAAAAAAAAAAAAAZAAAAAEAAABAAAAAAAAAAAAAAAAAAAAAAAAAAAAAAAAAAAAAAAAAAAAAAAAAAAAAAAAAAAAAAAAAAAAAAAAAAAAAAAAAAAAAAAAAAAAAAAAAAAAAAAAAAAAAAAAAAAAAFAAAADwAAAAAAAAAAAAAAAAAAAkUAAAAAQAAABQAAAAUAAAAFAAAAAEAAAAAAAAAZAAAAGQAAAAAAAAAZAAAAGQAAAAVAAAAYAAAAAAAAAAAAAAADwAAACADAAAAAAAAAAAAAAEAAACgMgAAVgcAAKr4//8BAAAAf39/AAEAAABkAAAAAAAAABQAAABAHwAAAAAAACYAAAAAAAAAwOD//wAAAAAmAAAAZAAAABYAAABMAAAAAAAAAAAAAAAEAAAAAAAAAAEAAADy8vIKAAAAACgAAAAoAAAAZAAAAGQAAAAAAAAAzMzMAAAAAABQAAAAUAAAAGQAAABkAAAAAAAAABcAAAAUAAAAAAAAAAAAAAD/fwAA/38AAAAAAAAJAAAABAAAAHlsZT4MAAAAEAAAAAAAAAAAAAAAAAAAAAAAAAAeAAAAaAAAAAAAAAAAAAAAAAAAAAAAAAAAAAAAECcAABAnAAAAAAAAAAAAAAAAAAAAAAAAAAAAAAAAAAAAAAAAAAAAABQAAAAAAAAAwMD/AAAAAABkAAAAMgAAAAAAAABkAAAAAAAAAH9/fwAKAAAAHwAAAFQAAACDwLoF////AQAAAAAAAAAAAAAAAAAAAAAAAAAAAAAAAAAAAAAAAAAAAAAAAn9/fwDy8vIDzMzMAMDA/wB/f38AAAAAAAAAAAAAAAAAAAAAAAAAAAAhAAAAGAAAABQAAAB9MQAAJhcAANw3AADMGQAAAAAAACYAAAAIAAAA//////////8="/>
+              </a:ext>
+            </a:extLst>
+          </p:cNvSpPr>
+          <p:nvPr/>
+        </p:nvSpPr>
+        <p:spPr>
+          <a:xfrm>
+            <a:off x="8044815" y="3763010"/>
+            <a:ext cx="1035685" cy="430530"/>
+          </a:xfrm>
+          <a:prstGeom prst="rect">
+            <a:avLst/>
+          </a:prstGeom>
+          <a:noFill/>
+          <a:ln>
+            <a:noFill/>
+          </a:ln>
+          <a:effectLst/>
+        </p:spPr>
+        <p:txBody>
+          <a:bodyPr vert="horz" wrap="square" numCol="1" spcCol="215900" anchor="t"/>
+          <a:lstStyle/>
+          <a:p>
+            <a:pPr marL="0" indent="0" algn="ctr" defTabSz="449580">
+              <a:spcBef>
+                <a:spcPts val="1000"/>
+              </a:spcBef>
+              <a:buNone/>
+              <a:tabLst/>
+              <a:defRPr sz="1200" b="1">
+                <a:latin typeface="Manjari" pitchFamily="1" charset="0"/>
+                <a:ea typeface="Manjari" pitchFamily="1" charset="0"/>
+                <a:cs typeface="Manjari" pitchFamily="1" charset="0"/>
+              </a:defRPr>
+            </a:pPr>
+            <a:r>
+              <a:t>Project completed</a:t>
             </a:r>
           </a:p>
         </p:txBody>
@@ -4893,6 +6354,47 @@
       </a:clrScheme>
       <a:clrMap bg1="lt1" tx1="dk1" bg2="lt2" tx2="dk2" accent1="accent1" accent2="accent2" accent3="accent3" accent4="accent4" accent5="accent5" accent6="accent6" hlink="hlink" folHlink="folHlink"/>
     </a:extraClrScheme>
+    <a:extraClrScheme>
+      <a:clrScheme name="Presentation 4">
+        <a:dk1>
+          <a:srgbClr val="000000"/>
+        </a:dk1>
+        <a:lt1>
+          <a:srgbClr val="FFFFFF"/>
+        </a:lt1>
+        <a:dk2>
+          <a:srgbClr val="000000"/>
+        </a:dk2>
+        <a:lt2>
+          <a:srgbClr val="F2F2F2"/>
+        </a:lt2>
+        <a:accent1>
+          <a:srgbClr val="83C0BA"/>
+        </a:accent1>
+        <a:accent2>
+          <a:srgbClr val="F3AA21"/>
+        </a:accent2>
+        <a:accent3>
+          <a:srgbClr val="535379"/>
+        </a:accent3>
+        <a:accent4>
+          <a:srgbClr val="737359"/>
+        </a:accent4>
+        <a:accent5>
+          <a:srgbClr val="939339"/>
+        </a:accent5>
+        <a:accent6>
+          <a:srgbClr val="B3B319"/>
+        </a:accent6>
+        <a:hlink>
+          <a:srgbClr val="009999"/>
+        </a:hlink>
+        <a:folHlink>
+          <a:srgbClr val="99CC00"/>
+        </a:folHlink>
+      </a:clrScheme>
+      <a:clrMap bg1="lt1" tx1="dk1" bg2="lt2" tx2="dk2" accent1="accent1" accent2="accent2" accent3="accent3" accent4="accent4" accent5="accent5" accent6="accent6" hlink="hlink" folHlink="folHlink"/>
+    </a:extraClrScheme>
   </a:extraClrSchemeLst>
 </a:theme>
 </file>
</xml_diff>